<commit_message>
Finished sketches for stories 32 - 34
Stories finalizadas para las historias 32 y 34 - Leonardo Guillermo Falcón Choque
</commit_message>
<xml_diff>
--- a/Sketches/FirstSketch.pptx
+++ b/Sketches/FirstSketch.pptx
@@ -5,7 +5,7 @@
     <p:sldMasterId id="2147483648" r:id="rId1"/>
   </p:sldMasterIdLst>
   <p:notesMasterIdLst>
-    <p:notesMasterId r:id="rId9"/>
+    <p:notesMasterId r:id="rId11"/>
   </p:notesMasterIdLst>
   <p:sldIdLst>
     <p:sldId id="256" r:id="rId2"/>
@@ -15,6 +15,8 @@
     <p:sldId id="261" r:id="rId6"/>
     <p:sldId id="262" r:id="rId7"/>
     <p:sldId id="258" r:id="rId8"/>
+    <p:sldId id="263" r:id="rId9"/>
+    <p:sldId id="264" r:id="rId10"/>
   </p:sldIdLst>
   <p:sldSz cx="12192000" cy="6858000"/>
   <p:notesSz cx="6858000" cy="9144000"/>
@@ -149,12 +151,17 @@
         <p14:section name="Admin" id="{16633886-2928-4DF3-9242-ECE0CC87B032}">
           <p14:sldIdLst>
             <p14:sldId id="258"/>
+            <p14:sldId id="263"/>
+            <p14:sldId id="264"/>
           </p14:sldIdLst>
         </p14:section>
         <p14:section name="Historial" id="{A14A4C41-277E-4280-BE8E-99581EE611B9}">
           <p14:sldIdLst/>
         </p14:section>
       </p14:sectionLst>
+    </p:ext>
+    <p:ext uri="{EFAFB233-063F-42B5-8137-9DF3F51BA10A}">
+      <p15:sldGuideLst xmlns:p15="http://schemas.microsoft.com/office/powerpoint/2012/main"/>
     </p:ext>
   </p:extLst>
 </p:presentation>
@@ -242,7 +249,7 @@
           <a:p>
             <a:fld id="{9F762629-5791-4A1C-941B-D0DB9326C820}" type="datetimeFigureOut">
               <a:rPr lang="es-PE" smtClean="0"/>
-              <a:t>5/02/2022</a:t>
+              <a:t>6/02/2022</a:t>
             </a:fld>
             <a:endParaRPr lang="es-PE"/>
           </a:p>
@@ -743,7 +750,7 @@
           <a:p>
             <a:fld id="{68D45077-6B19-4A94-B2AE-137AD1A11870}" type="datetimeFigureOut">
               <a:rPr lang="es-PE" smtClean="0"/>
-              <a:t>5/02/2022</a:t>
+              <a:t>6/02/2022</a:t>
             </a:fld>
             <a:endParaRPr lang="es-PE"/>
           </a:p>
@@ -943,7 +950,7 @@
           <a:p>
             <a:fld id="{68D45077-6B19-4A94-B2AE-137AD1A11870}" type="datetimeFigureOut">
               <a:rPr lang="es-PE" smtClean="0"/>
-              <a:t>5/02/2022</a:t>
+              <a:t>6/02/2022</a:t>
             </a:fld>
             <a:endParaRPr lang="es-PE"/>
           </a:p>
@@ -1153,7 +1160,7 @@
           <a:p>
             <a:fld id="{68D45077-6B19-4A94-B2AE-137AD1A11870}" type="datetimeFigureOut">
               <a:rPr lang="es-PE" smtClean="0"/>
-              <a:t>5/02/2022</a:t>
+              <a:t>6/02/2022</a:t>
             </a:fld>
             <a:endParaRPr lang="es-PE"/>
           </a:p>
@@ -1353,7 +1360,7 @@
           <a:p>
             <a:fld id="{68D45077-6B19-4A94-B2AE-137AD1A11870}" type="datetimeFigureOut">
               <a:rPr lang="es-PE" smtClean="0"/>
-              <a:t>5/02/2022</a:t>
+              <a:t>6/02/2022</a:t>
             </a:fld>
             <a:endParaRPr lang="es-PE"/>
           </a:p>
@@ -1629,7 +1636,7 @@
           <a:p>
             <a:fld id="{68D45077-6B19-4A94-B2AE-137AD1A11870}" type="datetimeFigureOut">
               <a:rPr lang="es-PE" smtClean="0"/>
-              <a:t>5/02/2022</a:t>
+              <a:t>6/02/2022</a:t>
             </a:fld>
             <a:endParaRPr lang="es-PE"/>
           </a:p>
@@ -1897,7 +1904,7 @@
           <a:p>
             <a:fld id="{68D45077-6B19-4A94-B2AE-137AD1A11870}" type="datetimeFigureOut">
               <a:rPr lang="es-PE" smtClean="0"/>
-              <a:t>5/02/2022</a:t>
+              <a:t>6/02/2022</a:t>
             </a:fld>
             <a:endParaRPr lang="es-PE"/>
           </a:p>
@@ -2312,7 +2319,7 @@
           <a:p>
             <a:fld id="{68D45077-6B19-4A94-B2AE-137AD1A11870}" type="datetimeFigureOut">
               <a:rPr lang="es-PE" smtClean="0"/>
-              <a:t>5/02/2022</a:t>
+              <a:t>6/02/2022</a:t>
             </a:fld>
             <a:endParaRPr lang="es-PE"/>
           </a:p>
@@ -2454,7 +2461,7 @@
           <a:p>
             <a:fld id="{68D45077-6B19-4A94-B2AE-137AD1A11870}" type="datetimeFigureOut">
               <a:rPr lang="es-PE" smtClean="0"/>
-              <a:t>5/02/2022</a:t>
+              <a:t>6/02/2022</a:t>
             </a:fld>
             <a:endParaRPr lang="es-PE"/>
           </a:p>
@@ -2567,7 +2574,7 @@
           <a:p>
             <a:fld id="{68D45077-6B19-4A94-B2AE-137AD1A11870}" type="datetimeFigureOut">
               <a:rPr lang="es-PE" smtClean="0"/>
-              <a:t>5/02/2022</a:t>
+              <a:t>6/02/2022</a:t>
             </a:fld>
             <a:endParaRPr lang="es-PE"/>
           </a:p>
@@ -2880,7 +2887,7 @@
           <a:p>
             <a:fld id="{68D45077-6B19-4A94-B2AE-137AD1A11870}" type="datetimeFigureOut">
               <a:rPr lang="es-PE" smtClean="0"/>
-              <a:t>5/02/2022</a:t>
+              <a:t>6/02/2022</a:t>
             </a:fld>
             <a:endParaRPr lang="es-PE"/>
           </a:p>
@@ -3169,7 +3176,7 @@
           <a:p>
             <a:fld id="{68D45077-6B19-4A94-B2AE-137AD1A11870}" type="datetimeFigureOut">
               <a:rPr lang="es-PE" smtClean="0"/>
-              <a:t>5/02/2022</a:t>
+              <a:t>6/02/2022</a:t>
             </a:fld>
             <a:endParaRPr lang="es-PE"/>
           </a:p>
@@ -3412,7 +3419,7 @@
           <a:p>
             <a:fld id="{68D45077-6B19-4A94-B2AE-137AD1A11870}" type="datetimeFigureOut">
               <a:rPr lang="es-PE" smtClean="0"/>
-              <a:t>5/02/2022</a:t>
+              <a:t>6/02/2022</a:t>
             </a:fld>
             <a:endParaRPr lang="es-PE"/>
           </a:p>
@@ -10778,6 +10785,4529 @@
     <p:extLst>
       <p:ext uri="{BB962C8B-B14F-4D97-AF65-F5344CB8AC3E}">
         <p14:creationId xmlns:p14="http://schemas.microsoft.com/office/powerpoint/2010/main" val="1785386796"/>
+      </p:ext>
+    </p:extLst>
+  </p:cSld>
+  <p:clrMapOvr>
+    <a:masterClrMapping/>
+  </p:clrMapOvr>
+</p:sld>
+</file>
+
+<file path=ppt/slides/slide8.xml><?xml version="1.0" encoding="utf-8"?>
+<p:sld xmlns:a="http://schemas.openxmlformats.org/drawingml/2006/main" xmlns:r="http://schemas.openxmlformats.org/officeDocument/2006/relationships" xmlns:p="http://schemas.openxmlformats.org/presentationml/2006/main">
+  <p:cSld>
+    <p:spTree>
+      <p:nvGrpSpPr>
+        <p:cNvPr id="1" name=""/>
+        <p:cNvGrpSpPr/>
+        <p:nvPr/>
+      </p:nvGrpSpPr>
+      <p:grpSpPr>
+        <a:xfrm>
+          <a:off x="0" y="0"/>
+          <a:ext cx="0" cy="0"/>
+          <a:chOff x="0" y="0"/>
+          <a:chExt cx="0" cy="0"/>
+        </a:xfrm>
+      </p:grpSpPr>
+      <p:sp>
+        <p:nvSpPr>
+          <p:cNvPr id="4" name="Rectángulo 3">
+            <a:extLst>
+              <a:ext uri="{FF2B5EF4-FFF2-40B4-BE49-F238E27FC236}">
+                <a16:creationId xmlns:a16="http://schemas.microsoft.com/office/drawing/2014/main" id="{7D0C1056-F063-4295-9589-100A21F99782}"/>
+              </a:ext>
+            </a:extLst>
+          </p:cNvPr>
+          <p:cNvSpPr/>
+          <p:nvPr/>
+        </p:nvSpPr>
+        <p:spPr>
+          <a:xfrm>
+            <a:off x="182880" y="182880"/>
+            <a:ext cx="11695176" cy="1124712"/>
+          </a:xfrm>
+          <a:prstGeom prst="rect">
+            <a:avLst/>
+          </a:prstGeom>
+        </p:spPr>
+        <p:style>
+          <a:lnRef idx="2">
+            <a:schemeClr val="dk1"/>
+          </a:lnRef>
+          <a:fillRef idx="1">
+            <a:schemeClr val="lt1"/>
+          </a:fillRef>
+          <a:effectRef idx="0">
+            <a:schemeClr val="dk1"/>
+          </a:effectRef>
+          <a:fontRef idx="minor">
+            <a:schemeClr val="dk1"/>
+          </a:fontRef>
+        </p:style>
+        <p:txBody>
+          <a:bodyPr rtlCol="0" anchor="ctr"/>
+          <a:lstStyle/>
+          <a:p>
+            <a:pPr algn="ctr"/>
+            <a:endParaRPr lang="es-PE"/>
+          </a:p>
+        </p:txBody>
+      </p:sp>
+      <p:sp>
+        <p:nvSpPr>
+          <p:cNvPr id="5" name="Rectángulo 4">
+            <a:extLst>
+              <a:ext uri="{FF2B5EF4-FFF2-40B4-BE49-F238E27FC236}">
+                <a16:creationId xmlns:a16="http://schemas.microsoft.com/office/drawing/2014/main" id="{FB0592F0-31E3-4A12-9D00-8202A4B8AF40}"/>
+              </a:ext>
+            </a:extLst>
+          </p:cNvPr>
+          <p:cNvSpPr/>
+          <p:nvPr/>
+        </p:nvSpPr>
+        <p:spPr>
+          <a:xfrm>
+            <a:off x="182880" y="1417320"/>
+            <a:ext cx="11695176" cy="3968496"/>
+          </a:xfrm>
+          <a:prstGeom prst="rect">
+            <a:avLst/>
+          </a:prstGeom>
+        </p:spPr>
+        <p:style>
+          <a:lnRef idx="2">
+            <a:schemeClr val="dk1"/>
+          </a:lnRef>
+          <a:fillRef idx="1">
+            <a:schemeClr val="lt1"/>
+          </a:fillRef>
+          <a:effectRef idx="0">
+            <a:schemeClr val="dk1"/>
+          </a:effectRef>
+          <a:fontRef idx="minor">
+            <a:schemeClr val="dk1"/>
+          </a:fontRef>
+        </p:style>
+        <p:txBody>
+          <a:bodyPr rtlCol="0" anchor="ctr"/>
+          <a:lstStyle/>
+          <a:p>
+            <a:pPr algn="ctr"/>
+            <a:endParaRPr lang="es-PE"/>
+          </a:p>
+        </p:txBody>
+      </p:sp>
+      <p:sp>
+        <p:nvSpPr>
+          <p:cNvPr id="6" name="Rectángulo 5">
+            <a:extLst>
+              <a:ext uri="{FF2B5EF4-FFF2-40B4-BE49-F238E27FC236}">
+                <a16:creationId xmlns:a16="http://schemas.microsoft.com/office/drawing/2014/main" id="{15921A5A-FAF3-418A-99AE-B7FC9DD7959F}"/>
+              </a:ext>
+            </a:extLst>
+          </p:cNvPr>
+          <p:cNvSpPr/>
+          <p:nvPr/>
+        </p:nvSpPr>
+        <p:spPr>
+          <a:xfrm>
+            <a:off x="182880" y="5495544"/>
+            <a:ext cx="11695176" cy="1179576"/>
+          </a:xfrm>
+          <a:prstGeom prst="rect">
+            <a:avLst/>
+          </a:prstGeom>
+        </p:spPr>
+        <p:style>
+          <a:lnRef idx="2">
+            <a:schemeClr val="dk1"/>
+          </a:lnRef>
+          <a:fillRef idx="1">
+            <a:schemeClr val="lt1"/>
+          </a:fillRef>
+          <a:effectRef idx="0">
+            <a:schemeClr val="dk1"/>
+          </a:effectRef>
+          <a:fontRef idx="minor">
+            <a:schemeClr val="dk1"/>
+          </a:fontRef>
+        </p:style>
+        <p:txBody>
+          <a:bodyPr rtlCol="0" anchor="ctr"/>
+          <a:lstStyle/>
+          <a:p>
+            <a:pPr algn="ctr"/>
+            <a:endParaRPr lang="es-PE"/>
+          </a:p>
+        </p:txBody>
+      </p:sp>
+      <p:sp>
+        <p:nvSpPr>
+          <p:cNvPr id="7" name="Rectángulo 6">
+            <a:extLst>
+              <a:ext uri="{FF2B5EF4-FFF2-40B4-BE49-F238E27FC236}">
+                <a16:creationId xmlns:a16="http://schemas.microsoft.com/office/drawing/2014/main" id="{9A05CB20-1A4C-44A9-BCFA-BACA053BB6D0}"/>
+              </a:ext>
+            </a:extLst>
+          </p:cNvPr>
+          <p:cNvSpPr/>
+          <p:nvPr/>
+        </p:nvSpPr>
+        <p:spPr>
+          <a:xfrm>
+            <a:off x="310896" y="292608"/>
+            <a:ext cx="2816352" cy="905256"/>
+          </a:xfrm>
+          <a:prstGeom prst="rect">
+            <a:avLst/>
+          </a:prstGeom>
+        </p:spPr>
+        <p:style>
+          <a:lnRef idx="2">
+            <a:schemeClr val="dk1"/>
+          </a:lnRef>
+          <a:fillRef idx="1">
+            <a:schemeClr val="lt1"/>
+          </a:fillRef>
+          <a:effectRef idx="0">
+            <a:schemeClr val="dk1"/>
+          </a:effectRef>
+          <a:fontRef idx="minor">
+            <a:schemeClr val="dk1"/>
+          </a:fontRef>
+        </p:style>
+        <p:txBody>
+          <a:bodyPr rtlCol="0" anchor="ctr"/>
+          <a:lstStyle/>
+          <a:p>
+            <a:pPr algn="ctr"/>
+            <a:r>
+              <a:rPr lang="es-PE" dirty="0"/>
+              <a:t>Logo </a:t>
+            </a:r>
+            <a:r>
+              <a:rPr lang="es-PE" dirty="0" err="1"/>
+              <a:t>Crypto</a:t>
+            </a:r>
+            <a:r>
+              <a:rPr lang="es-PE" dirty="0"/>
+              <a:t>-nita</a:t>
+            </a:r>
+          </a:p>
+        </p:txBody>
+      </p:sp>
+      <p:sp>
+        <p:nvSpPr>
+          <p:cNvPr id="9" name="Rectángulo 8">
+            <a:extLst>
+              <a:ext uri="{FF2B5EF4-FFF2-40B4-BE49-F238E27FC236}">
+                <a16:creationId xmlns:a16="http://schemas.microsoft.com/office/drawing/2014/main" id="{9059C4E3-239F-4824-8C5A-1858ACB1C26E}"/>
+              </a:ext>
+            </a:extLst>
+          </p:cNvPr>
+          <p:cNvSpPr/>
+          <p:nvPr/>
+        </p:nvSpPr>
+        <p:spPr>
+          <a:xfrm>
+            <a:off x="310896" y="5614416"/>
+            <a:ext cx="2450592" cy="950976"/>
+          </a:xfrm>
+          <a:prstGeom prst="rect">
+            <a:avLst/>
+          </a:prstGeom>
+        </p:spPr>
+        <p:style>
+          <a:lnRef idx="2">
+            <a:schemeClr val="dk1"/>
+          </a:lnRef>
+          <a:fillRef idx="1">
+            <a:schemeClr val="lt1"/>
+          </a:fillRef>
+          <a:effectRef idx="0">
+            <a:schemeClr val="dk1"/>
+          </a:effectRef>
+          <a:fontRef idx="minor">
+            <a:schemeClr val="dk1"/>
+          </a:fontRef>
+        </p:style>
+        <p:txBody>
+          <a:bodyPr rtlCol="0" anchor="ctr"/>
+          <a:lstStyle/>
+          <a:p>
+            <a:pPr algn="ctr"/>
+            <a:r>
+              <a:rPr lang="es-MX" dirty="0"/>
+              <a:t>Nombre/Logo del Grupo</a:t>
+            </a:r>
+            <a:endParaRPr lang="es-PE" dirty="0"/>
+          </a:p>
+        </p:txBody>
+      </p:sp>
+      <p:sp>
+        <p:nvSpPr>
+          <p:cNvPr id="10" name="Rectángulo 9">
+            <a:extLst>
+              <a:ext uri="{FF2B5EF4-FFF2-40B4-BE49-F238E27FC236}">
+                <a16:creationId xmlns:a16="http://schemas.microsoft.com/office/drawing/2014/main" id="{CE6F6AAA-080D-4FC6-88FA-3EBC4C0CD8F6}"/>
+              </a:ext>
+            </a:extLst>
+          </p:cNvPr>
+          <p:cNvSpPr/>
+          <p:nvPr/>
+        </p:nvSpPr>
+        <p:spPr>
+          <a:xfrm>
+            <a:off x="10049256" y="5614416"/>
+            <a:ext cx="1627632" cy="950976"/>
+          </a:xfrm>
+          <a:prstGeom prst="rect">
+            <a:avLst/>
+          </a:prstGeom>
+        </p:spPr>
+        <p:style>
+          <a:lnRef idx="2">
+            <a:schemeClr val="dk1"/>
+          </a:lnRef>
+          <a:fillRef idx="1">
+            <a:schemeClr val="lt1"/>
+          </a:fillRef>
+          <a:effectRef idx="0">
+            <a:schemeClr val="dk1"/>
+          </a:effectRef>
+          <a:fontRef idx="minor">
+            <a:schemeClr val="dk1"/>
+          </a:fontRef>
+        </p:style>
+        <p:txBody>
+          <a:bodyPr rtlCol="0" anchor="ctr"/>
+          <a:lstStyle/>
+          <a:p>
+            <a:pPr algn="ctr"/>
+            <a:r>
+              <a:rPr lang="es-MX" sz="1100" dirty="0"/>
+              <a:t>Integrantes</a:t>
+            </a:r>
+            <a:endParaRPr lang="es-PE" sz="1100" dirty="0"/>
+          </a:p>
+        </p:txBody>
+      </p:sp>
+      <p:sp>
+        <p:nvSpPr>
+          <p:cNvPr id="11" name="Rectángulo 10">
+            <a:extLst>
+              <a:ext uri="{FF2B5EF4-FFF2-40B4-BE49-F238E27FC236}">
+                <a16:creationId xmlns:a16="http://schemas.microsoft.com/office/drawing/2014/main" id="{2D34766E-3CC0-47DF-87DC-62FB893F3931}"/>
+              </a:ext>
+            </a:extLst>
+          </p:cNvPr>
+          <p:cNvSpPr/>
+          <p:nvPr/>
+        </p:nvSpPr>
+        <p:spPr>
+          <a:xfrm>
+            <a:off x="5506974" y="5925312"/>
+            <a:ext cx="3790188" cy="320040"/>
+          </a:xfrm>
+          <a:prstGeom prst="rect">
+            <a:avLst/>
+          </a:prstGeom>
+        </p:spPr>
+        <p:style>
+          <a:lnRef idx="2">
+            <a:schemeClr val="dk1"/>
+          </a:lnRef>
+          <a:fillRef idx="1">
+            <a:schemeClr val="lt1"/>
+          </a:fillRef>
+          <a:effectRef idx="0">
+            <a:schemeClr val="dk1"/>
+          </a:effectRef>
+          <a:fontRef idx="minor">
+            <a:schemeClr val="dk1"/>
+          </a:fontRef>
+        </p:style>
+        <p:txBody>
+          <a:bodyPr rtlCol="0" anchor="ctr"/>
+          <a:lstStyle/>
+          <a:p>
+            <a:pPr algn="ctr"/>
+            <a:r>
+              <a:rPr lang="es-PE" sz="1100" dirty="0"/>
+              <a:t>2022 - Nombre® - Todos los derechos reservados</a:t>
+            </a:r>
+          </a:p>
+        </p:txBody>
+      </p:sp>
+      <p:sp>
+        <p:nvSpPr>
+          <p:cNvPr id="12" name="Rectángulo 11">
+            <a:extLst>
+              <a:ext uri="{FF2B5EF4-FFF2-40B4-BE49-F238E27FC236}">
+                <a16:creationId xmlns:a16="http://schemas.microsoft.com/office/drawing/2014/main" id="{5E86E855-05F8-45D1-998F-FD3B01DB39A2}"/>
+              </a:ext>
+            </a:extLst>
+          </p:cNvPr>
+          <p:cNvSpPr/>
+          <p:nvPr/>
+        </p:nvSpPr>
+        <p:spPr>
+          <a:xfrm>
+            <a:off x="2889504" y="5614416"/>
+            <a:ext cx="1865376" cy="420624"/>
+          </a:xfrm>
+          <a:prstGeom prst="rect">
+            <a:avLst/>
+          </a:prstGeom>
+        </p:spPr>
+        <p:style>
+          <a:lnRef idx="2">
+            <a:schemeClr val="dk1"/>
+          </a:lnRef>
+          <a:fillRef idx="1">
+            <a:schemeClr val="lt1"/>
+          </a:fillRef>
+          <a:effectRef idx="0">
+            <a:schemeClr val="dk1"/>
+          </a:effectRef>
+          <a:fontRef idx="minor">
+            <a:schemeClr val="dk1"/>
+          </a:fontRef>
+        </p:style>
+        <p:txBody>
+          <a:bodyPr rtlCol="0" anchor="ctr"/>
+          <a:lstStyle/>
+          <a:p>
+            <a:pPr algn="ctr"/>
+            <a:r>
+              <a:rPr lang="es-PE" sz="1100" dirty="0"/>
+              <a:t>Nosotros</a:t>
+            </a:r>
+          </a:p>
+        </p:txBody>
+      </p:sp>
+      <p:sp>
+        <p:nvSpPr>
+          <p:cNvPr id="13" name="Rectángulo 12">
+            <a:extLst>
+              <a:ext uri="{FF2B5EF4-FFF2-40B4-BE49-F238E27FC236}">
+                <a16:creationId xmlns:a16="http://schemas.microsoft.com/office/drawing/2014/main" id="{BAE1FAEE-ABB3-4846-BC1C-59A39C7AD0AB}"/>
+              </a:ext>
+            </a:extLst>
+          </p:cNvPr>
+          <p:cNvSpPr/>
+          <p:nvPr/>
+        </p:nvSpPr>
+        <p:spPr>
+          <a:xfrm>
+            <a:off x="2889504" y="6144768"/>
+            <a:ext cx="1865376" cy="425196"/>
+          </a:xfrm>
+          <a:prstGeom prst="rect">
+            <a:avLst/>
+          </a:prstGeom>
+        </p:spPr>
+        <p:style>
+          <a:lnRef idx="2">
+            <a:schemeClr val="dk1"/>
+          </a:lnRef>
+          <a:fillRef idx="1">
+            <a:schemeClr val="lt1"/>
+          </a:fillRef>
+          <a:effectRef idx="0">
+            <a:schemeClr val="dk1"/>
+          </a:effectRef>
+          <a:fontRef idx="minor">
+            <a:schemeClr val="dk1"/>
+          </a:fontRef>
+        </p:style>
+        <p:txBody>
+          <a:bodyPr rtlCol="0" anchor="ctr"/>
+          <a:lstStyle/>
+          <a:p>
+            <a:pPr algn="ctr"/>
+            <a:r>
+              <a:rPr lang="es-PE" sz="1100" dirty="0"/>
+              <a:t>Términos y Condiciones</a:t>
+            </a:r>
+          </a:p>
+        </p:txBody>
+      </p:sp>
+      <p:sp>
+        <p:nvSpPr>
+          <p:cNvPr id="2" name="Rectángulo 1">
+            <a:extLst>
+              <a:ext uri="{FF2B5EF4-FFF2-40B4-BE49-F238E27FC236}">
+                <a16:creationId xmlns:a16="http://schemas.microsoft.com/office/drawing/2014/main" id="{CE5E8ED7-00AD-4F81-AE9D-99A64C9562B6}"/>
+              </a:ext>
+            </a:extLst>
+          </p:cNvPr>
+          <p:cNvSpPr/>
+          <p:nvPr/>
+        </p:nvSpPr>
+        <p:spPr>
+          <a:xfrm>
+            <a:off x="1837944" y="1527048"/>
+            <a:ext cx="2706624" cy="429768"/>
+          </a:xfrm>
+          <a:prstGeom prst="rect">
+            <a:avLst/>
+          </a:prstGeom>
+        </p:spPr>
+        <p:style>
+          <a:lnRef idx="2">
+            <a:schemeClr val="dk1"/>
+          </a:lnRef>
+          <a:fillRef idx="1">
+            <a:schemeClr val="lt1"/>
+          </a:fillRef>
+          <a:effectRef idx="0">
+            <a:schemeClr val="dk1"/>
+          </a:effectRef>
+          <a:fontRef idx="minor">
+            <a:schemeClr val="dk1"/>
+          </a:fontRef>
+        </p:style>
+        <p:txBody>
+          <a:bodyPr rtlCol="0" anchor="ctr"/>
+          <a:lstStyle/>
+          <a:p>
+            <a:pPr algn="ctr"/>
+            <a:r>
+              <a:rPr lang="es-PE" dirty="0"/>
+              <a:t>Listado de Operaciones</a:t>
+            </a:r>
+          </a:p>
+        </p:txBody>
+      </p:sp>
+      <p:sp>
+        <p:nvSpPr>
+          <p:cNvPr id="3" name="Rectángulo 2">
+            <a:extLst>
+              <a:ext uri="{FF2B5EF4-FFF2-40B4-BE49-F238E27FC236}">
+                <a16:creationId xmlns:a16="http://schemas.microsoft.com/office/drawing/2014/main" id="{3E2BFAE1-07A5-4D78-9177-AFFDFFF218F9}"/>
+              </a:ext>
+            </a:extLst>
+          </p:cNvPr>
+          <p:cNvSpPr/>
+          <p:nvPr/>
+        </p:nvSpPr>
+        <p:spPr>
+          <a:xfrm>
+            <a:off x="1837944" y="2075688"/>
+            <a:ext cx="8394192" cy="3108960"/>
+          </a:xfrm>
+          <a:prstGeom prst="rect">
+            <a:avLst/>
+          </a:prstGeom>
+        </p:spPr>
+        <p:style>
+          <a:lnRef idx="2">
+            <a:schemeClr val="dk1"/>
+          </a:lnRef>
+          <a:fillRef idx="1">
+            <a:schemeClr val="lt1"/>
+          </a:fillRef>
+          <a:effectRef idx="0">
+            <a:schemeClr val="dk1"/>
+          </a:effectRef>
+          <a:fontRef idx="minor">
+            <a:schemeClr val="dk1"/>
+          </a:fontRef>
+        </p:style>
+        <p:txBody>
+          <a:bodyPr rtlCol="0" anchor="ctr"/>
+          <a:lstStyle/>
+          <a:p>
+            <a:pPr algn="ctr"/>
+            <a:endParaRPr lang="es-PE"/>
+          </a:p>
+        </p:txBody>
+      </p:sp>
+      <p:sp>
+        <p:nvSpPr>
+          <p:cNvPr id="8" name="Rectángulo 7">
+            <a:extLst>
+              <a:ext uri="{FF2B5EF4-FFF2-40B4-BE49-F238E27FC236}">
+                <a16:creationId xmlns:a16="http://schemas.microsoft.com/office/drawing/2014/main" id="{CA005AC2-9A7D-49B6-973C-402F7EC3FB53}"/>
+              </a:ext>
+            </a:extLst>
+          </p:cNvPr>
+          <p:cNvSpPr/>
+          <p:nvPr/>
+        </p:nvSpPr>
+        <p:spPr>
+          <a:xfrm>
+            <a:off x="1837944" y="2075688"/>
+            <a:ext cx="1117854" cy="301752"/>
+          </a:xfrm>
+          <a:prstGeom prst="rect">
+            <a:avLst/>
+          </a:prstGeom>
+        </p:spPr>
+        <p:style>
+          <a:lnRef idx="2">
+            <a:schemeClr val="dk1"/>
+          </a:lnRef>
+          <a:fillRef idx="1">
+            <a:schemeClr val="lt1"/>
+          </a:fillRef>
+          <a:effectRef idx="0">
+            <a:schemeClr val="dk1"/>
+          </a:effectRef>
+          <a:fontRef idx="minor">
+            <a:schemeClr val="dk1"/>
+          </a:fontRef>
+        </p:style>
+        <p:txBody>
+          <a:bodyPr rtlCol="0" anchor="ctr"/>
+          <a:lstStyle/>
+          <a:p>
+            <a:pPr algn="ctr"/>
+            <a:r>
+              <a:rPr lang="es-PE" sz="1100" dirty="0"/>
+              <a:t>ID de Operación</a:t>
+            </a:r>
+          </a:p>
+        </p:txBody>
+      </p:sp>
+      <p:sp>
+        <p:nvSpPr>
+          <p:cNvPr id="27" name="Rectángulo 26">
+            <a:extLst>
+              <a:ext uri="{FF2B5EF4-FFF2-40B4-BE49-F238E27FC236}">
+                <a16:creationId xmlns:a16="http://schemas.microsoft.com/office/drawing/2014/main" id="{BFEEF1FF-835F-4ED1-B5D3-99BD4D98C8C8}"/>
+              </a:ext>
+            </a:extLst>
+          </p:cNvPr>
+          <p:cNvSpPr/>
+          <p:nvPr/>
+        </p:nvSpPr>
+        <p:spPr>
+          <a:xfrm>
+            <a:off x="2951226" y="2072640"/>
+            <a:ext cx="1008126" cy="301752"/>
+          </a:xfrm>
+          <a:prstGeom prst="rect">
+            <a:avLst/>
+          </a:prstGeom>
+        </p:spPr>
+        <p:style>
+          <a:lnRef idx="2">
+            <a:schemeClr val="dk1"/>
+          </a:lnRef>
+          <a:fillRef idx="1">
+            <a:schemeClr val="lt1"/>
+          </a:fillRef>
+          <a:effectRef idx="0">
+            <a:schemeClr val="dk1"/>
+          </a:effectRef>
+          <a:fontRef idx="minor">
+            <a:schemeClr val="dk1"/>
+          </a:fontRef>
+        </p:style>
+        <p:txBody>
+          <a:bodyPr rtlCol="0" anchor="ctr"/>
+          <a:lstStyle/>
+          <a:p>
+            <a:pPr algn="ctr"/>
+            <a:r>
+              <a:rPr lang="es-PE" sz="1100" dirty="0"/>
+              <a:t>Fecha y Hora</a:t>
+            </a:r>
+          </a:p>
+        </p:txBody>
+      </p:sp>
+      <p:sp>
+        <p:nvSpPr>
+          <p:cNvPr id="28" name="Rectángulo 27">
+            <a:extLst>
+              <a:ext uri="{FF2B5EF4-FFF2-40B4-BE49-F238E27FC236}">
+                <a16:creationId xmlns:a16="http://schemas.microsoft.com/office/drawing/2014/main" id="{24923D50-84D7-473F-91B8-014BA242EB40}"/>
+              </a:ext>
+            </a:extLst>
+          </p:cNvPr>
+          <p:cNvSpPr/>
+          <p:nvPr/>
+        </p:nvSpPr>
+        <p:spPr>
+          <a:xfrm>
+            <a:off x="3959352" y="2075688"/>
+            <a:ext cx="2256282" cy="301752"/>
+          </a:xfrm>
+          <a:prstGeom prst="rect">
+            <a:avLst/>
+          </a:prstGeom>
+        </p:spPr>
+        <p:style>
+          <a:lnRef idx="2">
+            <a:schemeClr val="dk1"/>
+          </a:lnRef>
+          <a:fillRef idx="1">
+            <a:schemeClr val="lt1"/>
+          </a:fillRef>
+          <a:effectRef idx="0">
+            <a:schemeClr val="dk1"/>
+          </a:effectRef>
+          <a:fontRef idx="minor">
+            <a:schemeClr val="dk1"/>
+          </a:fontRef>
+        </p:style>
+        <p:txBody>
+          <a:bodyPr rtlCol="0" anchor="ctr"/>
+          <a:lstStyle/>
+          <a:p>
+            <a:pPr algn="ctr"/>
+            <a:r>
+              <a:rPr lang="es-PE" sz="1100" dirty="0"/>
+              <a:t>Cliente</a:t>
+            </a:r>
+          </a:p>
+        </p:txBody>
+      </p:sp>
+      <p:sp>
+        <p:nvSpPr>
+          <p:cNvPr id="29" name="Rectángulo 28">
+            <a:extLst>
+              <a:ext uri="{FF2B5EF4-FFF2-40B4-BE49-F238E27FC236}">
+                <a16:creationId xmlns:a16="http://schemas.microsoft.com/office/drawing/2014/main" id="{3B8DE532-67D4-4A57-9BEF-51D052298078}"/>
+              </a:ext>
+            </a:extLst>
+          </p:cNvPr>
+          <p:cNvSpPr/>
+          <p:nvPr/>
+        </p:nvSpPr>
+        <p:spPr>
+          <a:xfrm>
+            <a:off x="6215634" y="2072640"/>
+            <a:ext cx="1241298" cy="301752"/>
+          </a:xfrm>
+          <a:prstGeom prst="rect">
+            <a:avLst/>
+          </a:prstGeom>
+        </p:spPr>
+        <p:style>
+          <a:lnRef idx="2">
+            <a:schemeClr val="dk1"/>
+          </a:lnRef>
+          <a:fillRef idx="1">
+            <a:schemeClr val="lt1"/>
+          </a:fillRef>
+          <a:effectRef idx="0">
+            <a:schemeClr val="dk1"/>
+          </a:effectRef>
+          <a:fontRef idx="minor">
+            <a:schemeClr val="dk1"/>
+          </a:fontRef>
+        </p:style>
+        <p:txBody>
+          <a:bodyPr rtlCol="0" anchor="ctr"/>
+          <a:lstStyle/>
+          <a:p>
+            <a:pPr algn="ctr"/>
+            <a:r>
+              <a:rPr lang="es-PE" sz="1100" dirty="0"/>
+              <a:t>Tipo de Operación</a:t>
+            </a:r>
+          </a:p>
+        </p:txBody>
+      </p:sp>
+      <p:sp>
+        <p:nvSpPr>
+          <p:cNvPr id="30" name="Rectángulo 29">
+            <a:extLst>
+              <a:ext uri="{FF2B5EF4-FFF2-40B4-BE49-F238E27FC236}">
+                <a16:creationId xmlns:a16="http://schemas.microsoft.com/office/drawing/2014/main" id="{4A4776AA-FE23-40F2-9BD6-25B969660660}"/>
+              </a:ext>
+            </a:extLst>
+          </p:cNvPr>
+          <p:cNvSpPr/>
+          <p:nvPr/>
+        </p:nvSpPr>
+        <p:spPr>
+          <a:xfrm>
+            <a:off x="7454646" y="2072640"/>
+            <a:ext cx="1083564" cy="301752"/>
+          </a:xfrm>
+          <a:prstGeom prst="rect">
+            <a:avLst/>
+          </a:prstGeom>
+        </p:spPr>
+        <p:style>
+          <a:lnRef idx="2">
+            <a:schemeClr val="dk1"/>
+          </a:lnRef>
+          <a:fillRef idx="1">
+            <a:schemeClr val="lt1"/>
+          </a:fillRef>
+          <a:effectRef idx="0">
+            <a:schemeClr val="dk1"/>
+          </a:effectRef>
+          <a:fontRef idx="minor">
+            <a:schemeClr val="dk1"/>
+          </a:fontRef>
+        </p:style>
+        <p:txBody>
+          <a:bodyPr rtlCol="0" anchor="ctr"/>
+          <a:lstStyle/>
+          <a:p>
+            <a:pPr algn="ctr"/>
+            <a:r>
+              <a:rPr lang="es-PE" sz="1100" dirty="0"/>
+              <a:t>Tipo de Cambio</a:t>
+            </a:r>
+          </a:p>
+        </p:txBody>
+      </p:sp>
+      <p:sp>
+        <p:nvSpPr>
+          <p:cNvPr id="31" name="Rectángulo 30">
+            <a:extLst>
+              <a:ext uri="{FF2B5EF4-FFF2-40B4-BE49-F238E27FC236}">
+                <a16:creationId xmlns:a16="http://schemas.microsoft.com/office/drawing/2014/main" id="{492F9B72-48F3-4761-98C9-DF8C89263DF6}"/>
+              </a:ext>
+            </a:extLst>
+          </p:cNvPr>
+          <p:cNvSpPr/>
+          <p:nvPr/>
+        </p:nvSpPr>
+        <p:spPr>
+          <a:xfrm>
+            <a:off x="8538210" y="2072640"/>
+            <a:ext cx="864108" cy="301752"/>
+          </a:xfrm>
+          <a:prstGeom prst="rect">
+            <a:avLst/>
+          </a:prstGeom>
+        </p:spPr>
+        <p:style>
+          <a:lnRef idx="2">
+            <a:schemeClr val="dk1"/>
+          </a:lnRef>
+          <a:fillRef idx="1">
+            <a:schemeClr val="lt1"/>
+          </a:fillRef>
+          <a:effectRef idx="0">
+            <a:schemeClr val="dk1"/>
+          </a:effectRef>
+          <a:fontRef idx="minor">
+            <a:schemeClr val="dk1"/>
+          </a:fontRef>
+        </p:style>
+        <p:txBody>
+          <a:bodyPr rtlCol="0" anchor="ctr"/>
+          <a:lstStyle/>
+          <a:p>
+            <a:pPr algn="ctr"/>
+            <a:r>
+              <a:rPr lang="es-PE" sz="1100" dirty="0"/>
+              <a:t>Monto</a:t>
+            </a:r>
+          </a:p>
+        </p:txBody>
+      </p:sp>
+      <p:sp>
+        <p:nvSpPr>
+          <p:cNvPr id="32" name="Rectángulo 31">
+            <a:extLst>
+              <a:ext uri="{FF2B5EF4-FFF2-40B4-BE49-F238E27FC236}">
+                <a16:creationId xmlns:a16="http://schemas.microsoft.com/office/drawing/2014/main" id="{177A6D6C-EDCF-4E13-BEFE-74E3F5723C8D}"/>
+              </a:ext>
+            </a:extLst>
+          </p:cNvPr>
+          <p:cNvSpPr/>
+          <p:nvPr/>
+        </p:nvSpPr>
+        <p:spPr>
+          <a:xfrm>
+            <a:off x="1837944" y="2386584"/>
+            <a:ext cx="1117854" cy="301752"/>
+          </a:xfrm>
+          <a:prstGeom prst="rect">
+            <a:avLst/>
+          </a:prstGeom>
+        </p:spPr>
+        <p:style>
+          <a:lnRef idx="2">
+            <a:schemeClr val="dk1"/>
+          </a:lnRef>
+          <a:fillRef idx="1">
+            <a:schemeClr val="lt1"/>
+          </a:fillRef>
+          <a:effectRef idx="0">
+            <a:schemeClr val="dk1"/>
+          </a:effectRef>
+          <a:fontRef idx="minor">
+            <a:schemeClr val="dk1"/>
+          </a:fontRef>
+        </p:style>
+        <p:txBody>
+          <a:bodyPr rtlCol="0" anchor="ctr"/>
+          <a:lstStyle/>
+          <a:p>
+            <a:pPr algn="ctr"/>
+            <a:endParaRPr lang="es-PE" sz="1100" dirty="0"/>
+          </a:p>
+        </p:txBody>
+      </p:sp>
+      <p:sp>
+        <p:nvSpPr>
+          <p:cNvPr id="33" name="Rectángulo 32">
+            <a:extLst>
+              <a:ext uri="{FF2B5EF4-FFF2-40B4-BE49-F238E27FC236}">
+                <a16:creationId xmlns:a16="http://schemas.microsoft.com/office/drawing/2014/main" id="{2DB57270-1F05-452D-9878-C828BDD64E8A}"/>
+              </a:ext>
+            </a:extLst>
+          </p:cNvPr>
+          <p:cNvSpPr/>
+          <p:nvPr/>
+        </p:nvSpPr>
+        <p:spPr>
+          <a:xfrm>
+            <a:off x="2951226" y="2383536"/>
+            <a:ext cx="1008126" cy="301752"/>
+          </a:xfrm>
+          <a:prstGeom prst="rect">
+            <a:avLst/>
+          </a:prstGeom>
+        </p:spPr>
+        <p:style>
+          <a:lnRef idx="2">
+            <a:schemeClr val="dk1"/>
+          </a:lnRef>
+          <a:fillRef idx="1">
+            <a:schemeClr val="lt1"/>
+          </a:fillRef>
+          <a:effectRef idx="0">
+            <a:schemeClr val="dk1"/>
+          </a:effectRef>
+          <a:fontRef idx="minor">
+            <a:schemeClr val="dk1"/>
+          </a:fontRef>
+        </p:style>
+        <p:txBody>
+          <a:bodyPr rtlCol="0" anchor="ctr"/>
+          <a:lstStyle/>
+          <a:p>
+            <a:pPr algn="ctr"/>
+            <a:endParaRPr lang="es-PE" sz="1100" dirty="0"/>
+          </a:p>
+        </p:txBody>
+      </p:sp>
+      <p:sp>
+        <p:nvSpPr>
+          <p:cNvPr id="34" name="Rectángulo 33">
+            <a:extLst>
+              <a:ext uri="{FF2B5EF4-FFF2-40B4-BE49-F238E27FC236}">
+                <a16:creationId xmlns:a16="http://schemas.microsoft.com/office/drawing/2014/main" id="{5CF144D8-8978-440B-8DF6-5A1BF7CEC3CB}"/>
+              </a:ext>
+            </a:extLst>
+          </p:cNvPr>
+          <p:cNvSpPr/>
+          <p:nvPr/>
+        </p:nvSpPr>
+        <p:spPr>
+          <a:xfrm>
+            <a:off x="3959352" y="2386584"/>
+            <a:ext cx="2256282" cy="301752"/>
+          </a:xfrm>
+          <a:prstGeom prst="rect">
+            <a:avLst/>
+          </a:prstGeom>
+        </p:spPr>
+        <p:style>
+          <a:lnRef idx="2">
+            <a:schemeClr val="dk1"/>
+          </a:lnRef>
+          <a:fillRef idx="1">
+            <a:schemeClr val="lt1"/>
+          </a:fillRef>
+          <a:effectRef idx="0">
+            <a:schemeClr val="dk1"/>
+          </a:effectRef>
+          <a:fontRef idx="minor">
+            <a:schemeClr val="dk1"/>
+          </a:fontRef>
+        </p:style>
+        <p:txBody>
+          <a:bodyPr rtlCol="0" anchor="ctr"/>
+          <a:lstStyle/>
+          <a:p>
+            <a:pPr algn="ctr"/>
+            <a:endParaRPr lang="es-PE" sz="1100" dirty="0"/>
+          </a:p>
+        </p:txBody>
+      </p:sp>
+      <p:sp>
+        <p:nvSpPr>
+          <p:cNvPr id="35" name="Rectángulo 34">
+            <a:extLst>
+              <a:ext uri="{FF2B5EF4-FFF2-40B4-BE49-F238E27FC236}">
+                <a16:creationId xmlns:a16="http://schemas.microsoft.com/office/drawing/2014/main" id="{5A36C3EC-12F9-4102-A072-E8FCF9CA0F4E}"/>
+              </a:ext>
+            </a:extLst>
+          </p:cNvPr>
+          <p:cNvSpPr/>
+          <p:nvPr/>
+        </p:nvSpPr>
+        <p:spPr>
+          <a:xfrm>
+            <a:off x="6215634" y="2383536"/>
+            <a:ext cx="1241298" cy="301752"/>
+          </a:xfrm>
+          <a:prstGeom prst="rect">
+            <a:avLst/>
+          </a:prstGeom>
+        </p:spPr>
+        <p:style>
+          <a:lnRef idx="2">
+            <a:schemeClr val="dk1"/>
+          </a:lnRef>
+          <a:fillRef idx="1">
+            <a:schemeClr val="lt1"/>
+          </a:fillRef>
+          <a:effectRef idx="0">
+            <a:schemeClr val="dk1"/>
+          </a:effectRef>
+          <a:fontRef idx="minor">
+            <a:schemeClr val="dk1"/>
+          </a:fontRef>
+        </p:style>
+        <p:txBody>
+          <a:bodyPr rtlCol="0" anchor="ctr"/>
+          <a:lstStyle/>
+          <a:p>
+            <a:pPr algn="ctr"/>
+            <a:endParaRPr lang="es-PE" sz="1100" dirty="0"/>
+          </a:p>
+        </p:txBody>
+      </p:sp>
+      <p:sp>
+        <p:nvSpPr>
+          <p:cNvPr id="36" name="Rectángulo 35">
+            <a:extLst>
+              <a:ext uri="{FF2B5EF4-FFF2-40B4-BE49-F238E27FC236}">
+                <a16:creationId xmlns:a16="http://schemas.microsoft.com/office/drawing/2014/main" id="{889F9BA8-BD5B-4425-B0CE-0C49137A53C1}"/>
+              </a:ext>
+            </a:extLst>
+          </p:cNvPr>
+          <p:cNvSpPr/>
+          <p:nvPr/>
+        </p:nvSpPr>
+        <p:spPr>
+          <a:xfrm>
+            <a:off x="7454646" y="2383536"/>
+            <a:ext cx="1083564" cy="301752"/>
+          </a:xfrm>
+          <a:prstGeom prst="rect">
+            <a:avLst/>
+          </a:prstGeom>
+        </p:spPr>
+        <p:style>
+          <a:lnRef idx="2">
+            <a:schemeClr val="dk1"/>
+          </a:lnRef>
+          <a:fillRef idx="1">
+            <a:schemeClr val="lt1"/>
+          </a:fillRef>
+          <a:effectRef idx="0">
+            <a:schemeClr val="dk1"/>
+          </a:effectRef>
+          <a:fontRef idx="minor">
+            <a:schemeClr val="dk1"/>
+          </a:fontRef>
+        </p:style>
+        <p:txBody>
+          <a:bodyPr rtlCol="0" anchor="ctr"/>
+          <a:lstStyle/>
+          <a:p>
+            <a:pPr algn="ctr"/>
+            <a:endParaRPr lang="es-PE" sz="1100" dirty="0"/>
+          </a:p>
+        </p:txBody>
+      </p:sp>
+      <p:sp>
+        <p:nvSpPr>
+          <p:cNvPr id="37" name="Rectángulo 36">
+            <a:extLst>
+              <a:ext uri="{FF2B5EF4-FFF2-40B4-BE49-F238E27FC236}">
+                <a16:creationId xmlns:a16="http://schemas.microsoft.com/office/drawing/2014/main" id="{15B09F85-BC91-484E-B6EF-5BF312F7FBE9}"/>
+              </a:ext>
+            </a:extLst>
+          </p:cNvPr>
+          <p:cNvSpPr/>
+          <p:nvPr/>
+        </p:nvSpPr>
+        <p:spPr>
+          <a:xfrm>
+            <a:off x="8538210" y="2383536"/>
+            <a:ext cx="864108" cy="301752"/>
+          </a:xfrm>
+          <a:prstGeom prst="rect">
+            <a:avLst/>
+          </a:prstGeom>
+        </p:spPr>
+        <p:style>
+          <a:lnRef idx="2">
+            <a:schemeClr val="dk1"/>
+          </a:lnRef>
+          <a:fillRef idx="1">
+            <a:schemeClr val="lt1"/>
+          </a:fillRef>
+          <a:effectRef idx="0">
+            <a:schemeClr val="dk1"/>
+          </a:effectRef>
+          <a:fontRef idx="minor">
+            <a:schemeClr val="dk1"/>
+          </a:fontRef>
+        </p:style>
+        <p:txBody>
+          <a:bodyPr rtlCol="0" anchor="ctr"/>
+          <a:lstStyle/>
+          <a:p>
+            <a:pPr algn="ctr"/>
+            <a:endParaRPr lang="es-PE" sz="1100" dirty="0"/>
+          </a:p>
+        </p:txBody>
+      </p:sp>
+      <p:sp>
+        <p:nvSpPr>
+          <p:cNvPr id="38" name="Rectángulo 37">
+            <a:extLst>
+              <a:ext uri="{FF2B5EF4-FFF2-40B4-BE49-F238E27FC236}">
+                <a16:creationId xmlns:a16="http://schemas.microsoft.com/office/drawing/2014/main" id="{13F92F1C-AC18-4477-B019-8CDE3ABBAE7D}"/>
+              </a:ext>
+            </a:extLst>
+          </p:cNvPr>
+          <p:cNvSpPr/>
+          <p:nvPr/>
+        </p:nvSpPr>
+        <p:spPr>
+          <a:xfrm>
+            <a:off x="1837944" y="2694432"/>
+            <a:ext cx="1117854" cy="301752"/>
+          </a:xfrm>
+          <a:prstGeom prst="rect">
+            <a:avLst/>
+          </a:prstGeom>
+        </p:spPr>
+        <p:style>
+          <a:lnRef idx="2">
+            <a:schemeClr val="dk1"/>
+          </a:lnRef>
+          <a:fillRef idx="1">
+            <a:schemeClr val="lt1"/>
+          </a:fillRef>
+          <a:effectRef idx="0">
+            <a:schemeClr val="dk1"/>
+          </a:effectRef>
+          <a:fontRef idx="minor">
+            <a:schemeClr val="dk1"/>
+          </a:fontRef>
+        </p:style>
+        <p:txBody>
+          <a:bodyPr rtlCol="0" anchor="ctr"/>
+          <a:lstStyle/>
+          <a:p>
+            <a:pPr algn="ctr"/>
+            <a:endParaRPr lang="es-PE" sz="1100" dirty="0"/>
+          </a:p>
+        </p:txBody>
+      </p:sp>
+      <p:sp>
+        <p:nvSpPr>
+          <p:cNvPr id="39" name="Rectángulo 38">
+            <a:extLst>
+              <a:ext uri="{FF2B5EF4-FFF2-40B4-BE49-F238E27FC236}">
+                <a16:creationId xmlns:a16="http://schemas.microsoft.com/office/drawing/2014/main" id="{F7092951-42EB-44A3-8E38-832A9D06FD99}"/>
+              </a:ext>
+            </a:extLst>
+          </p:cNvPr>
+          <p:cNvSpPr/>
+          <p:nvPr/>
+        </p:nvSpPr>
+        <p:spPr>
+          <a:xfrm>
+            <a:off x="2951226" y="2691384"/>
+            <a:ext cx="1008126" cy="301752"/>
+          </a:xfrm>
+          <a:prstGeom prst="rect">
+            <a:avLst/>
+          </a:prstGeom>
+        </p:spPr>
+        <p:style>
+          <a:lnRef idx="2">
+            <a:schemeClr val="dk1"/>
+          </a:lnRef>
+          <a:fillRef idx="1">
+            <a:schemeClr val="lt1"/>
+          </a:fillRef>
+          <a:effectRef idx="0">
+            <a:schemeClr val="dk1"/>
+          </a:effectRef>
+          <a:fontRef idx="minor">
+            <a:schemeClr val="dk1"/>
+          </a:fontRef>
+        </p:style>
+        <p:txBody>
+          <a:bodyPr rtlCol="0" anchor="ctr"/>
+          <a:lstStyle/>
+          <a:p>
+            <a:pPr algn="ctr"/>
+            <a:endParaRPr lang="es-PE" sz="1100" dirty="0"/>
+          </a:p>
+        </p:txBody>
+      </p:sp>
+      <p:sp>
+        <p:nvSpPr>
+          <p:cNvPr id="40" name="Rectángulo 39">
+            <a:extLst>
+              <a:ext uri="{FF2B5EF4-FFF2-40B4-BE49-F238E27FC236}">
+                <a16:creationId xmlns:a16="http://schemas.microsoft.com/office/drawing/2014/main" id="{DD7A8DDD-CFC8-450F-AAFD-E8CD6C575D4F}"/>
+              </a:ext>
+            </a:extLst>
+          </p:cNvPr>
+          <p:cNvSpPr/>
+          <p:nvPr/>
+        </p:nvSpPr>
+        <p:spPr>
+          <a:xfrm>
+            <a:off x="3959352" y="2694432"/>
+            <a:ext cx="2256282" cy="301752"/>
+          </a:xfrm>
+          <a:prstGeom prst="rect">
+            <a:avLst/>
+          </a:prstGeom>
+        </p:spPr>
+        <p:style>
+          <a:lnRef idx="2">
+            <a:schemeClr val="dk1"/>
+          </a:lnRef>
+          <a:fillRef idx="1">
+            <a:schemeClr val="lt1"/>
+          </a:fillRef>
+          <a:effectRef idx="0">
+            <a:schemeClr val="dk1"/>
+          </a:effectRef>
+          <a:fontRef idx="minor">
+            <a:schemeClr val="dk1"/>
+          </a:fontRef>
+        </p:style>
+        <p:txBody>
+          <a:bodyPr rtlCol="0" anchor="ctr"/>
+          <a:lstStyle/>
+          <a:p>
+            <a:pPr algn="ctr"/>
+            <a:endParaRPr lang="es-PE" sz="1100" dirty="0"/>
+          </a:p>
+        </p:txBody>
+      </p:sp>
+      <p:sp>
+        <p:nvSpPr>
+          <p:cNvPr id="41" name="Rectángulo 40">
+            <a:extLst>
+              <a:ext uri="{FF2B5EF4-FFF2-40B4-BE49-F238E27FC236}">
+                <a16:creationId xmlns:a16="http://schemas.microsoft.com/office/drawing/2014/main" id="{8E962F54-62D8-4467-B6CF-7951456C400A}"/>
+              </a:ext>
+            </a:extLst>
+          </p:cNvPr>
+          <p:cNvSpPr/>
+          <p:nvPr/>
+        </p:nvSpPr>
+        <p:spPr>
+          <a:xfrm>
+            <a:off x="6215634" y="2691384"/>
+            <a:ext cx="1241298" cy="301752"/>
+          </a:xfrm>
+          <a:prstGeom prst="rect">
+            <a:avLst/>
+          </a:prstGeom>
+        </p:spPr>
+        <p:style>
+          <a:lnRef idx="2">
+            <a:schemeClr val="dk1"/>
+          </a:lnRef>
+          <a:fillRef idx="1">
+            <a:schemeClr val="lt1"/>
+          </a:fillRef>
+          <a:effectRef idx="0">
+            <a:schemeClr val="dk1"/>
+          </a:effectRef>
+          <a:fontRef idx="minor">
+            <a:schemeClr val="dk1"/>
+          </a:fontRef>
+        </p:style>
+        <p:txBody>
+          <a:bodyPr rtlCol="0" anchor="ctr"/>
+          <a:lstStyle/>
+          <a:p>
+            <a:pPr algn="ctr"/>
+            <a:endParaRPr lang="es-PE" sz="1100" dirty="0"/>
+          </a:p>
+        </p:txBody>
+      </p:sp>
+      <p:sp>
+        <p:nvSpPr>
+          <p:cNvPr id="42" name="Rectángulo 41">
+            <a:extLst>
+              <a:ext uri="{FF2B5EF4-FFF2-40B4-BE49-F238E27FC236}">
+                <a16:creationId xmlns:a16="http://schemas.microsoft.com/office/drawing/2014/main" id="{B99E7470-DADD-44BD-AB05-ADC176BC27AF}"/>
+              </a:ext>
+            </a:extLst>
+          </p:cNvPr>
+          <p:cNvSpPr/>
+          <p:nvPr/>
+        </p:nvSpPr>
+        <p:spPr>
+          <a:xfrm>
+            <a:off x="7454646" y="2691384"/>
+            <a:ext cx="1083564" cy="301752"/>
+          </a:xfrm>
+          <a:prstGeom prst="rect">
+            <a:avLst/>
+          </a:prstGeom>
+        </p:spPr>
+        <p:style>
+          <a:lnRef idx="2">
+            <a:schemeClr val="dk1"/>
+          </a:lnRef>
+          <a:fillRef idx="1">
+            <a:schemeClr val="lt1"/>
+          </a:fillRef>
+          <a:effectRef idx="0">
+            <a:schemeClr val="dk1"/>
+          </a:effectRef>
+          <a:fontRef idx="minor">
+            <a:schemeClr val="dk1"/>
+          </a:fontRef>
+        </p:style>
+        <p:txBody>
+          <a:bodyPr rtlCol="0" anchor="ctr"/>
+          <a:lstStyle/>
+          <a:p>
+            <a:pPr algn="ctr"/>
+            <a:endParaRPr lang="es-PE" sz="1100" dirty="0"/>
+          </a:p>
+        </p:txBody>
+      </p:sp>
+      <p:sp>
+        <p:nvSpPr>
+          <p:cNvPr id="43" name="Rectángulo 42">
+            <a:extLst>
+              <a:ext uri="{FF2B5EF4-FFF2-40B4-BE49-F238E27FC236}">
+                <a16:creationId xmlns:a16="http://schemas.microsoft.com/office/drawing/2014/main" id="{EF64B3C9-364D-4008-9BD9-DF6772095950}"/>
+              </a:ext>
+            </a:extLst>
+          </p:cNvPr>
+          <p:cNvSpPr/>
+          <p:nvPr/>
+        </p:nvSpPr>
+        <p:spPr>
+          <a:xfrm>
+            <a:off x="8538210" y="2691384"/>
+            <a:ext cx="864108" cy="301752"/>
+          </a:xfrm>
+          <a:prstGeom prst="rect">
+            <a:avLst/>
+          </a:prstGeom>
+        </p:spPr>
+        <p:style>
+          <a:lnRef idx="2">
+            <a:schemeClr val="dk1"/>
+          </a:lnRef>
+          <a:fillRef idx="1">
+            <a:schemeClr val="lt1"/>
+          </a:fillRef>
+          <a:effectRef idx="0">
+            <a:schemeClr val="dk1"/>
+          </a:effectRef>
+          <a:fontRef idx="minor">
+            <a:schemeClr val="dk1"/>
+          </a:fontRef>
+        </p:style>
+        <p:txBody>
+          <a:bodyPr rtlCol="0" anchor="ctr"/>
+          <a:lstStyle/>
+          <a:p>
+            <a:pPr algn="ctr"/>
+            <a:endParaRPr lang="es-PE" sz="1100" dirty="0"/>
+          </a:p>
+        </p:txBody>
+      </p:sp>
+      <p:sp>
+        <p:nvSpPr>
+          <p:cNvPr id="44" name="Rectángulo 43">
+            <a:extLst>
+              <a:ext uri="{FF2B5EF4-FFF2-40B4-BE49-F238E27FC236}">
+                <a16:creationId xmlns:a16="http://schemas.microsoft.com/office/drawing/2014/main" id="{10FA4896-D313-496E-90D8-6872DA93FB88}"/>
+              </a:ext>
+            </a:extLst>
+          </p:cNvPr>
+          <p:cNvSpPr/>
+          <p:nvPr/>
+        </p:nvSpPr>
+        <p:spPr>
+          <a:xfrm>
+            <a:off x="1837944" y="2997708"/>
+            <a:ext cx="1117854" cy="301752"/>
+          </a:xfrm>
+          <a:prstGeom prst="rect">
+            <a:avLst/>
+          </a:prstGeom>
+        </p:spPr>
+        <p:style>
+          <a:lnRef idx="2">
+            <a:schemeClr val="dk1"/>
+          </a:lnRef>
+          <a:fillRef idx="1">
+            <a:schemeClr val="lt1"/>
+          </a:fillRef>
+          <a:effectRef idx="0">
+            <a:schemeClr val="dk1"/>
+          </a:effectRef>
+          <a:fontRef idx="minor">
+            <a:schemeClr val="dk1"/>
+          </a:fontRef>
+        </p:style>
+        <p:txBody>
+          <a:bodyPr rtlCol="0" anchor="ctr"/>
+          <a:lstStyle/>
+          <a:p>
+            <a:pPr algn="ctr"/>
+            <a:endParaRPr lang="es-PE" sz="1100" dirty="0"/>
+          </a:p>
+        </p:txBody>
+      </p:sp>
+      <p:sp>
+        <p:nvSpPr>
+          <p:cNvPr id="45" name="Rectángulo 44">
+            <a:extLst>
+              <a:ext uri="{FF2B5EF4-FFF2-40B4-BE49-F238E27FC236}">
+                <a16:creationId xmlns:a16="http://schemas.microsoft.com/office/drawing/2014/main" id="{35DE9AAD-E941-46F5-989A-E49EB7592051}"/>
+              </a:ext>
+            </a:extLst>
+          </p:cNvPr>
+          <p:cNvSpPr/>
+          <p:nvPr/>
+        </p:nvSpPr>
+        <p:spPr>
+          <a:xfrm>
+            <a:off x="2951226" y="2994660"/>
+            <a:ext cx="1008126" cy="301752"/>
+          </a:xfrm>
+          <a:prstGeom prst="rect">
+            <a:avLst/>
+          </a:prstGeom>
+        </p:spPr>
+        <p:style>
+          <a:lnRef idx="2">
+            <a:schemeClr val="dk1"/>
+          </a:lnRef>
+          <a:fillRef idx="1">
+            <a:schemeClr val="lt1"/>
+          </a:fillRef>
+          <a:effectRef idx="0">
+            <a:schemeClr val="dk1"/>
+          </a:effectRef>
+          <a:fontRef idx="minor">
+            <a:schemeClr val="dk1"/>
+          </a:fontRef>
+        </p:style>
+        <p:txBody>
+          <a:bodyPr rtlCol="0" anchor="ctr"/>
+          <a:lstStyle/>
+          <a:p>
+            <a:pPr algn="ctr"/>
+            <a:endParaRPr lang="es-PE" sz="1100" dirty="0"/>
+          </a:p>
+        </p:txBody>
+      </p:sp>
+      <p:sp>
+        <p:nvSpPr>
+          <p:cNvPr id="46" name="Rectángulo 45">
+            <a:extLst>
+              <a:ext uri="{FF2B5EF4-FFF2-40B4-BE49-F238E27FC236}">
+                <a16:creationId xmlns:a16="http://schemas.microsoft.com/office/drawing/2014/main" id="{C1CFEAEF-C3A8-490C-9AF9-71BA34DBC01C}"/>
+              </a:ext>
+            </a:extLst>
+          </p:cNvPr>
+          <p:cNvSpPr/>
+          <p:nvPr/>
+        </p:nvSpPr>
+        <p:spPr>
+          <a:xfrm>
+            <a:off x="3959352" y="2997708"/>
+            <a:ext cx="2256282" cy="301752"/>
+          </a:xfrm>
+          <a:prstGeom prst="rect">
+            <a:avLst/>
+          </a:prstGeom>
+        </p:spPr>
+        <p:style>
+          <a:lnRef idx="2">
+            <a:schemeClr val="dk1"/>
+          </a:lnRef>
+          <a:fillRef idx="1">
+            <a:schemeClr val="lt1"/>
+          </a:fillRef>
+          <a:effectRef idx="0">
+            <a:schemeClr val="dk1"/>
+          </a:effectRef>
+          <a:fontRef idx="minor">
+            <a:schemeClr val="dk1"/>
+          </a:fontRef>
+        </p:style>
+        <p:txBody>
+          <a:bodyPr rtlCol="0" anchor="ctr"/>
+          <a:lstStyle/>
+          <a:p>
+            <a:pPr algn="ctr"/>
+            <a:endParaRPr lang="es-PE" sz="1100" dirty="0"/>
+          </a:p>
+        </p:txBody>
+      </p:sp>
+      <p:sp>
+        <p:nvSpPr>
+          <p:cNvPr id="47" name="Rectángulo 46">
+            <a:extLst>
+              <a:ext uri="{FF2B5EF4-FFF2-40B4-BE49-F238E27FC236}">
+                <a16:creationId xmlns:a16="http://schemas.microsoft.com/office/drawing/2014/main" id="{EAD5D7B9-EDB0-4649-8B59-448232904E44}"/>
+              </a:ext>
+            </a:extLst>
+          </p:cNvPr>
+          <p:cNvSpPr/>
+          <p:nvPr/>
+        </p:nvSpPr>
+        <p:spPr>
+          <a:xfrm>
+            <a:off x="6215634" y="2994660"/>
+            <a:ext cx="1241298" cy="301752"/>
+          </a:xfrm>
+          <a:prstGeom prst="rect">
+            <a:avLst/>
+          </a:prstGeom>
+        </p:spPr>
+        <p:style>
+          <a:lnRef idx="2">
+            <a:schemeClr val="dk1"/>
+          </a:lnRef>
+          <a:fillRef idx="1">
+            <a:schemeClr val="lt1"/>
+          </a:fillRef>
+          <a:effectRef idx="0">
+            <a:schemeClr val="dk1"/>
+          </a:effectRef>
+          <a:fontRef idx="minor">
+            <a:schemeClr val="dk1"/>
+          </a:fontRef>
+        </p:style>
+        <p:txBody>
+          <a:bodyPr rtlCol="0" anchor="ctr"/>
+          <a:lstStyle/>
+          <a:p>
+            <a:pPr algn="ctr"/>
+            <a:endParaRPr lang="es-PE" sz="1100" dirty="0"/>
+          </a:p>
+        </p:txBody>
+      </p:sp>
+      <p:sp>
+        <p:nvSpPr>
+          <p:cNvPr id="48" name="Rectángulo 47">
+            <a:extLst>
+              <a:ext uri="{FF2B5EF4-FFF2-40B4-BE49-F238E27FC236}">
+                <a16:creationId xmlns:a16="http://schemas.microsoft.com/office/drawing/2014/main" id="{154B0574-F4AC-404E-AC2F-FCF43B27CCED}"/>
+              </a:ext>
+            </a:extLst>
+          </p:cNvPr>
+          <p:cNvSpPr/>
+          <p:nvPr/>
+        </p:nvSpPr>
+        <p:spPr>
+          <a:xfrm>
+            <a:off x="7454646" y="2994660"/>
+            <a:ext cx="1083564" cy="301752"/>
+          </a:xfrm>
+          <a:prstGeom prst="rect">
+            <a:avLst/>
+          </a:prstGeom>
+        </p:spPr>
+        <p:style>
+          <a:lnRef idx="2">
+            <a:schemeClr val="dk1"/>
+          </a:lnRef>
+          <a:fillRef idx="1">
+            <a:schemeClr val="lt1"/>
+          </a:fillRef>
+          <a:effectRef idx="0">
+            <a:schemeClr val="dk1"/>
+          </a:effectRef>
+          <a:fontRef idx="minor">
+            <a:schemeClr val="dk1"/>
+          </a:fontRef>
+        </p:style>
+        <p:txBody>
+          <a:bodyPr rtlCol="0" anchor="ctr"/>
+          <a:lstStyle/>
+          <a:p>
+            <a:pPr algn="ctr"/>
+            <a:endParaRPr lang="es-PE" sz="1100" dirty="0"/>
+          </a:p>
+        </p:txBody>
+      </p:sp>
+      <p:sp>
+        <p:nvSpPr>
+          <p:cNvPr id="49" name="Rectángulo 48">
+            <a:extLst>
+              <a:ext uri="{FF2B5EF4-FFF2-40B4-BE49-F238E27FC236}">
+                <a16:creationId xmlns:a16="http://schemas.microsoft.com/office/drawing/2014/main" id="{8C752E31-7B32-4052-B55B-8F5C5C271BE3}"/>
+              </a:ext>
+            </a:extLst>
+          </p:cNvPr>
+          <p:cNvSpPr/>
+          <p:nvPr/>
+        </p:nvSpPr>
+        <p:spPr>
+          <a:xfrm>
+            <a:off x="8538210" y="2994660"/>
+            <a:ext cx="864108" cy="301752"/>
+          </a:xfrm>
+          <a:prstGeom prst="rect">
+            <a:avLst/>
+          </a:prstGeom>
+        </p:spPr>
+        <p:style>
+          <a:lnRef idx="2">
+            <a:schemeClr val="dk1"/>
+          </a:lnRef>
+          <a:fillRef idx="1">
+            <a:schemeClr val="lt1"/>
+          </a:fillRef>
+          <a:effectRef idx="0">
+            <a:schemeClr val="dk1"/>
+          </a:effectRef>
+          <a:fontRef idx="minor">
+            <a:schemeClr val="dk1"/>
+          </a:fontRef>
+        </p:style>
+        <p:txBody>
+          <a:bodyPr rtlCol="0" anchor="ctr"/>
+          <a:lstStyle/>
+          <a:p>
+            <a:pPr algn="ctr"/>
+            <a:endParaRPr lang="es-PE" sz="1100" dirty="0"/>
+          </a:p>
+        </p:txBody>
+      </p:sp>
+      <p:sp>
+        <p:nvSpPr>
+          <p:cNvPr id="50" name="Rectángulo 49">
+            <a:extLst>
+              <a:ext uri="{FF2B5EF4-FFF2-40B4-BE49-F238E27FC236}">
+                <a16:creationId xmlns:a16="http://schemas.microsoft.com/office/drawing/2014/main" id="{0509DD43-A07F-4CC3-BBB3-BABEA87FBEF0}"/>
+              </a:ext>
+            </a:extLst>
+          </p:cNvPr>
+          <p:cNvSpPr/>
+          <p:nvPr/>
+        </p:nvSpPr>
+        <p:spPr>
+          <a:xfrm>
+            <a:off x="9402318" y="2382012"/>
+            <a:ext cx="829818" cy="301752"/>
+          </a:xfrm>
+          <a:prstGeom prst="rect">
+            <a:avLst/>
+          </a:prstGeom>
+        </p:spPr>
+        <p:style>
+          <a:lnRef idx="2">
+            <a:schemeClr val="dk1"/>
+          </a:lnRef>
+          <a:fillRef idx="1">
+            <a:schemeClr val="lt1"/>
+          </a:fillRef>
+          <a:effectRef idx="0">
+            <a:schemeClr val="dk1"/>
+          </a:effectRef>
+          <a:fontRef idx="minor">
+            <a:schemeClr val="dk1"/>
+          </a:fontRef>
+        </p:style>
+        <p:txBody>
+          <a:bodyPr rtlCol="0" anchor="ctr"/>
+          <a:lstStyle/>
+          <a:p>
+            <a:pPr algn="ctr"/>
+            <a:endParaRPr lang="es-PE" sz="1100" dirty="0"/>
+          </a:p>
+        </p:txBody>
+      </p:sp>
+      <p:sp>
+        <p:nvSpPr>
+          <p:cNvPr id="51" name="Rectángulo 50">
+            <a:extLst>
+              <a:ext uri="{FF2B5EF4-FFF2-40B4-BE49-F238E27FC236}">
+                <a16:creationId xmlns:a16="http://schemas.microsoft.com/office/drawing/2014/main" id="{A030E33F-7585-4720-BF44-DBB80360EDB9}"/>
+              </a:ext>
+            </a:extLst>
+          </p:cNvPr>
+          <p:cNvSpPr/>
+          <p:nvPr/>
+        </p:nvSpPr>
+        <p:spPr>
+          <a:xfrm>
+            <a:off x="9395460" y="2680716"/>
+            <a:ext cx="829818" cy="301752"/>
+          </a:xfrm>
+          <a:prstGeom prst="rect">
+            <a:avLst/>
+          </a:prstGeom>
+        </p:spPr>
+        <p:style>
+          <a:lnRef idx="2">
+            <a:schemeClr val="dk1"/>
+          </a:lnRef>
+          <a:fillRef idx="1">
+            <a:schemeClr val="lt1"/>
+          </a:fillRef>
+          <a:effectRef idx="0">
+            <a:schemeClr val="dk1"/>
+          </a:effectRef>
+          <a:fontRef idx="minor">
+            <a:schemeClr val="dk1"/>
+          </a:fontRef>
+        </p:style>
+        <p:txBody>
+          <a:bodyPr rtlCol="0" anchor="ctr"/>
+          <a:lstStyle/>
+          <a:p>
+            <a:pPr algn="ctr"/>
+            <a:endParaRPr lang="es-PE" sz="1100" dirty="0"/>
+          </a:p>
+        </p:txBody>
+      </p:sp>
+      <p:sp>
+        <p:nvSpPr>
+          <p:cNvPr id="52" name="Rectángulo 51">
+            <a:extLst>
+              <a:ext uri="{FF2B5EF4-FFF2-40B4-BE49-F238E27FC236}">
+                <a16:creationId xmlns:a16="http://schemas.microsoft.com/office/drawing/2014/main" id="{6540E53C-F5AD-4215-A641-5A100792D08F}"/>
+              </a:ext>
+            </a:extLst>
+          </p:cNvPr>
+          <p:cNvSpPr/>
+          <p:nvPr/>
+        </p:nvSpPr>
+        <p:spPr>
+          <a:xfrm>
+            <a:off x="9402318" y="2988564"/>
+            <a:ext cx="829818" cy="301752"/>
+          </a:xfrm>
+          <a:prstGeom prst="rect">
+            <a:avLst/>
+          </a:prstGeom>
+        </p:spPr>
+        <p:style>
+          <a:lnRef idx="2">
+            <a:schemeClr val="dk1"/>
+          </a:lnRef>
+          <a:fillRef idx="1">
+            <a:schemeClr val="lt1"/>
+          </a:fillRef>
+          <a:effectRef idx="0">
+            <a:schemeClr val="dk1"/>
+          </a:effectRef>
+          <a:fontRef idx="minor">
+            <a:schemeClr val="dk1"/>
+          </a:fontRef>
+        </p:style>
+        <p:txBody>
+          <a:bodyPr rtlCol="0" anchor="ctr"/>
+          <a:lstStyle/>
+          <a:p>
+            <a:pPr algn="ctr"/>
+            <a:endParaRPr lang="es-PE" sz="1100" dirty="0"/>
+          </a:p>
+        </p:txBody>
+      </p:sp>
+      <p:sp>
+        <p:nvSpPr>
+          <p:cNvPr id="74" name="Rectángulo 73">
+            <a:extLst>
+              <a:ext uri="{FF2B5EF4-FFF2-40B4-BE49-F238E27FC236}">
+                <a16:creationId xmlns:a16="http://schemas.microsoft.com/office/drawing/2014/main" id="{91F1C793-C1F0-48B0-BC12-A01D269BD500}"/>
+              </a:ext>
+            </a:extLst>
+          </p:cNvPr>
+          <p:cNvSpPr/>
+          <p:nvPr/>
+        </p:nvSpPr>
+        <p:spPr>
+          <a:xfrm>
+            <a:off x="1835658" y="3282696"/>
+            <a:ext cx="1117854" cy="301752"/>
+          </a:xfrm>
+          <a:prstGeom prst="rect">
+            <a:avLst/>
+          </a:prstGeom>
+        </p:spPr>
+        <p:style>
+          <a:lnRef idx="2">
+            <a:schemeClr val="dk1"/>
+          </a:lnRef>
+          <a:fillRef idx="1">
+            <a:schemeClr val="lt1"/>
+          </a:fillRef>
+          <a:effectRef idx="0">
+            <a:schemeClr val="dk1"/>
+          </a:effectRef>
+          <a:fontRef idx="minor">
+            <a:schemeClr val="dk1"/>
+          </a:fontRef>
+        </p:style>
+        <p:txBody>
+          <a:bodyPr rtlCol="0" anchor="ctr"/>
+          <a:lstStyle/>
+          <a:p>
+            <a:pPr algn="ctr"/>
+            <a:endParaRPr lang="es-PE" sz="1100" dirty="0"/>
+          </a:p>
+        </p:txBody>
+      </p:sp>
+      <p:sp>
+        <p:nvSpPr>
+          <p:cNvPr id="75" name="Rectángulo 74">
+            <a:extLst>
+              <a:ext uri="{FF2B5EF4-FFF2-40B4-BE49-F238E27FC236}">
+                <a16:creationId xmlns:a16="http://schemas.microsoft.com/office/drawing/2014/main" id="{8E460737-CC49-4D52-944B-C7670D9086D2}"/>
+              </a:ext>
+            </a:extLst>
+          </p:cNvPr>
+          <p:cNvSpPr/>
+          <p:nvPr/>
+        </p:nvSpPr>
+        <p:spPr>
+          <a:xfrm>
+            <a:off x="2948940" y="3279648"/>
+            <a:ext cx="1008126" cy="301752"/>
+          </a:xfrm>
+          <a:prstGeom prst="rect">
+            <a:avLst/>
+          </a:prstGeom>
+        </p:spPr>
+        <p:style>
+          <a:lnRef idx="2">
+            <a:schemeClr val="dk1"/>
+          </a:lnRef>
+          <a:fillRef idx="1">
+            <a:schemeClr val="lt1"/>
+          </a:fillRef>
+          <a:effectRef idx="0">
+            <a:schemeClr val="dk1"/>
+          </a:effectRef>
+          <a:fontRef idx="minor">
+            <a:schemeClr val="dk1"/>
+          </a:fontRef>
+        </p:style>
+        <p:txBody>
+          <a:bodyPr rtlCol="0" anchor="ctr"/>
+          <a:lstStyle/>
+          <a:p>
+            <a:pPr algn="ctr"/>
+            <a:endParaRPr lang="es-PE" sz="1100" dirty="0"/>
+          </a:p>
+        </p:txBody>
+      </p:sp>
+      <p:sp>
+        <p:nvSpPr>
+          <p:cNvPr id="76" name="Rectángulo 75">
+            <a:extLst>
+              <a:ext uri="{FF2B5EF4-FFF2-40B4-BE49-F238E27FC236}">
+                <a16:creationId xmlns:a16="http://schemas.microsoft.com/office/drawing/2014/main" id="{D2270C63-29E8-44CB-B5F9-010A4A33AE55}"/>
+              </a:ext>
+            </a:extLst>
+          </p:cNvPr>
+          <p:cNvSpPr/>
+          <p:nvPr/>
+        </p:nvSpPr>
+        <p:spPr>
+          <a:xfrm>
+            <a:off x="3957066" y="3282696"/>
+            <a:ext cx="2256282" cy="301752"/>
+          </a:xfrm>
+          <a:prstGeom prst="rect">
+            <a:avLst/>
+          </a:prstGeom>
+        </p:spPr>
+        <p:style>
+          <a:lnRef idx="2">
+            <a:schemeClr val="dk1"/>
+          </a:lnRef>
+          <a:fillRef idx="1">
+            <a:schemeClr val="lt1"/>
+          </a:fillRef>
+          <a:effectRef idx="0">
+            <a:schemeClr val="dk1"/>
+          </a:effectRef>
+          <a:fontRef idx="minor">
+            <a:schemeClr val="dk1"/>
+          </a:fontRef>
+        </p:style>
+        <p:txBody>
+          <a:bodyPr rtlCol="0" anchor="ctr"/>
+          <a:lstStyle/>
+          <a:p>
+            <a:pPr algn="ctr"/>
+            <a:endParaRPr lang="es-PE" sz="1100" dirty="0"/>
+          </a:p>
+        </p:txBody>
+      </p:sp>
+      <p:sp>
+        <p:nvSpPr>
+          <p:cNvPr id="77" name="Rectángulo 76">
+            <a:extLst>
+              <a:ext uri="{FF2B5EF4-FFF2-40B4-BE49-F238E27FC236}">
+                <a16:creationId xmlns:a16="http://schemas.microsoft.com/office/drawing/2014/main" id="{681A6073-8D6C-4BE9-9D54-5019B1439CC8}"/>
+              </a:ext>
+            </a:extLst>
+          </p:cNvPr>
+          <p:cNvSpPr/>
+          <p:nvPr/>
+        </p:nvSpPr>
+        <p:spPr>
+          <a:xfrm>
+            <a:off x="6213348" y="3279648"/>
+            <a:ext cx="1241298" cy="301752"/>
+          </a:xfrm>
+          <a:prstGeom prst="rect">
+            <a:avLst/>
+          </a:prstGeom>
+        </p:spPr>
+        <p:style>
+          <a:lnRef idx="2">
+            <a:schemeClr val="dk1"/>
+          </a:lnRef>
+          <a:fillRef idx="1">
+            <a:schemeClr val="lt1"/>
+          </a:fillRef>
+          <a:effectRef idx="0">
+            <a:schemeClr val="dk1"/>
+          </a:effectRef>
+          <a:fontRef idx="minor">
+            <a:schemeClr val="dk1"/>
+          </a:fontRef>
+        </p:style>
+        <p:txBody>
+          <a:bodyPr rtlCol="0" anchor="ctr"/>
+          <a:lstStyle/>
+          <a:p>
+            <a:pPr algn="ctr"/>
+            <a:endParaRPr lang="es-PE" sz="1100" dirty="0"/>
+          </a:p>
+        </p:txBody>
+      </p:sp>
+      <p:sp>
+        <p:nvSpPr>
+          <p:cNvPr id="78" name="Rectángulo 77">
+            <a:extLst>
+              <a:ext uri="{FF2B5EF4-FFF2-40B4-BE49-F238E27FC236}">
+                <a16:creationId xmlns:a16="http://schemas.microsoft.com/office/drawing/2014/main" id="{47C64876-C276-4701-B372-BE54F06C0CD0}"/>
+              </a:ext>
+            </a:extLst>
+          </p:cNvPr>
+          <p:cNvSpPr/>
+          <p:nvPr/>
+        </p:nvSpPr>
+        <p:spPr>
+          <a:xfrm>
+            <a:off x="7452360" y="3279648"/>
+            <a:ext cx="1083564" cy="301752"/>
+          </a:xfrm>
+          <a:prstGeom prst="rect">
+            <a:avLst/>
+          </a:prstGeom>
+        </p:spPr>
+        <p:style>
+          <a:lnRef idx="2">
+            <a:schemeClr val="dk1"/>
+          </a:lnRef>
+          <a:fillRef idx="1">
+            <a:schemeClr val="lt1"/>
+          </a:fillRef>
+          <a:effectRef idx="0">
+            <a:schemeClr val="dk1"/>
+          </a:effectRef>
+          <a:fontRef idx="minor">
+            <a:schemeClr val="dk1"/>
+          </a:fontRef>
+        </p:style>
+        <p:txBody>
+          <a:bodyPr rtlCol="0" anchor="ctr"/>
+          <a:lstStyle/>
+          <a:p>
+            <a:pPr algn="ctr"/>
+            <a:endParaRPr lang="es-PE" sz="1100" dirty="0"/>
+          </a:p>
+        </p:txBody>
+      </p:sp>
+      <p:sp>
+        <p:nvSpPr>
+          <p:cNvPr id="79" name="Rectángulo 78">
+            <a:extLst>
+              <a:ext uri="{FF2B5EF4-FFF2-40B4-BE49-F238E27FC236}">
+                <a16:creationId xmlns:a16="http://schemas.microsoft.com/office/drawing/2014/main" id="{5C44F0B6-DD4B-41D0-8616-4D18B5048FBD}"/>
+              </a:ext>
+            </a:extLst>
+          </p:cNvPr>
+          <p:cNvSpPr/>
+          <p:nvPr/>
+        </p:nvSpPr>
+        <p:spPr>
+          <a:xfrm>
+            <a:off x="8535924" y="3279648"/>
+            <a:ext cx="864108" cy="301752"/>
+          </a:xfrm>
+          <a:prstGeom prst="rect">
+            <a:avLst/>
+          </a:prstGeom>
+        </p:spPr>
+        <p:style>
+          <a:lnRef idx="2">
+            <a:schemeClr val="dk1"/>
+          </a:lnRef>
+          <a:fillRef idx="1">
+            <a:schemeClr val="lt1"/>
+          </a:fillRef>
+          <a:effectRef idx="0">
+            <a:schemeClr val="dk1"/>
+          </a:effectRef>
+          <a:fontRef idx="minor">
+            <a:schemeClr val="dk1"/>
+          </a:fontRef>
+        </p:style>
+        <p:txBody>
+          <a:bodyPr rtlCol="0" anchor="ctr"/>
+          <a:lstStyle/>
+          <a:p>
+            <a:pPr algn="ctr"/>
+            <a:endParaRPr lang="es-PE" sz="1100" dirty="0"/>
+          </a:p>
+        </p:txBody>
+      </p:sp>
+      <p:sp>
+        <p:nvSpPr>
+          <p:cNvPr id="80" name="Rectángulo 79">
+            <a:extLst>
+              <a:ext uri="{FF2B5EF4-FFF2-40B4-BE49-F238E27FC236}">
+                <a16:creationId xmlns:a16="http://schemas.microsoft.com/office/drawing/2014/main" id="{50B9E3EF-D58A-46B0-98EC-44E86C799DAA}"/>
+              </a:ext>
+            </a:extLst>
+          </p:cNvPr>
+          <p:cNvSpPr/>
+          <p:nvPr/>
+        </p:nvSpPr>
+        <p:spPr>
+          <a:xfrm>
+            <a:off x="1835658" y="3590544"/>
+            <a:ext cx="1117854" cy="301752"/>
+          </a:xfrm>
+          <a:prstGeom prst="rect">
+            <a:avLst/>
+          </a:prstGeom>
+        </p:spPr>
+        <p:style>
+          <a:lnRef idx="2">
+            <a:schemeClr val="dk1"/>
+          </a:lnRef>
+          <a:fillRef idx="1">
+            <a:schemeClr val="lt1"/>
+          </a:fillRef>
+          <a:effectRef idx="0">
+            <a:schemeClr val="dk1"/>
+          </a:effectRef>
+          <a:fontRef idx="minor">
+            <a:schemeClr val="dk1"/>
+          </a:fontRef>
+        </p:style>
+        <p:txBody>
+          <a:bodyPr rtlCol="0" anchor="ctr"/>
+          <a:lstStyle/>
+          <a:p>
+            <a:pPr algn="ctr"/>
+            <a:endParaRPr lang="es-PE" sz="1100" dirty="0"/>
+          </a:p>
+        </p:txBody>
+      </p:sp>
+      <p:sp>
+        <p:nvSpPr>
+          <p:cNvPr id="81" name="Rectángulo 80">
+            <a:extLst>
+              <a:ext uri="{FF2B5EF4-FFF2-40B4-BE49-F238E27FC236}">
+                <a16:creationId xmlns:a16="http://schemas.microsoft.com/office/drawing/2014/main" id="{B0A6A5D9-661C-4F9F-970C-4867127C5826}"/>
+              </a:ext>
+            </a:extLst>
+          </p:cNvPr>
+          <p:cNvSpPr/>
+          <p:nvPr/>
+        </p:nvSpPr>
+        <p:spPr>
+          <a:xfrm>
+            <a:off x="2948940" y="3587496"/>
+            <a:ext cx="1008126" cy="301752"/>
+          </a:xfrm>
+          <a:prstGeom prst="rect">
+            <a:avLst/>
+          </a:prstGeom>
+        </p:spPr>
+        <p:style>
+          <a:lnRef idx="2">
+            <a:schemeClr val="dk1"/>
+          </a:lnRef>
+          <a:fillRef idx="1">
+            <a:schemeClr val="lt1"/>
+          </a:fillRef>
+          <a:effectRef idx="0">
+            <a:schemeClr val="dk1"/>
+          </a:effectRef>
+          <a:fontRef idx="minor">
+            <a:schemeClr val="dk1"/>
+          </a:fontRef>
+        </p:style>
+        <p:txBody>
+          <a:bodyPr rtlCol="0" anchor="ctr"/>
+          <a:lstStyle/>
+          <a:p>
+            <a:pPr algn="ctr"/>
+            <a:endParaRPr lang="es-PE" sz="1100" dirty="0"/>
+          </a:p>
+        </p:txBody>
+      </p:sp>
+      <p:sp>
+        <p:nvSpPr>
+          <p:cNvPr id="82" name="Rectángulo 81">
+            <a:extLst>
+              <a:ext uri="{FF2B5EF4-FFF2-40B4-BE49-F238E27FC236}">
+                <a16:creationId xmlns:a16="http://schemas.microsoft.com/office/drawing/2014/main" id="{D56D73A7-1EAC-4F46-94B7-25A0D34351CD}"/>
+              </a:ext>
+            </a:extLst>
+          </p:cNvPr>
+          <p:cNvSpPr/>
+          <p:nvPr/>
+        </p:nvSpPr>
+        <p:spPr>
+          <a:xfrm>
+            <a:off x="3957066" y="3590544"/>
+            <a:ext cx="2256282" cy="301752"/>
+          </a:xfrm>
+          <a:prstGeom prst="rect">
+            <a:avLst/>
+          </a:prstGeom>
+        </p:spPr>
+        <p:style>
+          <a:lnRef idx="2">
+            <a:schemeClr val="dk1"/>
+          </a:lnRef>
+          <a:fillRef idx="1">
+            <a:schemeClr val="lt1"/>
+          </a:fillRef>
+          <a:effectRef idx="0">
+            <a:schemeClr val="dk1"/>
+          </a:effectRef>
+          <a:fontRef idx="minor">
+            <a:schemeClr val="dk1"/>
+          </a:fontRef>
+        </p:style>
+        <p:txBody>
+          <a:bodyPr rtlCol="0" anchor="ctr"/>
+          <a:lstStyle/>
+          <a:p>
+            <a:pPr algn="ctr"/>
+            <a:endParaRPr lang="es-PE" sz="1100" dirty="0"/>
+          </a:p>
+        </p:txBody>
+      </p:sp>
+      <p:sp>
+        <p:nvSpPr>
+          <p:cNvPr id="83" name="Rectángulo 82">
+            <a:extLst>
+              <a:ext uri="{FF2B5EF4-FFF2-40B4-BE49-F238E27FC236}">
+                <a16:creationId xmlns:a16="http://schemas.microsoft.com/office/drawing/2014/main" id="{2BB3BE28-D7AA-4D99-98AD-6CECBE91C5C3}"/>
+              </a:ext>
+            </a:extLst>
+          </p:cNvPr>
+          <p:cNvSpPr/>
+          <p:nvPr/>
+        </p:nvSpPr>
+        <p:spPr>
+          <a:xfrm>
+            <a:off x="6213348" y="3587496"/>
+            <a:ext cx="1241298" cy="301752"/>
+          </a:xfrm>
+          <a:prstGeom prst="rect">
+            <a:avLst/>
+          </a:prstGeom>
+        </p:spPr>
+        <p:style>
+          <a:lnRef idx="2">
+            <a:schemeClr val="dk1"/>
+          </a:lnRef>
+          <a:fillRef idx="1">
+            <a:schemeClr val="lt1"/>
+          </a:fillRef>
+          <a:effectRef idx="0">
+            <a:schemeClr val="dk1"/>
+          </a:effectRef>
+          <a:fontRef idx="minor">
+            <a:schemeClr val="dk1"/>
+          </a:fontRef>
+        </p:style>
+        <p:txBody>
+          <a:bodyPr rtlCol="0" anchor="ctr"/>
+          <a:lstStyle/>
+          <a:p>
+            <a:pPr algn="ctr"/>
+            <a:endParaRPr lang="es-PE" sz="1100" dirty="0"/>
+          </a:p>
+        </p:txBody>
+      </p:sp>
+      <p:sp>
+        <p:nvSpPr>
+          <p:cNvPr id="84" name="Rectángulo 83">
+            <a:extLst>
+              <a:ext uri="{FF2B5EF4-FFF2-40B4-BE49-F238E27FC236}">
+                <a16:creationId xmlns:a16="http://schemas.microsoft.com/office/drawing/2014/main" id="{B1833811-BFAC-4A0C-A164-48281E8EAEB0}"/>
+              </a:ext>
+            </a:extLst>
+          </p:cNvPr>
+          <p:cNvSpPr/>
+          <p:nvPr/>
+        </p:nvSpPr>
+        <p:spPr>
+          <a:xfrm>
+            <a:off x="7452360" y="3587496"/>
+            <a:ext cx="1083564" cy="301752"/>
+          </a:xfrm>
+          <a:prstGeom prst="rect">
+            <a:avLst/>
+          </a:prstGeom>
+        </p:spPr>
+        <p:style>
+          <a:lnRef idx="2">
+            <a:schemeClr val="dk1"/>
+          </a:lnRef>
+          <a:fillRef idx="1">
+            <a:schemeClr val="lt1"/>
+          </a:fillRef>
+          <a:effectRef idx="0">
+            <a:schemeClr val="dk1"/>
+          </a:effectRef>
+          <a:fontRef idx="minor">
+            <a:schemeClr val="dk1"/>
+          </a:fontRef>
+        </p:style>
+        <p:txBody>
+          <a:bodyPr rtlCol="0" anchor="ctr"/>
+          <a:lstStyle/>
+          <a:p>
+            <a:pPr algn="ctr"/>
+            <a:endParaRPr lang="es-PE" sz="1100" dirty="0"/>
+          </a:p>
+        </p:txBody>
+      </p:sp>
+      <p:sp>
+        <p:nvSpPr>
+          <p:cNvPr id="85" name="Rectángulo 84">
+            <a:extLst>
+              <a:ext uri="{FF2B5EF4-FFF2-40B4-BE49-F238E27FC236}">
+                <a16:creationId xmlns:a16="http://schemas.microsoft.com/office/drawing/2014/main" id="{E9D5416C-93E3-4D34-91A3-3792F0EC8570}"/>
+              </a:ext>
+            </a:extLst>
+          </p:cNvPr>
+          <p:cNvSpPr/>
+          <p:nvPr/>
+        </p:nvSpPr>
+        <p:spPr>
+          <a:xfrm>
+            <a:off x="8535924" y="3587496"/>
+            <a:ext cx="864108" cy="301752"/>
+          </a:xfrm>
+          <a:prstGeom prst="rect">
+            <a:avLst/>
+          </a:prstGeom>
+        </p:spPr>
+        <p:style>
+          <a:lnRef idx="2">
+            <a:schemeClr val="dk1"/>
+          </a:lnRef>
+          <a:fillRef idx="1">
+            <a:schemeClr val="lt1"/>
+          </a:fillRef>
+          <a:effectRef idx="0">
+            <a:schemeClr val="dk1"/>
+          </a:effectRef>
+          <a:fontRef idx="minor">
+            <a:schemeClr val="dk1"/>
+          </a:fontRef>
+        </p:style>
+        <p:txBody>
+          <a:bodyPr rtlCol="0" anchor="ctr"/>
+          <a:lstStyle/>
+          <a:p>
+            <a:pPr algn="ctr"/>
+            <a:endParaRPr lang="es-PE" sz="1100" dirty="0"/>
+          </a:p>
+        </p:txBody>
+      </p:sp>
+      <p:sp>
+        <p:nvSpPr>
+          <p:cNvPr id="86" name="Rectángulo 85">
+            <a:extLst>
+              <a:ext uri="{FF2B5EF4-FFF2-40B4-BE49-F238E27FC236}">
+                <a16:creationId xmlns:a16="http://schemas.microsoft.com/office/drawing/2014/main" id="{181D827C-36F6-48DA-A0F8-DEEA3F6891D6}"/>
+              </a:ext>
+            </a:extLst>
+          </p:cNvPr>
+          <p:cNvSpPr/>
+          <p:nvPr/>
+        </p:nvSpPr>
+        <p:spPr>
+          <a:xfrm>
+            <a:off x="1835658" y="3893820"/>
+            <a:ext cx="1117854" cy="301752"/>
+          </a:xfrm>
+          <a:prstGeom prst="rect">
+            <a:avLst/>
+          </a:prstGeom>
+        </p:spPr>
+        <p:style>
+          <a:lnRef idx="2">
+            <a:schemeClr val="dk1"/>
+          </a:lnRef>
+          <a:fillRef idx="1">
+            <a:schemeClr val="lt1"/>
+          </a:fillRef>
+          <a:effectRef idx="0">
+            <a:schemeClr val="dk1"/>
+          </a:effectRef>
+          <a:fontRef idx="minor">
+            <a:schemeClr val="dk1"/>
+          </a:fontRef>
+        </p:style>
+        <p:txBody>
+          <a:bodyPr rtlCol="0" anchor="ctr"/>
+          <a:lstStyle/>
+          <a:p>
+            <a:pPr algn="ctr"/>
+            <a:endParaRPr lang="es-PE" sz="1100" dirty="0"/>
+          </a:p>
+        </p:txBody>
+      </p:sp>
+      <p:sp>
+        <p:nvSpPr>
+          <p:cNvPr id="87" name="Rectángulo 86">
+            <a:extLst>
+              <a:ext uri="{FF2B5EF4-FFF2-40B4-BE49-F238E27FC236}">
+                <a16:creationId xmlns:a16="http://schemas.microsoft.com/office/drawing/2014/main" id="{E967675D-5B1C-41A2-84BA-E16C087FD51B}"/>
+              </a:ext>
+            </a:extLst>
+          </p:cNvPr>
+          <p:cNvSpPr/>
+          <p:nvPr/>
+        </p:nvSpPr>
+        <p:spPr>
+          <a:xfrm>
+            <a:off x="2948940" y="3890772"/>
+            <a:ext cx="1008126" cy="301752"/>
+          </a:xfrm>
+          <a:prstGeom prst="rect">
+            <a:avLst/>
+          </a:prstGeom>
+        </p:spPr>
+        <p:style>
+          <a:lnRef idx="2">
+            <a:schemeClr val="dk1"/>
+          </a:lnRef>
+          <a:fillRef idx="1">
+            <a:schemeClr val="lt1"/>
+          </a:fillRef>
+          <a:effectRef idx="0">
+            <a:schemeClr val="dk1"/>
+          </a:effectRef>
+          <a:fontRef idx="minor">
+            <a:schemeClr val="dk1"/>
+          </a:fontRef>
+        </p:style>
+        <p:txBody>
+          <a:bodyPr rtlCol="0" anchor="ctr"/>
+          <a:lstStyle/>
+          <a:p>
+            <a:pPr algn="ctr"/>
+            <a:endParaRPr lang="es-PE" sz="1100" dirty="0"/>
+          </a:p>
+        </p:txBody>
+      </p:sp>
+      <p:sp>
+        <p:nvSpPr>
+          <p:cNvPr id="88" name="Rectángulo 87">
+            <a:extLst>
+              <a:ext uri="{FF2B5EF4-FFF2-40B4-BE49-F238E27FC236}">
+                <a16:creationId xmlns:a16="http://schemas.microsoft.com/office/drawing/2014/main" id="{7C7FC96C-AA13-48A2-8FB7-B443F764EC79}"/>
+              </a:ext>
+            </a:extLst>
+          </p:cNvPr>
+          <p:cNvSpPr/>
+          <p:nvPr/>
+        </p:nvSpPr>
+        <p:spPr>
+          <a:xfrm>
+            <a:off x="3957066" y="3893820"/>
+            <a:ext cx="2256282" cy="301752"/>
+          </a:xfrm>
+          <a:prstGeom prst="rect">
+            <a:avLst/>
+          </a:prstGeom>
+        </p:spPr>
+        <p:style>
+          <a:lnRef idx="2">
+            <a:schemeClr val="dk1"/>
+          </a:lnRef>
+          <a:fillRef idx="1">
+            <a:schemeClr val="lt1"/>
+          </a:fillRef>
+          <a:effectRef idx="0">
+            <a:schemeClr val="dk1"/>
+          </a:effectRef>
+          <a:fontRef idx="minor">
+            <a:schemeClr val="dk1"/>
+          </a:fontRef>
+        </p:style>
+        <p:txBody>
+          <a:bodyPr rtlCol="0" anchor="ctr"/>
+          <a:lstStyle/>
+          <a:p>
+            <a:pPr algn="ctr"/>
+            <a:endParaRPr lang="es-PE" sz="1100" dirty="0"/>
+          </a:p>
+        </p:txBody>
+      </p:sp>
+      <p:sp>
+        <p:nvSpPr>
+          <p:cNvPr id="89" name="Rectángulo 88">
+            <a:extLst>
+              <a:ext uri="{FF2B5EF4-FFF2-40B4-BE49-F238E27FC236}">
+                <a16:creationId xmlns:a16="http://schemas.microsoft.com/office/drawing/2014/main" id="{228C59CA-8400-4965-9658-3CF4EF9DA6BD}"/>
+              </a:ext>
+            </a:extLst>
+          </p:cNvPr>
+          <p:cNvSpPr/>
+          <p:nvPr/>
+        </p:nvSpPr>
+        <p:spPr>
+          <a:xfrm>
+            <a:off x="6213348" y="3890772"/>
+            <a:ext cx="1241298" cy="301752"/>
+          </a:xfrm>
+          <a:prstGeom prst="rect">
+            <a:avLst/>
+          </a:prstGeom>
+        </p:spPr>
+        <p:style>
+          <a:lnRef idx="2">
+            <a:schemeClr val="dk1"/>
+          </a:lnRef>
+          <a:fillRef idx="1">
+            <a:schemeClr val="lt1"/>
+          </a:fillRef>
+          <a:effectRef idx="0">
+            <a:schemeClr val="dk1"/>
+          </a:effectRef>
+          <a:fontRef idx="minor">
+            <a:schemeClr val="dk1"/>
+          </a:fontRef>
+        </p:style>
+        <p:txBody>
+          <a:bodyPr rtlCol="0" anchor="ctr"/>
+          <a:lstStyle/>
+          <a:p>
+            <a:pPr algn="ctr"/>
+            <a:endParaRPr lang="es-PE" sz="1100" dirty="0"/>
+          </a:p>
+        </p:txBody>
+      </p:sp>
+      <p:sp>
+        <p:nvSpPr>
+          <p:cNvPr id="90" name="Rectángulo 89">
+            <a:extLst>
+              <a:ext uri="{FF2B5EF4-FFF2-40B4-BE49-F238E27FC236}">
+                <a16:creationId xmlns:a16="http://schemas.microsoft.com/office/drawing/2014/main" id="{C2FA249F-2454-41EC-862D-8373D7EDE573}"/>
+              </a:ext>
+            </a:extLst>
+          </p:cNvPr>
+          <p:cNvSpPr/>
+          <p:nvPr/>
+        </p:nvSpPr>
+        <p:spPr>
+          <a:xfrm>
+            <a:off x="7452360" y="3890772"/>
+            <a:ext cx="1083564" cy="301752"/>
+          </a:xfrm>
+          <a:prstGeom prst="rect">
+            <a:avLst/>
+          </a:prstGeom>
+        </p:spPr>
+        <p:style>
+          <a:lnRef idx="2">
+            <a:schemeClr val="dk1"/>
+          </a:lnRef>
+          <a:fillRef idx="1">
+            <a:schemeClr val="lt1"/>
+          </a:fillRef>
+          <a:effectRef idx="0">
+            <a:schemeClr val="dk1"/>
+          </a:effectRef>
+          <a:fontRef idx="minor">
+            <a:schemeClr val="dk1"/>
+          </a:fontRef>
+        </p:style>
+        <p:txBody>
+          <a:bodyPr rtlCol="0" anchor="ctr"/>
+          <a:lstStyle/>
+          <a:p>
+            <a:pPr algn="ctr"/>
+            <a:endParaRPr lang="es-PE" sz="1100" dirty="0"/>
+          </a:p>
+        </p:txBody>
+      </p:sp>
+      <p:sp>
+        <p:nvSpPr>
+          <p:cNvPr id="91" name="Rectángulo 90">
+            <a:extLst>
+              <a:ext uri="{FF2B5EF4-FFF2-40B4-BE49-F238E27FC236}">
+                <a16:creationId xmlns:a16="http://schemas.microsoft.com/office/drawing/2014/main" id="{3927857C-88F3-49AB-B46E-5A7A31A9EDD8}"/>
+              </a:ext>
+            </a:extLst>
+          </p:cNvPr>
+          <p:cNvSpPr/>
+          <p:nvPr/>
+        </p:nvSpPr>
+        <p:spPr>
+          <a:xfrm>
+            <a:off x="8535924" y="3890772"/>
+            <a:ext cx="864108" cy="301752"/>
+          </a:xfrm>
+          <a:prstGeom prst="rect">
+            <a:avLst/>
+          </a:prstGeom>
+        </p:spPr>
+        <p:style>
+          <a:lnRef idx="2">
+            <a:schemeClr val="dk1"/>
+          </a:lnRef>
+          <a:fillRef idx="1">
+            <a:schemeClr val="lt1"/>
+          </a:fillRef>
+          <a:effectRef idx="0">
+            <a:schemeClr val="dk1"/>
+          </a:effectRef>
+          <a:fontRef idx="minor">
+            <a:schemeClr val="dk1"/>
+          </a:fontRef>
+        </p:style>
+        <p:txBody>
+          <a:bodyPr rtlCol="0" anchor="ctr"/>
+          <a:lstStyle/>
+          <a:p>
+            <a:pPr algn="ctr"/>
+            <a:endParaRPr lang="es-PE" sz="1100" dirty="0"/>
+          </a:p>
+        </p:txBody>
+      </p:sp>
+      <p:sp>
+        <p:nvSpPr>
+          <p:cNvPr id="92" name="Rectángulo 91">
+            <a:extLst>
+              <a:ext uri="{FF2B5EF4-FFF2-40B4-BE49-F238E27FC236}">
+                <a16:creationId xmlns:a16="http://schemas.microsoft.com/office/drawing/2014/main" id="{CE6283AC-C458-434C-89FE-B16B1E2C9381}"/>
+              </a:ext>
+            </a:extLst>
+          </p:cNvPr>
+          <p:cNvSpPr/>
+          <p:nvPr/>
+        </p:nvSpPr>
+        <p:spPr>
+          <a:xfrm>
+            <a:off x="9400032" y="3278124"/>
+            <a:ext cx="829818" cy="301752"/>
+          </a:xfrm>
+          <a:prstGeom prst="rect">
+            <a:avLst/>
+          </a:prstGeom>
+        </p:spPr>
+        <p:style>
+          <a:lnRef idx="2">
+            <a:schemeClr val="dk1"/>
+          </a:lnRef>
+          <a:fillRef idx="1">
+            <a:schemeClr val="lt1"/>
+          </a:fillRef>
+          <a:effectRef idx="0">
+            <a:schemeClr val="dk1"/>
+          </a:effectRef>
+          <a:fontRef idx="minor">
+            <a:schemeClr val="dk1"/>
+          </a:fontRef>
+        </p:style>
+        <p:txBody>
+          <a:bodyPr rtlCol="0" anchor="ctr"/>
+          <a:lstStyle/>
+          <a:p>
+            <a:pPr algn="ctr"/>
+            <a:endParaRPr lang="es-PE" sz="1100" dirty="0"/>
+          </a:p>
+        </p:txBody>
+      </p:sp>
+      <p:sp>
+        <p:nvSpPr>
+          <p:cNvPr id="93" name="Rectángulo 92">
+            <a:extLst>
+              <a:ext uri="{FF2B5EF4-FFF2-40B4-BE49-F238E27FC236}">
+                <a16:creationId xmlns:a16="http://schemas.microsoft.com/office/drawing/2014/main" id="{06BCC52A-B3CF-421E-9ABD-93FE48C7629F}"/>
+              </a:ext>
+            </a:extLst>
+          </p:cNvPr>
+          <p:cNvSpPr/>
+          <p:nvPr/>
+        </p:nvSpPr>
+        <p:spPr>
+          <a:xfrm>
+            <a:off x="9393174" y="3576828"/>
+            <a:ext cx="829818" cy="301752"/>
+          </a:xfrm>
+          <a:prstGeom prst="rect">
+            <a:avLst/>
+          </a:prstGeom>
+        </p:spPr>
+        <p:style>
+          <a:lnRef idx="2">
+            <a:schemeClr val="dk1"/>
+          </a:lnRef>
+          <a:fillRef idx="1">
+            <a:schemeClr val="lt1"/>
+          </a:fillRef>
+          <a:effectRef idx="0">
+            <a:schemeClr val="dk1"/>
+          </a:effectRef>
+          <a:fontRef idx="minor">
+            <a:schemeClr val="dk1"/>
+          </a:fontRef>
+        </p:style>
+        <p:txBody>
+          <a:bodyPr rtlCol="0" anchor="ctr"/>
+          <a:lstStyle/>
+          <a:p>
+            <a:pPr algn="ctr"/>
+            <a:endParaRPr lang="es-PE" sz="1100" dirty="0"/>
+          </a:p>
+        </p:txBody>
+      </p:sp>
+      <p:sp>
+        <p:nvSpPr>
+          <p:cNvPr id="94" name="Rectángulo 93">
+            <a:extLst>
+              <a:ext uri="{FF2B5EF4-FFF2-40B4-BE49-F238E27FC236}">
+                <a16:creationId xmlns:a16="http://schemas.microsoft.com/office/drawing/2014/main" id="{05A67B8C-B9C3-47EB-BAA8-7AE81BE00BC1}"/>
+              </a:ext>
+            </a:extLst>
+          </p:cNvPr>
+          <p:cNvSpPr/>
+          <p:nvPr/>
+        </p:nvSpPr>
+        <p:spPr>
+          <a:xfrm>
+            <a:off x="9400032" y="3884676"/>
+            <a:ext cx="829818" cy="301752"/>
+          </a:xfrm>
+          <a:prstGeom prst="rect">
+            <a:avLst/>
+          </a:prstGeom>
+        </p:spPr>
+        <p:style>
+          <a:lnRef idx="2">
+            <a:schemeClr val="dk1"/>
+          </a:lnRef>
+          <a:fillRef idx="1">
+            <a:schemeClr val="lt1"/>
+          </a:fillRef>
+          <a:effectRef idx="0">
+            <a:schemeClr val="dk1"/>
+          </a:effectRef>
+          <a:fontRef idx="minor">
+            <a:schemeClr val="dk1"/>
+          </a:fontRef>
+        </p:style>
+        <p:txBody>
+          <a:bodyPr rtlCol="0" anchor="ctr"/>
+          <a:lstStyle/>
+          <a:p>
+            <a:pPr algn="ctr"/>
+            <a:endParaRPr lang="es-PE" sz="1100" dirty="0"/>
+          </a:p>
+        </p:txBody>
+      </p:sp>
+      <p:sp>
+        <p:nvSpPr>
+          <p:cNvPr id="95" name="Rectángulo 94">
+            <a:extLst>
+              <a:ext uri="{FF2B5EF4-FFF2-40B4-BE49-F238E27FC236}">
+                <a16:creationId xmlns:a16="http://schemas.microsoft.com/office/drawing/2014/main" id="{3296BF01-BE76-4ACB-B045-47941A21313A}"/>
+              </a:ext>
+            </a:extLst>
+          </p:cNvPr>
+          <p:cNvSpPr/>
+          <p:nvPr/>
+        </p:nvSpPr>
+        <p:spPr>
+          <a:xfrm>
+            <a:off x="1835658" y="4194048"/>
+            <a:ext cx="1117854" cy="301752"/>
+          </a:xfrm>
+          <a:prstGeom prst="rect">
+            <a:avLst/>
+          </a:prstGeom>
+        </p:spPr>
+        <p:style>
+          <a:lnRef idx="2">
+            <a:schemeClr val="dk1"/>
+          </a:lnRef>
+          <a:fillRef idx="1">
+            <a:schemeClr val="lt1"/>
+          </a:fillRef>
+          <a:effectRef idx="0">
+            <a:schemeClr val="dk1"/>
+          </a:effectRef>
+          <a:fontRef idx="minor">
+            <a:schemeClr val="dk1"/>
+          </a:fontRef>
+        </p:style>
+        <p:txBody>
+          <a:bodyPr rtlCol="0" anchor="ctr"/>
+          <a:lstStyle/>
+          <a:p>
+            <a:pPr algn="ctr"/>
+            <a:endParaRPr lang="es-PE" sz="1100" dirty="0"/>
+          </a:p>
+        </p:txBody>
+      </p:sp>
+      <p:sp>
+        <p:nvSpPr>
+          <p:cNvPr id="96" name="Rectángulo 95">
+            <a:extLst>
+              <a:ext uri="{FF2B5EF4-FFF2-40B4-BE49-F238E27FC236}">
+                <a16:creationId xmlns:a16="http://schemas.microsoft.com/office/drawing/2014/main" id="{BD2CB295-A1F3-4DA9-B4F7-1011BDCDDDEF}"/>
+              </a:ext>
+            </a:extLst>
+          </p:cNvPr>
+          <p:cNvSpPr/>
+          <p:nvPr/>
+        </p:nvSpPr>
+        <p:spPr>
+          <a:xfrm>
+            <a:off x="2948940" y="4191000"/>
+            <a:ext cx="1008126" cy="301752"/>
+          </a:xfrm>
+          <a:prstGeom prst="rect">
+            <a:avLst/>
+          </a:prstGeom>
+        </p:spPr>
+        <p:style>
+          <a:lnRef idx="2">
+            <a:schemeClr val="dk1"/>
+          </a:lnRef>
+          <a:fillRef idx="1">
+            <a:schemeClr val="lt1"/>
+          </a:fillRef>
+          <a:effectRef idx="0">
+            <a:schemeClr val="dk1"/>
+          </a:effectRef>
+          <a:fontRef idx="minor">
+            <a:schemeClr val="dk1"/>
+          </a:fontRef>
+        </p:style>
+        <p:txBody>
+          <a:bodyPr rtlCol="0" anchor="ctr"/>
+          <a:lstStyle/>
+          <a:p>
+            <a:pPr algn="ctr"/>
+            <a:endParaRPr lang="es-PE" sz="1100" dirty="0"/>
+          </a:p>
+        </p:txBody>
+      </p:sp>
+      <p:sp>
+        <p:nvSpPr>
+          <p:cNvPr id="97" name="Rectángulo 96">
+            <a:extLst>
+              <a:ext uri="{FF2B5EF4-FFF2-40B4-BE49-F238E27FC236}">
+                <a16:creationId xmlns:a16="http://schemas.microsoft.com/office/drawing/2014/main" id="{352B225E-7A2F-43AA-A26E-B9F1B235ABD6}"/>
+              </a:ext>
+            </a:extLst>
+          </p:cNvPr>
+          <p:cNvSpPr/>
+          <p:nvPr/>
+        </p:nvSpPr>
+        <p:spPr>
+          <a:xfrm>
+            <a:off x="3957066" y="4194048"/>
+            <a:ext cx="2256282" cy="301752"/>
+          </a:xfrm>
+          <a:prstGeom prst="rect">
+            <a:avLst/>
+          </a:prstGeom>
+        </p:spPr>
+        <p:style>
+          <a:lnRef idx="2">
+            <a:schemeClr val="dk1"/>
+          </a:lnRef>
+          <a:fillRef idx="1">
+            <a:schemeClr val="lt1"/>
+          </a:fillRef>
+          <a:effectRef idx="0">
+            <a:schemeClr val="dk1"/>
+          </a:effectRef>
+          <a:fontRef idx="minor">
+            <a:schemeClr val="dk1"/>
+          </a:fontRef>
+        </p:style>
+        <p:txBody>
+          <a:bodyPr rtlCol="0" anchor="ctr"/>
+          <a:lstStyle/>
+          <a:p>
+            <a:pPr algn="ctr"/>
+            <a:endParaRPr lang="es-PE" sz="1100" dirty="0"/>
+          </a:p>
+        </p:txBody>
+      </p:sp>
+      <p:sp>
+        <p:nvSpPr>
+          <p:cNvPr id="98" name="Rectángulo 97">
+            <a:extLst>
+              <a:ext uri="{FF2B5EF4-FFF2-40B4-BE49-F238E27FC236}">
+                <a16:creationId xmlns:a16="http://schemas.microsoft.com/office/drawing/2014/main" id="{275D054C-6C37-48E2-8EE2-4841A870C335}"/>
+              </a:ext>
+            </a:extLst>
+          </p:cNvPr>
+          <p:cNvSpPr/>
+          <p:nvPr/>
+        </p:nvSpPr>
+        <p:spPr>
+          <a:xfrm>
+            <a:off x="6213348" y="4191000"/>
+            <a:ext cx="1241298" cy="301752"/>
+          </a:xfrm>
+          <a:prstGeom prst="rect">
+            <a:avLst/>
+          </a:prstGeom>
+        </p:spPr>
+        <p:style>
+          <a:lnRef idx="2">
+            <a:schemeClr val="dk1"/>
+          </a:lnRef>
+          <a:fillRef idx="1">
+            <a:schemeClr val="lt1"/>
+          </a:fillRef>
+          <a:effectRef idx="0">
+            <a:schemeClr val="dk1"/>
+          </a:effectRef>
+          <a:fontRef idx="minor">
+            <a:schemeClr val="dk1"/>
+          </a:fontRef>
+        </p:style>
+        <p:txBody>
+          <a:bodyPr rtlCol="0" anchor="ctr"/>
+          <a:lstStyle/>
+          <a:p>
+            <a:pPr algn="ctr"/>
+            <a:endParaRPr lang="es-PE" sz="1100" dirty="0"/>
+          </a:p>
+        </p:txBody>
+      </p:sp>
+      <p:sp>
+        <p:nvSpPr>
+          <p:cNvPr id="99" name="Rectángulo 98">
+            <a:extLst>
+              <a:ext uri="{FF2B5EF4-FFF2-40B4-BE49-F238E27FC236}">
+                <a16:creationId xmlns:a16="http://schemas.microsoft.com/office/drawing/2014/main" id="{52B2B099-6734-49C1-9EC2-249E92023137}"/>
+              </a:ext>
+            </a:extLst>
+          </p:cNvPr>
+          <p:cNvSpPr/>
+          <p:nvPr/>
+        </p:nvSpPr>
+        <p:spPr>
+          <a:xfrm>
+            <a:off x="7452360" y="4191000"/>
+            <a:ext cx="1083564" cy="301752"/>
+          </a:xfrm>
+          <a:prstGeom prst="rect">
+            <a:avLst/>
+          </a:prstGeom>
+        </p:spPr>
+        <p:style>
+          <a:lnRef idx="2">
+            <a:schemeClr val="dk1"/>
+          </a:lnRef>
+          <a:fillRef idx="1">
+            <a:schemeClr val="lt1"/>
+          </a:fillRef>
+          <a:effectRef idx="0">
+            <a:schemeClr val="dk1"/>
+          </a:effectRef>
+          <a:fontRef idx="minor">
+            <a:schemeClr val="dk1"/>
+          </a:fontRef>
+        </p:style>
+        <p:txBody>
+          <a:bodyPr rtlCol="0" anchor="ctr"/>
+          <a:lstStyle/>
+          <a:p>
+            <a:pPr algn="ctr"/>
+            <a:endParaRPr lang="es-PE" sz="1100" dirty="0"/>
+          </a:p>
+        </p:txBody>
+      </p:sp>
+      <p:sp>
+        <p:nvSpPr>
+          <p:cNvPr id="100" name="Rectángulo 99">
+            <a:extLst>
+              <a:ext uri="{FF2B5EF4-FFF2-40B4-BE49-F238E27FC236}">
+                <a16:creationId xmlns:a16="http://schemas.microsoft.com/office/drawing/2014/main" id="{9C070142-517E-45C2-B7A9-EF04C3F26C91}"/>
+              </a:ext>
+            </a:extLst>
+          </p:cNvPr>
+          <p:cNvSpPr/>
+          <p:nvPr/>
+        </p:nvSpPr>
+        <p:spPr>
+          <a:xfrm>
+            <a:off x="8535924" y="4191000"/>
+            <a:ext cx="864108" cy="301752"/>
+          </a:xfrm>
+          <a:prstGeom prst="rect">
+            <a:avLst/>
+          </a:prstGeom>
+        </p:spPr>
+        <p:style>
+          <a:lnRef idx="2">
+            <a:schemeClr val="dk1"/>
+          </a:lnRef>
+          <a:fillRef idx="1">
+            <a:schemeClr val="lt1"/>
+          </a:fillRef>
+          <a:effectRef idx="0">
+            <a:schemeClr val="dk1"/>
+          </a:effectRef>
+          <a:fontRef idx="minor">
+            <a:schemeClr val="dk1"/>
+          </a:fontRef>
+        </p:style>
+        <p:txBody>
+          <a:bodyPr rtlCol="0" anchor="ctr"/>
+          <a:lstStyle/>
+          <a:p>
+            <a:pPr algn="ctr"/>
+            <a:endParaRPr lang="es-PE" sz="1100" dirty="0"/>
+          </a:p>
+        </p:txBody>
+      </p:sp>
+      <p:sp>
+        <p:nvSpPr>
+          <p:cNvPr id="101" name="Rectángulo 100">
+            <a:extLst>
+              <a:ext uri="{FF2B5EF4-FFF2-40B4-BE49-F238E27FC236}">
+                <a16:creationId xmlns:a16="http://schemas.microsoft.com/office/drawing/2014/main" id="{ECC4774B-0A0E-43DB-A6DA-15D02D0FF362}"/>
+              </a:ext>
+            </a:extLst>
+          </p:cNvPr>
+          <p:cNvSpPr/>
+          <p:nvPr/>
+        </p:nvSpPr>
+        <p:spPr>
+          <a:xfrm>
+            <a:off x="1835658" y="4501896"/>
+            <a:ext cx="1117854" cy="301752"/>
+          </a:xfrm>
+          <a:prstGeom prst="rect">
+            <a:avLst/>
+          </a:prstGeom>
+        </p:spPr>
+        <p:style>
+          <a:lnRef idx="2">
+            <a:schemeClr val="dk1"/>
+          </a:lnRef>
+          <a:fillRef idx="1">
+            <a:schemeClr val="lt1"/>
+          </a:fillRef>
+          <a:effectRef idx="0">
+            <a:schemeClr val="dk1"/>
+          </a:effectRef>
+          <a:fontRef idx="minor">
+            <a:schemeClr val="dk1"/>
+          </a:fontRef>
+        </p:style>
+        <p:txBody>
+          <a:bodyPr rtlCol="0" anchor="ctr"/>
+          <a:lstStyle/>
+          <a:p>
+            <a:pPr algn="ctr"/>
+            <a:endParaRPr lang="es-PE" sz="1100" dirty="0"/>
+          </a:p>
+        </p:txBody>
+      </p:sp>
+      <p:sp>
+        <p:nvSpPr>
+          <p:cNvPr id="102" name="Rectángulo 101">
+            <a:extLst>
+              <a:ext uri="{FF2B5EF4-FFF2-40B4-BE49-F238E27FC236}">
+                <a16:creationId xmlns:a16="http://schemas.microsoft.com/office/drawing/2014/main" id="{241FB684-0945-4867-9A09-CEC4C5947B76}"/>
+              </a:ext>
+            </a:extLst>
+          </p:cNvPr>
+          <p:cNvSpPr/>
+          <p:nvPr/>
+        </p:nvSpPr>
+        <p:spPr>
+          <a:xfrm>
+            <a:off x="2948940" y="4498848"/>
+            <a:ext cx="1008126" cy="301752"/>
+          </a:xfrm>
+          <a:prstGeom prst="rect">
+            <a:avLst/>
+          </a:prstGeom>
+        </p:spPr>
+        <p:style>
+          <a:lnRef idx="2">
+            <a:schemeClr val="dk1"/>
+          </a:lnRef>
+          <a:fillRef idx="1">
+            <a:schemeClr val="lt1"/>
+          </a:fillRef>
+          <a:effectRef idx="0">
+            <a:schemeClr val="dk1"/>
+          </a:effectRef>
+          <a:fontRef idx="minor">
+            <a:schemeClr val="dk1"/>
+          </a:fontRef>
+        </p:style>
+        <p:txBody>
+          <a:bodyPr rtlCol="0" anchor="ctr"/>
+          <a:lstStyle/>
+          <a:p>
+            <a:pPr algn="ctr"/>
+            <a:endParaRPr lang="es-PE" sz="1100" dirty="0"/>
+          </a:p>
+        </p:txBody>
+      </p:sp>
+      <p:sp>
+        <p:nvSpPr>
+          <p:cNvPr id="103" name="Rectángulo 102">
+            <a:extLst>
+              <a:ext uri="{FF2B5EF4-FFF2-40B4-BE49-F238E27FC236}">
+                <a16:creationId xmlns:a16="http://schemas.microsoft.com/office/drawing/2014/main" id="{58FBD8E5-C1C2-4E1B-9281-AA931119D8F9}"/>
+              </a:ext>
+            </a:extLst>
+          </p:cNvPr>
+          <p:cNvSpPr/>
+          <p:nvPr/>
+        </p:nvSpPr>
+        <p:spPr>
+          <a:xfrm>
+            <a:off x="3957066" y="4501896"/>
+            <a:ext cx="2256282" cy="301752"/>
+          </a:xfrm>
+          <a:prstGeom prst="rect">
+            <a:avLst/>
+          </a:prstGeom>
+        </p:spPr>
+        <p:style>
+          <a:lnRef idx="2">
+            <a:schemeClr val="dk1"/>
+          </a:lnRef>
+          <a:fillRef idx="1">
+            <a:schemeClr val="lt1"/>
+          </a:fillRef>
+          <a:effectRef idx="0">
+            <a:schemeClr val="dk1"/>
+          </a:effectRef>
+          <a:fontRef idx="minor">
+            <a:schemeClr val="dk1"/>
+          </a:fontRef>
+        </p:style>
+        <p:txBody>
+          <a:bodyPr rtlCol="0" anchor="ctr"/>
+          <a:lstStyle/>
+          <a:p>
+            <a:pPr algn="ctr"/>
+            <a:endParaRPr lang="es-PE" sz="1100" dirty="0"/>
+          </a:p>
+        </p:txBody>
+      </p:sp>
+      <p:sp>
+        <p:nvSpPr>
+          <p:cNvPr id="104" name="Rectángulo 103">
+            <a:extLst>
+              <a:ext uri="{FF2B5EF4-FFF2-40B4-BE49-F238E27FC236}">
+                <a16:creationId xmlns:a16="http://schemas.microsoft.com/office/drawing/2014/main" id="{109B54D4-31C3-4F10-A28C-16A08D018C6B}"/>
+              </a:ext>
+            </a:extLst>
+          </p:cNvPr>
+          <p:cNvSpPr/>
+          <p:nvPr/>
+        </p:nvSpPr>
+        <p:spPr>
+          <a:xfrm>
+            <a:off x="6213348" y="4498848"/>
+            <a:ext cx="1241298" cy="301752"/>
+          </a:xfrm>
+          <a:prstGeom prst="rect">
+            <a:avLst/>
+          </a:prstGeom>
+        </p:spPr>
+        <p:style>
+          <a:lnRef idx="2">
+            <a:schemeClr val="dk1"/>
+          </a:lnRef>
+          <a:fillRef idx="1">
+            <a:schemeClr val="lt1"/>
+          </a:fillRef>
+          <a:effectRef idx="0">
+            <a:schemeClr val="dk1"/>
+          </a:effectRef>
+          <a:fontRef idx="minor">
+            <a:schemeClr val="dk1"/>
+          </a:fontRef>
+        </p:style>
+        <p:txBody>
+          <a:bodyPr rtlCol="0" anchor="ctr"/>
+          <a:lstStyle/>
+          <a:p>
+            <a:pPr algn="ctr"/>
+            <a:endParaRPr lang="es-PE" sz="1100" dirty="0"/>
+          </a:p>
+        </p:txBody>
+      </p:sp>
+      <p:sp>
+        <p:nvSpPr>
+          <p:cNvPr id="105" name="Rectángulo 104">
+            <a:extLst>
+              <a:ext uri="{FF2B5EF4-FFF2-40B4-BE49-F238E27FC236}">
+                <a16:creationId xmlns:a16="http://schemas.microsoft.com/office/drawing/2014/main" id="{470B7DBC-D270-4A63-8AB7-C6A2B68C2150}"/>
+              </a:ext>
+            </a:extLst>
+          </p:cNvPr>
+          <p:cNvSpPr/>
+          <p:nvPr/>
+        </p:nvSpPr>
+        <p:spPr>
+          <a:xfrm>
+            <a:off x="7452360" y="4498848"/>
+            <a:ext cx="1083564" cy="301752"/>
+          </a:xfrm>
+          <a:prstGeom prst="rect">
+            <a:avLst/>
+          </a:prstGeom>
+        </p:spPr>
+        <p:style>
+          <a:lnRef idx="2">
+            <a:schemeClr val="dk1"/>
+          </a:lnRef>
+          <a:fillRef idx="1">
+            <a:schemeClr val="lt1"/>
+          </a:fillRef>
+          <a:effectRef idx="0">
+            <a:schemeClr val="dk1"/>
+          </a:effectRef>
+          <a:fontRef idx="minor">
+            <a:schemeClr val="dk1"/>
+          </a:fontRef>
+        </p:style>
+        <p:txBody>
+          <a:bodyPr rtlCol="0" anchor="ctr"/>
+          <a:lstStyle/>
+          <a:p>
+            <a:pPr algn="ctr"/>
+            <a:endParaRPr lang="es-PE" sz="1100" dirty="0"/>
+          </a:p>
+        </p:txBody>
+      </p:sp>
+      <p:sp>
+        <p:nvSpPr>
+          <p:cNvPr id="106" name="Rectángulo 105">
+            <a:extLst>
+              <a:ext uri="{FF2B5EF4-FFF2-40B4-BE49-F238E27FC236}">
+                <a16:creationId xmlns:a16="http://schemas.microsoft.com/office/drawing/2014/main" id="{52C450D6-14CF-4393-81E4-72F24DB6840E}"/>
+              </a:ext>
+            </a:extLst>
+          </p:cNvPr>
+          <p:cNvSpPr/>
+          <p:nvPr/>
+        </p:nvSpPr>
+        <p:spPr>
+          <a:xfrm>
+            <a:off x="8535924" y="4498848"/>
+            <a:ext cx="864108" cy="301752"/>
+          </a:xfrm>
+          <a:prstGeom prst="rect">
+            <a:avLst/>
+          </a:prstGeom>
+        </p:spPr>
+        <p:style>
+          <a:lnRef idx="2">
+            <a:schemeClr val="dk1"/>
+          </a:lnRef>
+          <a:fillRef idx="1">
+            <a:schemeClr val="lt1"/>
+          </a:fillRef>
+          <a:effectRef idx="0">
+            <a:schemeClr val="dk1"/>
+          </a:effectRef>
+          <a:fontRef idx="minor">
+            <a:schemeClr val="dk1"/>
+          </a:fontRef>
+        </p:style>
+        <p:txBody>
+          <a:bodyPr rtlCol="0" anchor="ctr"/>
+          <a:lstStyle/>
+          <a:p>
+            <a:pPr algn="ctr"/>
+            <a:endParaRPr lang="es-PE" sz="1100" dirty="0"/>
+          </a:p>
+        </p:txBody>
+      </p:sp>
+      <p:sp>
+        <p:nvSpPr>
+          <p:cNvPr id="113" name="Rectángulo 112">
+            <a:extLst>
+              <a:ext uri="{FF2B5EF4-FFF2-40B4-BE49-F238E27FC236}">
+                <a16:creationId xmlns:a16="http://schemas.microsoft.com/office/drawing/2014/main" id="{9228DEE4-57B6-4C10-9B8A-5BA2B7B81B3E}"/>
+              </a:ext>
+            </a:extLst>
+          </p:cNvPr>
+          <p:cNvSpPr/>
+          <p:nvPr/>
+        </p:nvSpPr>
+        <p:spPr>
+          <a:xfrm>
+            <a:off x="9400032" y="4189476"/>
+            <a:ext cx="829818" cy="301752"/>
+          </a:xfrm>
+          <a:prstGeom prst="rect">
+            <a:avLst/>
+          </a:prstGeom>
+        </p:spPr>
+        <p:style>
+          <a:lnRef idx="2">
+            <a:schemeClr val="dk1"/>
+          </a:lnRef>
+          <a:fillRef idx="1">
+            <a:schemeClr val="lt1"/>
+          </a:fillRef>
+          <a:effectRef idx="0">
+            <a:schemeClr val="dk1"/>
+          </a:effectRef>
+          <a:fontRef idx="minor">
+            <a:schemeClr val="dk1"/>
+          </a:fontRef>
+        </p:style>
+        <p:txBody>
+          <a:bodyPr rtlCol="0" anchor="ctr"/>
+          <a:lstStyle/>
+          <a:p>
+            <a:pPr algn="ctr"/>
+            <a:endParaRPr lang="es-PE" sz="1100" dirty="0"/>
+          </a:p>
+        </p:txBody>
+      </p:sp>
+      <p:sp>
+        <p:nvSpPr>
+          <p:cNvPr id="114" name="Rectángulo 113">
+            <a:extLst>
+              <a:ext uri="{FF2B5EF4-FFF2-40B4-BE49-F238E27FC236}">
+                <a16:creationId xmlns:a16="http://schemas.microsoft.com/office/drawing/2014/main" id="{4816E518-97A0-47C4-953C-56BE3EB50F72}"/>
+              </a:ext>
+            </a:extLst>
+          </p:cNvPr>
+          <p:cNvSpPr/>
+          <p:nvPr/>
+        </p:nvSpPr>
+        <p:spPr>
+          <a:xfrm>
+            <a:off x="9393174" y="4488180"/>
+            <a:ext cx="829818" cy="301752"/>
+          </a:xfrm>
+          <a:prstGeom prst="rect">
+            <a:avLst/>
+          </a:prstGeom>
+        </p:spPr>
+        <p:style>
+          <a:lnRef idx="2">
+            <a:schemeClr val="dk1"/>
+          </a:lnRef>
+          <a:fillRef idx="1">
+            <a:schemeClr val="lt1"/>
+          </a:fillRef>
+          <a:effectRef idx="0">
+            <a:schemeClr val="dk1"/>
+          </a:effectRef>
+          <a:fontRef idx="minor">
+            <a:schemeClr val="dk1"/>
+          </a:fontRef>
+        </p:style>
+        <p:txBody>
+          <a:bodyPr rtlCol="0" anchor="ctr"/>
+          <a:lstStyle/>
+          <a:p>
+            <a:pPr algn="ctr"/>
+            <a:endParaRPr lang="es-PE" sz="1100" dirty="0"/>
+          </a:p>
+        </p:txBody>
+      </p:sp>
+    </p:spTree>
+    <p:extLst>
+      <p:ext uri="{BB962C8B-B14F-4D97-AF65-F5344CB8AC3E}">
+        <p14:creationId xmlns:p14="http://schemas.microsoft.com/office/powerpoint/2010/main" val="1334674216"/>
+      </p:ext>
+    </p:extLst>
+  </p:cSld>
+  <p:clrMapOvr>
+    <a:masterClrMapping/>
+  </p:clrMapOvr>
+</p:sld>
+</file>
+
+<file path=ppt/slides/slide9.xml><?xml version="1.0" encoding="utf-8"?>
+<p:sld xmlns:a="http://schemas.openxmlformats.org/drawingml/2006/main" xmlns:r="http://schemas.openxmlformats.org/officeDocument/2006/relationships" xmlns:p="http://schemas.openxmlformats.org/presentationml/2006/main">
+  <p:cSld>
+    <p:spTree>
+      <p:nvGrpSpPr>
+        <p:cNvPr id="1" name=""/>
+        <p:cNvGrpSpPr/>
+        <p:nvPr/>
+      </p:nvGrpSpPr>
+      <p:grpSpPr>
+        <a:xfrm>
+          <a:off x="0" y="0"/>
+          <a:ext cx="0" cy="0"/>
+          <a:chOff x="0" y="0"/>
+          <a:chExt cx="0" cy="0"/>
+        </a:xfrm>
+      </p:grpSpPr>
+      <p:sp>
+        <p:nvSpPr>
+          <p:cNvPr id="4" name="Rectángulo 3">
+            <a:extLst>
+              <a:ext uri="{FF2B5EF4-FFF2-40B4-BE49-F238E27FC236}">
+                <a16:creationId xmlns:a16="http://schemas.microsoft.com/office/drawing/2014/main" id="{7D0C1056-F063-4295-9589-100A21F99782}"/>
+              </a:ext>
+            </a:extLst>
+          </p:cNvPr>
+          <p:cNvSpPr/>
+          <p:nvPr/>
+        </p:nvSpPr>
+        <p:spPr>
+          <a:xfrm>
+            <a:off x="182880" y="182880"/>
+            <a:ext cx="11695176" cy="1124712"/>
+          </a:xfrm>
+          <a:prstGeom prst="rect">
+            <a:avLst/>
+          </a:prstGeom>
+        </p:spPr>
+        <p:style>
+          <a:lnRef idx="2">
+            <a:schemeClr val="dk1"/>
+          </a:lnRef>
+          <a:fillRef idx="1">
+            <a:schemeClr val="lt1"/>
+          </a:fillRef>
+          <a:effectRef idx="0">
+            <a:schemeClr val="dk1"/>
+          </a:effectRef>
+          <a:fontRef idx="minor">
+            <a:schemeClr val="dk1"/>
+          </a:fontRef>
+        </p:style>
+        <p:txBody>
+          <a:bodyPr rtlCol="0" anchor="ctr"/>
+          <a:lstStyle/>
+          <a:p>
+            <a:pPr algn="ctr"/>
+            <a:endParaRPr lang="es-PE"/>
+          </a:p>
+        </p:txBody>
+      </p:sp>
+      <p:sp>
+        <p:nvSpPr>
+          <p:cNvPr id="5" name="Rectángulo 4">
+            <a:extLst>
+              <a:ext uri="{FF2B5EF4-FFF2-40B4-BE49-F238E27FC236}">
+                <a16:creationId xmlns:a16="http://schemas.microsoft.com/office/drawing/2014/main" id="{FB0592F0-31E3-4A12-9D00-8202A4B8AF40}"/>
+              </a:ext>
+            </a:extLst>
+          </p:cNvPr>
+          <p:cNvSpPr/>
+          <p:nvPr/>
+        </p:nvSpPr>
+        <p:spPr>
+          <a:xfrm>
+            <a:off x="182880" y="1417320"/>
+            <a:ext cx="11695176" cy="3968496"/>
+          </a:xfrm>
+          <a:prstGeom prst="rect">
+            <a:avLst/>
+          </a:prstGeom>
+        </p:spPr>
+        <p:style>
+          <a:lnRef idx="2">
+            <a:schemeClr val="dk1"/>
+          </a:lnRef>
+          <a:fillRef idx="1">
+            <a:schemeClr val="lt1"/>
+          </a:fillRef>
+          <a:effectRef idx="0">
+            <a:schemeClr val="dk1"/>
+          </a:effectRef>
+          <a:fontRef idx="minor">
+            <a:schemeClr val="dk1"/>
+          </a:fontRef>
+        </p:style>
+        <p:txBody>
+          <a:bodyPr rtlCol="0" anchor="ctr"/>
+          <a:lstStyle/>
+          <a:p>
+            <a:pPr algn="ctr"/>
+            <a:endParaRPr lang="es-PE"/>
+          </a:p>
+        </p:txBody>
+      </p:sp>
+      <p:sp>
+        <p:nvSpPr>
+          <p:cNvPr id="6" name="Rectángulo 5">
+            <a:extLst>
+              <a:ext uri="{FF2B5EF4-FFF2-40B4-BE49-F238E27FC236}">
+                <a16:creationId xmlns:a16="http://schemas.microsoft.com/office/drawing/2014/main" id="{15921A5A-FAF3-418A-99AE-B7FC9DD7959F}"/>
+              </a:ext>
+            </a:extLst>
+          </p:cNvPr>
+          <p:cNvSpPr/>
+          <p:nvPr/>
+        </p:nvSpPr>
+        <p:spPr>
+          <a:xfrm>
+            <a:off x="182880" y="5495544"/>
+            <a:ext cx="11695176" cy="1179576"/>
+          </a:xfrm>
+          <a:prstGeom prst="rect">
+            <a:avLst/>
+          </a:prstGeom>
+        </p:spPr>
+        <p:style>
+          <a:lnRef idx="2">
+            <a:schemeClr val="dk1"/>
+          </a:lnRef>
+          <a:fillRef idx="1">
+            <a:schemeClr val="lt1"/>
+          </a:fillRef>
+          <a:effectRef idx="0">
+            <a:schemeClr val="dk1"/>
+          </a:effectRef>
+          <a:fontRef idx="minor">
+            <a:schemeClr val="dk1"/>
+          </a:fontRef>
+        </p:style>
+        <p:txBody>
+          <a:bodyPr rtlCol="0" anchor="ctr"/>
+          <a:lstStyle/>
+          <a:p>
+            <a:pPr algn="ctr"/>
+            <a:endParaRPr lang="es-PE"/>
+          </a:p>
+        </p:txBody>
+      </p:sp>
+      <p:sp>
+        <p:nvSpPr>
+          <p:cNvPr id="7" name="Rectángulo 6">
+            <a:extLst>
+              <a:ext uri="{FF2B5EF4-FFF2-40B4-BE49-F238E27FC236}">
+                <a16:creationId xmlns:a16="http://schemas.microsoft.com/office/drawing/2014/main" id="{9A05CB20-1A4C-44A9-BCFA-BACA053BB6D0}"/>
+              </a:ext>
+            </a:extLst>
+          </p:cNvPr>
+          <p:cNvSpPr/>
+          <p:nvPr/>
+        </p:nvSpPr>
+        <p:spPr>
+          <a:xfrm>
+            <a:off x="310896" y="292608"/>
+            <a:ext cx="2816352" cy="905256"/>
+          </a:xfrm>
+          <a:prstGeom prst="rect">
+            <a:avLst/>
+          </a:prstGeom>
+        </p:spPr>
+        <p:style>
+          <a:lnRef idx="2">
+            <a:schemeClr val="dk1"/>
+          </a:lnRef>
+          <a:fillRef idx="1">
+            <a:schemeClr val="lt1"/>
+          </a:fillRef>
+          <a:effectRef idx="0">
+            <a:schemeClr val="dk1"/>
+          </a:effectRef>
+          <a:fontRef idx="minor">
+            <a:schemeClr val="dk1"/>
+          </a:fontRef>
+        </p:style>
+        <p:txBody>
+          <a:bodyPr rtlCol="0" anchor="ctr"/>
+          <a:lstStyle/>
+          <a:p>
+            <a:pPr algn="ctr"/>
+            <a:r>
+              <a:rPr lang="es-PE" dirty="0"/>
+              <a:t>Logo </a:t>
+            </a:r>
+            <a:r>
+              <a:rPr lang="es-PE" dirty="0" err="1"/>
+              <a:t>Crypto</a:t>
+            </a:r>
+            <a:r>
+              <a:rPr lang="es-PE" dirty="0"/>
+              <a:t>-nita</a:t>
+            </a:r>
+          </a:p>
+        </p:txBody>
+      </p:sp>
+      <p:sp>
+        <p:nvSpPr>
+          <p:cNvPr id="9" name="Rectángulo 8">
+            <a:extLst>
+              <a:ext uri="{FF2B5EF4-FFF2-40B4-BE49-F238E27FC236}">
+                <a16:creationId xmlns:a16="http://schemas.microsoft.com/office/drawing/2014/main" id="{9059C4E3-239F-4824-8C5A-1858ACB1C26E}"/>
+              </a:ext>
+            </a:extLst>
+          </p:cNvPr>
+          <p:cNvSpPr/>
+          <p:nvPr/>
+        </p:nvSpPr>
+        <p:spPr>
+          <a:xfrm>
+            <a:off x="310896" y="5614416"/>
+            <a:ext cx="2450592" cy="950976"/>
+          </a:xfrm>
+          <a:prstGeom prst="rect">
+            <a:avLst/>
+          </a:prstGeom>
+        </p:spPr>
+        <p:style>
+          <a:lnRef idx="2">
+            <a:schemeClr val="dk1"/>
+          </a:lnRef>
+          <a:fillRef idx="1">
+            <a:schemeClr val="lt1"/>
+          </a:fillRef>
+          <a:effectRef idx="0">
+            <a:schemeClr val="dk1"/>
+          </a:effectRef>
+          <a:fontRef idx="minor">
+            <a:schemeClr val="dk1"/>
+          </a:fontRef>
+        </p:style>
+        <p:txBody>
+          <a:bodyPr rtlCol="0" anchor="ctr"/>
+          <a:lstStyle/>
+          <a:p>
+            <a:pPr algn="ctr"/>
+            <a:r>
+              <a:rPr lang="es-MX" dirty="0"/>
+              <a:t>Nombre/Logo del Grupo</a:t>
+            </a:r>
+            <a:endParaRPr lang="es-PE" dirty="0"/>
+          </a:p>
+        </p:txBody>
+      </p:sp>
+      <p:sp>
+        <p:nvSpPr>
+          <p:cNvPr id="10" name="Rectángulo 9">
+            <a:extLst>
+              <a:ext uri="{FF2B5EF4-FFF2-40B4-BE49-F238E27FC236}">
+                <a16:creationId xmlns:a16="http://schemas.microsoft.com/office/drawing/2014/main" id="{CE6F6AAA-080D-4FC6-88FA-3EBC4C0CD8F6}"/>
+              </a:ext>
+            </a:extLst>
+          </p:cNvPr>
+          <p:cNvSpPr/>
+          <p:nvPr/>
+        </p:nvSpPr>
+        <p:spPr>
+          <a:xfrm>
+            <a:off x="10049256" y="5614416"/>
+            <a:ext cx="1627632" cy="950976"/>
+          </a:xfrm>
+          <a:prstGeom prst="rect">
+            <a:avLst/>
+          </a:prstGeom>
+        </p:spPr>
+        <p:style>
+          <a:lnRef idx="2">
+            <a:schemeClr val="dk1"/>
+          </a:lnRef>
+          <a:fillRef idx="1">
+            <a:schemeClr val="lt1"/>
+          </a:fillRef>
+          <a:effectRef idx="0">
+            <a:schemeClr val="dk1"/>
+          </a:effectRef>
+          <a:fontRef idx="minor">
+            <a:schemeClr val="dk1"/>
+          </a:fontRef>
+        </p:style>
+        <p:txBody>
+          <a:bodyPr rtlCol="0" anchor="ctr"/>
+          <a:lstStyle/>
+          <a:p>
+            <a:pPr algn="ctr"/>
+            <a:r>
+              <a:rPr lang="es-MX" sz="1100" dirty="0"/>
+              <a:t>Integrantes</a:t>
+            </a:r>
+            <a:endParaRPr lang="es-PE" sz="1100" dirty="0"/>
+          </a:p>
+        </p:txBody>
+      </p:sp>
+      <p:sp>
+        <p:nvSpPr>
+          <p:cNvPr id="11" name="Rectángulo 10">
+            <a:extLst>
+              <a:ext uri="{FF2B5EF4-FFF2-40B4-BE49-F238E27FC236}">
+                <a16:creationId xmlns:a16="http://schemas.microsoft.com/office/drawing/2014/main" id="{2D34766E-3CC0-47DF-87DC-62FB893F3931}"/>
+              </a:ext>
+            </a:extLst>
+          </p:cNvPr>
+          <p:cNvSpPr/>
+          <p:nvPr/>
+        </p:nvSpPr>
+        <p:spPr>
+          <a:xfrm>
+            <a:off x="5506974" y="5925312"/>
+            <a:ext cx="3790188" cy="320040"/>
+          </a:xfrm>
+          <a:prstGeom prst="rect">
+            <a:avLst/>
+          </a:prstGeom>
+        </p:spPr>
+        <p:style>
+          <a:lnRef idx="2">
+            <a:schemeClr val="dk1"/>
+          </a:lnRef>
+          <a:fillRef idx="1">
+            <a:schemeClr val="lt1"/>
+          </a:fillRef>
+          <a:effectRef idx="0">
+            <a:schemeClr val="dk1"/>
+          </a:effectRef>
+          <a:fontRef idx="minor">
+            <a:schemeClr val="dk1"/>
+          </a:fontRef>
+        </p:style>
+        <p:txBody>
+          <a:bodyPr rtlCol="0" anchor="ctr"/>
+          <a:lstStyle/>
+          <a:p>
+            <a:pPr algn="ctr"/>
+            <a:r>
+              <a:rPr lang="es-PE" sz="1100" dirty="0"/>
+              <a:t>2022 - Nombre® - Todos los derechos reservados</a:t>
+            </a:r>
+          </a:p>
+        </p:txBody>
+      </p:sp>
+      <p:sp>
+        <p:nvSpPr>
+          <p:cNvPr id="12" name="Rectángulo 11">
+            <a:extLst>
+              <a:ext uri="{FF2B5EF4-FFF2-40B4-BE49-F238E27FC236}">
+                <a16:creationId xmlns:a16="http://schemas.microsoft.com/office/drawing/2014/main" id="{5E86E855-05F8-45D1-998F-FD3B01DB39A2}"/>
+              </a:ext>
+            </a:extLst>
+          </p:cNvPr>
+          <p:cNvSpPr/>
+          <p:nvPr/>
+        </p:nvSpPr>
+        <p:spPr>
+          <a:xfrm>
+            <a:off x="2889504" y="5614416"/>
+            <a:ext cx="1865376" cy="420624"/>
+          </a:xfrm>
+          <a:prstGeom prst="rect">
+            <a:avLst/>
+          </a:prstGeom>
+        </p:spPr>
+        <p:style>
+          <a:lnRef idx="2">
+            <a:schemeClr val="dk1"/>
+          </a:lnRef>
+          <a:fillRef idx="1">
+            <a:schemeClr val="lt1"/>
+          </a:fillRef>
+          <a:effectRef idx="0">
+            <a:schemeClr val="dk1"/>
+          </a:effectRef>
+          <a:fontRef idx="minor">
+            <a:schemeClr val="dk1"/>
+          </a:fontRef>
+        </p:style>
+        <p:txBody>
+          <a:bodyPr rtlCol="0" anchor="ctr"/>
+          <a:lstStyle/>
+          <a:p>
+            <a:pPr algn="ctr"/>
+            <a:r>
+              <a:rPr lang="es-PE" sz="1100" dirty="0"/>
+              <a:t>Nosotros</a:t>
+            </a:r>
+          </a:p>
+        </p:txBody>
+      </p:sp>
+      <p:sp>
+        <p:nvSpPr>
+          <p:cNvPr id="13" name="Rectángulo 12">
+            <a:extLst>
+              <a:ext uri="{FF2B5EF4-FFF2-40B4-BE49-F238E27FC236}">
+                <a16:creationId xmlns:a16="http://schemas.microsoft.com/office/drawing/2014/main" id="{BAE1FAEE-ABB3-4846-BC1C-59A39C7AD0AB}"/>
+              </a:ext>
+            </a:extLst>
+          </p:cNvPr>
+          <p:cNvSpPr/>
+          <p:nvPr/>
+        </p:nvSpPr>
+        <p:spPr>
+          <a:xfrm>
+            <a:off x="2889504" y="6144768"/>
+            <a:ext cx="1865376" cy="425196"/>
+          </a:xfrm>
+          <a:prstGeom prst="rect">
+            <a:avLst/>
+          </a:prstGeom>
+        </p:spPr>
+        <p:style>
+          <a:lnRef idx="2">
+            <a:schemeClr val="dk1"/>
+          </a:lnRef>
+          <a:fillRef idx="1">
+            <a:schemeClr val="lt1"/>
+          </a:fillRef>
+          <a:effectRef idx="0">
+            <a:schemeClr val="dk1"/>
+          </a:effectRef>
+          <a:fontRef idx="minor">
+            <a:schemeClr val="dk1"/>
+          </a:fontRef>
+        </p:style>
+        <p:txBody>
+          <a:bodyPr rtlCol="0" anchor="ctr"/>
+          <a:lstStyle/>
+          <a:p>
+            <a:pPr algn="ctr"/>
+            <a:r>
+              <a:rPr lang="es-PE" sz="1100" dirty="0"/>
+              <a:t>Términos y Condiciones</a:t>
+            </a:r>
+          </a:p>
+        </p:txBody>
+      </p:sp>
+      <p:sp>
+        <p:nvSpPr>
+          <p:cNvPr id="2" name="Rectángulo 1">
+            <a:extLst>
+              <a:ext uri="{FF2B5EF4-FFF2-40B4-BE49-F238E27FC236}">
+                <a16:creationId xmlns:a16="http://schemas.microsoft.com/office/drawing/2014/main" id="{CE5E8ED7-00AD-4F81-AE9D-99A64C9562B6}"/>
+              </a:ext>
+            </a:extLst>
+          </p:cNvPr>
+          <p:cNvSpPr/>
+          <p:nvPr/>
+        </p:nvSpPr>
+        <p:spPr>
+          <a:xfrm>
+            <a:off x="4677156" y="1584203"/>
+            <a:ext cx="2706624" cy="429768"/>
+          </a:xfrm>
+          <a:prstGeom prst="rect">
+            <a:avLst/>
+          </a:prstGeom>
+        </p:spPr>
+        <p:style>
+          <a:lnRef idx="2">
+            <a:schemeClr val="dk1"/>
+          </a:lnRef>
+          <a:fillRef idx="1">
+            <a:schemeClr val="lt1"/>
+          </a:fillRef>
+          <a:effectRef idx="0">
+            <a:schemeClr val="dk1"/>
+          </a:effectRef>
+          <a:fontRef idx="minor">
+            <a:schemeClr val="dk1"/>
+          </a:fontRef>
+        </p:style>
+        <p:txBody>
+          <a:bodyPr rtlCol="0" anchor="ctr"/>
+          <a:lstStyle/>
+          <a:p>
+            <a:pPr algn="ctr"/>
+            <a:r>
+              <a:rPr lang="es-PE" dirty="0"/>
+              <a:t>Editar Operación:</a:t>
+            </a:r>
+          </a:p>
+        </p:txBody>
+      </p:sp>
+      <p:sp>
+        <p:nvSpPr>
+          <p:cNvPr id="8" name="Rectángulo 7">
+            <a:extLst>
+              <a:ext uri="{FF2B5EF4-FFF2-40B4-BE49-F238E27FC236}">
+                <a16:creationId xmlns:a16="http://schemas.microsoft.com/office/drawing/2014/main" id="{CA005AC2-9A7D-49B6-973C-402F7EC3FB53}"/>
+              </a:ext>
+            </a:extLst>
+          </p:cNvPr>
+          <p:cNvSpPr/>
+          <p:nvPr/>
+        </p:nvSpPr>
+        <p:spPr>
+          <a:xfrm>
+            <a:off x="3928872" y="2153699"/>
+            <a:ext cx="1241298" cy="301752"/>
+          </a:xfrm>
+          <a:prstGeom prst="rect">
+            <a:avLst/>
+          </a:prstGeom>
+        </p:spPr>
+        <p:style>
+          <a:lnRef idx="2">
+            <a:schemeClr val="dk1"/>
+          </a:lnRef>
+          <a:fillRef idx="1">
+            <a:schemeClr val="lt1"/>
+          </a:fillRef>
+          <a:effectRef idx="0">
+            <a:schemeClr val="dk1"/>
+          </a:effectRef>
+          <a:fontRef idx="minor">
+            <a:schemeClr val="dk1"/>
+          </a:fontRef>
+        </p:style>
+        <p:txBody>
+          <a:bodyPr rtlCol="0" anchor="ctr"/>
+          <a:lstStyle/>
+          <a:p>
+            <a:pPr algn="ctr"/>
+            <a:r>
+              <a:rPr lang="es-PE" sz="1100" dirty="0"/>
+              <a:t>ID de Operación</a:t>
+            </a:r>
+          </a:p>
+        </p:txBody>
+      </p:sp>
+      <p:sp>
+        <p:nvSpPr>
+          <p:cNvPr id="27" name="Rectángulo 26">
+            <a:extLst>
+              <a:ext uri="{FF2B5EF4-FFF2-40B4-BE49-F238E27FC236}">
+                <a16:creationId xmlns:a16="http://schemas.microsoft.com/office/drawing/2014/main" id="{BFEEF1FF-835F-4ED1-B5D3-99BD4D98C8C8}"/>
+              </a:ext>
+            </a:extLst>
+          </p:cNvPr>
+          <p:cNvSpPr/>
+          <p:nvPr/>
+        </p:nvSpPr>
+        <p:spPr>
+          <a:xfrm>
+            <a:off x="3928872" y="2537747"/>
+            <a:ext cx="1241298" cy="301752"/>
+          </a:xfrm>
+          <a:prstGeom prst="rect">
+            <a:avLst/>
+          </a:prstGeom>
+        </p:spPr>
+        <p:style>
+          <a:lnRef idx="2">
+            <a:schemeClr val="dk1"/>
+          </a:lnRef>
+          <a:fillRef idx="1">
+            <a:schemeClr val="lt1"/>
+          </a:fillRef>
+          <a:effectRef idx="0">
+            <a:schemeClr val="dk1"/>
+          </a:effectRef>
+          <a:fontRef idx="minor">
+            <a:schemeClr val="dk1"/>
+          </a:fontRef>
+        </p:style>
+        <p:txBody>
+          <a:bodyPr rtlCol="0" anchor="ctr"/>
+          <a:lstStyle/>
+          <a:p>
+            <a:pPr algn="ctr"/>
+            <a:r>
+              <a:rPr lang="es-PE" sz="1100" dirty="0"/>
+              <a:t>Fecha y Hora</a:t>
+            </a:r>
+          </a:p>
+        </p:txBody>
+      </p:sp>
+      <p:sp>
+        <p:nvSpPr>
+          <p:cNvPr id="28" name="Rectángulo 27">
+            <a:extLst>
+              <a:ext uri="{FF2B5EF4-FFF2-40B4-BE49-F238E27FC236}">
+                <a16:creationId xmlns:a16="http://schemas.microsoft.com/office/drawing/2014/main" id="{24923D50-84D7-473F-91B8-014BA242EB40}"/>
+              </a:ext>
+            </a:extLst>
+          </p:cNvPr>
+          <p:cNvSpPr/>
+          <p:nvPr/>
+        </p:nvSpPr>
+        <p:spPr>
+          <a:xfrm>
+            <a:off x="3928872" y="2921795"/>
+            <a:ext cx="1241298" cy="301752"/>
+          </a:xfrm>
+          <a:prstGeom prst="rect">
+            <a:avLst/>
+          </a:prstGeom>
+        </p:spPr>
+        <p:style>
+          <a:lnRef idx="2">
+            <a:schemeClr val="dk1"/>
+          </a:lnRef>
+          <a:fillRef idx="1">
+            <a:schemeClr val="lt1"/>
+          </a:fillRef>
+          <a:effectRef idx="0">
+            <a:schemeClr val="dk1"/>
+          </a:effectRef>
+          <a:fontRef idx="minor">
+            <a:schemeClr val="dk1"/>
+          </a:fontRef>
+        </p:style>
+        <p:txBody>
+          <a:bodyPr rtlCol="0" anchor="ctr"/>
+          <a:lstStyle/>
+          <a:p>
+            <a:pPr algn="ctr"/>
+            <a:r>
+              <a:rPr lang="es-PE" sz="1100" dirty="0"/>
+              <a:t>Cliente</a:t>
+            </a:r>
+          </a:p>
+        </p:txBody>
+      </p:sp>
+      <p:sp>
+        <p:nvSpPr>
+          <p:cNvPr id="29" name="Rectángulo 28">
+            <a:extLst>
+              <a:ext uri="{FF2B5EF4-FFF2-40B4-BE49-F238E27FC236}">
+                <a16:creationId xmlns:a16="http://schemas.microsoft.com/office/drawing/2014/main" id="{3B8DE532-67D4-4A57-9BEF-51D052298078}"/>
+              </a:ext>
+            </a:extLst>
+          </p:cNvPr>
+          <p:cNvSpPr/>
+          <p:nvPr/>
+        </p:nvSpPr>
+        <p:spPr>
+          <a:xfrm>
+            <a:off x="3928872" y="3305843"/>
+            <a:ext cx="1241298" cy="301752"/>
+          </a:xfrm>
+          <a:prstGeom prst="rect">
+            <a:avLst/>
+          </a:prstGeom>
+        </p:spPr>
+        <p:style>
+          <a:lnRef idx="2">
+            <a:schemeClr val="dk1"/>
+          </a:lnRef>
+          <a:fillRef idx="1">
+            <a:schemeClr val="lt1"/>
+          </a:fillRef>
+          <a:effectRef idx="0">
+            <a:schemeClr val="dk1"/>
+          </a:effectRef>
+          <a:fontRef idx="minor">
+            <a:schemeClr val="dk1"/>
+          </a:fontRef>
+        </p:style>
+        <p:txBody>
+          <a:bodyPr rtlCol="0" anchor="ctr"/>
+          <a:lstStyle/>
+          <a:p>
+            <a:pPr algn="ctr"/>
+            <a:r>
+              <a:rPr lang="es-PE" sz="1100" dirty="0"/>
+              <a:t>Tipo de Operación</a:t>
+            </a:r>
+          </a:p>
+        </p:txBody>
+      </p:sp>
+      <p:sp>
+        <p:nvSpPr>
+          <p:cNvPr id="30" name="Rectángulo 29">
+            <a:extLst>
+              <a:ext uri="{FF2B5EF4-FFF2-40B4-BE49-F238E27FC236}">
+                <a16:creationId xmlns:a16="http://schemas.microsoft.com/office/drawing/2014/main" id="{4A4776AA-FE23-40F2-9BD6-25B969660660}"/>
+              </a:ext>
+            </a:extLst>
+          </p:cNvPr>
+          <p:cNvSpPr/>
+          <p:nvPr/>
+        </p:nvSpPr>
+        <p:spPr>
+          <a:xfrm>
+            <a:off x="3928872" y="3689891"/>
+            <a:ext cx="1241298" cy="301752"/>
+          </a:xfrm>
+          <a:prstGeom prst="rect">
+            <a:avLst/>
+          </a:prstGeom>
+        </p:spPr>
+        <p:style>
+          <a:lnRef idx="2">
+            <a:schemeClr val="dk1"/>
+          </a:lnRef>
+          <a:fillRef idx="1">
+            <a:schemeClr val="lt1"/>
+          </a:fillRef>
+          <a:effectRef idx="0">
+            <a:schemeClr val="dk1"/>
+          </a:effectRef>
+          <a:fontRef idx="minor">
+            <a:schemeClr val="dk1"/>
+          </a:fontRef>
+        </p:style>
+        <p:txBody>
+          <a:bodyPr rtlCol="0" anchor="ctr"/>
+          <a:lstStyle/>
+          <a:p>
+            <a:pPr algn="ctr"/>
+            <a:r>
+              <a:rPr lang="es-PE" sz="1100" dirty="0"/>
+              <a:t>Tipo de Cambio</a:t>
+            </a:r>
+          </a:p>
+        </p:txBody>
+      </p:sp>
+      <p:sp>
+        <p:nvSpPr>
+          <p:cNvPr id="31" name="Rectángulo 30">
+            <a:extLst>
+              <a:ext uri="{FF2B5EF4-FFF2-40B4-BE49-F238E27FC236}">
+                <a16:creationId xmlns:a16="http://schemas.microsoft.com/office/drawing/2014/main" id="{492F9B72-48F3-4761-98C9-DF8C89263DF6}"/>
+              </a:ext>
+            </a:extLst>
+          </p:cNvPr>
+          <p:cNvSpPr/>
+          <p:nvPr/>
+        </p:nvSpPr>
+        <p:spPr>
+          <a:xfrm>
+            <a:off x="3928872" y="4073939"/>
+            <a:ext cx="1241298" cy="301752"/>
+          </a:xfrm>
+          <a:prstGeom prst="rect">
+            <a:avLst/>
+          </a:prstGeom>
+        </p:spPr>
+        <p:style>
+          <a:lnRef idx="2">
+            <a:schemeClr val="dk1"/>
+          </a:lnRef>
+          <a:fillRef idx="1">
+            <a:schemeClr val="lt1"/>
+          </a:fillRef>
+          <a:effectRef idx="0">
+            <a:schemeClr val="dk1"/>
+          </a:effectRef>
+          <a:fontRef idx="minor">
+            <a:schemeClr val="dk1"/>
+          </a:fontRef>
+        </p:style>
+        <p:txBody>
+          <a:bodyPr rtlCol="0" anchor="ctr"/>
+          <a:lstStyle/>
+          <a:p>
+            <a:pPr algn="ctr"/>
+            <a:r>
+              <a:rPr lang="es-PE" sz="1100" dirty="0"/>
+              <a:t>Monto</a:t>
+            </a:r>
+          </a:p>
+        </p:txBody>
+      </p:sp>
+      <p:sp>
+        <p:nvSpPr>
+          <p:cNvPr id="107" name="Rectángulo 106">
+            <a:extLst>
+              <a:ext uri="{FF2B5EF4-FFF2-40B4-BE49-F238E27FC236}">
+                <a16:creationId xmlns:a16="http://schemas.microsoft.com/office/drawing/2014/main" id="{11D49FCA-50BB-4896-AE27-E056A278B24B}"/>
+              </a:ext>
+            </a:extLst>
+          </p:cNvPr>
+          <p:cNvSpPr/>
+          <p:nvPr/>
+        </p:nvSpPr>
+        <p:spPr>
+          <a:xfrm>
+            <a:off x="3933444" y="4457987"/>
+            <a:ext cx="1236726" cy="301752"/>
+          </a:xfrm>
+          <a:prstGeom prst="rect">
+            <a:avLst/>
+          </a:prstGeom>
+        </p:spPr>
+        <p:style>
+          <a:lnRef idx="2">
+            <a:schemeClr val="dk1"/>
+          </a:lnRef>
+          <a:fillRef idx="1">
+            <a:schemeClr val="lt1"/>
+          </a:fillRef>
+          <a:effectRef idx="0">
+            <a:schemeClr val="dk1"/>
+          </a:effectRef>
+          <a:fontRef idx="minor">
+            <a:schemeClr val="dk1"/>
+          </a:fontRef>
+        </p:style>
+        <p:txBody>
+          <a:bodyPr rtlCol="0" anchor="ctr"/>
+          <a:lstStyle/>
+          <a:p>
+            <a:pPr algn="ctr"/>
+            <a:r>
+              <a:rPr lang="es-PE" sz="1100" dirty="0"/>
+              <a:t>Estado</a:t>
+            </a:r>
+          </a:p>
+        </p:txBody>
+      </p:sp>
+      <p:sp>
+        <p:nvSpPr>
+          <p:cNvPr id="108" name="Rectángulo 107">
+            <a:extLst>
+              <a:ext uri="{FF2B5EF4-FFF2-40B4-BE49-F238E27FC236}">
+                <a16:creationId xmlns:a16="http://schemas.microsoft.com/office/drawing/2014/main" id="{C31BC17A-C4CE-4791-A69A-BA2A16AA2AFD}"/>
+              </a:ext>
+            </a:extLst>
+          </p:cNvPr>
+          <p:cNvSpPr/>
+          <p:nvPr/>
+        </p:nvSpPr>
+        <p:spPr>
+          <a:xfrm>
+            <a:off x="5270754" y="2153699"/>
+            <a:ext cx="2992374" cy="301752"/>
+          </a:xfrm>
+          <a:prstGeom prst="rect">
+            <a:avLst/>
+          </a:prstGeom>
+        </p:spPr>
+        <p:style>
+          <a:lnRef idx="2">
+            <a:schemeClr val="dk1"/>
+          </a:lnRef>
+          <a:fillRef idx="1">
+            <a:schemeClr val="lt1"/>
+          </a:fillRef>
+          <a:effectRef idx="0">
+            <a:schemeClr val="dk1"/>
+          </a:effectRef>
+          <a:fontRef idx="minor">
+            <a:schemeClr val="dk1"/>
+          </a:fontRef>
+        </p:style>
+        <p:txBody>
+          <a:bodyPr rtlCol="0" anchor="ctr"/>
+          <a:lstStyle/>
+          <a:p>
+            <a:pPr algn="ctr"/>
+            <a:endParaRPr lang="es-PE" sz="1100" dirty="0"/>
+          </a:p>
+        </p:txBody>
+      </p:sp>
+      <p:sp>
+        <p:nvSpPr>
+          <p:cNvPr id="109" name="Rectángulo 108">
+            <a:extLst>
+              <a:ext uri="{FF2B5EF4-FFF2-40B4-BE49-F238E27FC236}">
+                <a16:creationId xmlns:a16="http://schemas.microsoft.com/office/drawing/2014/main" id="{515FD8DD-FA50-4E90-9C58-D8C40FBCC5D0}"/>
+              </a:ext>
+            </a:extLst>
+          </p:cNvPr>
+          <p:cNvSpPr/>
+          <p:nvPr/>
+        </p:nvSpPr>
+        <p:spPr>
+          <a:xfrm>
+            <a:off x="5270754" y="2537747"/>
+            <a:ext cx="2992374" cy="301752"/>
+          </a:xfrm>
+          <a:prstGeom prst="rect">
+            <a:avLst/>
+          </a:prstGeom>
+        </p:spPr>
+        <p:style>
+          <a:lnRef idx="2">
+            <a:schemeClr val="dk1"/>
+          </a:lnRef>
+          <a:fillRef idx="1">
+            <a:schemeClr val="lt1"/>
+          </a:fillRef>
+          <a:effectRef idx="0">
+            <a:schemeClr val="dk1"/>
+          </a:effectRef>
+          <a:fontRef idx="minor">
+            <a:schemeClr val="dk1"/>
+          </a:fontRef>
+        </p:style>
+        <p:txBody>
+          <a:bodyPr rtlCol="0" anchor="ctr"/>
+          <a:lstStyle/>
+          <a:p>
+            <a:pPr algn="ctr"/>
+            <a:endParaRPr lang="es-PE" sz="1100" dirty="0"/>
+          </a:p>
+        </p:txBody>
+      </p:sp>
+      <p:sp>
+        <p:nvSpPr>
+          <p:cNvPr id="110" name="Rectángulo 109">
+            <a:extLst>
+              <a:ext uri="{FF2B5EF4-FFF2-40B4-BE49-F238E27FC236}">
+                <a16:creationId xmlns:a16="http://schemas.microsoft.com/office/drawing/2014/main" id="{61B08619-607F-4E02-ABFD-E3A09C8A256B}"/>
+              </a:ext>
+            </a:extLst>
+          </p:cNvPr>
+          <p:cNvSpPr/>
+          <p:nvPr/>
+        </p:nvSpPr>
+        <p:spPr>
+          <a:xfrm>
+            <a:off x="5270754" y="2921795"/>
+            <a:ext cx="2992374" cy="301752"/>
+          </a:xfrm>
+          <a:prstGeom prst="rect">
+            <a:avLst/>
+          </a:prstGeom>
+        </p:spPr>
+        <p:style>
+          <a:lnRef idx="2">
+            <a:schemeClr val="dk1"/>
+          </a:lnRef>
+          <a:fillRef idx="1">
+            <a:schemeClr val="lt1"/>
+          </a:fillRef>
+          <a:effectRef idx="0">
+            <a:schemeClr val="dk1"/>
+          </a:effectRef>
+          <a:fontRef idx="minor">
+            <a:schemeClr val="dk1"/>
+          </a:fontRef>
+        </p:style>
+        <p:txBody>
+          <a:bodyPr rtlCol="0" anchor="ctr"/>
+          <a:lstStyle/>
+          <a:p>
+            <a:pPr algn="ctr"/>
+            <a:endParaRPr lang="es-PE" sz="1100" dirty="0"/>
+          </a:p>
+        </p:txBody>
+      </p:sp>
+      <p:sp>
+        <p:nvSpPr>
+          <p:cNvPr id="111" name="Rectángulo 110">
+            <a:extLst>
+              <a:ext uri="{FF2B5EF4-FFF2-40B4-BE49-F238E27FC236}">
+                <a16:creationId xmlns:a16="http://schemas.microsoft.com/office/drawing/2014/main" id="{7D2D2FEE-7035-4335-B26D-1C6A3FCFC3D7}"/>
+              </a:ext>
+            </a:extLst>
+          </p:cNvPr>
+          <p:cNvSpPr/>
+          <p:nvPr/>
+        </p:nvSpPr>
+        <p:spPr>
+          <a:xfrm>
+            <a:off x="5270754" y="3305843"/>
+            <a:ext cx="2992374" cy="301752"/>
+          </a:xfrm>
+          <a:prstGeom prst="rect">
+            <a:avLst/>
+          </a:prstGeom>
+        </p:spPr>
+        <p:style>
+          <a:lnRef idx="2">
+            <a:schemeClr val="dk1"/>
+          </a:lnRef>
+          <a:fillRef idx="1">
+            <a:schemeClr val="lt1"/>
+          </a:fillRef>
+          <a:effectRef idx="0">
+            <a:schemeClr val="dk1"/>
+          </a:effectRef>
+          <a:fontRef idx="minor">
+            <a:schemeClr val="dk1"/>
+          </a:fontRef>
+        </p:style>
+        <p:txBody>
+          <a:bodyPr rtlCol="0" anchor="ctr"/>
+          <a:lstStyle/>
+          <a:p>
+            <a:pPr algn="ctr"/>
+            <a:endParaRPr lang="es-PE" sz="1100" dirty="0"/>
+          </a:p>
+        </p:txBody>
+      </p:sp>
+      <p:sp>
+        <p:nvSpPr>
+          <p:cNvPr id="112" name="Rectángulo 111">
+            <a:extLst>
+              <a:ext uri="{FF2B5EF4-FFF2-40B4-BE49-F238E27FC236}">
+                <a16:creationId xmlns:a16="http://schemas.microsoft.com/office/drawing/2014/main" id="{7B7C8157-89DF-4C08-8440-BB97EF25FA7B}"/>
+              </a:ext>
+            </a:extLst>
+          </p:cNvPr>
+          <p:cNvSpPr/>
+          <p:nvPr/>
+        </p:nvSpPr>
+        <p:spPr>
+          <a:xfrm>
+            <a:off x="5270754" y="3689891"/>
+            <a:ext cx="2992374" cy="301752"/>
+          </a:xfrm>
+          <a:prstGeom prst="rect">
+            <a:avLst/>
+          </a:prstGeom>
+        </p:spPr>
+        <p:style>
+          <a:lnRef idx="2">
+            <a:schemeClr val="dk1"/>
+          </a:lnRef>
+          <a:fillRef idx="1">
+            <a:schemeClr val="lt1"/>
+          </a:fillRef>
+          <a:effectRef idx="0">
+            <a:schemeClr val="dk1"/>
+          </a:effectRef>
+          <a:fontRef idx="minor">
+            <a:schemeClr val="dk1"/>
+          </a:fontRef>
+        </p:style>
+        <p:txBody>
+          <a:bodyPr rtlCol="0" anchor="ctr"/>
+          <a:lstStyle/>
+          <a:p>
+            <a:pPr algn="ctr"/>
+            <a:endParaRPr lang="es-PE" sz="1100" dirty="0"/>
+          </a:p>
+        </p:txBody>
+      </p:sp>
+      <p:sp>
+        <p:nvSpPr>
+          <p:cNvPr id="115" name="Rectángulo 114">
+            <a:extLst>
+              <a:ext uri="{FF2B5EF4-FFF2-40B4-BE49-F238E27FC236}">
+                <a16:creationId xmlns:a16="http://schemas.microsoft.com/office/drawing/2014/main" id="{52DB3B61-0D35-4E00-AE81-CD7F1A8AD156}"/>
+              </a:ext>
+            </a:extLst>
+          </p:cNvPr>
+          <p:cNvSpPr/>
+          <p:nvPr/>
+        </p:nvSpPr>
+        <p:spPr>
+          <a:xfrm>
+            <a:off x="5270754" y="4073939"/>
+            <a:ext cx="2992374" cy="301752"/>
+          </a:xfrm>
+          <a:prstGeom prst="rect">
+            <a:avLst/>
+          </a:prstGeom>
+        </p:spPr>
+        <p:style>
+          <a:lnRef idx="2">
+            <a:schemeClr val="dk1"/>
+          </a:lnRef>
+          <a:fillRef idx="1">
+            <a:schemeClr val="lt1"/>
+          </a:fillRef>
+          <a:effectRef idx="0">
+            <a:schemeClr val="dk1"/>
+          </a:effectRef>
+          <a:fontRef idx="minor">
+            <a:schemeClr val="dk1"/>
+          </a:fontRef>
+        </p:style>
+        <p:txBody>
+          <a:bodyPr rtlCol="0" anchor="ctr"/>
+          <a:lstStyle/>
+          <a:p>
+            <a:pPr algn="ctr"/>
+            <a:endParaRPr lang="es-PE" sz="1100" dirty="0"/>
+          </a:p>
+        </p:txBody>
+      </p:sp>
+      <p:sp>
+        <p:nvSpPr>
+          <p:cNvPr id="116" name="Rectángulo 115">
+            <a:extLst>
+              <a:ext uri="{FF2B5EF4-FFF2-40B4-BE49-F238E27FC236}">
+                <a16:creationId xmlns:a16="http://schemas.microsoft.com/office/drawing/2014/main" id="{00AECEBE-92AC-4213-8A4D-E4DC705F310E}"/>
+              </a:ext>
+            </a:extLst>
+          </p:cNvPr>
+          <p:cNvSpPr/>
+          <p:nvPr/>
+        </p:nvSpPr>
+        <p:spPr>
+          <a:xfrm>
+            <a:off x="5275326" y="4457987"/>
+            <a:ext cx="2981352" cy="301752"/>
+          </a:xfrm>
+          <a:prstGeom prst="rect">
+            <a:avLst/>
+          </a:prstGeom>
+        </p:spPr>
+        <p:style>
+          <a:lnRef idx="2">
+            <a:schemeClr val="dk1"/>
+          </a:lnRef>
+          <a:fillRef idx="1">
+            <a:schemeClr val="lt1"/>
+          </a:fillRef>
+          <a:effectRef idx="0">
+            <a:schemeClr val="dk1"/>
+          </a:effectRef>
+          <a:fontRef idx="minor">
+            <a:schemeClr val="dk1"/>
+          </a:fontRef>
+        </p:style>
+        <p:txBody>
+          <a:bodyPr rtlCol="0" anchor="ctr"/>
+          <a:lstStyle/>
+          <a:p>
+            <a:pPr algn="ctr"/>
+            <a:endParaRPr lang="es-PE" sz="1100" dirty="0"/>
+          </a:p>
+        </p:txBody>
+      </p:sp>
+      <p:sp>
+        <p:nvSpPr>
+          <p:cNvPr id="117" name="Rectángulo: esquinas redondeadas 116">
+            <a:extLst>
+              <a:ext uri="{FF2B5EF4-FFF2-40B4-BE49-F238E27FC236}">
+                <a16:creationId xmlns:a16="http://schemas.microsoft.com/office/drawing/2014/main" id="{57EBD2B7-F501-46F7-9A96-14E2691767FD}"/>
+              </a:ext>
+            </a:extLst>
+          </p:cNvPr>
+          <p:cNvSpPr/>
+          <p:nvPr/>
+        </p:nvSpPr>
+        <p:spPr>
+          <a:xfrm>
+            <a:off x="4461510" y="4887755"/>
+            <a:ext cx="1417320" cy="302895"/>
+          </a:xfrm>
+          <a:prstGeom prst="roundRect">
+            <a:avLst/>
+          </a:prstGeom>
+        </p:spPr>
+        <p:style>
+          <a:lnRef idx="2">
+            <a:schemeClr val="dk1"/>
+          </a:lnRef>
+          <a:fillRef idx="1">
+            <a:schemeClr val="lt1"/>
+          </a:fillRef>
+          <a:effectRef idx="0">
+            <a:schemeClr val="dk1"/>
+          </a:effectRef>
+          <a:fontRef idx="minor">
+            <a:schemeClr val="dk1"/>
+          </a:fontRef>
+        </p:style>
+        <p:txBody>
+          <a:bodyPr rtlCol="0" anchor="ctr"/>
+          <a:lstStyle/>
+          <a:p>
+            <a:pPr algn="ctr"/>
+            <a:r>
+              <a:rPr lang="es-PE" sz="1200" dirty="0"/>
+              <a:t>Cancelar</a:t>
+            </a:r>
+          </a:p>
+        </p:txBody>
+      </p:sp>
+      <p:sp>
+        <p:nvSpPr>
+          <p:cNvPr id="118" name="Rectángulo: esquinas redondeadas 117">
+            <a:extLst>
+              <a:ext uri="{FF2B5EF4-FFF2-40B4-BE49-F238E27FC236}">
+                <a16:creationId xmlns:a16="http://schemas.microsoft.com/office/drawing/2014/main" id="{A9CBCEC4-1DC6-4211-B0B3-E20CE90D0DCC}"/>
+              </a:ext>
+            </a:extLst>
+          </p:cNvPr>
+          <p:cNvSpPr/>
+          <p:nvPr/>
+        </p:nvSpPr>
+        <p:spPr>
+          <a:xfrm>
+            <a:off x="6156198" y="4895182"/>
+            <a:ext cx="1417320" cy="302895"/>
+          </a:xfrm>
+          <a:prstGeom prst="roundRect">
+            <a:avLst/>
+          </a:prstGeom>
+        </p:spPr>
+        <p:style>
+          <a:lnRef idx="2">
+            <a:schemeClr val="dk1"/>
+          </a:lnRef>
+          <a:fillRef idx="1">
+            <a:schemeClr val="lt1"/>
+          </a:fillRef>
+          <a:effectRef idx="0">
+            <a:schemeClr val="dk1"/>
+          </a:effectRef>
+          <a:fontRef idx="minor">
+            <a:schemeClr val="dk1"/>
+          </a:fontRef>
+        </p:style>
+        <p:txBody>
+          <a:bodyPr rtlCol="0" anchor="ctr"/>
+          <a:lstStyle/>
+          <a:p>
+            <a:pPr algn="ctr"/>
+            <a:r>
+              <a:rPr lang="es-PE" sz="1200" dirty="0"/>
+              <a:t>Aplicar Cambios</a:t>
+            </a:r>
+          </a:p>
+        </p:txBody>
+      </p:sp>
+    </p:spTree>
+    <p:extLst>
+      <p:ext uri="{BB962C8B-B14F-4D97-AF65-F5344CB8AC3E}">
+        <p14:creationId xmlns:p14="http://schemas.microsoft.com/office/powerpoint/2010/main" val="475674319"/>
       </p:ext>
     </p:extLst>
   </p:cSld>

</xml_diff>

<commit_message>
Se han agregado Sketchs
Los Sketch de historias de usuarios que se agregaron son los siguientes:

- Calcular Soles para compra
- Cerrar Sesion Admin
- Cerrar Sesion Cliente
- Historial de operaciones
- Iniciar Sesion admin
- Iniciar sesion cliente
- Seleccion de compra Venta
- Solicitar Compra
- Tipo de cambio
</commit_message>
<xml_diff>
--- a/Sketches/FirstSketch.pptx
+++ b/Sketches/FirstSketch.pptx
@@ -5,7 +5,7 @@
     <p:sldMasterId id="2147483648" r:id="rId1"/>
   </p:sldMasterIdLst>
   <p:notesMasterIdLst>
-    <p:notesMasterId r:id="rId11"/>
+    <p:notesMasterId r:id="rId20"/>
   </p:notesMasterIdLst>
   <p:sldIdLst>
     <p:sldId id="256" r:id="rId2"/>
@@ -17,6 +17,15 @@
     <p:sldId id="258" r:id="rId8"/>
     <p:sldId id="263" r:id="rId9"/>
     <p:sldId id="264" r:id="rId10"/>
+    <p:sldId id="265" r:id="rId11"/>
+    <p:sldId id="266" r:id="rId12"/>
+    <p:sldId id="267" r:id="rId13"/>
+    <p:sldId id="268" r:id="rId14"/>
+    <p:sldId id="269" r:id="rId15"/>
+    <p:sldId id="270" r:id="rId16"/>
+    <p:sldId id="271" r:id="rId17"/>
+    <p:sldId id="272" r:id="rId18"/>
+    <p:sldId id="273" r:id="rId19"/>
   </p:sldIdLst>
   <p:sldSz cx="12192000" cy="6858000"/>
   <p:notesSz cx="6858000" cy="9144000"/>
@@ -153,6 +162,15 @@
             <p14:sldId id="258"/>
             <p14:sldId id="263"/>
             <p14:sldId id="264"/>
+            <p14:sldId id="265"/>
+            <p14:sldId id="266"/>
+            <p14:sldId id="267"/>
+            <p14:sldId id="268"/>
+            <p14:sldId id="269"/>
+            <p14:sldId id="270"/>
+            <p14:sldId id="271"/>
+            <p14:sldId id="272"/>
+            <p14:sldId id="273"/>
           </p14:sldIdLst>
         </p14:section>
         <p14:section name="Historial" id="{A14A4C41-277E-4280-BE8E-99581EE611B9}">
@@ -249,7 +267,7 @@
           <a:p>
             <a:fld id="{9F762629-5791-4A1C-941B-D0DB9326C820}" type="datetimeFigureOut">
               <a:rPr lang="es-PE" smtClean="0"/>
-              <a:t>6/02/2022</a:t>
+              <a:t>8/02/2022</a:t>
             </a:fld>
             <a:endParaRPr lang="es-PE"/>
           </a:p>
@@ -750,7 +768,7 @@
           <a:p>
             <a:fld id="{68D45077-6B19-4A94-B2AE-137AD1A11870}" type="datetimeFigureOut">
               <a:rPr lang="es-PE" smtClean="0"/>
-              <a:t>6/02/2022</a:t>
+              <a:t>8/02/2022</a:t>
             </a:fld>
             <a:endParaRPr lang="es-PE"/>
           </a:p>
@@ -950,7 +968,7 @@
           <a:p>
             <a:fld id="{68D45077-6B19-4A94-B2AE-137AD1A11870}" type="datetimeFigureOut">
               <a:rPr lang="es-PE" smtClean="0"/>
-              <a:t>6/02/2022</a:t>
+              <a:t>8/02/2022</a:t>
             </a:fld>
             <a:endParaRPr lang="es-PE"/>
           </a:p>
@@ -1160,7 +1178,7 @@
           <a:p>
             <a:fld id="{68D45077-6B19-4A94-B2AE-137AD1A11870}" type="datetimeFigureOut">
               <a:rPr lang="es-PE" smtClean="0"/>
-              <a:t>6/02/2022</a:t>
+              <a:t>8/02/2022</a:t>
             </a:fld>
             <a:endParaRPr lang="es-PE"/>
           </a:p>
@@ -1360,7 +1378,7 @@
           <a:p>
             <a:fld id="{68D45077-6B19-4A94-B2AE-137AD1A11870}" type="datetimeFigureOut">
               <a:rPr lang="es-PE" smtClean="0"/>
-              <a:t>6/02/2022</a:t>
+              <a:t>8/02/2022</a:t>
             </a:fld>
             <a:endParaRPr lang="es-PE"/>
           </a:p>
@@ -1636,7 +1654,7 @@
           <a:p>
             <a:fld id="{68D45077-6B19-4A94-B2AE-137AD1A11870}" type="datetimeFigureOut">
               <a:rPr lang="es-PE" smtClean="0"/>
-              <a:t>6/02/2022</a:t>
+              <a:t>8/02/2022</a:t>
             </a:fld>
             <a:endParaRPr lang="es-PE"/>
           </a:p>
@@ -1904,7 +1922,7 @@
           <a:p>
             <a:fld id="{68D45077-6B19-4A94-B2AE-137AD1A11870}" type="datetimeFigureOut">
               <a:rPr lang="es-PE" smtClean="0"/>
-              <a:t>6/02/2022</a:t>
+              <a:t>8/02/2022</a:t>
             </a:fld>
             <a:endParaRPr lang="es-PE"/>
           </a:p>
@@ -2319,7 +2337,7 @@
           <a:p>
             <a:fld id="{68D45077-6B19-4A94-B2AE-137AD1A11870}" type="datetimeFigureOut">
               <a:rPr lang="es-PE" smtClean="0"/>
-              <a:t>6/02/2022</a:t>
+              <a:t>8/02/2022</a:t>
             </a:fld>
             <a:endParaRPr lang="es-PE"/>
           </a:p>
@@ -2461,7 +2479,7 @@
           <a:p>
             <a:fld id="{68D45077-6B19-4A94-B2AE-137AD1A11870}" type="datetimeFigureOut">
               <a:rPr lang="es-PE" smtClean="0"/>
-              <a:t>6/02/2022</a:t>
+              <a:t>8/02/2022</a:t>
             </a:fld>
             <a:endParaRPr lang="es-PE"/>
           </a:p>
@@ -2574,7 +2592,7 @@
           <a:p>
             <a:fld id="{68D45077-6B19-4A94-B2AE-137AD1A11870}" type="datetimeFigureOut">
               <a:rPr lang="es-PE" smtClean="0"/>
-              <a:t>6/02/2022</a:t>
+              <a:t>8/02/2022</a:t>
             </a:fld>
             <a:endParaRPr lang="es-PE"/>
           </a:p>
@@ -2887,7 +2905,7 @@
           <a:p>
             <a:fld id="{68D45077-6B19-4A94-B2AE-137AD1A11870}" type="datetimeFigureOut">
               <a:rPr lang="es-PE" smtClean="0"/>
-              <a:t>6/02/2022</a:t>
+              <a:t>8/02/2022</a:t>
             </a:fld>
             <a:endParaRPr lang="es-PE"/>
           </a:p>
@@ -3176,7 +3194,7 @@
           <a:p>
             <a:fld id="{68D45077-6B19-4A94-B2AE-137AD1A11870}" type="datetimeFigureOut">
               <a:rPr lang="es-PE" smtClean="0"/>
-              <a:t>6/02/2022</a:t>
+              <a:t>8/02/2022</a:t>
             </a:fld>
             <a:endParaRPr lang="es-PE"/>
           </a:p>
@@ -3419,7 +3437,7 @@
           <a:p>
             <a:fld id="{68D45077-6B19-4A94-B2AE-137AD1A11870}" type="datetimeFigureOut">
               <a:rPr lang="es-PE" smtClean="0"/>
-              <a:t>6/02/2022</a:t>
+              <a:t>8/02/2022</a:t>
             </a:fld>
             <a:endParaRPr lang="es-PE"/>
           </a:p>
@@ -4735,6 +4753,4359 @@
     <p:extLst>
       <p:ext uri="{BB962C8B-B14F-4D97-AF65-F5344CB8AC3E}">
         <p14:creationId xmlns:p14="http://schemas.microsoft.com/office/powerpoint/2010/main" val="2766713519"/>
+      </p:ext>
+    </p:extLst>
+  </p:cSld>
+  <p:clrMapOvr>
+    <a:masterClrMapping/>
+  </p:clrMapOvr>
+</p:sld>
+</file>
+
+<file path=ppt/slides/slide10.xml><?xml version="1.0" encoding="utf-8"?>
+<p:sld xmlns:a="http://schemas.openxmlformats.org/drawingml/2006/main" xmlns:r="http://schemas.openxmlformats.org/officeDocument/2006/relationships" xmlns:p="http://schemas.openxmlformats.org/presentationml/2006/main">
+  <p:cSld>
+    <p:spTree>
+      <p:nvGrpSpPr>
+        <p:cNvPr id="1" name=""/>
+        <p:cNvGrpSpPr/>
+        <p:nvPr/>
+      </p:nvGrpSpPr>
+      <p:grpSpPr>
+        <a:xfrm>
+          <a:off x="0" y="0"/>
+          <a:ext cx="0" cy="0"/>
+          <a:chOff x="0" y="0"/>
+          <a:chExt cx="0" cy="0"/>
+        </a:xfrm>
+      </p:grpSpPr>
+      <p:sp>
+        <p:nvSpPr>
+          <p:cNvPr id="4" name="Rectángulo 3">
+            <a:extLst>
+              <a:ext uri="{FF2B5EF4-FFF2-40B4-BE49-F238E27FC236}">
+                <a16:creationId xmlns:a16="http://schemas.microsoft.com/office/drawing/2014/main" id="{7D0C1056-F063-4295-9589-100A21F99782}"/>
+              </a:ext>
+            </a:extLst>
+          </p:cNvPr>
+          <p:cNvSpPr/>
+          <p:nvPr/>
+        </p:nvSpPr>
+        <p:spPr>
+          <a:xfrm>
+            <a:off x="182880" y="182880"/>
+            <a:ext cx="11695176" cy="1124712"/>
+          </a:xfrm>
+          <a:prstGeom prst="rect">
+            <a:avLst/>
+          </a:prstGeom>
+        </p:spPr>
+        <p:style>
+          <a:lnRef idx="2">
+            <a:schemeClr val="dk1"/>
+          </a:lnRef>
+          <a:fillRef idx="1">
+            <a:schemeClr val="lt1"/>
+          </a:fillRef>
+          <a:effectRef idx="0">
+            <a:schemeClr val="dk1"/>
+          </a:effectRef>
+          <a:fontRef idx="minor">
+            <a:schemeClr val="dk1"/>
+          </a:fontRef>
+        </p:style>
+        <p:txBody>
+          <a:bodyPr rtlCol="0" anchor="ctr"/>
+          <a:lstStyle/>
+          <a:p>
+            <a:pPr algn="ctr"/>
+            <a:endParaRPr lang="es-PE"/>
+          </a:p>
+        </p:txBody>
+      </p:sp>
+      <p:sp>
+        <p:nvSpPr>
+          <p:cNvPr id="5" name="Rectángulo 4">
+            <a:extLst>
+              <a:ext uri="{FF2B5EF4-FFF2-40B4-BE49-F238E27FC236}">
+                <a16:creationId xmlns:a16="http://schemas.microsoft.com/office/drawing/2014/main" id="{FB0592F0-31E3-4A12-9D00-8202A4B8AF40}"/>
+              </a:ext>
+            </a:extLst>
+          </p:cNvPr>
+          <p:cNvSpPr/>
+          <p:nvPr/>
+        </p:nvSpPr>
+        <p:spPr>
+          <a:xfrm>
+            <a:off x="182880" y="1417320"/>
+            <a:ext cx="11695176" cy="3968496"/>
+          </a:xfrm>
+          <a:prstGeom prst="rect">
+            <a:avLst/>
+          </a:prstGeom>
+        </p:spPr>
+        <p:style>
+          <a:lnRef idx="2">
+            <a:schemeClr val="dk1"/>
+          </a:lnRef>
+          <a:fillRef idx="1">
+            <a:schemeClr val="lt1"/>
+          </a:fillRef>
+          <a:effectRef idx="0">
+            <a:schemeClr val="dk1"/>
+          </a:effectRef>
+          <a:fontRef idx="minor">
+            <a:schemeClr val="dk1"/>
+          </a:fontRef>
+        </p:style>
+        <p:txBody>
+          <a:bodyPr rtlCol="0" anchor="ctr"/>
+          <a:lstStyle/>
+          <a:p>
+            <a:pPr algn="ctr"/>
+            <a:endParaRPr lang="es-PE"/>
+          </a:p>
+        </p:txBody>
+      </p:sp>
+      <p:sp>
+        <p:nvSpPr>
+          <p:cNvPr id="6" name="Rectángulo 5">
+            <a:extLst>
+              <a:ext uri="{FF2B5EF4-FFF2-40B4-BE49-F238E27FC236}">
+                <a16:creationId xmlns:a16="http://schemas.microsoft.com/office/drawing/2014/main" id="{15921A5A-FAF3-418A-99AE-B7FC9DD7959F}"/>
+              </a:ext>
+            </a:extLst>
+          </p:cNvPr>
+          <p:cNvSpPr/>
+          <p:nvPr/>
+        </p:nvSpPr>
+        <p:spPr>
+          <a:xfrm>
+            <a:off x="182880" y="5495544"/>
+            <a:ext cx="11695176" cy="1179576"/>
+          </a:xfrm>
+          <a:prstGeom prst="rect">
+            <a:avLst/>
+          </a:prstGeom>
+        </p:spPr>
+        <p:style>
+          <a:lnRef idx="2">
+            <a:schemeClr val="dk1"/>
+          </a:lnRef>
+          <a:fillRef idx="1">
+            <a:schemeClr val="lt1"/>
+          </a:fillRef>
+          <a:effectRef idx="0">
+            <a:schemeClr val="dk1"/>
+          </a:effectRef>
+          <a:fontRef idx="minor">
+            <a:schemeClr val="dk1"/>
+          </a:fontRef>
+        </p:style>
+        <p:txBody>
+          <a:bodyPr rtlCol="0" anchor="ctr"/>
+          <a:lstStyle/>
+          <a:p>
+            <a:pPr algn="ctr"/>
+            <a:endParaRPr lang="es-PE"/>
+          </a:p>
+        </p:txBody>
+      </p:sp>
+      <p:sp>
+        <p:nvSpPr>
+          <p:cNvPr id="7" name="Rectángulo 6">
+            <a:extLst>
+              <a:ext uri="{FF2B5EF4-FFF2-40B4-BE49-F238E27FC236}">
+                <a16:creationId xmlns:a16="http://schemas.microsoft.com/office/drawing/2014/main" id="{9A05CB20-1A4C-44A9-BCFA-BACA053BB6D0}"/>
+              </a:ext>
+            </a:extLst>
+          </p:cNvPr>
+          <p:cNvSpPr/>
+          <p:nvPr/>
+        </p:nvSpPr>
+        <p:spPr>
+          <a:xfrm>
+            <a:off x="310896" y="292608"/>
+            <a:ext cx="2816352" cy="905256"/>
+          </a:xfrm>
+          <a:prstGeom prst="rect">
+            <a:avLst/>
+          </a:prstGeom>
+        </p:spPr>
+        <p:style>
+          <a:lnRef idx="2">
+            <a:schemeClr val="dk1"/>
+          </a:lnRef>
+          <a:fillRef idx="1">
+            <a:schemeClr val="lt1"/>
+          </a:fillRef>
+          <a:effectRef idx="0">
+            <a:schemeClr val="dk1"/>
+          </a:effectRef>
+          <a:fontRef idx="minor">
+            <a:schemeClr val="dk1"/>
+          </a:fontRef>
+        </p:style>
+        <p:txBody>
+          <a:bodyPr rtlCol="0" anchor="ctr"/>
+          <a:lstStyle/>
+          <a:p>
+            <a:pPr algn="ctr"/>
+            <a:r>
+              <a:rPr lang="es-PE" dirty="0"/>
+              <a:t>Logo </a:t>
+            </a:r>
+            <a:r>
+              <a:rPr lang="es-PE" dirty="0" err="1"/>
+              <a:t>Crypto</a:t>
+            </a:r>
+            <a:r>
+              <a:rPr lang="es-PE" dirty="0"/>
+              <a:t>-nita</a:t>
+            </a:r>
+          </a:p>
+        </p:txBody>
+      </p:sp>
+      <p:sp>
+        <p:nvSpPr>
+          <p:cNvPr id="9" name="Rectángulo 8">
+            <a:extLst>
+              <a:ext uri="{FF2B5EF4-FFF2-40B4-BE49-F238E27FC236}">
+                <a16:creationId xmlns:a16="http://schemas.microsoft.com/office/drawing/2014/main" id="{9059C4E3-239F-4824-8C5A-1858ACB1C26E}"/>
+              </a:ext>
+            </a:extLst>
+          </p:cNvPr>
+          <p:cNvSpPr/>
+          <p:nvPr/>
+        </p:nvSpPr>
+        <p:spPr>
+          <a:xfrm>
+            <a:off x="310896" y="5614416"/>
+            <a:ext cx="2450592" cy="950976"/>
+          </a:xfrm>
+          <a:prstGeom prst="rect">
+            <a:avLst/>
+          </a:prstGeom>
+        </p:spPr>
+        <p:style>
+          <a:lnRef idx="2">
+            <a:schemeClr val="dk1"/>
+          </a:lnRef>
+          <a:fillRef idx="1">
+            <a:schemeClr val="lt1"/>
+          </a:fillRef>
+          <a:effectRef idx="0">
+            <a:schemeClr val="dk1"/>
+          </a:effectRef>
+          <a:fontRef idx="minor">
+            <a:schemeClr val="dk1"/>
+          </a:fontRef>
+        </p:style>
+        <p:txBody>
+          <a:bodyPr rtlCol="0" anchor="ctr"/>
+          <a:lstStyle/>
+          <a:p>
+            <a:pPr algn="ctr"/>
+            <a:r>
+              <a:rPr lang="es-MX" dirty="0"/>
+              <a:t>Nombre/Logo del Grupo</a:t>
+            </a:r>
+            <a:endParaRPr lang="es-PE" dirty="0"/>
+          </a:p>
+        </p:txBody>
+      </p:sp>
+      <p:sp>
+        <p:nvSpPr>
+          <p:cNvPr id="10" name="Rectángulo 9">
+            <a:extLst>
+              <a:ext uri="{FF2B5EF4-FFF2-40B4-BE49-F238E27FC236}">
+                <a16:creationId xmlns:a16="http://schemas.microsoft.com/office/drawing/2014/main" id="{CE6F6AAA-080D-4FC6-88FA-3EBC4C0CD8F6}"/>
+              </a:ext>
+            </a:extLst>
+          </p:cNvPr>
+          <p:cNvSpPr/>
+          <p:nvPr/>
+        </p:nvSpPr>
+        <p:spPr>
+          <a:xfrm>
+            <a:off x="10049256" y="5614416"/>
+            <a:ext cx="1627632" cy="950976"/>
+          </a:xfrm>
+          <a:prstGeom prst="rect">
+            <a:avLst/>
+          </a:prstGeom>
+        </p:spPr>
+        <p:style>
+          <a:lnRef idx="2">
+            <a:schemeClr val="dk1"/>
+          </a:lnRef>
+          <a:fillRef idx="1">
+            <a:schemeClr val="lt1"/>
+          </a:fillRef>
+          <a:effectRef idx="0">
+            <a:schemeClr val="dk1"/>
+          </a:effectRef>
+          <a:fontRef idx="minor">
+            <a:schemeClr val="dk1"/>
+          </a:fontRef>
+        </p:style>
+        <p:txBody>
+          <a:bodyPr rtlCol="0" anchor="ctr"/>
+          <a:lstStyle/>
+          <a:p>
+            <a:pPr algn="ctr"/>
+            <a:r>
+              <a:rPr lang="es-MX" sz="1100" dirty="0"/>
+              <a:t>Integrantes</a:t>
+            </a:r>
+            <a:endParaRPr lang="es-PE" sz="1100" dirty="0"/>
+          </a:p>
+        </p:txBody>
+      </p:sp>
+      <p:sp>
+        <p:nvSpPr>
+          <p:cNvPr id="11" name="Rectángulo 10">
+            <a:extLst>
+              <a:ext uri="{FF2B5EF4-FFF2-40B4-BE49-F238E27FC236}">
+                <a16:creationId xmlns:a16="http://schemas.microsoft.com/office/drawing/2014/main" id="{2D34766E-3CC0-47DF-87DC-62FB893F3931}"/>
+              </a:ext>
+            </a:extLst>
+          </p:cNvPr>
+          <p:cNvSpPr/>
+          <p:nvPr/>
+        </p:nvSpPr>
+        <p:spPr>
+          <a:xfrm>
+            <a:off x="5506974" y="5925312"/>
+            <a:ext cx="3790188" cy="320040"/>
+          </a:xfrm>
+          <a:prstGeom prst="rect">
+            <a:avLst/>
+          </a:prstGeom>
+        </p:spPr>
+        <p:style>
+          <a:lnRef idx="2">
+            <a:schemeClr val="dk1"/>
+          </a:lnRef>
+          <a:fillRef idx="1">
+            <a:schemeClr val="lt1"/>
+          </a:fillRef>
+          <a:effectRef idx="0">
+            <a:schemeClr val="dk1"/>
+          </a:effectRef>
+          <a:fontRef idx="minor">
+            <a:schemeClr val="dk1"/>
+          </a:fontRef>
+        </p:style>
+        <p:txBody>
+          <a:bodyPr rtlCol="0" anchor="ctr"/>
+          <a:lstStyle/>
+          <a:p>
+            <a:pPr algn="ctr"/>
+            <a:r>
+              <a:rPr lang="es-PE" sz="1100" dirty="0"/>
+              <a:t>2022 - Nombre® - Todos los derechos reservados</a:t>
+            </a:r>
+          </a:p>
+        </p:txBody>
+      </p:sp>
+      <p:sp>
+        <p:nvSpPr>
+          <p:cNvPr id="12" name="Rectángulo 11">
+            <a:extLst>
+              <a:ext uri="{FF2B5EF4-FFF2-40B4-BE49-F238E27FC236}">
+                <a16:creationId xmlns:a16="http://schemas.microsoft.com/office/drawing/2014/main" id="{5E86E855-05F8-45D1-998F-FD3B01DB39A2}"/>
+              </a:ext>
+            </a:extLst>
+          </p:cNvPr>
+          <p:cNvSpPr/>
+          <p:nvPr/>
+        </p:nvSpPr>
+        <p:spPr>
+          <a:xfrm>
+            <a:off x="2889504" y="5614416"/>
+            <a:ext cx="1865376" cy="420624"/>
+          </a:xfrm>
+          <a:prstGeom prst="rect">
+            <a:avLst/>
+          </a:prstGeom>
+        </p:spPr>
+        <p:style>
+          <a:lnRef idx="2">
+            <a:schemeClr val="dk1"/>
+          </a:lnRef>
+          <a:fillRef idx="1">
+            <a:schemeClr val="lt1"/>
+          </a:fillRef>
+          <a:effectRef idx="0">
+            <a:schemeClr val="dk1"/>
+          </a:effectRef>
+          <a:fontRef idx="minor">
+            <a:schemeClr val="dk1"/>
+          </a:fontRef>
+        </p:style>
+        <p:txBody>
+          <a:bodyPr rtlCol="0" anchor="ctr"/>
+          <a:lstStyle/>
+          <a:p>
+            <a:pPr algn="ctr"/>
+            <a:r>
+              <a:rPr lang="es-PE" sz="1100" dirty="0"/>
+              <a:t>Nosotros</a:t>
+            </a:r>
+          </a:p>
+        </p:txBody>
+      </p:sp>
+      <p:sp>
+        <p:nvSpPr>
+          <p:cNvPr id="13" name="Rectángulo 12">
+            <a:extLst>
+              <a:ext uri="{FF2B5EF4-FFF2-40B4-BE49-F238E27FC236}">
+                <a16:creationId xmlns:a16="http://schemas.microsoft.com/office/drawing/2014/main" id="{BAE1FAEE-ABB3-4846-BC1C-59A39C7AD0AB}"/>
+              </a:ext>
+            </a:extLst>
+          </p:cNvPr>
+          <p:cNvSpPr/>
+          <p:nvPr/>
+        </p:nvSpPr>
+        <p:spPr>
+          <a:xfrm>
+            <a:off x="2889504" y="6144768"/>
+            <a:ext cx="1865376" cy="425196"/>
+          </a:xfrm>
+          <a:prstGeom prst="rect">
+            <a:avLst/>
+          </a:prstGeom>
+        </p:spPr>
+        <p:style>
+          <a:lnRef idx="2">
+            <a:schemeClr val="dk1"/>
+          </a:lnRef>
+          <a:fillRef idx="1">
+            <a:schemeClr val="lt1"/>
+          </a:fillRef>
+          <a:effectRef idx="0">
+            <a:schemeClr val="dk1"/>
+          </a:effectRef>
+          <a:fontRef idx="minor">
+            <a:schemeClr val="dk1"/>
+          </a:fontRef>
+        </p:style>
+        <p:txBody>
+          <a:bodyPr rtlCol="0" anchor="ctr"/>
+          <a:lstStyle/>
+          <a:p>
+            <a:pPr algn="ctr"/>
+            <a:r>
+              <a:rPr lang="es-PE" sz="1100" dirty="0"/>
+              <a:t>Términos y Condiciones</a:t>
+            </a:r>
+          </a:p>
+        </p:txBody>
+      </p:sp>
+      <p:pic>
+        <p:nvPicPr>
+          <p:cNvPr id="16" name="Imagen 15">
+            <a:extLst>
+              <a:ext uri="{FF2B5EF4-FFF2-40B4-BE49-F238E27FC236}">
+                <a16:creationId xmlns:a16="http://schemas.microsoft.com/office/drawing/2014/main" id="{661C1A85-CA65-4617-BC98-2ECBB0EA1FDC}"/>
+              </a:ext>
+            </a:extLst>
+          </p:cNvPr>
+          <p:cNvPicPr>
+            <a:picLocks noChangeAspect="1"/>
+          </p:cNvPicPr>
+          <p:nvPr/>
+        </p:nvPicPr>
+        <p:blipFill rotWithShape="1">
+          <a:blip r:embed="rId2"/>
+          <a:srcRect l="21429" t="5110" r="19697" b="32741"/>
+          <a:stretch/>
+        </p:blipFill>
+        <p:spPr>
+          <a:xfrm>
+            <a:off x="3850075" y="1556479"/>
+            <a:ext cx="4491849" cy="3745042"/>
+          </a:xfrm>
+          <a:prstGeom prst="rect">
+            <a:avLst/>
+          </a:prstGeom>
+        </p:spPr>
+      </p:pic>
+    </p:spTree>
+    <p:extLst>
+      <p:ext uri="{BB962C8B-B14F-4D97-AF65-F5344CB8AC3E}">
+        <p14:creationId xmlns:p14="http://schemas.microsoft.com/office/powerpoint/2010/main" val="1501398333"/>
+      </p:ext>
+    </p:extLst>
+  </p:cSld>
+  <p:clrMapOvr>
+    <a:masterClrMapping/>
+  </p:clrMapOvr>
+</p:sld>
+</file>
+
+<file path=ppt/slides/slide11.xml><?xml version="1.0" encoding="utf-8"?>
+<p:sld xmlns:a="http://schemas.openxmlformats.org/drawingml/2006/main" xmlns:r="http://schemas.openxmlformats.org/officeDocument/2006/relationships" xmlns:p="http://schemas.openxmlformats.org/presentationml/2006/main">
+  <p:cSld>
+    <p:spTree>
+      <p:nvGrpSpPr>
+        <p:cNvPr id="1" name=""/>
+        <p:cNvGrpSpPr/>
+        <p:nvPr/>
+      </p:nvGrpSpPr>
+      <p:grpSpPr>
+        <a:xfrm>
+          <a:off x="0" y="0"/>
+          <a:ext cx="0" cy="0"/>
+          <a:chOff x="0" y="0"/>
+          <a:chExt cx="0" cy="0"/>
+        </a:xfrm>
+      </p:grpSpPr>
+      <p:sp>
+        <p:nvSpPr>
+          <p:cNvPr id="4" name="Rectángulo 3">
+            <a:extLst>
+              <a:ext uri="{FF2B5EF4-FFF2-40B4-BE49-F238E27FC236}">
+                <a16:creationId xmlns:a16="http://schemas.microsoft.com/office/drawing/2014/main" id="{7D0C1056-F063-4295-9589-100A21F99782}"/>
+              </a:ext>
+            </a:extLst>
+          </p:cNvPr>
+          <p:cNvSpPr/>
+          <p:nvPr/>
+        </p:nvSpPr>
+        <p:spPr>
+          <a:xfrm>
+            <a:off x="182880" y="182880"/>
+            <a:ext cx="11695176" cy="1124712"/>
+          </a:xfrm>
+          <a:prstGeom prst="rect">
+            <a:avLst/>
+          </a:prstGeom>
+        </p:spPr>
+        <p:style>
+          <a:lnRef idx="2">
+            <a:schemeClr val="dk1"/>
+          </a:lnRef>
+          <a:fillRef idx="1">
+            <a:schemeClr val="lt1"/>
+          </a:fillRef>
+          <a:effectRef idx="0">
+            <a:schemeClr val="dk1"/>
+          </a:effectRef>
+          <a:fontRef idx="minor">
+            <a:schemeClr val="dk1"/>
+          </a:fontRef>
+        </p:style>
+        <p:txBody>
+          <a:bodyPr rtlCol="0" anchor="ctr"/>
+          <a:lstStyle/>
+          <a:p>
+            <a:pPr algn="ctr"/>
+            <a:endParaRPr lang="es-PE"/>
+          </a:p>
+        </p:txBody>
+      </p:sp>
+      <p:sp>
+        <p:nvSpPr>
+          <p:cNvPr id="5" name="Rectángulo 4">
+            <a:extLst>
+              <a:ext uri="{FF2B5EF4-FFF2-40B4-BE49-F238E27FC236}">
+                <a16:creationId xmlns:a16="http://schemas.microsoft.com/office/drawing/2014/main" id="{FB0592F0-31E3-4A12-9D00-8202A4B8AF40}"/>
+              </a:ext>
+            </a:extLst>
+          </p:cNvPr>
+          <p:cNvSpPr/>
+          <p:nvPr/>
+        </p:nvSpPr>
+        <p:spPr>
+          <a:xfrm>
+            <a:off x="182880" y="1417320"/>
+            <a:ext cx="11695176" cy="3968496"/>
+          </a:xfrm>
+          <a:prstGeom prst="rect">
+            <a:avLst/>
+          </a:prstGeom>
+        </p:spPr>
+        <p:style>
+          <a:lnRef idx="2">
+            <a:schemeClr val="dk1"/>
+          </a:lnRef>
+          <a:fillRef idx="1">
+            <a:schemeClr val="lt1"/>
+          </a:fillRef>
+          <a:effectRef idx="0">
+            <a:schemeClr val="dk1"/>
+          </a:effectRef>
+          <a:fontRef idx="minor">
+            <a:schemeClr val="dk1"/>
+          </a:fontRef>
+        </p:style>
+        <p:txBody>
+          <a:bodyPr rtlCol="0" anchor="ctr"/>
+          <a:lstStyle/>
+          <a:p>
+            <a:pPr algn="ctr"/>
+            <a:endParaRPr lang="es-PE"/>
+          </a:p>
+        </p:txBody>
+      </p:sp>
+      <p:sp>
+        <p:nvSpPr>
+          <p:cNvPr id="6" name="Rectángulo 5">
+            <a:extLst>
+              <a:ext uri="{FF2B5EF4-FFF2-40B4-BE49-F238E27FC236}">
+                <a16:creationId xmlns:a16="http://schemas.microsoft.com/office/drawing/2014/main" id="{15921A5A-FAF3-418A-99AE-B7FC9DD7959F}"/>
+              </a:ext>
+            </a:extLst>
+          </p:cNvPr>
+          <p:cNvSpPr/>
+          <p:nvPr/>
+        </p:nvSpPr>
+        <p:spPr>
+          <a:xfrm>
+            <a:off x="182880" y="5495544"/>
+            <a:ext cx="11695176" cy="1179576"/>
+          </a:xfrm>
+          <a:prstGeom prst="rect">
+            <a:avLst/>
+          </a:prstGeom>
+        </p:spPr>
+        <p:style>
+          <a:lnRef idx="2">
+            <a:schemeClr val="dk1"/>
+          </a:lnRef>
+          <a:fillRef idx="1">
+            <a:schemeClr val="lt1"/>
+          </a:fillRef>
+          <a:effectRef idx="0">
+            <a:schemeClr val="dk1"/>
+          </a:effectRef>
+          <a:fontRef idx="minor">
+            <a:schemeClr val="dk1"/>
+          </a:fontRef>
+        </p:style>
+        <p:txBody>
+          <a:bodyPr rtlCol="0" anchor="ctr"/>
+          <a:lstStyle/>
+          <a:p>
+            <a:pPr algn="ctr"/>
+            <a:endParaRPr lang="es-PE"/>
+          </a:p>
+        </p:txBody>
+      </p:sp>
+      <p:sp>
+        <p:nvSpPr>
+          <p:cNvPr id="7" name="Rectángulo 6">
+            <a:extLst>
+              <a:ext uri="{FF2B5EF4-FFF2-40B4-BE49-F238E27FC236}">
+                <a16:creationId xmlns:a16="http://schemas.microsoft.com/office/drawing/2014/main" id="{9A05CB20-1A4C-44A9-BCFA-BACA053BB6D0}"/>
+              </a:ext>
+            </a:extLst>
+          </p:cNvPr>
+          <p:cNvSpPr/>
+          <p:nvPr/>
+        </p:nvSpPr>
+        <p:spPr>
+          <a:xfrm>
+            <a:off x="310896" y="292608"/>
+            <a:ext cx="2816352" cy="905256"/>
+          </a:xfrm>
+          <a:prstGeom prst="rect">
+            <a:avLst/>
+          </a:prstGeom>
+        </p:spPr>
+        <p:style>
+          <a:lnRef idx="2">
+            <a:schemeClr val="dk1"/>
+          </a:lnRef>
+          <a:fillRef idx="1">
+            <a:schemeClr val="lt1"/>
+          </a:fillRef>
+          <a:effectRef idx="0">
+            <a:schemeClr val="dk1"/>
+          </a:effectRef>
+          <a:fontRef idx="minor">
+            <a:schemeClr val="dk1"/>
+          </a:fontRef>
+        </p:style>
+        <p:txBody>
+          <a:bodyPr rtlCol="0" anchor="ctr"/>
+          <a:lstStyle/>
+          <a:p>
+            <a:pPr algn="ctr"/>
+            <a:r>
+              <a:rPr lang="es-PE" dirty="0"/>
+              <a:t>Logo </a:t>
+            </a:r>
+            <a:r>
+              <a:rPr lang="es-PE" dirty="0" err="1"/>
+              <a:t>Crypto</a:t>
+            </a:r>
+            <a:r>
+              <a:rPr lang="es-PE" dirty="0"/>
+              <a:t>-nita</a:t>
+            </a:r>
+          </a:p>
+        </p:txBody>
+      </p:sp>
+      <p:sp>
+        <p:nvSpPr>
+          <p:cNvPr id="9" name="Rectángulo 8">
+            <a:extLst>
+              <a:ext uri="{FF2B5EF4-FFF2-40B4-BE49-F238E27FC236}">
+                <a16:creationId xmlns:a16="http://schemas.microsoft.com/office/drawing/2014/main" id="{9059C4E3-239F-4824-8C5A-1858ACB1C26E}"/>
+              </a:ext>
+            </a:extLst>
+          </p:cNvPr>
+          <p:cNvSpPr/>
+          <p:nvPr/>
+        </p:nvSpPr>
+        <p:spPr>
+          <a:xfrm>
+            <a:off x="310896" y="5614416"/>
+            <a:ext cx="2450592" cy="950976"/>
+          </a:xfrm>
+          <a:prstGeom prst="rect">
+            <a:avLst/>
+          </a:prstGeom>
+        </p:spPr>
+        <p:style>
+          <a:lnRef idx="2">
+            <a:schemeClr val="dk1"/>
+          </a:lnRef>
+          <a:fillRef idx="1">
+            <a:schemeClr val="lt1"/>
+          </a:fillRef>
+          <a:effectRef idx="0">
+            <a:schemeClr val="dk1"/>
+          </a:effectRef>
+          <a:fontRef idx="minor">
+            <a:schemeClr val="dk1"/>
+          </a:fontRef>
+        </p:style>
+        <p:txBody>
+          <a:bodyPr rtlCol="0" anchor="ctr"/>
+          <a:lstStyle/>
+          <a:p>
+            <a:pPr algn="ctr"/>
+            <a:r>
+              <a:rPr lang="es-MX" dirty="0"/>
+              <a:t>Nombre/Logo del Grupo</a:t>
+            </a:r>
+            <a:endParaRPr lang="es-PE" dirty="0"/>
+          </a:p>
+        </p:txBody>
+      </p:sp>
+      <p:sp>
+        <p:nvSpPr>
+          <p:cNvPr id="10" name="Rectángulo 9">
+            <a:extLst>
+              <a:ext uri="{FF2B5EF4-FFF2-40B4-BE49-F238E27FC236}">
+                <a16:creationId xmlns:a16="http://schemas.microsoft.com/office/drawing/2014/main" id="{CE6F6AAA-080D-4FC6-88FA-3EBC4C0CD8F6}"/>
+              </a:ext>
+            </a:extLst>
+          </p:cNvPr>
+          <p:cNvSpPr/>
+          <p:nvPr/>
+        </p:nvSpPr>
+        <p:spPr>
+          <a:xfrm>
+            <a:off x="10049256" y="5614416"/>
+            <a:ext cx="1627632" cy="950976"/>
+          </a:xfrm>
+          <a:prstGeom prst="rect">
+            <a:avLst/>
+          </a:prstGeom>
+        </p:spPr>
+        <p:style>
+          <a:lnRef idx="2">
+            <a:schemeClr val="dk1"/>
+          </a:lnRef>
+          <a:fillRef idx="1">
+            <a:schemeClr val="lt1"/>
+          </a:fillRef>
+          <a:effectRef idx="0">
+            <a:schemeClr val="dk1"/>
+          </a:effectRef>
+          <a:fontRef idx="minor">
+            <a:schemeClr val="dk1"/>
+          </a:fontRef>
+        </p:style>
+        <p:txBody>
+          <a:bodyPr rtlCol="0" anchor="ctr"/>
+          <a:lstStyle/>
+          <a:p>
+            <a:pPr algn="ctr"/>
+            <a:r>
+              <a:rPr lang="es-MX" sz="1100" dirty="0"/>
+              <a:t>Integrantes</a:t>
+            </a:r>
+            <a:endParaRPr lang="es-PE" sz="1100" dirty="0"/>
+          </a:p>
+        </p:txBody>
+      </p:sp>
+      <p:sp>
+        <p:nvSpPr>
+          <p:cNvPr id="11" name="Rectángulo 10">
+            <a:extLst>
+              <a:ext uri="{FF2B5EF4-FFF2-40B4-BE49-F238E27FC236}">
+                <a16:creationId xmlns:a16="http://schemas.microsoft.com/office/drawing/2014/main" id="{2D34766E-3CC0-47DF-87DC-62FB893F3931}"/>
+              </a:ext>
+            </a:extLst>
+          </p:cNvPr>
+          <p:cNvSpPr/>
+          <p:nvPr/>
+        </p:nvSpPr>
+        <p:spPr>
+          <a:xfrm>
+            <a:off x="5506974" y="5925312"/>
+            <a:ext cx="3790188" cy="320040"/>
+          </a:xfrm>
+          <a:prstGeom prst="rect">
+            <a:avLst/>
+          </a:prstGeom>
+        </p:spPr>
+        <p:style>
+          <a:lnRef idx="2">
+            <a:schemeClr val="dk1"/>
+          </a:lnRef>
+          <a:fillRef idx="1">
+            <a:schemeClr val="lt1"/>
+          </a:fillRef>
+          <a:effectRef idx="0">
+            <a:schemeClr val="dk1"/>
+          </a:effectRef>
+          <a:fontRef idx="minor">
+            <a:schemeClr val="dk1"/>
+          </a:fontRef>
+        </p:style>
+        <p:txBody>
+          <a:bodyPr rtlCol="0" anchor="ctr"/>
+          <a:lstStyle/>
+          <a:p>
+            <a:pPr algn="ctr"/>
+            <a:r>
+              <a:rPr lang="es-PE" sz="1100" dirty="0"/>
+              <a:t>2022 - Nombre® - Todos los derechos reservados</a:t>
+            </a:r>
+          </a:p>
+        </p:txBody>
+      </p:sp>
+      <p:sp>
+        <p:nvSpPr>
+          <p:cNvPr id="12" name="Rectángulo 11">
+            <a:extLst>
+              <a:ext uri="{FF2B5EF4-FFF2-40B4-BE49-F238E27FC236}">
+                <a16:creationId xmlns:a16="http://schemas.microsoft.com/office/drawing/2014/main" id="{5E86E855-05F8-45D1-998F-FD3B01DB39A2}"/>
+              </a:ext>
+            </a:extLst>
+          </p:cNvPr>
+          <p:cNvSpPr/>
+          <p:nvPr/>
+        </p:nvSpPr>
+        <p:spPr>
+          <a:xfrm>
+            <a:off x="2889504" y="5614416"/>
+            <a:ext cx="1865376" cy="420624"/>
+          </a:xfrm>
+          <a:prstGeom prst="rect">
+            <a:avLst/>
+          </a:prstGeom>
+        </p:spPr>
+        <p:style>
+          <a:lnRef idx="2">
+            <a:schemeClr val="dk1"/>
+          </a:lnRef>
+          <a:fillRef idx="1">
+            <a:schemeClr val="lt1"/>
+          </a:fillRef>
+          <a:effectRef idx="0">
+            <a:schemeClr val="dk1"/>
+          </a:effectRef>
+          <a:fontRef idx="minor">
+            <a:schemeClr val="dk1"/>
+          </a:fontRef>
+        </p:style>
+        <p:txBody>
+          <a:bodyPr rtlCol="0" anchor="ctr"/>
+          <a:lstStyle/>
+          <a:p>
+            <a:pPr algn="ctr"/>
+            <a:r>
+              <a:rPr lang="es-PE" sz="1100" dirty="0"/>
+              <a:t>Nosotros</a:t>
+            </a:r>
+          </a:p>
+        </p:txBody>
+      </p:sp>
+      <p:sp>
+        <p:nvSpPr>
+          <p:cNvPr id="13" name="Rectángulo 12">
+            <a:extLst>
+              <a:ext uri="{FF2B5EF4-FFF2-40B4-BE49-F238E27FC236}">
+                <a16:creationId xmlns:a16="http://schemas.microsoft.com/office/drawing/2014/main" id="{BAE1FAEE-ABB3-4846-BC1C-59A39C7AD0AB}"/>
+              </a:ext>
+            </a:extLst>
+          </p:cNvPr>
+          <p:cNvSpPr/>
+          <p:nvPr/>
+        </p:nvSpPr>
+        <p:spPr>
+          <a:xfrm>
+            <a:off x="2889504" y="6144768"/>
+            <a:ext cx="1865376" cy="425196"/>
+          </a:xfrm>
+          <a:prstGeom prst="rect">
+            <a:avLst/>
+          </a:prstGeom>
+        </p:spPr>
+        <p:style>
+          <a:lnRef idx="2">
+            <a:schemeClr val="dk1"/>
+          </a:lnRef>
+          <a:fillRef idx="1">
+            <a:schemeClr val="lt1"/>
+          </a:fillRef>
+          <a:effectRef idx="0">
+            <a:schemeClr val="dk1"/>
+          </a:effectRef>
+          <a:fontRef idx="minor">
+            <a:schemeClr val="dk1"/>
+          </a:fontRef>
+        </p:style>
+        <p:txBody>
+          <a:bodyPr rtlCol="0" anchor="ctr"/>
+          <a:lstStyle/>
+          <a:p>
+            <a:pPr algn="ctr"/>
+            <a:r>
+              <a:rPr lang="es-PE" sz="1100" dirty="0"/>
+              <a:t>Términos y Condiciones</a:t>
+            </a:r>
+          </a:p>
+        </p:txBody>
+      </p:sp>
+      <p:pic>
+        <p:nvPicPr>
+          <p:cNvPr id="3" name="Imagen 2">
+            <a:extLst>
+              <a:ext uri="{FF2B5EF4-FFF2-40B4-BE49-F238E27FC236}">
+                <a16:creationId xmlns:a16="http://schemas.microsoft.com/office/drawing/2014/main" id="{905FE270-C01E-45D8-84CB-0CC85DB82A6D}"/>
+              </a:ext>
+            </a:extLst>
+          </p:cNvPr>
+          <p:cNvPicPr>
+            <a:picLocks noChangeAspect="1"/>
+          </p:cNvPicPr>
+          <p:nvPr/>
+        </p:nvPicPr>
+        <p:blipFill rotWithShape="1">
+          <a:blip r:embed="rId2"/>
+          <a:srcRect l="15605"/>
+          <a:stretch/>
+        </p:blipFill>
+        <p:spPr>
+          <a:xfrm>
+            <a:off x="5000665" y="1476843"/>
+            <a:ext cx="2190670" cy="3849450"/>
+          </a:xfrm>
+          <a:prstGeom prst="rect">
+            <a:avLst/>
+          </a:prstGeom>
+        </p:spPr>
+      </p:pic>
+    </p:spTree>
+    <p:extLst>
+      <p:ext uri="{BB962C8B-B14F-4D97-AF65-F5344CB8AC3E}">
+        <p14:creationId xmlns:p14="http://schemas.microsoft.com/office/powerpoint/2010/main" val="3905886581"/>
+      </p:ext>
+    </p:extLst>
+  </p:cSld>
+  <p:clrMapOvr>
+    <a:masterClrMapping/>
+  </p:clrMapOvr>
+</p:sld>
+</file>
+
+<file path=ppt/slides/slide12.xml><?xml version="1.0" encoding="utf-8"?>
+<p:sld xmlns:a="http://schemas.openxmlformats.org/drawingml/2006/main" xmlns:r="http://schemas.openxmlformats.org/officeDocument/2006/relationships" xmlns:p="http://schemas.openxmlformats.org/presentationml/2006/main">
+  <p:cSld>
+    <p:spTree>
+      <p:nvGrpSpPr>
+        <p:cNvPr id="1" name=""/>
+        <p:cNvGrpSpPr/>
+        <p:nvPr/>
+      </p:nvGrpSpPr>
+      <p:grpSpPr>
+        <a:xfrm>
+          <a:off x="0" y="0"/>
+          <a:ext cx="0" cy="0"/>
+          <a:chOff x="0" y="0"/>
+          <a:chExt cx="0" cy="0"/>
+        </a:xfrm>
+      </p:grpSpPr>
+      <p:sp>
+        <p:nvSpPr>
+          <p:cNvPr id="4" name="Rectángulo 3">
+            <a:extLst>
+              <a:ext uri="{FF2B5EF4-FFF2-40B4-BE49-F238E27FC236}">
+                <a16:creationId xmlns:a16="http://schemas.microsoft.com/office/drawing/2014/main" id="{7D0C1056-F063-4295-9589-100A21F99782}"/>
+              </a:ext>
+            </a:extLst>
+          </p:cNvPr>
+          <p:cNvSpPr/>
+          <p:nvPr/>
+        </p:nvSpPr>
+        <p:spPr>
+          <a:xfrm>
+            <a:off x="182880" y="182880"/>
+            <a:ext cx="11695176" cy="1124712"/>
+          </a:xfrm>
+          <a:prstGeom prst="rect">
+            <a:avLst/>
+          </a:prstGeom>
+        </p:spPr>
+        <p:style>
+          <a:lnRef idx="2">
+            <a:schemeClr val="dk1"/>
+          </a:lnRef>
+          <a:fillRef idx="1">
+            <a:schemeClr val="lt1"/>
+          </a:fillRef>
+          <a:effectRef idx="0">
+            <a:schemeClr val="dk1"/>
+          </a:effectRef>
+          <a:fontRef idx="minor">
+            <a:schemeClr val="dk1"/>
+          </a:fontRef>
+        </p:style>
+        <p:txBody>
+          <a:bodyPr rtlCol="0" anchor="ctr"/>
+          <a:lstStyle/>
+          <a:p>
+            <a:pPr algn="ctr"/>
+            <a:endParaRPr lang="es-PE"/>
+          </a:p>
+        </p:txBody>
+      </p:sp>
+      <p:sp>
+        <p:nvSpPr>
+          <p:cNvPr id="5" name="Rectángulo 4">
+            <a:extLst>
+              <a:ext uri="{FF2B5EF4-FFF2-40B4-BE49-F238E27FC236}">
+                <a16:creationId xmlns:a16="http://schemas.microsoft.com/office/drawing/2014/main" id="{FB0592F0-31E3-4A12-9D00-8202A4B8AF40}"/>
+              </a:ext>
+            </a:extLst>
+          </p:cNvPr>
+          <p:cNvSpPr/>
+          <p:nvPr/>
+        </p:nvSpPr>
+        <p:spPr>
+          <a:xfrm>
+            <a:off x="182880" y="1417320"/>
+            <a:ext cx="11695176" cy="3968496"/>
+          </a:xfrm>
+          <a:prstGeom prst="rect">
+            <a:avLst/>
+          </a:prstGeom>
+        </p:spPr>
+        <p:style>
+          <a:lnRef idx="2">
+            <a:schemeClr val="dk1"/>
+          </a:lnRef>
+          <a:fillRef idx="1">
+            <a:schemeClr val="lt1"/>
+          </a:fillRef>
+          <a:effectRef idx="0">
+            <a:schemeClr val="dk1"/>
+          </a:effectRef>
+          <a:fontRef idx="minor">
+            <a:schemeClr val="dk1"/>
+          </a:fontRef>
+        </p:style>
+        <p:txBody>
+          <a:bodyPr rtlCol="0" anchor="ctr"/>
+          <a:lstStyle/>
+          <a:p>
+            <a:pPr algn="ctr"/>
+            <a:endParaRPr lang="es-PE"/>
+          </a:p>
+        </p:txBody>
+      </p:sp>
+      <p:sp>
+        <p:nvSpPr>
+          <p:cNvPr id="6" name="Rectángulo 5">
+            <a:extLst>
+              <a:ext uri="{FF2B5EF4-FFF2-40B4-BE49-F238E27FC236}">
+                <a16:creationId xmlns:a16="http://schemas.microsoft.com/office/drawing/2014/main" id="{15921A5A-FAF3-418A-99AE-B7FC9DD7959F}"/>
+              </a:ext>
+            </a:extLst>
+          </p:cNvPr>
+          <p:cNvSpPr/>
+          <p:nvPr/>
+        </p:nvSpPr>
+        <p:spPr>
+          <a:xfrm>
+            <a:off x="182880" y="5495544"/>
+            <a:ext cx="11695176" cy="1179576"/>
+          </a:xfrm>
+          <a:prstGeom prst="rect">
+            <a:avLst/>
+          </a:prstGeom>
+        </p:spPr>
+        <p:style>
+          <a:lnRef idx="2">
+            <a:schemeClr val="dk1"/>
+          </a:lnRef>
+          <a:fillRef idx="1">
+            <a:schemeClr val="lt1"/>
+          </a:fillRef>
+          <a:effectRef idx="0">
+            <a:schemeClr val="dk1"/>
+          </a:effectRef>
+          <a:fontRef idx="minor">
+            <a:schemeClr val="dk1"/>
+          </a:fontRef>
+        </p:style>
+        <p:txBody>
+          <a:bodyPr rtlCol="0" anchor="ctr"/>
+          <a:lstStyle/>
+          <a:p>
+            <a:pPr algn="ctr"/>
+            <a:endParaRPr lang="es-PE"/>
+          </a:p>
+        </p:txBody>
+      </p:sp>
+      <p:sp>
+        <p:nvSpPr>
+          <p:cNvPr id="7" name="Rectángulo 6">
+            <a:extLst>
+              <a:ext uri="{FF2B5EF4-FFF2-40B4-BE49-F238E27FC236}">
+                <a16:creationId xmlns:a16="http://schemas.microsoft.com/office/drawing/2014/main" id="{9A05CB20-1A4C-44A9-BCFA-BACA053BB6D0}"/>
+              </a:ext>
+            </a:extLst>
+          </p:cNvPr>
+          <p:cNvSpPr/>
+          <p:nvPr/>
+        </p:nvSpPr>
+        <p:spPr>
+          <a:xfrm>
+            <a:off x="310896" y="292608"/>
+            <a:ext cx="2816352" cy="905256"/>
+          </a:xfrm>
+          <a:prstGeom prst="rect">
+            <a:avLst/>
+          </a:prstGeom>
+        </p:spPr>
+        <p:style>
+          <a:lnRef idx="2">
+            <a:schemeClr val="dk1"/>
+          </a:lnRef>
+          <a:fillRef idx="1">
+            <a:schemeClr val="lt1"/>
+          </a:fillRef>
+          <a:effectRef idx="0">
+            <a:schemeClr val="dk1"/>
+          </a:effectRef>
+          <a:fontRef idx="minor">
+            <a:schemeClr val="dk1"/>
+          </a:fontRef>
+        </p:style>
+        <p:txBody>
+          <a:bodyPr rtlCol="0" anchor="ctr"/>
+          <a:lstStyle/>
+          <a:p>
+            <a:pPr algn="ctr"/>
+            <a:r>
+              <a:rPr lang="es-PE" dirty="0"/>
+              <a:t>Logo </a:t>
+            </a:r>
+            <a:r>
+              <a:rPr lang="es-PE" dirty="0" err="1"/>
+              <a:t>Crypto</a:t>
+            </a:r>
+            <a:r>
+              <a:rPr lang="es-PE" dirty="0"/>
+              <a:t>-nita</a:t>
+            </a:r>
+          </a:p>
+        </p:txBody>
+      </p:sp>
+      <p:sp>
+        <p:nvSpPr>
+          <p:cNvPr id="9" name="Rectángulo 8">
+            <a:extLst>
+              <a:ext uri="{FF2B5EF4-FFF2-40B4-BE49-F238E27FC236}">
+                <a16:creationId xmlns:a16="http://schemas.microsoft.com/office/drawing/2014/main" id="{9059C4E3-239F-4824-8C5A-1858ACB1C26E}"/>
+              </a:ext>
+            </a:extLst>
+          </p:cNvPr>
+          <p:cNvSpPr/>
+          <p:nvPr/>
+        </p:nvSpPr>
+        <p:spPr>
+          <a:xfrm>
+            <a:off x="310896" y="5614416"/>
+            <a:ext cx="2450592" cy="950976"/>
+          </a:xfrm>
+          <a:prstGeom prst="rect">
+            <a:avLst/>
+          </a:prstGeom>
+        </p:spPr>
+        <p:style>
+          <a:lnRef idx="2">
+            <a:schemeClr val="dk1"/>
+          </a:lnRef>
+          <a:fillRef idx="1">
+            <a:schemeClr val="lt1"/>
+          </a:fillRef>
+          <a:effectRef idx="0">
+            <a:schemeClr val="dk1"/>
+          </a:effectRef>
+          <a:fontRef idx="minor">
+            <a:schemeClr val="dk1"/>
+          </a:fontRef>
+        </p:style>
+        <p:txBody>
+          <a:bodyPr rtlCol="0" anchor="ctr"/>
+          <a:lstStyle/>
+          <a:p>
+            <a:pPr algn="ctr"/>
+            <a:r>
+              <a:rPr lang="es-MX" dirty="0"/>
+              <a:t>Nombre/Logo del Grupo</a:t>
+            </a:r>
+            <a:endParaRPr lang="es-PE" dirty="0"/>
+          </a:p>
+        </p:txBody>
+      </p:sp>
+      <p:sp>
+        <p:nvSpPr>
+          <p:cNvPr id="10" name="Rectángulo 9">
+            <a:extLst>
+              <a:ext uri="{FF2B5EF4-FFF2-40B4-BE49-F238E27FC236}">
+                <a16:creationId xmlns:a16="http://schemas.microsoft.com/office/drawing/2014/main" id="{CE6F6AAA-080D-4FC6-88FA-3EBC4C0CD8F6}"/>
+              </a:ext>
+            </a:extLst>
+          </p:cNvPr>
+          <p:cNvSpPr/>
+          <p:nvPr/>
+        </p:nvSpPr>
+        <p:spPr>
+          <a:xfrm>
+            <a:off x="10049256" y="5614416"/>
+            <a:ext cx="1627632" cy="950976"/>
+          </a:xfrm>
+          <a:prstGeom prst="rect">
+            <a:avLst/>
+          </a:prstGeom>
+        </p:spPr>
+        <p:style>
+          <a:lnRef idx="2">
+            <a:schemeClr val="dk1"/>
+          </a:lnRef>
+          <a:fillRef idx="1">
+            <a:schemeClr val="lt1"/>
+          </a:fillRef>
+          <a:effectRef idx="0">
+            <a:schemeClr val="dk1"/>
+          </a:effectRef>
+          <a:fontRef idx="minor">
+            <a:schemeClr val="dk1"/>
+          </a:fontRef>
+        </p:style>
+        <p:txBody>
+          <a:bodyPr rtlCol="0" anchor="ctr"/>
+          <a:lstStyle/>
+          <a:p>
+            <a:pPr algn="ctr"/>
+            <a:r>
+              <a:rPr lang="es-MX" sz="1100" dirty="0"/>
+              <a:t>Integrantes</a:t>
+            </a:r>
+            <a:endParaRPr lang="es-PE" sz="1100" dirty="0"/>
+          </a:p>
+        </p:txBody>
+      </p:sp>
+      <p:sp>
+        <p:nvSpPr>
+          <p:cNvPr id="11" name="Rectángulo 10">
+            <a:extLst>
+              <a:ext uri="{FF2B5EF4-FFF2-40B4-BE49-F238E27FC236}">
+                <a16:creationId xmlns:a16="http://schemas.microsoft.com/office/drawing/2014/main" id="{2D34766E-3CC0-47DF-87DC-62FB893F3931}"/>
+              </a:ext>
+            </a:extLst>
+          </p:cNvPr>
+          <p:cNvSpPr/>
+          <p:nvPr/>
+        </p:nvSpPr>
+        <p:spPr>
+          <a:xfrm>
+            <a:off x="5506974" y="5925312"/>
+            <a:ext cx="3790188" cy="320040"/>
+          </a:xfrm>
+          <a:prstGeom prst="rect">
+            <a:avLst/>
+          </a:prstGeom>
+        </p:spPr>
+        <p:style>
+          <a:lnRef idx="2">
+            <a:schemeClr val="dk1"/>
+          </a:lnRef>
+          <a:fillRef idx="1">
+            <a:schemeClr val="lt1"/>
+          </a:fillRef>
+          <a:effectRef idx="0">
+            <a:schemeClr val="dk1"/>
+          </a:effectRef>
+          <a:fontRef idx="minor">
+            <a:schemeClr val="dk1"/>
+          </a:fontRef>
+        </p:style>
+        <p:txBody>
+          <a:bodyPr rtlCol="0" anchor="ctr"/>
+          <a:lstStyle/>
+          <a:p>
+            <a:pPr algn="ctr"/>
+            <a:r>
+              <a:rPr lang="es-PE" sz="1100" dirty="0"/>
+              <a:t>2022 - Nombre® - Todos los derechos reservados</a:t>
+            </a:r>
+          </a:p>
+        </p:txBody>
+      </p:sp>
+      <p:sp>
+        <p:nvSpPr>
+          <p:cNvPr id="12" name="Rectángulo 11">
+            <a:extLst>
+              <a:ext uri="{FF2B5EF4-FFF2-40B4-BE49-F238E27FC236}">
+                <a16:creationId xmlns:a16="http://schemas.microsoft.com/office/drawing/2014/main" id="{5E86E855-05F8-45D1-998F-FD3B01DB39A2}"/>
+              </a:ext>
+            </a:extLst>
+          </p:cNvPr>
+          <p:cNvSpPr/>
+          <p:nvPr/>
+        </p:nvSpPr>
+        <p:spPr>
+          <a:xfrm>
+            <a:off x="2889504" y="5614416"/>
+            <a:ext cx="1865376" cy="420624"/>
+          </a:xfrm>
+          <a:prstGeom prst="rect">
+            <a:avLst/>
+          </a:prstGeom>
+        </p:spPr>
+        <p:style>
+          <a:lnRef idx="2">
+            <a:schemeClr val="dk1"/>
+          </a:lnRef>
+          <a:fillRef idx="1">
+            <a:schemeClr val="lt1"/>
+          </a:fillRef>
+          <a:effectRef idx="0">
+            <a:schemeClr val="dk1"/>
+          </a:effectRef>
+          <a:fontRef idx="minor">
+            <a:schemeClr val="dk1"/>
+          </a:fontRef>
+        </p:style>
+        <p:txBody>
+          <a:bodyPr rtlCol="0" anchor="ctr"/>
+          <a:lstStyle/>
+          <a:p>
+            <a:pPr algn="ctr"/>
+            <a:r>
+              <a:rPr lang="es-PE" sz="1100" dirty="0"/>
+              <a:t>Nosotros</a:t>
+            </a:r>
+          </a:p>
+        </p:txBody>
+      </p:sp>
+      <p:sp>
+        <p:nvSpPr>
+          <p:cNvPr id="13" name="Rectángulo 12">
+            <a:extLst>
+              <a:ext uri="{FF2B5EF4-FFF2-40B4-BE49-F238E27FC236}">
+                <a16:creationId xmlns:a16="http://schemas.microsoft.com/office/drawing/2014/main" id="{BAE1FAEE-ABB3-4846-BC1C-59A39C7AD0AB}"/>
+              </a:ext>
+            </a:extLst>
+          </p:cNvPr>
+          <p:cNvSpPr/>
+          <p:nvPr/>
+        </p:nvSpPr>
+        <p:spPr>
+          <a:xfrm>
+            <a:off x="2889504" y="6144768"/>
+            <a:ext cx="1865376" cy="425196"/>
+          </a:xfrm>
+          <a:prstGeom prst="rect">
+            <a:avLst/>
+          </a:prstGeom>
+        </p:spPr>
+        <p:style>
+          <a:lnRef idx="2">
+            <a:schemeClr val="dk1"/>
+          </a:lnRef>
+          <a:fillRef idx="1">
+            <a:schemeClr val="lt1"/>
+          </a:fillRef>
+          <a:effectRef idx="0">
+            <a:schemeClr val="dk1"/>
+          </a:effectRef>
+          <a:fontRef idx="minor">
+            <a:schemeClr val="dk1"/>
+          </a:fontRef>
+        </p:style>
+        <p:txBody>
+          <a:bodyPr rtlCol="0" anchor="ctr"/>
+          <a:lstStyle/>
+          <a:p>
+            <a:pPr algn="ctr"/>
+            <a:r>
+              <a:rPr lang="es-PE" sz="1100" dirty="0"/>
+              <a:t>Términos y Condiciones</a:t>
+            </a:r>
+          </a:p>
+        </p:txBody>
+      </p:sp>
+      <p:pic>
+        <p:nvPicPr>
+          <p:cNvPr id="3" name="Imagen 2">
+            <a:extLst>
+              <a:ext uri="{FF2B5EF4-FFF2-40B4-BE49-F238E27FC236}">
+                <a16:creationId xmlns:a16="http://schemas.microsoft.com/office/drawing/2014/main" id="{03848429-3550-43BB-AA2A-82D7C01446D9}"/>
+              </a:ext>
+            </a:extLst>
+          </p:cNvPr>
+          <p:cNvPicPr>
+            <a:picLocks noChangeAspect="1"/>
+          </p:cNvPicPr>
+          <p:nvPr/>
+        </p:nvPicPr>
+        <p:blipFill rotWithShape="1">
+          <a:blip r:embed="rId2"/>
+          <a:srcRect l="16181"/>
+          <a:stretch/>
+        </p:blipFill>
+        <p:spPr>
+          <a:xfrm>
+            <a:off x="4936122" y="1516082"/>
+            <a:ext cx="2188692" cy="3825836"/>
+          </a:xfrm>
+          <a:prstGeom prst="rect">
+            <a:avLst/>
+          </a:prstGeom>
+        </p:spPr>
+      </p:pic>
+    </p:spTree>
+    <p:extLst>
+      <p:ext uri="{BB962C8B-B14F-4D97-AF65-F5344CB8AC3E}">
+        <p14:creationId xmlns:p14="http://schemas.microsoft.com/office/powerpoint/2010/main" val="3671552784"/>
+      </p:ext>
+    </p:extLst>
+  </p:cSld>
+  <p:clrMapOvr>
+    <a:masterClrMapping/>
+  </p:clrMapOvr>
+</p:sld>
+</file>
+
+<file path=ppt/slides/slide13.xml><?xml version="1.0" encoding="utf-8"?>
+<p:sld xmlns:a="http://schemas.openxmlformats.org/drawingml/2006/main" xmlns:r="http://schemas.openxmlformats.org/officeDocument/2006/relationships" xmlns:p="http://schemas.openxmlformats.org/presentationml/2006/main">
+  <p:cSld>
+    <p:spTree>
+      <p:nvGrpSpPr>
+        <p:cNvPr id="1" name=""/>
+        <p:cNvGrpSpPr/>
+        <p:nvPr/>
+      </p:nvGrpSpPr>
+      <p:grpSpPr>
+        <a:xfrm>
+          <a:off x="0" y="0"/>
+          <a:ext cx="0" cy="0"/>
+          <a:chOff x="0" y="0"/>
+          <a:chExt cx="0" cy="0"/>
+        </a:xfrm>
+      </p:grpSpPr>
+      <p:sp>
+        <p:nvSpPr>
+          <p:cNvPr id="4" name="Rectángulo 3">
+            <a:extLst>
+              <a:ext uri="{FF2B5EF4-FFF2-40B4-BE49-F238E27FC236}">
+                <a16:creationId xmlns:a16="http://schemas.microsoft.com/office/drawing/2014/main" id="{7D0C1056-F063-4295-9589-100A21F99782}"/>
+              </a:ext>
+            </a:extLst>
+          </p:cNvPr>
+          <p:cNvSpPr/>
+          <p:nvPr/>
+        </p:nvSpPr>
+        <p:spPr>
+          <a:xfrm>
+            <a:off x="182880" y="182880"/>
+            <a:ext cx="11695176" cy="1124712"/>
+          </a:xfrm>
+          <a:prstGeom prst="rect">
+            <a:avLst/>
+          </a:prstGeom>
+        </p:spPr>
+        <p:style>
+          <a:lnRef idx="2">
+            <a:schemeClr val="dk1"/>
+          </a:lnRef>
+          <a:fillRef idx="1">
+            <a:schemeClr val="lt1"/>
+          </a:fillRef>
+          <a:effectRef idx="0">
+            <a:schemeClr val="dk1"/>
+          </a:effectRef>
+          <a:fontRef idx="minor">
+            <a:schemeClr val="dk1"/>
+          </a:fontRef>
+        </p:style>
+        <p:txBody>
+          <a:bodyPr rtlCol="0" anchor="ctr"/>
+          <a:lstStyle/>
+          <a:p>
+            <a:pPr algn="ctr"/>
+            <a:endParaRPr lang="es-PE"/>
+          </a:p>
+        </p:txBody>
+      </p:sp>
+      <p:sp>
+        <p:nvSpPr>
+          <p:cNvPr id="5" name="Rectángulo 4">
+            <a:extLst>
+              <a:ext uri="{FF2B5EF4-FFF2-40B4-BE49-F238E27FC236}">
+                <a16:creationId xmlns:a16="http://schemas.microsoft.com/office/drawing/2014/main" id="{FB0592F0-31E3-4A12-9D00-8202A4B8AF40}"/>
+              </a:ext>
+            </a:extLst>
+          </p:cNvPr>
+          <p:cNvSpPr/>
+          <p:nvPr/>
+        </p:nvSpPr>
+        <p:spPr>
+          <a:xfrm>
+            <a:off x="182880" y="1417320"/>
+            <a:ext cx="11695176" cy="3968496"/>
+          </a:xfrm>
+          <a:prstGeom prst="rect">
+            <a:avLst/>
+          </a:prstGeom>
+        </p:spPr>
+        <p:style>
+          <a:lnRef idx="2">
+            <a:schemeClr val="dk1"/>
+          </a:lnRef>
+          <a:fillRef idx="1">
+            <a:schemeClr val="lt1"/>
+          </a:fillRef>
+          <a:effectRef idx="0">
+            <a:schemeClr val="dk1"/>
+          </a:effectRef>
+          <a:fontRef idx="minor">
+            <a:schemeClr val="dk1"/>
+          </a:fontRef>
+        </p:style>
+        <p:txBody>
+          <a:bodyPr rtlCol="0" anchor="ctr"/>
+          <a:lstStyle/>
+          <a:p>
+            <a:pPr algn="ctr"/>
+            <a:endParaRPr lang="es-PE"/>
+          </a:p>
+        </p:txBody>
+      </p:sp>
+      <p:sp>
+        <p:nvSpPr>
+          <p:cNvPr id="6" name="Rectángulo 5">
+            <a:extLst>
+              <a:ext uri="{FF2B5EF4-FFF2-40B4-BE49-F238E27FC236}">
+                <a16:creationId xmlns:a16="http://schemas.microsoft.com/office/drawing/2014/main" id="{15921A5A-FAF3-418A-99AE-B7FC9DD7959F}"/>
+              </a:ext>
+            </a:extLst>
+          </p:cNvPr>
+          <p:cNvSpPr/>
+          <p:nvPr/>
+        </p:nvSpPr>
+        <p:spPr>
+          <a:xfrm>
+            <a:off x="182880" y="5495544"/>
+            <a:ext cx="11695176" cy="1179576"/>
+          </a:xfrm>
+          <a:prstGeom prst="rect">
+            <a:avLst/>
+          </a:prstGeom>
+        </p:spPr>
+        <p:style>
+          <a:lnRef idx="2">
+            <a:schemeClr val="dk1"/>
+          </a:lnRef>
+          <a:fillRef idx="1">
+            <a:schemeClr val="lt1"/>
+          </a:fillRef>
+          <a:effectRef idx="0">
+            <a:schemeClr val="dk1"/>
+          </a:effectRef>
+          <a:fontRef idx="minor">
+            <a:schemeClr val="dk1"/>
+          </a:fontRef>
+        </p:style>
+        <p:txBody>
+          <a:bodyPr rtlCol="0" anchor="ctr"/>
+          <a:lstStyle/>
+          <a:p>
+            <a:pPr algn="ctr"/>
+            <a:endParaRPr lang="es-PE"/>
+          </a:p>
+        </p:txBody>
+      </p:sp>
+      <p:sp>
+        <p:nvSpPr>
+          <p:cNvPr id="7" name="Rectángulo 6">
+            <a:extLst>
+              <a:ext uri="{FF2B5EF4-FFF2-40B4-BE49-F238E27FC236}">
+                <a16:creationId xmlns:a16="http://schemas.microsoft.com/office/drawing/2014/main" id="{9A05CB20-1A4C-44A9-BCFA-BACA053BB6D0}"/>
+              </a:ext>
+            </a:extLst>
+          </p:cNvPr>
+          <p:cNvSpPr/>
+          <p:nvPr/>
+        </p:nvSpPr>
+        <p:spPr>
+          <a:xfrm>
+            <a:off x="310896" y="292608"/>
+            <a:ext cx="2816352" cy="905256"/>
+          </a:xfrm>
+          <a:prstGeom prst="rect">
+            <a:avLst/>
+          </a:prstGeom>
+        </p:spPr>
+        <p:style>
+          <a:lnRef idx="2">
+            <a:schemeClr val="dk1"/>
+          </a:lnRef>
+          <a:fillRef idx="1">
+            <a:schemeClr val="lt1"/>
+          </a:fillRef>
+          <a:effectRef idx="0">
+            <a:schemeClr val="dk1"/>
+          </a:effectRef>
+          <a:fontRef idx="minor">
+            <a:schemeClr val="dk1"/>
+          </a:fontRef>
+        </p:style>
+        <p:txBody>
+          <a:bodyPr rtlCol="0" anchor="ctr"/>
+          <a:lstStyle/>
+          <a:p>
+            <a:pPr algn="ctr"/>
+            <a:r>
+              <a:rPr lang="es-PE" dirty="0"/>
+              <a:t>Logo </a:t>
+            </a:r>
+            <a:r>
+              <a:rPr lang="es-PE" dirty="0" err="1"/>
+              <a:t>Crypto</a:t>
+            </a:r>
+            <a:r>
+              <a:rPr lang="es-PE" dirty="0"/>
+              <a:t>-nita</a:t>
+            </a:r>
+          </a:p>
+        </p:txBody>
+      </p:sp>
+      <p:sp>
+        <p:nvSpPr>
+          <p:cNvPr id="9" name="Rectángulo 8">
+            <a:extLst>
+              <a:ext uri="{FF2B5EF4-FFF2-40B4-BE49-F238E27FC236}">
+                <a16:creationId xmlns:a16="http://schemas.microsoft.com/office/drawing/2014/main" id="{9059C4E3-239F-4824-8C5A-1858ACB1C26E}"/>
+              </a:ext>
+            </a:extLst>
+          </p:cNvPr>
+          <p:cNvSpPr/>
+          <p:nvPr/>
+        </p:nvSpPr>
+        <p:spPr>
+          <a:xfrm>
+            <a:off x="310896" y="5614416"/>
+            <a:ext cx="2450592" cy="950976"/>
+          </a:xfrm>
+          <a:prstGeom prst="rect">
+            <a:avLst/>
+          </a:prstGeom>
+        </p:spPr>
+        <p:style>
+          <a:lnRef idx="2">
+            <a:schemeClr val="dk1"/>
+          </a:lnRef>
+          <a:fillRef idx="1">
+            <a:schemeClr val="lt1"/>
+          </a:fillRef>
+          <a:effectRef idx="0">
+            <a:schemeClr val="dk1"/>
+          </a:effectRef>
+          <a:fontRef idx="minor">
+            <a:schemeClr val="dk1"/>
+          </a:fontRef>
+        </p:style>
+        <p:txBody>
+          <a:bodyPr rtlCol="0" anchor="ctr"/>
+          <a:lstStyle/>
+          <a:p>
+            <a:pPr algn="ctr"/>
+            <a:r>
+              <a:rPr lang="es-MX" dirty="0"/>
+              <a:t>Nombre/Logo del Grupo</a:t>
+            </a:r>
+            <a:endParaRPr lang="es-PE" dirty="0"/>
+          </a:p>
+        </p:txBody>
+      </p:sp>
+      <p:sp>
+        <p:nvSpPr>
+          <p:cNvPr id="10" name="Rectángulo 9">
+            <a:extLst>
+              <a:ext uri="{FF2B5EF4-FFF2-40B4-BE49-F238E27FC236}">
+                <a16:creationId xmlns:a16="http://schemas.microsoft.com/office/drawing/2014/main" id="{CE6F6AAA-080D-4FC6-88FA-3EBC4C0CD8F6}"/>
+              </a:ext>
+            </a:extLst>
+          </p:cNvPr>
+          <p:cNvSpPr/>
+          <p:nvPr/>
+        </p:nvSpPr>
+        <p:spPr>
+          <a:xfrm>
+            <a:off x="10049256" y="5614416"/>
+            <a:ext cx="1627632" cy="950976"/>
+          </a:xfrm>
+          <a:prstGeom prst="rect">
+            <a:avLst/>
+          </a:prstGeom>
+        </p:spPr>
+        <p:style>
+          <a:lnRef idx="2">
+            <a:schemeClr val="dk1"/>
+          </a:lnRef>
+          <a:fillRef idx="1">
+            <a:schemeClr val="lt1"/>
+          </a:fillRef>
+          <a:effectRef idx="0">
+            <a:schemeClr val="dk1"/>
+          </a:effectRef>
+          <a:fontRef idx="minor">
+            <a:schemeClr val="dk1"/>
+          </a:fontRef>
+        </p:style>
+        <p:txBody>
+          <a:bodyPr rtlCol="0" anchor="ctr"/>
+          <a:lstStyle/>
+          <a:p>
+            <a:pPr algn="ctr"/>
+            <a:r>
+              <a:rPr lang="es-MX" sz="1100" dirty="0"/>
+              <a:t>Integrantes</a:t>
+            </a:r>
+            <a:endParaRPr lang="es-PE" sz="1100" dirty="0"/>
+          </a:p>
+        </p:txBody>
+      </p:sp>
+      <p:sp>
+        <p:nvSpPr>
+          <p:cNvPr id="11" name="Rectángulo 10">
+            <a:extLst>
+              <a:ext uri="{FF2B5EF4-FFF2-40B4-BE49-F238E27FC236}">
+                <a16:creationId xmlns:a16="http://schemas.microsoft.com/office/drawing/2014/main" id="{2D34766E-3CC0-47DF-87DC-62FB893F3931}"/>
+              </a:ext>
+            </a:extLst>
+          </p:cNvPr>
+          <p:cNvSpPr/>
+          <p:nvPr/>
+        </p:nvSpPr>
+        <p:spPr>
+          <a:xfrm>
+            <a:off x="5506974" y="5925312"/>
+            <a:ext cx="3790188" cy="320040"/>
+          </a:xfrm>
+          <a:prstGeom prst="rect">
+            <a:avLst/>
+          </a:prstGeom>
+        </p:spPr>
+        <p:style>
+          <a:lnRef idx="2">
+            <a:schemeClr val="dk1"/>
+          </a:lnRef>
+          <a:fillRef idx="1">
+            <a:schemeClr val="lt1"/>
+          </a:fillRef>
+          <a:effectRef idx="0">
+            <a:schemeClr val="dk1"/>
+          </a:effectRef>
+          <a:fontRef idx="minor">
+            <a:schemeClr val="dk1"/>
+          </a:fontRef>
+        </p:style>
+        <p:txBody>
+          <a:bodyPr rtlCol="0" anchor="ctr"/>
+          <a:lstStyle/>
+          <a:p>
+            <a:pPr algn="ctr"/>
+            <a:r>
+              <a:rPr lang="es-PE" sz="1100" dirty="0"/>
+              <a:t>2022 - Nombre® - Todos los derechos reservados</a:t>
+            </a:r>
+          </a:p>
+        </p:txBody>
+      </p:sp>
+      <p:sp>
+        <p:nvSpPr>
+          <p:cNvPr id="12" name="Rectángulo 11">
+            <a:extLst>
+              <a:ext uri="{FF2B5EF4-FFF2-40B4-BE49-F238E27FC236}">
+                <a16:creationId xmlns:a16="http://schemas.microsoft.com/office/drawing/2014/main" id="{5E86E855-05F8-45D1-998F-FD3B01DB39A2}"/>
+              </a:ext>
+            </a:extLst>
+          </p:cNvPr>
+          <p:cNvSpPr/>
+          <p:nvPr/>
+        </p:nvSpPr>
+        <p:spPr>
+          <a:xfrm>
+            <a:off x="2889504" y="5614416"/>
+            <a:ext cx="1865376" cy="420624"/>
+          </a:xfrm>
+          <a:prstGeom prst="rect">
+            <a:avLst/>
+          </a:prstGeom>
+        </p:spPr>
+        <p:style>
+          <a:lnRef idx="2">
+            <a:schemeClr val="dk1"/>
+          </a:lnRef>
+          <a:fillRef idx="1">
+            <a:schemeClr val="lt1"/>
+          </a:fillRef>
+          <a:effectRef idx="0">
+            <a:schemeClr val="dk1"/>
+          </a:effectRef>
+          <a:fontRef idx="minor">
+            <a:schemeClr val="dk1"/>
+          </a:fontRef>
+        </p:style>
+        <p:txBody>
+          <a:bodyPr rtlCol="0" anchor="ctr"/>
+          <a:lstStyle/>
+          <a:p>
+            <a:pPr algn="ctr"/>
+            <a:r>
+              <a:rPr lang="es-PE" sz="1100" dirty="0"/>
+              <a:t>Nosotros</a:t>
+            </a:r>
+          </a:p>
+        </p:txBody>
+      </p:sp>
+      <p:sp>
+        <p:nvSpPr>
+          <p:cNvPr id="13" name="Rectángulo 12">
+            <a:extLst>
+              <a:ext uri="{FF2B5EF4-FFF2-40B4-BE49-F238E27FC236}">
+                <a16:creationId xmlns:a16="http://schemas.microsoft.com/office/drawing/2014/main" id="{BAE1FAEE-ABB3-4846-BC1C-59A39C7AD0AB}"/>
+              </a:ext>
+            </a:extLst>
+          </p:cNvPr>
+          <p:cNvSpPr/>
+          <p:nvPr/>
+        </p:nvSpPr>
+        <p:spPr>
+          <a:xfrm>
+            <a:off x="2889504" y="6144768"/>
+            <a:ext cx="1865376" cy="425196"/>
+          </a:xfrm>
+          <a:prstGeom prst="rect">
+            <a:avLst/>
+          </a:prstGeom>
+        </p:spPr>
+        <p:style>
+          <a:lnRef idx="2">
+            <a:schemeClr val="dk1"/>
+          </a:lnRef>
+          <a:fillRef idx="1">
+            <a:schemeClr val="lt1"/>
+          </a:fillRef>
+          <a:effectRef idx="0">
+            <a:schemeClr val="dk1"/>
+          </a:effectRef>
+          <a:fontRef idx="minor">
+            <a:schemeClr val="dk1"/>
+          </a:fontRef>
+        </p:style>
+        <p:txBody>
+          <a:bodyPr rtlCol="0" anchor="ctr"/>
+          <a:lstStyle/>
+          <a:p>
+            <a:pPr algn="ctr"/>
+            <a:r>
+              <a:rPr lang="es-PE" sz="1100" dirty="0"/>
+              <a:t>Términos y Condiciones</a:t>
+            </a:r>
+          </a:p>
+        </p:txBody>
+      </p:sp>
+      <p:pic>
+        <p:nvPicPr>
+          <p:cNvPr id="3" name="Imagen 2">
+            <a:extLst>
+              <a:ext uri="{FF2B5EF4-FFF2-40B4-BE49-F238E27FC236}">
+                <a16:creationId xmlns:a16="http://schemas.microsoft.com/office/drawing/2014/main" id="{7052B4F0-CCA8-4606-8D9D-AA5D6920CDCF}"/>
+              </a:ext>
+            </a:extLst>
+          </p:cNvPr>
+          <p:cNvPicPr>
+            <a:picLocks noChangeAspect="1"/>
+          </p:cNvPicPr>
+          <p:nvPr/>
+        </p:nvPicPr>
+        <p:blipFill>
+          <a:blip r:embed="rId2"/>
+          <a:stretch>
+            <a:fillRect/>
+          </a:stretch>
+        </p:blipFill>
+        <p:spPr>
+          <a:xfrm>
+            <a:off x="4731342" y="1545940"/>
+            <a:ext cx="2729315" cy="3766119"/>
+          </a:xfrm>
+          <a:prstGeom prst="rect">
+            <a:avLst/>
+          </a:prstGeom>
+        </p:spPr>
+      </p:pic>
+    </p:spTree>
+    <p:extLst>
+      <p:ext uri="{BB962C8B-B14F-4D97-AF65-F5344CB8AC3E}">
+        <p14:creationId xmlns:p14="http://schemas.microsoft.com/office/powerpoint/2010/main" val="2441233450"/>
+      </p:ext>
+    </p:extLst>
+  </p:cSld>
+  <p:clrMapOvr>
+    <a:masterClrMapping/>
+  </p:clrMapOvr>
+</p:sld>
+</file>
+
+<file path=ppt/slides/slide14.xml><?xml version="1.0" encoding="utf-8"?>
+<p:sld xmlns:a="http://schemas.openxmlformats.org/drawingml/2006/main" xmlns:r="http://schemas.openxmlformats.org/officeDocument/2006/relationships" xmlns:p="http://schemas.openxmlformats.org/presentationml/2006/main">
+  <p:cSld>
+    <p:spTree>
+      <p:nvGrpSpPr>
+        <p:cNvPr id="1" name=""/>
+        <p:cNvGrpSpPr/>
+        <p:nvPr/>
+      </p:nvGrpSpPr>
+      <p:grpSpPr>
+        <a:xfrm>
+          <a:off x="0" y="0"/>
+          <a:ext cx="0" cy="0"/>
+          <a:chOff x="0" y="0"/>
+          <a:chExt cx="0" cy="0"/>
+        </a:xfrm>
+      </p:grpSpPr>
+      <p:sp>
+        <p:nvSpPr>
+          <p:cNvPr id="4" name="Rectángulo 3">
+            <a:extLst>
+              <a:ext uri="{FF2B5EF4-FFF2-40B4-BE49-F238E27FC236}">
+                <a16:creationId xmlns:a16="http://schemas.microsoft.com/office/drawing/2014/main" id="{7D0C1056-F063-4295-9589-100A21F99782}"/>
+              </a:ext>
+            </a:extLst>
+          </p:cNvPr>
+          <p:cNvSpPr/>
+          <p:nvPr/>
+        </p:nvSpPr>
+        <p:spPr>
+          <a:xfrm>
+            <a:off x="182880" y="182880"/>
+            <a:ext cx="11695176" cy="1124712"/>
+          </a:xfrm>
+          <a:prstGeom prst="rect">
+            <a:avLst/>
+          </a:prstGeom>
+        </p:spPr>
+        <p:style>
+          <a:lnRef idx="2">
+            <a:schemeClr val="dk1"/>
+          </a:lnRef>
+          <a:fillRef idx="1">
+            <a:schemeClr val="lt1"/>
+          </a:fillRef>
+          <a:effectRef idx="0">
+            <a:schemeClr val="dk1"/>
+          </a:effectRef>
+          <a:fontRef idx="minor">
+            <a:schemeClr val="dk1"/>
+          </a:fontRef>
+        </p:style>
+        <p:txBody>
+          <a:bodyPr rtlCol="0" anchor="ctr"/>
+          <a:lstStyle/>
+          <a:p>
+            <a:pPr algn="ctr"/>
+            <a:endParaRPr lang="es-PE"/>
+          </a:p>
+        </p:txBody>
+      </p:sp>
+      <p:sp>
+        <p:nvSpPr>
+          <p:cNvPr id="5" name="Rectángulo 4">
+            <a:extLst>
+              <a:ext uri="{FF2B5EF4-FFF2-40B4-BE49-F238E27FC236}">
+                <a16:creationId xmlns:a16="http://schemas.microsoft.com/office/drawing/2014/main" id="{FB0592F0-31E3-4A12-9D00-8202A4B8AF40}"/>
+              </a:ext>
+            </a:extLst>
+          </p:cNvPr>
+          <p:cNvSpPr/>
+          <p:nvPr/>
+        </p:nvSpPr>
+        <p:spPr>
+          <a:xfrm>
+            <a:off x="182880" y="1417320"/>
+            <a:ext cx="11695176" cy="3968496"/>
+          </a:xfrm>
+          <a:prstGeom prst="rect">
+            <a:avLst/>
+          </a:prstGeom>
+        </p:spPr>
+        <p:style>
+          <a:lnRef idx="2">
+            <a:schemeClr val="dk1"/>
+          </a:lnRef>
+          <a:fillRef idx="1">
+            <a:schemeClr val="lt1"/>
+          </a:fillRef>
+          <a:effectRef idx="0">
+            <a:schemeClr val="dk1"/>
+          </a:effectRef>
+          <a:fontRef idx="minor">
+            <a:schemeClr val="dk1"/>
+          </a:fontRef>
+        </p:style>
+        <p:txBody>
+          <a:bodyPr rtlCol="0" anchor="ctr"/>
+          <a:lstStyle/>
+          <a:p>
+            <a:pPr algn="ctr"/>
+            <a:endParaRPr lang="es-PE"/>
+          </a:p>
+        </p:txBody>
+      </p:sp>
+      <p:sp>
+        <p:nvSpPr>
+          <p:cNvPr id="6" name="Rectángulo 5">
+            <a:extLst>
+              <a:ext uri="{FF2B5EF4-FFF2-40B4-BE49-F238E27FC236}">
+                <a16:creationId xmlns:a16="http://schemas.microsoft.com/office/drawing/2014/main" id="{15921A5A-FAF3-418A-99AE-B7FC9DD7959F}"/>
+              </a:ext>
+            </a:extLst>
+          </p:cNvPr>
+          <p:cNvSpPr/>
+          <p:nvPr/>
+        </p:nvSpPr>
+        <p:spPr>
+          <a:xfrm>
+            <a:off x="182880" y="5495544"/>
+            <a:ext cx="11695176" cy="1179576"/>
+          </a:xfrm>
+          <a:prstGeom prst="rect">
+            <a:avLst/>
+          </a:prstGeom>
+        </p:spPr>
+        <p:style>
+          <a:lnRef idx="2">
+            <a:schemeClr val="dk1"/>
+          </a:lnRef>
+          <a:fillRef idx="1">
+            <a:schemeClr val="lt1"/>
+          </a:fillRef>
+          <a:effectRef idx="0">
+            <a:schemeClr val="dk1"/>
+          </a:effectRef>
+          <a:fontRef idx="minor">
+            <a:schemeClr val="dk1"/>
+          </a:fontRef>
+        </p:style>
+        <p:txBody>
+          <a:bodyPr rtlCol="0" anchor="ctr"/>
+          <a:lstStyle/>
+          <a:p>
+            <a:pPr algn="ctr"/>
+            <a:endParaRPr lang="es-PE"/>
+          </a:p>
+        </p:txBody>
+      </p:sp>
+      <p:sp>
+        <p:nvSpPr>
+          <p:cNvPr id="7" name="Rectángulo 6">
+            <a:extLst>
+              <a:ext uri="{FF2B5EF4-FFF2-40B4-BE49-F238E27FC236}">
+                <a16:creationId xmlns:a16="http://schemas.microsoft.com/office/drawing/2014/main" id="{9A05CB20-1A4C-44A9-BCFA-BACA053BB6D0}"/>
+              </a:ext>
+            </a:extLst>
+          </p:cNvPr>
+          <p:cNvSpPr/>
+          <p:nvPr/>
+        </p:nvSpPr>
+        <p:spPr>
+          <a:xfrm>
+            <a:off x="310896" y="292608"/>
+            <a:ext cx="2816352" cy="905256"/>
+          </a:xfrm>
+          <a:prstGeom prst="rect">
+            <a:avLst/>
+          </a:prstGeom>
+        </p:spPr>
+        <p:style>
+          <a:lnRef idx="2">
+            <a:schemeClr val="dk1"/>
+          </a:lnRef>
+          <a:fillRef idx="1">
+            <a:schemeClr val="lt1"/>
+          </a:fillRef>
+          <a:effectRef idx="0">
+            <a:schemeClr val="dk1"/>
+          </a:effectRef>
+          <a:fontRef idx="minor">
+            <a:schemeClr val="dk1"/>
+          </a:fontRef>
+        </p:style>
+        <p:txBody>
+          <a:bodyPr rtlCol="0" anchor="ctr"/>
+          <a:lstStyle/>
+          <a:p>
+            <a:pPr algn="ctr"/>
+            <a:r>
+              <a:rPr lang="es-PE" dirty="0"/>
+              <a:t>Logo </a:t>
+            </a:r>
+            <a:r>
+              <a:rPr lang="es-PE" dirty="0" err="1"/>
+              <a:t>Crypto</a:t>
+            </a:r>
+            <a:r>
+              <a:rPr lang="es-PE" dirty="0"/>
+              <a:t>-nita</a:t>
+            </a:r>
+          </a:p>
+        </p:txBody>
+      </p:sp>
+      <p:sp>
+        <p:nvSpPr>
+          <p:cNvPr id="9" name="Rectángulo 8">
+            <a:extLst>
+              <a:ext uri="{FF2B5EF4-FFF2-40B4-BE49-F238E27FC236}">
+                <a16:creationId xmlns:a16="http://schemas.microsoft.com/office/drawing/2014/main" id="{9059C4E3-239F-4824-8C5A-1858ACB1C26E}"/>
+              </a:ext>
+            </a:extLst>
+          </p:cNvPr>
+          <p:cNvSpPr/>
+          <p:nvPr/>
+        </p:nvSpPr>
+        <p:spPr>
+          <a:xfrm>
+            <a:off x="310896" y="5614416"/>
+            <a:ext cx="2450592" cy="950976"/>
+          </a:xfrm>
+          <a:prstGeom prst="rect">
+            <a:avLst/>
+          </a:prstGeom>
+        </p:spPr>
+        <p:style>
+          <a:lnRef idx="2">
+            <a:schemeClr val="dk1"/>
+          </a:lnRef>
+          <a:fillRef idx="1">
+            <a:schemeClr val="lt1"/>
+          </a:fillRef>
+          <a:effectRef idx="0">
+            <a:schemeClr val="dk1"/>
+          </a:effectRef>
+          <a:fontRef idx="minor">
+            <a:schemeClr val="dk1"/>
+          </a:fontRef>
+        </p:style>
+        <p:txBody>
+          <a:bodyPr rtlCol="0" anchor="ctr"/>
+          <a:lstStyle/>
+          <a:p>
+            <a:pPr algn="ctr"/>
+            <a:r>
+              <a:rPr lang="es-MX" dirty="0"/>
+              <a:t>Nombre/Logo del Grupo</a:t>
+            </a:r>
+            <a:endParaRPr lang="es-PE" dirty="0"/>
+          </a:p>
+        </p:txBody>
+      </p:sp>
+      <p:sp>
+        <p:nvSpPr>
+          <p:cNvPr id="10" name="Rectángulo 9">
+            <a:extLst>
+              <a:ext uri="{FF2B5EF4-FFF2-40B4-BE49-F238E27FC236}">
+                <a16:creationId xmlns:a16="http://schemas.microsoft.com/office/drawing/2014/main" id="{CE6F6AAA-080D-4FC6-88FA-3EBC4C0CD8F6}"/>
+              </a:ext>
+            </a:extLst>
+          </p:cNvPr>
+          <p:cNvSpPr/>
+          <p:nvPr/>
+        </p:nvSpPr>
+        <p:spPr>
+          <a:xfrm>
+            <a:off x="10049256" y="5614416"/>
+            <a:ext cx="1627632" cy="950976"/>
+          </a:xfrm>
+          <a:prstGeom prst="rect">
+            <a:avLst/>
+          </a:prstGeom>
+        </p:spPr>
+        <p:style>
+          <a:lnRef idx="2">
+            <a:schemeClr val="dk1"/>
+          </a:lnRef>
+          <a:fillRef idx="1">
+            <a:schemeClr val="lt1"/>
+          </a:fillRef>
+          <a:effectRef idx="0">
+            <a:schemeClr val="dk1"/>
+          </a:effectRef>
+          <a:fontRef idx="minor">
+            <a:schemeClr val="dk1"/>
+          </a:fontRef>
+        </p:style>
+        <p:txBody>
+          <a:bodyPr rtlCol="0" anchor="ctr"/>
+          <a:lstStyle/>
+          <a:p>
+            <a:pPr algn="ctr"/>
+            <a:r>
+              <a:rPr lang="es-MX" sz="1100" dirty="0"/>
+              <a:t>Integrantes</a:t>
+            </a:r>
+            <a:endParaRPr lang="es-PE" sz="1100" dirty="0"/>
+          </a:p>
+        </p:txBody>
+      </p:sp>
+      <p:sp>
+        <p:nvSpPr>
+          <p:cNvPr id="11" name="Rectángulo 10">
+            <a:extLst>
+              <a:ext uri="{FF2B5EF4-FFF2-40B4-BE49-F238E27FC236}">
+                <a16:creationId xmlns:a16="http://schemas.microsoft.com/office/drawing/2014/main" id="{2D34766E-3CC0-47DF-87DC-62FB893F3931}"/>
+              </a:ext>
+            </a:extLst>
+          </p:cNvPr>
+          <p:cNvSpPr/>
+          <p:nvPr/>
+        </p:nvSpPr>
+        <p:spPr>
+          <a:xfrm>
+            <a:off x="5506974" y="5925312"/>
+            <a:ext cx="3790188" cy="320040"/>
+          </a:xfrm>
+          <a:prstGeom prst="rect">
+            <a:avLst/>
+          </a:prstGeom>
+        </p:spPr>
+        <p:style>
+          <a:lnRef idx="2">
+            <a:schemeClr val="dk1"/>
+          </a:lnRef>
+          <a:fillRef idx="1">
+            <a:schemeClr val="lt1"/>
+          </a:fillRef>
+          <a:effectRef idx="0">
+            <a:schemeClr val="dk1"/>
+          </a:effectRef>
+          <a:fontRef idx="minor">
+            <a:schemeClr val="dk1"/>
+          </a:fontRef>
+        </p:style>
+        <p:txBody>
+          <a:bodyPr rtlCol="0" anchor="ctr"/>
+          <a:lstStyle/>
+          <a:p>
+            <a:pPr algn="ctr"/>
+            <a:r>
+              <a:rPr lang="es-PE" sz="1100" dirty="0"/>
+              <a:t>2022 - Nombre® - Todos los derechos reservados</a:t>
+            </a:r>
+          </a:p>
+        </p:txBody>
+      </p:sp>
+      <p:sp>
+        <p:nvSpPr>
+          <p:cNvPr id="12" name="Rectángulo 11">
+            <a:extLst>
+              <a:ext uri="{FF2B5EF4-FFF2-40B4-BE49-F238E27FC236}">
+                <a16:creationId xmlns:a16="http://schemas.microsoft.com/office/drawing/2014/main" id="{5E86E855-05F8-45D1-998F-FD3B01DB39A2}"/>
+              </a:ext>
+            </a:extLst>
+          </p:cNvPr>
+          <p:cNvSpPr/>
+          <p:nvPr/>
+        </p:nvSpPr>
+        <p:spPr>
+          <a:xfrm>
+            <a:off x="2889504" y="5614416"/>
+            <a:ext cx="1865376" cy="420624"/>
+          </a:xfrm>
+          <a:prstGeom prst="rect">
+            <a:avLst/>
+          </a:prstGeom>
+        </p:spPr>
+        <p:style>
+          <a:lnRef idx="2">
+            <a:schemeClr val="dk1"/>
+          </a:lnRef>
+          <a:fillRef idx="1">
+            <a:schemeClr val="lt1"/>
+          </a:fillRef>
+          <a:effectRef idx="0">
+            <a:schemeClr val="dk1"/>
+          </a:effectRef>
+          <a:fontRef idx="minor">
+            <a:schemeClr val="dk1"/>
+          </a:fontRef>
+        </p:style>
+        <p:txBody>
+          <a:bodyPr rtlCol="0" anchor="ctr"/>
+          <a:lstStyle/>
+          <a:p>
+            <a:pPr algn="ctr"/>
+            <a:r>
+              <a:rPr lang="es-PE" sz="1100" dirty="0"/>
+              <a:t>Nosotros</a:t>
+            </a:r>
+          </a:p>
+        </p:txBody>
+      </p:sp>
+      <p:sp>
+        <p:nvSpPr>
+          <p:cNvPr id="13" name="Rectángulo 12">
+            <a:extLst>
+              <a:ext uri="{FF2B5EF4-FFF2-40B4-BE49-F238E27FC236}">
+                <a16:creationId xmlns:a16="http://schemas.microsoft.com/office/drawing/2014/main" id="{BAE1FAEE-ABB3-4846-BC1C-59A39C7AD0AB}"/>
+              </a:ext>
+            </a:extLst>
+          </p:cNvPr>
+          <p:cNvSpPr/>
+          <p:nvPr/>
+        </p:nvSpPr>
+        <p:spPr>
+          <a:xfrm>
+            <a:off x="2889504" y="6144768"/>
+            <a:ext cx="1865376" cy="425196"/>
+          </a:xfrm>
+          <a:prstGeom prst="rect">
+            <a:avLst/>
+          </a:prstGeom>
+        </p:spPr>
+        <p:style>
+          <a:lnRef idx="2">
+            <a:schemeClr val="dk1"/>
+          </a:lnRef>
+          <a:fillRef idx="1">
+            <a:schemeClr val="lt1"/>
+          </a:fillRef>
+          <a:effectRef idx="0">
+            <a:schemeClr val="dk1"/>
+          </a:effectRef>
+          <a:fontRef idx="minor">
+            <a:schemeClr val="dk1"/>
+          </a:fontRef>
+        </p:style>
+        <p:txBody>
+          <a:bodyPr rtlCol="0" anchor="ctr"/>
+          <a:lstStyle/>
+          <a:p>
+            <a:pPr algn="ctr"/>
+            <a:r>
+              <a:rPr lang="es-PE" sz="1100" dirty="0"/>
+              <a:t>Términos y Condiciones</a:t>
+            </a:r>
+          </a:p>
+        </p:txBody>
+      </p:sp>
+      <p:pic>
+        <p:nvPicPr>
+          <p:cNvPr id="3" name="Imagen 2">
+            <a:extLst>
+              <a:ext uri="{FF2B5EF4-FFF2-40B4-BE49-F238E27FC236}">
+                <a16:creationId xmlns:a16="http://schemas.microsoft.com/office/drawing/2014/main" id="{FE66CB94-7D44-49BC-B259-C18DFDE944AA}"/>
+              </a:ext>
+            </a:extLst>
+          </p:cNvPr>
+          <p:cNvPicPr>
+            <a:picLocks noChangeAspect="1"/>
+          </p:cNvPicPr>
+          <p:nvPr/>
+        </p:nvPicPr>
+        <p:blipFill>
+          <a:blip r:embed="rId2"/>
+          <a:stretch>
+            <a:fillRect/>
+          </a:stretch>
+        </p:blipFill>
+        <p:spPr>
+          <a:xfrm>
+            <a:off x="4227663" y="1476615"/>
+            <a:ext cx="3736673" cy="3849905"/>
+          </a:xfrm>
+          <a:prstGeom prst="rect">
+            <a:avLst/>
+          </a:prstGeom>
+        </p:spPr>
+      </p:pic>
+    </p:spTree>
+    <p:extLst>
+      <p:ext uri="{BB962C8B-B14F-4D97-AF65-F5344CB8AC3E}">
+        <p14:creationId xmlns:p14="http://schemas.microsoft.com/office/powerpoint/2010/main" val="257755973"/>
+      </p:ext>
+    </p:extLst>
+  </p:cSld>
+  <p:clrMapOvr>
+    <a:masterClrMapping/>
+  </p:clrMapOvr>
+</p:sld>
+</file>
+
+<file path=ppt/slides/slide15.xml><?xml version="1.0" encoding="utf-8"?>
+<p:sld xmlns:a="http://schemas.openxmlformats.org/drawingml/2006/main" xmlns:r="http://schemas.openxmlformats.org/officeDocument/2006/relationships" xmlns:p="http://schemas.openxmlformats.org/presentationml/2006/main">
+  <p:cSld>
+    <p:spTree>
+      <p:nvGrpSpPr>
+        <p:cNvPr id="1" name=""/>
+        <p:cNvGrpSpPr/>
+        <p:nvPr/>
+      </p:nvGrpSpPr>
+      <p:grpSpPr>
+        <a:xfrm>
+          <a:off x="0" y="0"/>
+          <a:ext cx="0" cy="0"/>
+          <a:chOff x="0" y="0"/>
+          <a:chExt cx="0" cy="0"/>
+        </a:xfrm>
+      </p:grpSpPr>
+      <p:sp>
+        <p:nvSpPr>
+          <p:cNvPr id="4" name="Rectángulo 3">
+            <a:extLst>
+              <a:ext uri="{FF2B5EF4-FFF2-40B4-BE49-F238E27FC236}">
+                <a16:creationId xmlns:a16="http://schemas.microsoft.com/office/drawing/2014/main" id="{7D0C1056-F063-4295-9589-100A21F99782}"/>
+              </a:ext>
+            </a:extLst>
+          </p:cNvPr>
+          <p:cNvSpPr/>
+          <p:nvPr/>
+        </p:nvSpPr>
+        <p:spPr>
+          <a:xfrm>
+            <a:off x="182880" y="182880"/>
+            <a:ext cx="11695176" cy="1124712"/>
+          </a:xfrm>
+          <a:prstGeom prst="rect">
+            <a:avLst/>
+          </a:prstGeom>
+        </p:spPr>
+        <p:style>
+          <a:lnRef idx="2">
+            <a:schemeClr val="dk1"/>
+          </a:lnRef>
+          <a:fillRef idx="1">
+            <a:schemeClr val="lt1"/>
+          </a:fillRef>
+          <a:effectRef idx="0">
+            <a:schemeClr val="dk1"/>
+          </a:effectRef>
+          <a:fontRef idx="minor">
+            <a:schemeClr val="dk1"/>
+          </a:fontRef>
+        </p:style>
+        <p:txBody>
+          <a:bodyPr rtlCol="0" anchor="ctr"/>
+          <a:lstStyle/>
+          <a:p>
+            <a:pPr algn="ctr"/>
+            <a:endParaRPr lang="es-PE"/>
+          </a:p>
+        </p:txBody>
+      </p:sp>
+      <p:sp>
+        <p:nvSpPr>
+          <p:cNvPr id="5" name="Rectángulo 4">
+            <a:extLst>
+              <a:ext uri="{FF2B5EF4-FFF2-40B4-BE49-F238E27FC236}">
+                <a16:creationId xmlns:a16="http://schemas.microsoft.com/office/drawing/2014/main" id="{FB0592F0-31E3-4A12-9D00-8202A4B8AF40}"/>
+              </a:ext>
+            </a:extLst>
+          </p:cNvPr>
+          <p:cNvSpPr/>
+          <p:nvPr/>
+        </p:nvSpPr>
+        <p:spPr>
+          <a:xfrm>
+            <a:off x="182880" y="1417320"/>
+            <a:ext cx="11695176" cy="3968496"/>
+          </a:xfrm>
+          <a:prstGeom prst="rect">
+            <a:avLst/>
+          </a:prstGeom>
+        </p:spPr>
+        <p:style>
+          <a:lnRef idx="2">
+            <a:schemeClr val="dk1"/>
+          </a:lnRef>
+          <a:fillRef idx="1">
+            <a:schemeClr val="lt1"/>
+          </a:fillRef>
+          <a:effectRef idx="0">
+            <a:schemeClr val="dk1"/>
+          </a:effectRef>
+          <a:fontRef idx="minor">
+            <a:schemeClr val="dk1"/>
+          </a:fontRef>
+        </p:style>
+        <p:txBody>
+          <a:bodyPr rtlCol="0" anchor="ctr"/>
+          <a:lstStyle/>
+          <a:p>
+            <a:pPr algn="ctr"/>
+            <a:endParaRPr lang="es-PE"/>
+          </a:p>
+        </p:txBody>
+      </p:sp>
+      <p:sp>
+        <p:nvSpPr>
+          <p:cNvPr id="6" name="Rectángulo 5">
+            <a:extLst>
+              <a:ext uri="{FF2B5EF4-FFF2-40B4-BE49-F238E27FC236}">
+                <a16:creationId xmlns:a16="http://schemas.microsoft.com/office/drawing/2014/main" id="{15921A5A-FAF3-418A-99AE-B7FC9DD7959F}"/>
+              </a:ext>
+            </a:extLst>
+          </p:cNvPr>
+          <p:cNvSpPr/>
+          <p:nvPr/>
+        </p:nvSpPr>
+        <p:spPr>
+          <a:xfrm>
+            <a:off x="182880" y="5495544"/>
+            <a:ext cx="11695176" cy="1179576"/>
+          </a:xfrm>
+          <a:prstGeom prst="rect">
+            <a:avLst/>
+          </a:prstGeom>
+        </p:spPr>
+        <p:style>
+          <a:lnRef idx="2">
+            <a:schemeClr val="dk1"/>
+          </a:lnRef>
+          <a:fillRef idx="1">
+            <a:schemeClr val="lt1"/>
+          </a:fillRef>
+          <a:effectRef idx="0">
+            <a:schemeClr val="dk1"/>
+          </a:effectRef>
+          <a:fontRef idx="minor">
+            <a:schemeClr val="dk1"/>
+          </a:fontRef>
+        </p:style>
+        <p:txBody>
+          <a:bodyPr rtlCol="0" anchor="ctr"/>
+          <a:lstStyle/>
+          <a:p>
+            <a:pPr algn="ctr"/>
+            <a:endParaRPr lang="es-PE"/>
+          </a:p>
+        </p:txBody>
+      </p:sp>
+      <p:sp>
+        <p:nvSpPr>
+          <p:cNvPr id="7" name="Rectángulo 6">
+            <a:extLst>
+              <a:ext uri="{FF2B5EF4-FFF2-40B4-BE49-F238E27FC236}">
+                <a16:creationId xmlns:a16="http://schemas.microsoft.com/office/drawing/2014/main" id="{9A05CB20-1A4C-44A9-BCFA-BACA053BB6D0}"/>
+              </a:ext>
+            </a:extLst>
+          </p:cNvPr>
+          <p:cNvSpPr/>
+          <p:nvPr/>
+        </p:nvSpPr>
+        <p:spPr>
+          <a:xfrm>
+            <a:off x="310896" y="292608"/>
+            <a:ext cx="2816352" cy="905256"/>
+          </a:xfrm>
+          <a:prstGeom prst="rect">
+            <a:avLst/>
+          </a:prstGeom>
+        </p:spPr>
+        <p:style>
+          <a:lnRef idx="2">
+            <a:schemeClr val="dk1"/>
+          </a:lnRef>
+          <a:fillRef idx="1">
+            <a:schemeClr val="lt1"/>
+          </a:fillRef>
+          <a:effectRef idx="0">
+            <a:schemeClr val="dk1"/>
+          </a:effectRef>
+          <a:fontRef idx="minor">
+            <a:schemeClr val="dk1"/>
+          </a:fontRef>
+        </p:style>
+        <p:txBody>
+          <a:bodyPr rtlCol="0" anchor="ctr"/>
+          <a:lstStyle/>
+          <a:p>
+            <a:pPr algn="ctr"/>
+            <a:r>
+              <a:rPr lang="es-PE" dirty="0"/>
+              <a:t>Logo </a:t>
+            </a:r>
+            <a:r>
+              <a:rPr lang="es-PE" dirty="0" err="1"/>
+              <a:t>Crypto</a:t>
+            </a:r>
+            <a:r>
+              <a:rPr lang="es-PE" dirty="0"/>
+              <a:t>-nita</a:t>
+            </a:r>
+          </a:p>
+        </p:txBody>
+      </p:sp>
+      <p:sp>
+        <p:nvSpPr>
+          <p:cNvPr id="9" name="Rectángulo 8">
+            <a:extLst>
+              <a:ext uri="{FF2B5EF4-FFF2-40B4-BE49-F238E27FC236}">
+                <a16:creationId xmlns:a16="http://schemas.microsoft.com/office/drawing/2014/main" id="{9059C4E3-239F-4824-8C5A-1858ACB1C26E}"/>
+              </a:ext>
+            </a:extLst>
+          </p:cNvPr>
+          <p:cNvSpPr/>
+          <p:nvPr/>
+        </p:nvSpPr>
+        <p:spPr>
+          <a:xfrm>
+            <a:off x="310896" y="5614416"/>
+            <a:ext cx="2450592" cy="950976"/>
+          </a:xfrm>
+          <a:prstGeom prst="rect">
+            <a:avLst/>
+          </a:prstGeom>
+        </p:spPr>
+        <p:style>
+          <a:lnRef idx="2">
+            <a:schemeClr val="dk1"/>
+          </a:lnRef>
+          <a:fillRef idx="1">
+            <a:schemeClr val="lt1"/>
+          </a:fillRef>
+          <a:effectRef idx="0">
+            <a:schemeClr val="dk1"/>
+          </a:effectRef>
+          <a:fontRef idx="minor">
+            <a:schemeClr val="dk1"/>
+          </a:fontRef>
+        </p:style>
+        <p:txBody>
+          <a:bodyPr rtlCol="0" anchor="ctr"/>
+          <a:lstStyle/>
+          <a:p>
+            <a:pPr algn="ctr"/>
+            <a:r>
+              <a:rPr lang="es-MX" dirty="0"/>
+              <a:t>Nombre/Logo del Grupo</a:t>
+            </a:r>
+            <a:endParaRPr lang="es-PE" dirty="0"/>
+          </a:p>
+        </p:txBody>
+      </p:sp>
+      <p:sp>
+        <p:nvSpPr>
+          <p:cNvPr id="10" name="Rectángulo 9">
+            <a:extLst>
+              <a:ext uri="{FF2B5EF4-FFF2-40B4-BE49-F238E27FC236}">
+                <a16:creationId xmlns:a16="http://schemas.microsoft.com/office/drawing/2014/main" id="{CE6F6AAA-080D-4FC6-88FA-3EBC4C0CD8F6}"/>
+              </a:ext>
+            </a:extLst>
+          </p:cNvPr>
+          <p:cNvSpPr/>
+          <p:nvPr/>
+        </p:nvSpPr>
+        <p:spPr>
+          <a:xfrm>
+            <a:off x="10049256" y="5614416"/>
+            <a:ext cx="1627632" cy="950976"/>
+          </a:xfrm>
+          <a:prstGeom prst="rect">
+            <a:avLst/>
+          </a:prstGeom>
+        </p:spPr>
+        <p:style>
+          <a:lnRef idx="2">
+            <a:schemeClr val="dk1"/>
+          </a:lnRef>
+          <a:fillRef idx="1">
+            <a:schemeClr val="lt1"/>
+          </a:fillRef>
+          <a:effectRef idx="0">
+            <a:schemeClr val="dk1"/>
+          </a:effectRef>
+          <a:fontRef idx="minor">
+            <a:schemeClr val="dk1"/>
+          </a:fontRef>
+        </p:style>
+        <p:txBody>
+          <a:bodyPr rtlCol="0" anchor="ctr"/>
+          <a:lstStyle/>
+          <a:p>
+            <a:pPr algn="ctr"/>
+            <a:r>
+              <a:rPr lang="es-MX" sz="1100" dirty="0"/>
+              <a:t>Integrantes</a:t>
+            </a:r>
+            <a:endParaRPr lang="es-PE" sz="1100" dirty="0"/>
+          </a:p>
+        </p:txBody>
+      </p:sp>
+      <p:sp>
+        <p:nvSpPr>
+          <p:cNvPr id="11" name="Rectángulo 10">
+            <a:extLst>
+              <a:ext uri="{FF2B5EF4-FFF2-40B4-BE49-F238E27FC236}">
+                <a16:creationId xmlns:a16="http://schemas.microsoft.com/office/drawing/2014/main" id="{2D34766E-3CC0-47DF-87DC-62FB893F3931}"/>
+              </a:ext>
+            </a:extLst>
+          </p:cNvPr>
+          <p:cNvSpPr/>
+          <p:nvPr/>
+        </p:nvSpPr>
+        <p:spPr>
+          <a:xfrm>
+            <a:off x="5506974" y="5925312"/>
+            <a:ext cx="3790188" cy="320040"/>
+          </a:xfrm>
+          <a:prstGeom prst="rect">
+            <a:avLst/>
+          </a:prstGeom>
+        </p:spPr>
+        <p:style>
+          <a:lnRef idx="2">
+            <a:schemeClr val="dk1"/>
+          </a:lnRef>
+          <a:fillRef idx="1">
+            <a:schemeClr val="lt1"/>
+          </a:fillRef>
+          <a:effectRef idx="0">
+            <a:schemeClr val="dk1"/>
+          </a:effectRef>
+          <a:fontRef idx="minor">
+            <a:schemeClr val="dk1"/>
+          </a:fontRef>
+        </p:style>
+        <p:txBody>
+          <a:bodyPr rtlCol="0" anchor="ctr"/>
+          <a:lstStyle/>
+          <a:p>
+            <a:pPr algn="ctr"/>
+            <a:r>
+              <a:rPr lang="es-PE" sz="1100" dirty="0"/>
+              <a:t>2022 - Nombre® - Todos los derechos reservados</a:t>
+            </a:r>
+          </a:p>
+        </p:txBody>
+      </p:sp>
+      <p:sp>
+        <p:nvSpPr>
+          <p:cNvPr id="12" name="Rectángulo 11">
+            <a:extLst>
+              <a:ext uri="{FF2B5EF4-FFF2-40B4-BE49-F238E27FC236}">
+                <a16:creationId xmlns:a16="http://schemas.microsoft.com/office/drawing/2014/main" id="{5E86E855-05F8-45D1-998F-FD3B01DB39A2}"/>
+              </a:ext>
+            </a:extLst>
+          </p:cNvPr>
+          <p:cNvSpPr/>
+          <p:nvPr/>
+        </p:nvSpPr>
+        <p:spPr>
+          <a:xfrm>
+            <a:off x="2889504" y="5614416"/>
+            <a:ext cx="1865376" cy="420624"/>
+          </a:xfrm>
+          <a:prstGeom prst="rect">
+            <a:avLst/>
+          </a:prstGeom>
+        </p:spPr>
+        <p:style>
+          <a:lnRef idx="2">
+            <a:schemeClr val="dk1"/>
+          </a:lnRef>
+          <a:fillRef idx="1">
+            <a:schemeClr val="lt1"/>
+          </a:fillRef>
+          <a:effectRef idx="0">
+            <a:schemeClr val="dk1"/>
+          </a:effectRef>
+          <a:fontRef idx="minor">
+            <a:schemeClr val="dk1"/>
+          </a:fontRef>
+        </p:style>
+        <p:txBody>
+          <a:bodyPr rtlCol="0" anchor="ctr"/>
+          <a:lstStyle/>
+          <a:p>
+            <a:pPr algn="ctr"/>
+            <a:r>
+              <a:rPr lang="es-PE" sz="1100" dirty="0"/>
+              <a:t>Nosotros</a:t>
+            </a:r>
+          </a:p>
+        </p:txBody>
+      </p:sp>
+      <p:sp>
+        <p:nvSpPr>
+          <p:cNvPr id="13" name="Rectángulo 12">
+            <a:extLst>
+              <a:ext uri="{FF2B5EF4-FFF2-40B4-BE49-F238E27FC236}">
+                <a16:creationId xmlns:a16="http://schemas.microsoft.com/office/drawing/2014/main" id="{BAE1FAEE-ABB3-4846-BC1C-59A39C7AD0AB}"/>
+              </a:ext>
+            </a:extLst>
+          </p:cNvPr>
+          <p:cNvSpPr/>
+          <p:nvPr/>
+        </p:nvSpPr>
+        <p:spPr>
+          <a:xfrm>
+            <a:off x="2889504" y="6144768"/>
+            <a:ext cx="1865376" cy="425196"/>
+          </a:xfrm>
+          <a:prstGeom prst="rect">
+            <a:avLst/>
+          </a:prstGeom>
+        </p:spPr>
+        <p:style>
+          <a:lnRef idx="2">
+            <a:schemeClr val="dk1"/>
+          </a:lnRef>
+          <a:fillRef idx="1">
+            <a:schemeClr val="lt1"/>
+          </a:fillRef>
+          <a:effectRef idx="0">
+            <a:schemeClr val="dk1"/>
+          </a:effectRef>
+          <a:fontRef idx="minor">
+            <a:schemeClr val="dk1"/>
+          </a:fontRef>
+        </p:style>
+        <p:txBody>
+          <a:bodyPr rtlCol="0" anchor="ctr"/>
+          <a:lstStyle/>
+          <a:p>
+            <a:pPr algn="ctr"/>
+            <a:r>
+              <a:rPr lang="es-PE" sz="1100" dirty="0"/>
+              <a:t>Términos y Condiciones</a:t>
+            </a:r>
+          </a:p>
+        </p:txBody>
+      </p:sp>
+      <p:pic>
+        <p:nvPicPr>
+          <p:cNvPr id="3" name="Imagen 2">
+            <a:extLst>
+              <a:ext uri="{FF2B5EF4-FFF2-40B4-BE49-F238E27FC236}">
+                <a16:creationId xmlns:a16="http://schemas.microsoft.com/office/drawing/2014/main" id="{EDB0FAB0-DBB2-4D63-9EEC-D2DB087658EF}"/>
+              </a:ext>
+            </a:extLst>
+          </p:cNvPr>
+          <p:cNvPicPr>
+            <a:picLocks noChangeAspect="1"/>
+          </p:cNvPicPr>
+          <p:nvPr/>
+        </p:nvPicPr>
+        <p:blipFill>
+          <a:blip r:embed="rId2"/>
+          <a:stretch>
+            <a:fillRect/>
+          </a:stretch>
+        </p:blipFill>
+        <p:spPr>
+          <a:xfrm>
+            <a:off x="4794774" y="1874280"/>
+            <a:ext cx="2607294" cy="3109439"/>
+          </a:xfrm>
+          <a:prstGeom prst="rect">
+            <a:avLst/>
+          </a:prstGeom>
+        </p:spPr>
+      </p:pic>
+    </p:spTree>
+    <p:extLst>
+      <p:ext uri="{BB962C8B-B14F-4D97-AF65-F5344CB8AC3E}">
+        <p14:creationId xmlns:p14="http://schemas.microsoft.com/office/powerpoint/2010/main" val="2022379188"/>
+      </p:ext>
+    </p:extLst>
+  </p:cSld>
+  <p:clrMapOvr>
+    <a:masterClrMapping/>
+  </p:clrMapOvr>
+</p:sld>
+</file>
+
+<file path=ppt/slides/slide16.xml><?xml version="1.0" encoding="utf-8"?>
+<p:sld xmlns:a="http://schemas.openxmlformats.org/drawingml/2006/main" xmlns:r="http://schemas.openxmlformats.org/officeDocument/2006/relationships" xmlns:p="http://schemas.openxmlformats.org/presentationml/2006/main">
+  <p:cSld>
+    <p:spTree>
+      <p:nvGrpSpPr>
+        <p:cNvPr id="1" name=""/>
+        <p:cNvGrpSpPr/>
+        <p:nvPr/>
+      </p:nvGrpSpPr>
+      <p:grpSpPr>
+        <a:xfrm>
+          <a:off x="0" y="0"/>
+          <a:ext cx="0" cy="0"/>
+          <a:chOff x="0" y="0"/>
+          <a:chExt cx="0" cy="0"/>
+        </a:xfrm>
+      </p:grpSpPr>
+      <p:sp>
+        <p:nvSpPr>
+          <p:cNvPr id="4" name="Rectángulo 3">
+            <a:extLst>
+              <a:ext uri="{FF2B5EF4-FFF2-40B4-BE49-F238E27FC236}">
+                <a16:creationId xmlns:a16="http://schemas.microsoft.com/office/drawing/2014/main" id="{7D0C1056-F063-4295-9589-100A21F99782}"/>
+              </a:ext>
+            </a:extLst>
+          </p:cNvPr>
+          <p:cNvSpPr/>
+          <p:nvPr/>
+        </p:nvSpPr>
+        <p:spPr>
+          <a:xfrm>
+            <a:off x="182880" y="182880"/>
+            <a:ext cx="11695176" cy="1124712"/>
+          </a:xfrm>
+          <a:prstGeom prst="rect">
+            <a:avLst/>
+          </a:prstGeom>
+        </p:spPr>
+        <p:style>
+          <a:lnRef idx="2">
+            <a:schemeClr val="dk1"/>
+          </a:lnRef>
+          <a:fillRef idx="1">
+            <a:schemeClr val="lt1"/>
+          </a:fillRef>
+          <a:effectRef idx="0">
+            <a:schemeClr val="dk1"/>
+          </a:effectRef>
+          <a:fontRef idx="minor">
+            <a:schemeClr val="dk1"/>
+          </a:fontRef>
+        </p:style>
+        <p:txBody>
+          <a:bodyPr rtlCol="0" anchor="ctr"/>
+          <a:lstStyle/>
+          <a:p>
+            <a:pPr algn="ctr"/>
+            <a:endParaRPr lang="es-PE"/>
+          </a:p>
+        </p:txBody>
+      </p:sp>
+      <p:sp>
+        <p:nvSpPr>
+          <p:cNvPr id="5" name="Rectángulo 4">
+            <a:extLst>
+              <a:ext uri="{FF2B5EF4-FFF2-40B4-BE49-F238E27FC236}">
+                <a16:creationId xmlns:a16="http://schemas.microsoft.com/office/drawing/2014/main" id="{FB0592F0-31E3-4A12-9D00-8202A4B8AF40}"/>
+              </a:ext>
+            </a:extLst>
+          </p:cNvPr>
+          <p:cNvSpPr/>
+          <p:nvPr/>
+        </p:nvSpPr>
+        <p:spPr>
+          <a:xfrm>
+            <a:off x="182880" y="1417320"/>
+            <a:ext cx="11695176" cy="3968496"/>
+          </a:xfrm>
+          <a:prstGeom prst="rect">
+            <a:avLst/>
+          </a:prstGeom>
+        </p:spPr>
+        <p:style>
+          <a:lnRef idx="2">
+            <a:schemeClr val="dk1"/>
+          </a:lnRef>
+          <a:fillRef idx="1">
+            <a:schemeClr val="lt1"/>
+          </a:fillRef>
+          <a:effectRef idx="0">
+            <a:schemeClr val="dk1"/>
+          </a:effectRef>
+          <a:fontRef idx="minor">
+            <a:schemeClr val="dk1"/>
+          </a:fontRef>
+        </p:style>
+        <p:txBody>
+          <a:bodyPr rtlCol="0" anchor="ctr"/>
+          <a:lstStyle/>
+          <a:p>
+            <a:pPr algn="ctr"/>
+            <a:endParaRPr lang="es-PE"/>
+          </a:p>
+        </p:txBody>
+      </p:sp>
+      <p:sp>
+        <p:nvSpPr>
+          <p:cNvPr id="6" name="Rectángulo 5">
+            <a:extLst>
+              <a:ext uri="{FF2B5EF4-FFF2-40B4-BE49-F238E27FC236}">
+                <a16:creationId xmlns:a16="http://schemas.microsoft.com/office/drawing/2014/main" id="{15921A5A-FAF3-418A-99AE-B7FC9DD7959F}"/>
+              </a:ext>
+            </a:extLst>
+          </p:cNvPr>
+          <p:cNvSpPr/>
+          <p:nvPr/>
+        </p:nvSpPr>
+        <p:spPr>
+          <a:xfrm>
+            <a:off x="182880" y="5495544"/>
+            <a:ext cx="11695176" cy="1179576"/>
+          </a:xfrm>
+          <a:prstGeom prst="rect">
+            <a:avLst/>
+          </a:prstGeom>
+        </p:spPr>
+        <p:style>
+          <a:lnRef idx="2">
+            <a:schemeClr val="dk1"/>
+          </a:lnRef>
+          <a:fillRef idx="1">
+            <a:schemeClr val="lt1"/>
+          </a:fillRef>
+          <a:effectRef idx="0">
+            <a:schemeClr val="dk1"/>
+          </a:effectRef>
+          <a:fontRef idx="minor">
+            <a:schemeClr val="dk1"/>
+          </a:fontRef>
+        </p:style>
+        <p:txBody>
+          <a:bodyPr rtlCol="0" anchor="ctr"/>
+          <a:lstStyle/>
+          <a:p>
+            <a:pPr algn="ctr"/>
+            <a:endParaRPr lang="es-PE"/>
+          </a:p>
+        </p:txBody>
+      </p:sp>
+      <p:sp>
+        <p:nvSpPr>
+          <p:cNvPr id="7" name="Rectángulo 6">
+            <a:extLst>
+              <a:ext uri="{FF2B5EF4-FFF2-40B4-BE49-F238E27FC236}">
+                <a16:creationId xmlns:a16="http://schemas.microsoft.com/office/drawing/2014/main" id="{9A05CB20-1A4C-44A9-BCFA-BACA053BB6D0}"/>
+              </a:ext>
+            </a:extLst>
+          </p:cNvPr>
+          <p:cNvSpPr/>
+          <p:nvPr/>
+        </p:nvSpPr>
+        <p:spPr>
+          <a:xfrm>
+            <a:off x="310896" y="292608"/>
+            <a:ext cx="2816352" cy="905256"/>
+          </a:xfrm>
+          <a:prstGeom prst="rect">
+            <a:avLst/>
+          </a:prstGeom>
+        </p:spPr>
+        <p:style>
+          <a:lnRef idx="2">
+            <a:schemeClr val="dk1"/>
+          </a:lnRef>
+          <a:fillRef idx="1">
+            <a:schemeClr val="lt1"/>
+          </a:fillRef>
+          <a:effectRef idx="0">
+            <a:schemeClr val="dk1"/>
+          </a:effectRef>
+          <a:fontRef idx="minor">
+            <a:schemeClr val="dk1"/>
+          </a:fontRef>
+        </p:style>
+        <p:txBody>
+          <a:bodyPr rtlCol="0" anchor="ctr"/>
+          <a:lstStyle/>
+          <a:p>
+            <a:pPr algn="ctr"/>
+            <a:r>
+              <a:rPr lang="es-PE" dirty="0"/>
+              <a:t>Logo </a:t>
+            </a:r>
+            <a:r>
+              <a:rPr lang="es-PE" dirty="0" err="1"/>
+              <a:t>Crypto</a:t>
+            </a:r>
+            <a:r>
+              <a:rPr lang="es-PE" dirty="0"/>
+              <a:t>-nita</a:t>
+            </a:r>
+          </a:p>
+        </p:txBody>
+      </p:sp>
+      <p:sp>
+        <p:nvSpPr>
+          <p:cNvPr id="9" name="Rectángulo 8">
+            <a:extLst>
+              <a:ext uri="{FF2B5EF4-FFF2-40B4-BE49-F238E27FC236}">
+                <a16:creationId xmlns:a16="http://schemas.microsoft.com/office/drawing/2014/main" id="{9059C4E3-239F-4824-8C5A-1858ACB1C26E}"/>
+              </a:ext>
+            </a:extLst>
+          </p:cNvPr>
+          <p:cNvSpPr/>
+          <p:nvPr/>
+        </p:nvSpPr>
+        <p:spPr>
+          <a:xfrm>
+            <a:off x="310896" y="5614416"/>
+            <a:ext cx="2450592" cy="950976"/>
+          </a:xfrm>
+          <a:prstGeom prst="rect">
+            <a:avLst/>
+          </a:prstGeom>
+        </p:spPr>
+        <p:style>
+          <a:lnRef idx="2">
+            <a:schemeClr val="dk1"/>
+          </a:lnRef>
+          <a:fillRef idx="1">
+            <a:schemeClr val="lt1"/>
+          </a:fillRef>
+          <a:effectRef idx="0">
+            <a:schemeClr val="dk1"/>
+          </a:effectRef>
+          <a:fontRef idx="minor">
+            <a:schemeClr val="dk1"/>
+          </a:fontRef>
+        </p:style>
+        <p:txBody>
+          <a:bodyPr rtlCol="0" anchor="ctr"/>
+          <a:lstStyle/>
+          <a:p>
+            <a:pPr algn="ctr"/>
+            <a:r>
+              <a:rPr lang="es-MX" dirty="0"/>
+              <a:t>Nombre/Logo del Grupo</a:t>
+            </a:r>
+            <a:endParaRPr lang="es-PE" dirty="0"/>
+          </a:p>
+        </p:txBody>
+      </p:sp>
+      <p:sp>
+        <p:nvSpPr>
+          <p:cNvPr id="10" name="Rectángulo 9">
+            <a:extLst>
+              <a:ext uri="{FF2B5EF4-FFF2-40B4-BE49-F238E27FC236}">
+                <a16:creationId xmlns:a16="http://schemas.microsoft.com/office/drawing/2014/main" id="{CE6F6AAA-080D-4FC6-88FA-3EBC4C0CD8F6}"/>
+              </a:ext>
+            </a:extLst>
+          </p:cNvPr>
+          <p:cNvSpPr/>
+          <p:nvPr/>
+        </p:nvSpPr>
+        <p:spPr>
+          <a:xfrm>
+            <a:off x="10049256" y="5614416"/>
+            <a:ext cx="1627632" cy="950976"/>
+          </a:xfrm>
+          <a:prstGeom prst="rect">
+            <a:avLst/>
+          </a:prstGeom>
+        </p:spPr>
+        <p:style>
+          <a:lnRef idx="2">
+            <a:schemeClr val="dk1"/>
+          </a:lnRef>
+          <a:fillRef idx="1">
+            <a:schemeClr val="lt1"/>
+          </a:fillRef>
+          <a:effectRef idx="0">
+            <a:schemeClr val="dk1"/>
+          </a:effectRef>
+          <a:fontRef idx="minor">
+            <a:schemeClr val="dk1"/>
+          </a:fontRef>
+        </p:style>
+        <p:txBody>
+          <a:bodyPr rtlCol="0" anchor="ctr"/>
+          <a:lstStyle/>
+          <a:p>
+            <a:pPr algn="ctr"/>
+            <a:r>
+              <a:rPr lang="es-MX" sz="1100" dirty="0"/>
+              <a:t>Integrantes</a:t>
+            </a:r>
+            <a:endParaRPr lang="es-PE" sz="1100" dirty="0"/>
+          </a:p>
+        </p:txBody>
+      </p:sp>
+      <p:sp>
+        <p:nvSpPr>
+          <p:cNvPr id="11" name="Rectángulo 10">
+            <a:extLst>
+              <a:ext uri="{FF2B5EF4-FFF2-40B4-BE49-F238E27FC236}">
+                <a16:creationId xmlns:a16="http://schemas.microsoft.com/office/drawing/2014/main" id="{2D34766E-3CC0-47DF-87DC-62FB893F3931}"/>
+              </a:ext>
+            </a:extLst>
+          </p:cNvPr>
+          <p:cNvSpPr/>
+          <p:nvPr/>
+        </p:nvSpPr>
+        <p:spPr>
+          <a:xfrm>
+            <a:off x="5506974" y="5925312"/>
+            <a:ext cx="3790188" cy="320040"/>
+          </a:xfrm>
+          <a:prstGeom prst="rect">
+            <a:avLst/>
+          </a:prstGeom>
+        </p:spPr>
+        <p:style>
+          <a:lnRef idx="2">
+            <a:schemeClr val="dk1"/>
+          </a:lnRef>
+          <a:fillRef idx="1">
+            <a:schemeClr val="lt1"/>
+          </a:fillRef>
+          <a:effectRef idx="0">
+            <a:schemeClr val="dk1"/>
+          </a:effectRef>
+          <a:fontRef idx="minor">
+            <a:schemeClr val="dk1"/>
+          </a:fontRef>
+        </p:style>
+        <p:txBody>
+          <a:bodyPr rtlCol="0" anchor="ctr"/>
+          <a:lstStyle/>
+          <a:p>
+            <a:pPr algn="ctr"/>
+            <a:r>
+              <a:rPr lang="es-PE" sz="1100" dirty="0"/>
+              <a:t>2022 - Nombre® - Todos los derechos reservados</a:t>
+            </a:r>
+          </a:p>
+        </p:txBody>
+      </p:sp>
+      <p:sp>
+        <p:nvSpPr>
+          <p:cNvPr id="12" name="Rectángulo 11">
+            <a:extLst>
+              <a:ext uri="{FF2B5EF4-FFF2-40B4-BE49-F238E27FC236}">
+                <a16:creationId xmlns:a16="http://schemas.microsoft.com/office/drawing/2014/main" id="{5E86E855-05F8-45D1-998F-FD3B01DB39A2}"/>
+              </a:ext>
+            </a:extLst>
+          </p:cNvPr>
+          <p:cNvSpPr/>
+          <p:nvPr/>
+        </p:nvSpPr>
+        <p:spPr>
+          <a:xfrm>
+            <a:off x="2889504" y="5614416"/>
+            <a:ext cx="1865376" cy="420624"/>
+          </a:xfrm>
+          <a:prstGeom prst="rect">
+            <a:avLst/>
+          </a:prstGeom>
+        </p:spPr>
+        <p:style>
+          <a:lnRef idx="2">
+            <a:schemeClr val="dk1"/>
+          </a:lnRef>
+          <a:fillRef idx="1">
+            <a:schemeClr val="lt1"/>
+          </a:fillRef>
+          <a:effectRef idx="0">
+            <a:schemeClr val="dk1"/>
+          </a:effectRef>
+          <a:fontRef idx="minor">
+            <a:schemeClr val="dk1"/>
+          </a:fontRef>
+        </p:style>
+        <p:txBody>
+          <a:bodyPr rtlCol="0" anchor="ctr"/>
+          <a:lstStyle/>
+          <a:p>
+            <a:pPr algn="ctr"/>
+            <a:r>
+              <a:rPr lang="es-PE" sz="1100" dirty="0"/>
+              <a:t>Nosotros</a:t>
+            </a:r>
+          </a:p>
+        </p:txBody>
+      </p:sp>
+      <p:sp>
+        <p:nvSpPr>
+          <p:cNvPr id="13" name="Rectángulo 12">
+            <a:extLst>
+              <a:ext uri="{FF2B5EF4-FFF2-40B4-BE49-F238E27FC236}">
+                <a16:creationId xmlns:a16="http://schemas.microsoft.com/office/drawing/2014/main" id="{BAE1FAEE-ABB3-4846-BC1C-59A39C7AD0AB}"/>
+              </a:ext>
+            </a:extLst>
+          </p:cNvPr>
+          <p:cNvSpPr/>
+          <p:nvPr/>
+        </p:nvSpPr>
+        <p:spPr>
+          <a:xfrm>
+            <a:off x="2889504" y="6144768"/>
+            <a:ext cx="1865376" cy="425196"/>
+          </a:xfrm>
+          <a:prstGeom prst="rect">
+            <a:avLst/>
+          </a:prstGeom>
+        </p:spPr>
+        <p:style>
+          <a:lnRef idx="2">
+            <a:schemeClr val="dk1"/>
+          </a:lnRef>
+          <a:fillRef idx="1">
+            <a:schemeClr val="lt1"/>
+          </a:fillRef>
+          <a:effectRef idx="0">
+            <a:schemeClr val="dk1"/>
+          </a:effectRef>
+          <a:fontRef idx="minor">
+            <a:schemeClr val="dk1"/>
+          </a:fontRef>
+        </p:style>
+        <p:txBody>
+          <a:bodyPr rtlCol="0" anchor="ctr"/>
+          <a:lstStyle/>
+          <a:p>
+            <a:pPr algn="ctr"/>
+            <a:r>
+              <a:rPr lang="es-PE" sz="1100" dirty="0"/>
+              <a:t>Términos y Condiciones</a:t>
+            </a:r>
+          </a:p>
+        </p:txBody>
+      </p:sp>
+      <p:pic>
+        <p:nvPicPr>
+          <p:cNvPr id="3" name="Imagen 2">
+            <a:extLst>
+              <a:ext uri="{FF2B5EF4-FFF2-40B4-BE49-F238E27FC236}">
+                <a16:creationId xmlns:a16="http://schemas.microsoft.com/office/drawing/2014/main" id="{5163AFA6-D5DC-48D6-AC02-2B6BC98B37C1}"/>
+              </a:ext>
+            </a:extLst>
+          </p:cNvPr>
+          <p:cNvPicPr>
+            <a:picLocks noChangeAspect="1"/>
+          </p:cNvPicPr>
+          <p:nvPr/>
+        </p:nvPicPr>
+        <p:blipFill>
+          <a:blip r:embed="rId2"/>
+          <a:stretch>
+            <a:fillRect/>
+          </a:stretch>
+        </p:blipFill>
+        <p:spPr>
+          <a:xfrm>
+            <a:off x="4392101" y="1509114"/>
+            <a:ext cx="3407798" cy="3839772"/>
+          </a:xfrm>
+          <a:prstGeom prst="rect">
+            <a:avLst/>
+          </a:prstGeom>
+        </p:spPr>
+      </p:pic>
+    </p:spTree>
+    <p:extLst>
+      <p:ext uri="{BB962C8B-B14F-4D97-AF65-F5344CB8AC3E}">
+        <p14:creationId xmlns:p14="http://schemas.microsoft.com/office/powerpoint/2010/main" val="3332243026"/>
+      </p:ext>
+    </p:extLst>
+  </p:cSld>
+  <p:clrMapOvr>
+    <a:masterClrMapping/>
+  </p:clrMapOvr>
+</p:sld>
+</file>
+
+<file path=ppt/slides/slide17.xml><?xml version="1.0" encoding="utf-8"?>
+<p:sld xmlns:a="http://schemas.openxmlformats.org/drawingml/2006/main" xmlns:r="http://schemas.openxmlformats.org/officeDocument/2006/relationships" xmlns:p="http://schemas.openxmlformats.org/presentationml/2006/main">
+  <p:cSld>
+    <p:spTree>
+      <p:nvGrpSpPr>
+        <p:cNvPr id="1" name=""/>
+        <p:cNvGrpSpPr/>
+        <p:nvPr/>
+      </p:nvGrpSpPr>
+      <p:grpSpPr>
+        <a:xfrm>
+          <a:off x="0" y="0"/>
+          <a:ext cx="0" cy="0"/>
+          <a:chOff x="0" y="0"/>
+          <a:chExt cx="0" cy="0"/>
+        </a:xfrm>
+      </p:grpSpPr>
+      <p:sp>
+        <p:nvSpPr>
+          <p:cNvPr id="4" name="Rectángulo 3">
+            <a:extLst>
+              <a:ext uri="{FF2B5EF4-FFF2-40B4-BE49-F238E27FC236}">
+                <a16:creationId xmlns:a16="http://schemas.microsoft.com/office/drawing/2014/main" id="{7D0C1056-F063-4295-9589-100A21F99782}"/>
+              </a:ext>
+            </a:extLst>
+          </p:cNvPr>
+          <p:cNvSpPr/>
+          <p:nvPr/>
+        </p:nvSpPr>
+        <p:spPr>
+          <a:xfrm>
+            <a:off x="182880" y="182880"/>
+            <a:ext cx="11695176" cy="1124712"/>
+          </a:xfrm>
+          <a:prstGeom prst="rect">
+            <a:avLst/>
+          </a:prstGeom>
+        </p:spPr>
+        <p:style>
+          <a:lnRef idx="2">
+            <a:schemeClr val="dk1"/>
+          </a:lnRef>
+          <a:fillRef idx="1">
+            <a:schemeClr val="lt1"/>
+          </a:fillRef>
+          <a:effectRef idx="0">
+            <a:schemeClr val="dk1"/>
+          </a:effectRef>
+          <a:fontRef idx="minor">
+            <a:schemeClr val="dk1"/>
+          </a:fontRef>
+        </p:style>
+        <p:txBody>
+          <a:bodyPr rtlCol="0" anchor="ctr"/>
+          <a:lstStyle/>
+          <a:p>
+            <a:pPr algn="ctr"/>
+            <a:endParaRPr lang="es-PE"/>
+          </a:p>
+        </p:txBody>
+      </p:sp>
+      <p:sp>
+        <p:nvSpPr>
+          <p:cNvPr id="5" name="Rectángulo 4">
+            <a:extLst>
+              <a:ext uri="{FF2B5EF4-FFF2-40B4-BE49-F238E27FC236}">
+                <a16:creationId xmlns:a16="http://schemas.microsoft.com/office/drawing/2014/main" id="{FB0592F0-31E3-4A12-9D00-8202A4B8AF40}"/>
+              </a:ext>
+            </a:extLst>
+          </p:cNvPr>
+          <p:cNvSpPr/>
+          <p:nvPr/>
+        </p:nvSpPr>
+        <p:spPr>
+          <a:xfrm>
+            <a:off x="182880" y="1417320"/>
+            <a:ext cx="11695176" cy="3968496"/>
+          </a:xfrm>
+          <a:prstGeom prst="rect">
+            <a:avLst/>
+          </a:prstGeom>
+        </p:spPr>
+        <p:style>
+          <a:lnRef idx="2">
+            <a:schemeClr val="dk1"/>
+          </a:lnRef>
+          <a:fillRef idx="1">
+            <a:schemeClr val="lt1"/>
+          </a:fillRef>
+          <a:effectRef idx="0">
+            <a:schemeClr val="dk1"/>
+          </a:effectRef>
+          <a:fontRef idx="minor">
+            <a:schemeClr val="dk1"/>
+          </a:fontRef>
+        </p:style>
+        <p:txBody>
+          <a:bodyPr rtlCol="0" anchor="ctr"/>
+          <a:lstStyle/>
+          <a:p>
+            <a:pPr algn="ctr"/>
+            <a:endParaRPr lang="es-PE" dirty="0"/>
+          </a:p>
+        </p:txBody>
+      </p:sp>
+      <p:sp>
+        <p:nvSpPr>
+          <p:cNvPr id="6" name="Rectángulo 5">
+            <a:extLst>
+              <a:ext uri="{FF2B5EF4-FFF2-40B4-BE49-F238E27FC236}">
+                <a16:creationId xmlns:a16="http://schemas.microsoft.com/office/drawing/2014/main" id="{15921A5A-FAF3-418A-99AE-B7FC9DD7959F}"/>
+              </a:ext>
+            </a:extLst>
+          </p:cNvPr>
+          <p:cNvSpPr/>
+          <p:nvPr/>
+        </p:nvSpPr>
+        <p:spPr>
+          <a:xfrm>
+            <a:off x="182880" y="5495544"/>
+            <a:ext cx="11695176" cy="1179576"/>
+          </a:xfrm>
+          <a:prstGeom prst="rect">
+            <a:avLst/>
+          </a:prstGeom>
+        </p:spPr>
+        <p:style>
+          <a:lnRef idx="2">
+            <a:schemeClr val="dk1"/>
+          </a:lnRef>
+          <a:fillRef idx="1">
+            <a:schemeClr val="lt1"/>
+          </a:fillRef>
+          <a:effectRef idx="0">
+            <a:schemeClr val="dk1"/>
+          </a:effectRef>
+          <a:fontRef idx="minor">
+            <a:schemeClr val="dk1"/>
+          </a:fontRef>
+        </p:style>
+        <p:txBody>
+          <a:bodyPr rtlCol="0" anchor="ctr"/>
+          <a:lstStyle/>
+          <a:p>
+            <a:pPr algn="ctr"/>
+            <a:endParaRPr lang="es-PE"/>
+          </a:p>
+        </p:txBody>
+      </p:sp>
+      <p:sp>
+        <p:nvSpPr>
+          <p:cNvPr id="7" name="Rectángulo 6">
+            <a:extLst>
+              <a:ext uri="{FF2B5EF4-FFF2-40B4-BE49-F238E27FC236}">
+                <a16:creationId xmlns:a16="http://schemas.microsoft.com/office/drawing/2014/main" id="{9A05CB20-1A4C-44A9-BCFA-BACA053BB6D0}"/>
+              </a:ext>
+            </a:extLst>
+          </p:cNvPr>
+          <p:cNvSpPr/>
+          <p:nvPr/>
+        </p:nvSpPr>
+        <p:spPr>
+          <a:xfrm>
+            <a:off x="310896" y="292608"/>
+            <a:ext cx="2816352" cy="905256"/>
+          </a:xfrm>
+          <a:prstGeom prst="rect">
+            <a:avLst/>
+          </a:prstGeom>
+        </p:spPr>
+        <p:style>
+          <a:lnRef idx="2">
+            <a:schemeClr val="dk1"/>
+          </a:lnRef>
+          <a:fillRef idx="1">
+            <a:schemeClr val="lt1"/>
+          </a:fillRef>
+          <a:effectRef idx="0">
+            <a:schemeClr val="dk1"/>
+          </a:effectRef>
+          <a:fontRef idx="minor">
+            <a:schemeClr val="dk1"/>
+          </a:fontRef>
+        </p:style>
+        <p:txBody>
+          <a:bodyPr rtlCol="0" anchor="ctr"/>
+          <a:lstStyle/>
+          <a:p>
+            <a:pPr algn="ctr"/>
+            <a:r>
+              <a:rPr lang="es-PE" dirty="0"/>
+              <a:t>Logo </a:t>
+            </a:r>
+            <a:r>
+              <a:rPr lang="es-PE" dirty="0" err="1"/>
+              <a:t>Crypto</a:t>
+            </a:r>
+            <a:r>
+              <a:rPr lang="es-PE" dirty="0"/>
+              <a:t>-nita</a:t>
+            </a:r>
+          </a:p>
+        </p:txBody>
+      </p:sp>
+      <p:sp>
+        <p:nvSpPr>
+          <p:cNvPr id="9" name="Rectángulo 8">
+            <a:extLst>
+              <a:ext uri="{FF2B5EF4-FFF2-40B4-BE49-F238E27FC236}">
+                <a16:creationId xmlns:a16="http://schemas.microsoft.com/office/drawing/2014/main" id="{9059C4E3-239F-4824-8C5A-1858ACB1C26E}"/>
+              </a:ext>
+            </a:extLst>
+          </p:cNvPr>
+          <p:cNvSpPr/>
+          <p:nvPr/>
+        </p:nvSpPr>
+        <p:spPr>
+          <a:xfrm>
+            <a:off x="310896" y="5614416"/>
+            <a:ext cx="2450592" cy="950976"/>
+          </a:xfrm>
+          <a:prstGeom prst="rect">
+            <a:avLst/>
+          </a:prstGeom>
+        </p:spPr>
+        <p:style>
+          <a:lnRef idx="2">
+            <a:schemeClr val="dk1"/>
+          </a:lnRef>
+          <a:fillRef idx="1">
+            <a:schemeClr val="lt1"/>
+          </a:fillRef>
+          <a:effectRef idx="0">
+            <a:schemeClr val="dk1"/>
+          </a:effectRef>
+          <a:fontRef idx="minor">
+            <a:schemeClr val="dk1"/>
+          </a:fontRef>
+        </p:style>
+        <p:txBody>
+          <a:bodyPr rtlCol="0" anchor="ctr"/>
+          <a:lstStyle/>
+          <a:p>
+            <a:pPr algn="ctr"/>
+            <a:r>
+              <a:rPr lang="es-MX" dirty="0"/>
+              <a:t>Nombre/Logo del Grupo</a:t>
+            </a:r>
+            <a:endParaRPr lang="es-PE" dirty="0"/>
+          </a:p>
+        </p:txBody>
+      </p:sp>
+      <p:sp>
+        <p:nvSpPr>
+          <p:cNvPr id="10" name="Rectángulo 9">
+            <a:extLst>
+              <a:ext uri="{FF2B5EF4-FFF2-40B4-BE49-F238E27FC236}">
+                <a16:creationId xmlns:a16="http://schemas.microsoft.com/office/drawing/2014/main" id="{CE6F6AAA-080D-4FC6-88FA-3EBC4C0CD8F6}"/>
+              </a:ext>
+            </a:extLst>
+          </p:cNvPr>
+          <p:cNvSpPr/>
+          <p:nvPr/>
+        </p:nvSpPr>
+        <p:spPr>
+          <a:xfrm>
+            <a:off x="10049256" y="5614416"/>
+            <a:ext cx="1627632" cy="950976"/>
+          </a:xfrm>
+          <a:prstGeom prst="rect">
+            <a:avLst/>
+          </a:prstGeom>
+        </p:spPr>
+        <p:style>
+          <a:lnRef idx="2">
+            <a:schemeClr val="dk1"/>
+          </a:lnRef>
+          <a:fillRef idx="1">
+            <a:schemeClr val="lt1"/>
+          </a:fillRef>
+          <a:effectRef idx="0">
+            <a:schemeClr val="dk1"/>
+          </a:effectRef>
+          <a:fontRef idx="minor">
+            <a:schemeClr val="dk1"/>
+          </a:fontRef>
+        </p:style>
+        <p:txBody>
+          <a:bodyPr rtlCol="0" anchor="ctr"/>
+          <a:lstStyle/>
+          <a:p>
+            <a:pPr algn="ctr"/>
+            <a:r>
+              <a:rPr lang="es-MX" sz="1100" dirty="0"/>
+              <a:t>Integrantes</a:t>
+            </a:r>
+            <a:endParaRPr lang="es-PE" sz="1100" dirty="0"/>
+          </a:p>
+        </p:txBody>
+      </p:sp>
+      <p:sp>
+        <p:nvSpPr>
+          <p:cNvPr id="11" name="Rectángulo 10">
+            <a:extLst>
+              <a:ext uri="{FF2B5EF4-FFF2-40B4-BE49-F238E27FC236}">
+                <a16:creationId xmlns:a16="http://schemas.microsoft.com/office/drawing/2014/main" id="{2D34766E-3CC0-47DF-87DC-62FB893F3931}"/>
+              </a:ext>
+            </a:extLst>
+          </p:cNvPr>
+          <p:cNvSpPr/>
+          <p:nvPr/>
+        </p:nvSpPr>
+        <p:spPr>
+          <a:xfrm>
+            <a:off x="5506974" y="5925312"/>
+            <a:ext cx="3790188" cy="320040"/>
+          </a:xfrm>
+          <a:prstGeom prst="rect">
+            <a:avLst/>
+          </a:prstGeom>
+        </p:spPr>
+        <p:style>
+          <a:lnRef idx="2">
+            <a:schemeClr val="dk1"/>
+          </a:lnRef>
+          <a:fillRef idx="1">
+            <a:schemeClr val="lt1"/>
+          </a:fillRef>
+          <a:effectRef idx="0">
+            <a:schemeClr val="dk1"/>
+          </a:effectRef>
+          <a:fontRef idx="minor">
+            <a:schemeClr val="dk1"/>
+          </a:fontRef>
+        </p:style>
+        <p:txBody>
+          <a:bodyPr rtlCol="0" anchor="ctr"/>
+          <a:lstStyle/>
+          <a:p>
+            <a:pPr algn="ctr"/>
+            <a:r>
+              <a:rPr lang="es-PE" sz="1100" dirty="0"/>
+              <a:t>2022 - Nombre® - Todos los derechos reservados</a:t>
+            </a:r>
+          </a:p>
+        </p:txBody>
+      </p:sp>
+      <p:sp>
+        <p:nvSpPr>
+          <p:cNvPr id="12" name="Rectángulo 11">
+            <a:extLst>
+              <a:ext uri="{FF2B5EF4-FFF2-40B4-BE49-F238E27FC236}">
+                <a16:creationId xmlns:a16="http://schemas.microsoft.com/office/drawing/2014/main" id="{5E86E855-05F8-45D1-998F-FD3B01DB39A2}"/>
+              </a:ext>
+            </a:extLst>
+          </p:cNvPr>
+          <p:cNvSpPr/>
+          <p:nvPr/>
+        </p:nvSpPr>
+        <p:spPr>
+          <a:xfrm>
+            <a:off x="2889504" y="5614416"/>
+            <a:ext cx="1865376" cy="420624"/>
+          </a:xfrm>
+          <a:prstGeom prst="rect">
+            <a:avLst/>
+          </a:prstGeom>
+        </p:spPr>
+        <p:style>
+          <a:lnRef idx="2">
+            <a:schemeClr val="dk1"/>
+          </a:lnRef>
+          <a:fillRef idx="1">
+            <a:schemeClr val="lt1"/>
+          </a:fillRef>
+          <a:effectRef idx="0">
+            <a:schemeClr val="dk1"/>
+          </a:effectRef>
+          <a:fontRef idx="minor">
+            <a:schemeClr val="dk1"/>
+          </a:fontRef>
+        </p:style>
+        <p:txBody>
+          <a:bodyPr rtlCol="0" anchor="ctr"/>
+          <a:lstStyle/>
+          <a:p>
+            <a:pPr algn="ctr"/>
+            <a:r>
+              <a:rPr lang="es-PE" sz="1100" dirty="0"/>
+              <a:t>Nosotros</a:t>
+            </a:r>
+          </a:p>
+        </p:txBody>
+      </p:sp>
+      <p:sp>
+        <p:nvSpPr>
+          <p:cNvPr id="13" name="Rectángulo 12">
+            <a:extLst>
+              <a:ext uri="{FF2B5EF4-FFF2-40B4-BE49-F238E27FC236}">
+                <a16:creationId xmlns:a16="http://schemas.microsoft.com/office/drawing/2014/main" id="{BAE1FAEE-ABB3-4846-BC1C-59A39C7AD0AB}"/>
+              </a:ext>
+            </a:extLst>
+          </p:cNvPr>
+          <p:cNvSpPr/>
+          <p:nvPr/>
+        </p:nvSpPr>
+        <p:spPr>
+          <a:xfrm>
+            <a:off x="2889504" y="6144768"/>
+            <a:ext cx="1865376" cy="425196"/>
+          </a:xfrm>
+          <a:prstGeom prst="rect">
+            <a:avLst/>
+          </a:prstGeom>
+        </p:spPr>
+        <p:style>
+          <a:lnRef idx="2">
+            <a:schemeClr val="dk1"/>
+          </a:lnRef>
+          <a:fillRef idx="1">
+            <a:schemeClr val="lt1"/>
+          </a:fillRef>
+          <a:effectRef idx="0">
+            <a:schemeClr val="dk1"/>
+          </a:effectRef>
+          <a:fontRef idx="minor">
+            <a:schemeClr val="dk1"/>
+          </a:fontRef>
+        </p:style>
+        <p:txBody>
+          <a:bodyPr rtlCol="0" anchor="ctr"/>
+          <a:lstStyle/>
+          <a:p>
+            <a:pPr algn="ctr"/>
+            <a:r>
+              <a:rPr lang="es-PE" sz="1100" dirty="0"/>
+              <a:t>Términos y Condiciones</a:t>
+            </a:r>
+          </a:p>
+        </p:txBody>
+      </p:sp>
+      <p:pic>
+        <p:nvPicPr>
+          <p:cNvPr id="3" name="Imagen 2">
+            <a:extLst>
+              <a:ext uri="{FF2B5EF4-FFF2-40B4-BE49-F238E27FC236}">
+                <a16:creationId xmlns:a16="http://schemas.microsoft.com/office/drawing/2014/main" id="{1FA4AC91-2D6F-46D5-9114-F185C611CDFE}"/>
+              </a:ext>
+            </a:extLst>
+          </p:cNvPr>
+          <p:cNvPicPr>
+            <a:picLocks noChangeAspect="1"/>
+          </p:cNvPicPr>
+          <p:nvPr/>
+        </p:nvPicPr>
+        <p:blipFill>
+          <a:blip r:embed="rId2"/>
+          <a:stretch>
+            <a:fillRect/>
+          </a:stretch>
+        </p:blipFill>
+        <p:spPr>
+          <a:xfrm>
+            <a:off x="4340972" y="1551711"/>
+            <a:ext cx="3510056" cy="3754577"/>
+          </a:xfrm>
+          <a:prstGeom prst="rect">
+            <a:avLst/>
+          </a:prstGeom>
+        </p:spPr>
+      </p:pic>
+    </p:spTree>
+    <p:extLst>
+      <p:ext uri="{BB962C8B-B14F-4D97-AF65-F5344CB8AC3E}">
+        <p14:creationId xmlns:p14="http://schemas.microsoft.com/office/powerpoint/2010/main" val="1035854182"/>
+      </p:ext>
+    </p:extLst>
+  </p:cSld>
+  <p:clrMapOvr>
+    <a:masterClrMapping/>
+  </p:clrMapOvr>
+</p:sld>
+</file>
+
+<file path=ppt/slides/slide18.xml><?xml version="1.0" encoding="utf-8"?>
+<p:sld xmlns:a="http://schemas.openxmlformats.org/drawingml/2006/main" xmlns:r="http://schemas.openxmlformats.org/officeDocument/2006/relationships" xmlns:p="http://schemas.openxmlformats.org/presentationml/2006/main">
+  <p:cSld>
+    <p:spTree>
+      <p:nvGrpSpPr>
+        <p:cNvPr id="1" name=""/>
+        <p:cNvGrpSpPr/>
+        <p:nvPr/>
+      </p:nvGrpSpPr>
+      <p:grpSpPr>
+        <a:xfrm>
+          <a:off x="0" y="0"/>
+          <a:ext cx="0" cy="0"/>
+          <a:chOff x="0" y="0"/>
+          <a:chExt cx="0" cy="0"/>
+        </a:xfrm>
+      </p:grpSpPr>
+      <p:sp>
+        <p:nvSpPr>
+          <p:cNvPr id="4" name="Rectángulo 3">
+            <a:extLst>
+              <a:ext uri="{FF2B5EF4-FFF2-40B4-BE49-F238E27FC236}">
+                <a16:creationId xmlns:a16="http://schemas.microsoft.com/office/drawing/2014/main" id="{7D0C1056-F063-4295-9589-100A21F99782}"/>
+              </a:ext>
+            </a:extLst>
+          </p:cNvPr>
+          <p:cNvSpPr/>
+          <p:nvPr/>
+        </p:nvSpPr>
+        <p:spPr>
+          <a:xfrm>
+            <a:off x="182880" y="182880"/>
+            <a:ext cx="11695176" cy="1124712"/>
+          </a:xfrm>
+          <a:prstGeom prst="rect">
+            <a:avLst/>
+          </a:prstGeom>
+        </p:spPr>
+        <p:style>
+          <a:lnRef idx="2">
+            <a:schemeClr val="dk1"/>
+          </a:lnRef>
+          <a:fillRef idx="1">
+            <a:schemeClr val="lt1"/>
+          </a:fillRef>
+          <a:effectRef idx="0">
+            <a:schemeClr val="dk1"/>
+          </a:effectRef>
+          <a:fontRef idx="minor">
+            <a:schemeClr val="dk1"/>
+          </a:fontRef>
+        </p:style>
+        <p:txBody>
+          <a:bodyPr rtlCol="0" anchor="ctr"/>
+          <a:lstStyle/>
+          <a:p>
+            <a:pPr algn="ctr"/>
+            <a:endParaRPr lang="es-PE"/>
+          </a:p>
+        </p:txBody>
+      </p:sp>
+      <p:sp>
+        <p:nvSpPr>
+          <p:cNvPr id="5" name="Rectángulo 4">
+            <a:extLst>
+              <a:ext uri="{FF2B5EF4-FFF2-40B4-BE49-F238E27FC236}">
+                <a16:creationId xmlns:a16="http://schemas.microsoft.com/office/drawing/2014/main" id="{FB0592F0-31E3-4A12-9D00-8202A4B8AF40}"/>
+              </a:ext>
+            </a:extLst>
+          </p:cNvPr>
+          <p:cNvSpPr/>
+          <p:nvPr/>
+        </p:nvSpPr>
+        <p:spPr>
+          <a:xfrm>
+            <a:off x="182880" y="1417320"/>
+            <a:ext cx="11695176" cy="3968496"/>
+          </a:xfrm>
+          <a:prstGeom prst="rect">
+            <a:avLst/>
+          </a:prstGeom>
+        </p:spPr>
+        <p:style>
+          <a:lnRef idx="2">
+            <a:schemeClr val="dk1"/>
+          </a:lnRef>
+          <a:fillRef idx="1">
+            <a:schemeClr val="lt1"/>
+          </a:fillRef>
+          <a:effectRef idx="0">
+            <a:schemeClr val="dk1"/>
+          </a:effectRef>
+          <a:fontRef idx="minor">
+            <a:schemeClr val="dk1"/>
+          </a:fontRef>
+        </p:style>
+        <p:txBody>
+          <a:bodyPr rtlCol="0" anchor="ctr"/>
+          <a:lstStyle/>
+          <a:p>
+            <a:pPr algn="ctr"/>
+            <a:endParaRPr lang="es-PE"/>
+          </a:p>
+        </p:txBody>
+      </p:sp>
+      <p:sp>
+        <p:nvSpPr>
+          <p:cNvPr id="6" name="Rectángulo 5">
+            <a:extLst>
+              <a:ext uri="{FF2B5EF4-FFF2-40B4-BE49-F238E27FC236}">
+                <a16:creationId xmlns:a16="http://schemas.microsoft.com/office/drawing/2014/main" id="{15921A5A-FAF3-418A-99AE-B7FC9DD7959F}"/>
+              </a:ext>
+            </a:extLst>
+          </p:cNvPr>
+          <p:cNvSpPr/>
+          <p:nvPr/>
+        </p:nvSpPr>
+        <p:spPr>
+          <a:xfrm>
+            <a:off x="182880" y="5495544"/>
+            <a:ext cx="11695176" cy="1179576"/>
+          </a:xfrm>
+          <a:prstGeom prst="rect">
+            <a:avLst/>
+          </a:prstGeom>
+        </p:spPr>
+        <p:style>
+          <a:lnRef idx="2">
+            <a:schemeClr val="dk1"/>
+          </a:lnRef>
+          <a:fillRef idx="1">
+            <a:schemeClr val="lt1"/>
+          </a:fillRef>
+          <a:effectRef idx="0">
+            <a:schemeClr val="dk1"/>
+          </a:effectRef>
+          <a:fontRef idx="minor">
+            <a:schemeClr val="dk1"/>
+          </a:fontRef>
+        </p:style>
+        <p:txBody>
+          <a:bodyPr rtlCol="0" anchor="ctr"/>
+          <a:lstStyle/>
+          <a:p>
+            <a:pPr algn="ctr"/>
+            <a:endParaRPr lang="es-PE"/>
+          </a:p>
+        </p:txBody>
+      </p:sp>
+      <p:sp>
+        <p:nvSpPr>
+          <p:cNvPr id="7" name="Rectángulo 6">
+            <a:extLst>
+              <a:ext uri="{FF2B5EF4-FFF2-40B4-BE49-F238E27FC236}">
+                <a16:creationId xmlns:a16="http://schemas.microsoft.com/office/drawing/2014/main" id="{9A05CB20-1A4C-44A9-BCFA-BACA053BB6D0}"/>
+              </a:ext>
+            </a:extLst>
+          </p:cNvPr>
+          <p:cNvSpPr/>
+          <p:nvPr/>
+        </p:nvSpPr>
+        <p:spPr>
+          <a:xfrm>
+            <a:off x="310896" y="292608"/>
+            <a:ext cx="2816352" cy="905256"/>
+          </a:xfrm>
+          <a:prstGeom prst="rect">
+            <a:avLst/>
+          </a:prstGeom>
+        </p:spPr>
+        <p:style>
+          <a:lnRef idx="2">
+            <a:schemeClr val="dk1"/>
+          </a:lnRef>
+          <a:fillRef idx="1">
+            <a:schemeClr val="lt1"/>
+          </a:fillRef>
+          <a:effectRef idx="0">
+            <a:schemeClr val="dk1"/>
+          </a:effectRef>
+          <a:fontRef idx="minor">
+            <a:schemeClr val="dk1"/>
+          </a:fontRef>
+        </p:style>
+        <p:txBody>
+          <a:bodyPr rtlCol="0" anchor="ctr"/>
+          <a:lstStyle/>
+          <a:p>
+            <a:pPr algn="ctr"/>
+            <a:r>
+              <a:rPr lang="es-PE" dirty="0"/>
+              <a:t>Logo </a:t>
+            </a:r>
+            <a:r>
+              <a:rPr lang="es-PE" dirty="0" err="1"/>
+              <a:t>Crypto</a:t>
+            </a:r>
+            <a:r>
+              <a:rPr lang="es-PE" dirty="0"/>
+              <a:t>-nita</a:t>
+            </a:r>
+          </a:p>
+        </p:txBody>
+      </p:sp>
+      <p:sp>
+        <p:nvSpPr>
+          <p:cNvPr id="9" name="Rectángulo 8">
+            <a:extLst>
+              <a:ext uri="{FF2B5EF4-FFF2-40B4-BE49-F238E27FC236}">
+                <a16:creationId xmlns:a16="http://schemas.microsoft.com/office/drawing/2014/main" id="{9059C4E3-239F-4824-8C5A-1858ACB1C26E}"/>
+              </a:ext>
+            </a:extLst>
+          </p:cNvPr>
+          <p:cNvSpPr/>
+          <p:nvPr/>
+        </p:nvSpPr>
+        <p:spPr>
+          <a:xfrm>
+            <a:off x="310896" y="5614416"/>
+            <a:ext cx="2450592" cy="950976"/>
+          </a:xfrm>
+          <a:prstGeom prst="rect">
+            <a:avLst/>
+          </a:prstGeom>
+        </p:spPr>
+        <p:style>
+          <a:lnRef idx="2">
+            <a:schemeClr val="dk1"/>
+          </a:lnRef>
+          <a:fillRef idx="1">
+            <a:schemeClr val="lt1"/>
+          </a:fillRef>
+          <a:effectRef idx="0">
+            <a:schemeClr val="dk1"/>
+          </a:effectRef>
+          <a:fontRef idx="minor">
+            <a:schemeClr val="dk1"/>
+          </a:fontRef>
+        </p:style>
+        <p:txBody>
+          <a:bodyPr rtlCol="0" anchor="ctr"/>
+          <a:lstStyle/>
+          <a:p>
+            <a:pPr algn="ctr"/>
+            <a:r>
+              <a:rPr lang="es-MX" dirty="0"/>
+              <a:t>Nombre/Logo del Grupo</a:t>
+            </a:r>
+            <a:endParaRPr lang="es-PE" dirty="0"/>
+          </a:p>
+        </p:txBody>
+      </p:sp>
+      <p:sp>
+        <p:nvSpPr>
+          <p:cNvPr id="10" name="Rectángulo 9">
+            <a:extLst>
+              <a:ext uri="{FF2B5EF4-FFF2-40B4-BE49-F238E27FC236}">
+                <a16:creationId xmlns:a16="http://schemas.microsoft.com/office/drawing/2014/main" id="{CE6F6AAA-080D-4FC6-88FA-3EBC4C0CD8F6}"/>
+              </a:ext>
+            </a:extLst>
+          </p:cNvPr>
+          <p:cNvSpPr/>
+          <p:nvPr/>
+        </p:nvSpPr>
+        <p:spPr>
+          <a:xfrm>
+            <a:off x="10049256" y="5614416"/>
+            <a:ext cx="1627632" cy="950976"/>
+          </a:xfrm>
+          <a:prstGeom prst="rect">
+            <a:avLst/>
+          </a:prstGeom>
+        </p:spPr>
+        <p:style>
+          <a:lnRef idx="2">
+            <a:schemeClr val="dk1"/>
+          </a:lnRef>
+          <a:fillRef idx="1">
+            <a:schemeClr val="lt1"/>
+          </a:fillRef>
+          <a:effectRef idx="0">
+            <a:schemeClr val="dk1"/>
+          </a:effectRef>
+          <a:fontRef idx="minor">
+            <a:schemeClr val="dk1"/>
+          </a:fontRef>
+        </p:style>
+        <p:txBody>
+          <a:bodyPr rtlCol="0" anchor="ctr"/>
+          <a:lstStyle/>
+          <a:p>
+            <a:pPr algn="ctr"/>
+            <a:r>
+              <a:rPr lang="es-MX" sz="1100" dirty="0"/>
+              <a:t>Integrantes</a:t>
+            </a:r>
+            <a:endParaRPr lang="es-PE" sz="1100" dirty="0"/>
+          </a:p>
+        </p:txBody>
+      </p:sp>
+      <p:sp>
+        <p:nvSpPr>
+          <p:cNvPr id="11" name="Rectángulo 10">
+            <a:extLst>
+              <a:ext uri="{FF2B5EF4-FFF2-40B4-BE49-F238E27FC236}">
+                <a16:creationId xmlns:a16="http://schemas.microsoft.com/office/drawing/2014/main" id="{2D34766E-3CC0-47DF-87DC-62FB893F3931}"/>
+              </a:ext>
+            </a:extLst>
+          </p:cNvPr>
+          <p:cNvSpPr/>
+          <p:nvPr/>
+        </p:nvSpPr>
+        <p:spPr>
+          <a:xfrm>
+            <a:off x="5506974" y="5925312"/>
+            <a:ext cx="3790188" cy="320040"/>
+          </a:xfrm>
+          <a:prstGeom prst="rect">
+            <a:avLst/>
+          </a:prstGeom>
+        </p:spPr>
+        <p:style>
+          <a:lnRef idx="2">
+            <a:schemeClr val="dk1"/>
+          </a:lnRef>
+          <a:fillRef idx="1">
+            <a:schemeClr val="lt1"/>
+          </a:fillRef>
+          <a:effectRef idx="0">
+            <a:schemeClr val="dk1"/>
+          </a:effectRef>
+          <a:fontRef idx="minor">
+            <a:schemeClr val="dk1"/>
+          </a:fontRef>
+        </p:style>
+        <p:txBody>
+          <a:bodyPr rtlCol="0" anchor="ctr"/>
+          <a:lstStyle/>
+          <a:p>
+            <a:pPr algn="ctr"/>
+            <a:r>
+              <a:rPr lang="es-PE" sz="1100" dirty="0"/>
+              <a:t>2022 - Nombre® - Todos los derechos reservados</a:t>
+            </a:r>
+          </a:p>
+        </p:txBody>
+      </p:sp>
+      <p:sp>
+        <p:nvSpPr>
+          <p:cNvPr id="12" name="Rectángulo 11">
+            <a:extLst>
+              <a:ext uri="{FF2B5EF4-FFF2-40B4-BE49-F238E27FC236}">
+                <a16:creationId xmlns:a16="http://schemas.microsoft.com/office/drawing/2014/main" id="{5E86E855-05F8-45D1-998F-FD3B01DB39A2}"/>
+              </a:ext>
+            </a:extLst>
+          </p:cNvPr>
+          <p:cNvSpPr/>
+          <p:nvPr/>
+        </p:nvSpPr>
+        <p:spPr>
+          <a:xfrm>
+            <a:off x="2889504" y="5614416"/>
+            <a:ext cx="1865376" cy="420624"/>
+          </a:xfrm>
+          <a:prstGeom prst="rect">
+            <a:avLst/>
+          </a:prstGeom>
+        </p:spPr>
+        <p:style>
+          <a:lnRef idx="2">
+            <a:schemeClr val="dk1"/>
+          </a:lnRef>
+          <a:fillRef idx="1">
+            <a:schemeClr val="lt1"/>
+          </a:fillRef>
+          <a:effectRef idx="0">
+            <a:schemeClr val="dk1"/>
+          </a:effectRef>
+          <a:fontRef idx="minor">
+            <a:schemeClr val="dk1"/>
+          </a:fontRef>
+        </p:style>
+        <p:txBody>
+          <a:bodyPr rtlCol="0" anchor="ctr"/>
+          <a:lstStyle/>
+          <a:p>
+            <a:pPr algn="ctr"/>
+            <a:r>
+              <a:rPr lang="es-PE" sz="1100" dirty="0"/>
+              <a:t>Nosotros</a:t>
+            </a:r>
+          </a:p>
+        </p:txBody>
+      </p:sp>
+      <p:sp>
+        <p:nvSpPr>
+          <p:cNvPr id="13" name="Rectángulo 12">
+            <a:extLst>
+              <a:ext uri="{FF2B5EF4-FFF2-40B4-BE49-F238E27FC236}">
+                <a16:creationId xmlns:a16="http://schemas.microsoft.com/office/drawing/2014/main" id="{BAE1FAEE-ABB3-4846-BC1C-59A39C7AD0AB}"/>
+              </a:ext>
+            </a:extLst>
+          </p:cNvPr>
+          <p:cNvSpPr/>
+          <p:nvPr/>
+        </p:nvSpPr>
+        <p:spPr>
+          <a:xfrm>
+            <a:off x="2889504" y="6144768"/>
+            <a:ext cx="1865376" cy="425196"/>
+          </a:xfrm>
+          <a:prstGeom prst="rect">
+            <a:avLst/>
+          </a:prstGeom>
+        </p:spPr>
+        <p:style>
+          <a:lnRef idx="2">
+            <a:schemeClr val="dk1"/>
+          </a:lnRef>
+          <a:fillRef idx="1">
+            <a:schemeClr val="lt1"/>
+          </a:fillRef>
+          <a:effectRef idx="0">
+            <a:schemeClr val="dk1"/>
+          </a:effectRef>
+          <a:fontRef idx="minor">
+            <a:schemeClr val="dk1"/>
+          </a:fontRef>
+        </p:style>
+        <p:txBody>
+          <a:bodyPr rtlCol="0" anchor="ctr"/>
+          <a:lstStyle/>
+          <a:p>
+            <a:pPr algn="ctr"/>
+            <a:r>
+              <a:rPr lang="es-PE" sz="1100" dirty="0"/>
+              <a:t>Términos y Condiciones</a:t>
+            </a:r>
+          </a:p>
+        </p:txBody>
+      </p:sp>
+      <p:pic>
+        <p:nvPicPr>
+          <p:cNvPr id="3" name="Imagen 2">
+            <a:extLst>
+              <a:ext uri="{FF2B5EF4-FFF2-40B4-BE49-F238E27FC236}">
+                <a16:creationId xmlns:a16="http://schemas.microsoft.com/office/drawing/2014/main" id="{33494994-51F7-4204-A1F4-A51DBA9BAC9B}"/>
+              </a:ext>
+            </a:extLst>
+          </p:cNvPr>
+          <p:cNvPicPr>
+            <a:picLocks noChangeAspect="1"/>
+          </p:cNvPicPr>
+          <p:nvPr/>
+        </p:nvPicPr>
+        <p:blipFill>
+          <a:blip r:embed="rId2"/>
+          <a:stretch>
+            <a:fillRect/>
+          </a:stretch>
+        </p:blipFill>
+        <p:spPr>
+          <a:xfrm>
+            <a:off x="4812040" y="1511736"/>
+            <a:ext cx="2567919" cy="3834527"/>
+          </a:xfrm>
+          <a:prstGeom prst="rect">
+            <a:avLst/>
+          </a:prstGeom>
+        </p:spPr>
+      </p:pic>
+    </p:spTree>
+    <p:extLst>
+      <p:ext uri="{BB962C8B-B14F-4D97-AF65-F5344CB8AC3E}">
+        <p14:creationId xmlns:p14="http://schemas.microsoft.com/office/powerpoint/2010/main" val="676663334"/>
       </p:ext>
     </p:extLst>
   </p:cSld>

</xml_diff>

<commit_message>
Se ha agregado Sketches faltantes
Historias 9,10,11,12,17,18
</commit_message>
<xml_diff>
--- a/Sketches/FirstSketch.pptx
+++ b/Sketches/FirstSketch.pptx
@@ -5,7 +5,7 @@
     <p:sldMasterId id="2147483648" r:id="rId1"/>
   </p:sldMasterIdLst>
   <p:notesMasterIdLst>
-    <p:notesMasterId r:id="rId28"/>
+    <p:notesMasterId r:id="rId34"/>
   </p:notesMasterIdLst>
   <p:sldIdLst>
     <p:sldId id="256" r:id="rId2"/>
@@ -34,6 +34,12 @@
     <p:sldId id="272" r:id="rId25"/>
     <p:sldId id="273" r:id="rId26"/>
     <p:sldId id="278" r:id="rId27"/>
+    <p:sldId id="286" r:id="rId28"/>
+    <p:sldId id="287" r:id="rId29"/>
+    <p:sldId id="290" r:id="rId30"/>
+    <p:sldId id="289" r:id="rId31"/>
+    <p:sldId id="285" r:id="rId32"/>
+    <p:sldId id="288" r:id="rId33"/>
   </p:sldIdLst>
   <p:sldSz cx="12192000" cy="6858000"/>
   <p:notesSz cx="6858000" cy="9144000"/>
@@ -193,7 +199,14 @@
           </p14:sldIdLst>
         </p14:section>
         <p14:section name="Historial" id="{A14A4C41-277E-4280-BE8E-99581EE611B9}">
-          <p14:sldIdLst/>
+          <p14:sldIdLst>
+            <p14:sldId id="286"/>
+            <p14:sldId id="287"/>
+            <p14:sldId id="290"/>
+            <p14:sldId id="289"/>
+            <p14:sldId id="285"/>
+            <p14:sldId id="288"/>
+          </p14:sldIdLst>
         </p14:section>
       </p14:sectionLst>
     </p:ext>
@@ -20899,6 +20912,1458 @@
 </p:sld>
 </file>
 
+<file path=ppt/slides/slide27.xml><?xml version="1.0" encoding="utf-8"?>
+<p:sld xmlns:a="http://schemas.openxmlformats.org/drawingml/2006/main" xmlns:r="http://schemas.openxmlformats.org/officeDocument/2006/relationships" xmlns:p="http://schemas.openxmlformats.org/presentationml/2006/main">
+  <p:cSld>
+    <p:spTree>
+      <p:nvGrpSpPr>
+        <p:cNvPr id="1" name=""/>
+        <p:cNvGrpSpPr/>
+        <p:nvPr/>
+      </p:nvGrpSpPr>
+      <p:grpSpPr>
+        <a:xfrm>
+          <a:off x="0" y="0"/>
+          <a:ext cx="0" cy="0"/>
+          <a:chOff x="0" y="0"/>
+          <a:chExt cx="0" cy="0"/>
+        </a:xfrm>
+      </p:grpSpPr>
+      <p:sp>
+        <p:nvSpPr>
+          <p:cNvPr id="4" name="Rectángulo 3">
+            <a:extLst>
+              <a:ext uri="{FF2B5EF4-FFF2-40B4-BE49-F238E27FC236}">
+                <a16:creationId xmlns:a16="http://schemas.microsoft.com/office/drawing/2014/main" id="{7D0C1056-F063-4295-9589-100A21F99782}"/>
+              </a:ext>
+            </a:extLst>
+          </p:cNvPr>
+          <p:cNvSpPr/>
+          <p:nvPr/>
+        </p:nvSpPr>
+        <p:spPr>
+          <a:xfrm>
+            <a:off x="182880" y="182880"/>
+            <a:ext cx="11695176" cy="1124712"/>
+          </a:xfrm>
+          <a:prstGeom prst="rect">
+            <a:avLst/>
+          </a:prstGeom>
+        </p:spPr>
+        <p:style>
+          <a:lnRef idx="2">
+            <a:schemeClr val="dk1"/>
+          </a:lnRef>
+          <a:fillRef idx="1">
+            <a:schemeClr val="lt1"/>
+          </a:fillRef>
+          <a:effectRef idx="0">
+            <a:schemeClr val="dk1"/>
+          </a:effectRef>
+          <a:fontRef idx="minor">
+            <a:schemeClr val="dk1"/>
+          </a:fontRef>
+        </p:style>
+        <p:txBody>
+          <a:bodyPr rtlCol="0" anchor="ctr"/>
+          <a:lstStyle/>
+          <a:p>
+            <a:pPr algn="ctr"/>
+            <a:endParaRPr lang="es-PE"/>
+          </a:p>
+        </p:txBody>
+      </p:sp>
+      <p:sp>
+        <p:nvSpPr>
+          <p:cNvPr id="5" name="Rectángulo 4">
+            <a:extLst>
+              <a:ext uri="{FF2B5EF4-FFF2-40B4-BE49-F238E27FC236}">
+                <a16:creationId xmlns:a16="http://schemas.microsoft.com/office/drawing/2014/main" id="{FB0592F0-31E3-4A12-9D00-8202A4B8AF40}"/>
+              </a:ext>
+            </a:extLst>
+          </p:cNvPr>
+          <p:cNvSpPr/>
+          <p:nvPr/>
+        </p:nvSpPr>
+        <p:spPr>
+          <a:xfrm>
+            <a:off x="182880" y="1417320"/>
+            <a:ext cx="11695176" cy="3968496"/>
+          </a:xfrm>
+          <a:prstGeom prst="rect">
+            <a:avLst/>
+          </a:prstGeom>
+        </p:spPr>
+        <p:style>
+          <a:lnRef idx="2">
+            <a:schemeClr val="dk1"/>
+          </a:lnRef>
+          <a:fillRef idx="1">
+            <a:schemeClr val="lt1"/>
+          </a:fillRef>
+          <a:effectRef idx="0">
+            <a:schemeClr val="dk1"/>
+          </a:effectRef>
+          <a:fontRef idx="minor">
+            <a:schemeClr val="dk1"/>
+          </a:fontRef>
+        </p:style>
+        <p:txBody>
+          <a:bodyPr rtlCol="0" anchor="ctr"/>
+          <a:lstStyle/>
+          <a:p>
+            <a:pPr algn="ctr"/>
+            <a:endParaRPr lang="es-PE"/>
+          </a:p>
+        </p:txBody>
+      </p:sp>
+      <p:sp>
+        <p:nvSpPr>
+          <p:cNvPr id="6" name="Rectángulo 5">
+            <a:extLst>
+              <a:ext uri="{FF2B5EF4-FFF2-40B4-BE49-F238E27FC236}">
+                <a16:creationId xmlns:a16="http://schemas.microsoft.com/office/drawing/2014/main" id="{15921A5A-FAF3-418A-99AE-B7FC9DD7959F}"/>
+              </a:ext>
+            </a:extLst>
+          </p:cNvPr>
+          <p:cNvSpPr/>
+          <p:nvPr/>
+        </p:nvSpPr>
+        <p:spPr>
+          <a:xfrm>
+            <a:off x="182880" y="5495544"/>
+            <a:ext cx="11695176" cy="1179576"/>
+          </a:xfrm>
+          <a:prstGeom prst="rect">
+            <a:avLst/>
+          </a:prstGeom>
+        </p:spPr>
+        <p:style>
+          <a:lnRef idx="2">
+            <a:schemeClr val="dk1"/>
+          </a:lnRef>
+          <a:fillRef idx="1">
+            <a:schemeClr val="lt1"/>
+          </a:fillRef>
+          <a:effectRef idx="0">
+            <a:schemeClr val="dk1"/>
+          </a:effectRef>
+          <a:fontRef idx="minor">
+            <a:schemeClr val="dk1"/>
+          </a:fontRef>
+        </p:style>
+        <p:txBody>
+          <a:bodyPr rtlCol="0" anchor="ctr"/>
+          <a:lstStyle/>
+          <a:p>
+            <a:pPr algn="ctr"/>
+            <a:endParaRPr lang="es-PE"/>
+          </a:p>
+        </p:txBody>
+      </p:sp>
+      <p:sp>
+        <p:nvSpPr>
+          <p:cNvPr id="7" name="Rectángulo 6">
+            <a:extLst>
+              <a:ext uri="{FF2B5EF4-FFF2-40B4-BE49-F238E27FC236}">
+                <a16:creationId xmlns:a16="http://schemas.microsoft.com/office/drawing/2014/main" id="{9A05CB20-1A4C-44A9-BCFA-BACA053BB6D0}"/>
+              </a:ext>
+            </a:extLst>
+          </p:cNvPr>
+          <p:cNvSpPr/>
+          <p:nvPr/>
+        </p:nvSpPr>
+        <p:spPr>
+          <a:xfrm>
+            <a:off x="310896" y="292608"/>
+            <a:ext cx="2816352" cy="905256"/>
+          </a:xfrm>
+          <a:prstGeom prst="rect">
+            <a:avLst/>
+          </a:prstGeom>
+        </p:spPr>
+        <p:style>
+          <a:lnRef idx="2">
+            <a:schemeClr val="dk1"/>
+          </a:lnRef>
+          <a:fillRef idx="1">
+            <a:schemeClr val="lt1"/>
+          </a:fillRef>
+          <a:effectRef idx="0">
+            <a:schemeClr val="dk1"/>
+          </a:effectRef>
+          <a:fontRef idx="minor">
+            <a:schemeClr val="dk1"/>
+          </a:fontRef>
+        </p:style>
+        <p:txBody>
+          <a:bodyPr rtlCol="0" anchor="ctr"/>
+          <a:lstStyle/>
+          <a:p>
+            <a:pPr algn="ctr"/>
+            <a:r>
+              <a:rPr lang="es-PE" dirty="0"/>
+              <a:t>Logo </a:t>
+            </a:r>
+            <a:r>
+              <a:rPr lang="es-PE" dirty="0" err="1"/>
+              <a:t>Crypto</a:t>
+            </a:r>
+            <a:r>
+              <a:rPr lang="es-PE" dirty="0"/>
+              <a:t>-nita</a:t>
+            </a:r>
+          </a:p>
+        </p:txBody>
+      </p:sp>
+      <p:sp>
+        <p:nvSpPr>
+          <p:cNvPr id="9" name="Rectángulo 8">
+            <a:extLst>
+              <a:ext uri="{FF2B5EF4-FFF2-40B4-BE49-F238E27FC236}">
+                <a16:creationId xmlns:a16="http://schemas.microsoft.com/office/drawing/2014/main" id="{9059C4E3-239F-4824-8C5A-1858ACB1C26E}"/>
+              </a:ext>
+            </a:extLst>
+          </p:cNvPr>
+          <p:cNvSpPr/>
+          <p:nvPr/>
+        </p:nvSpPr>
+        <p:spPr>
+          <a:xfrm>
+            <a:off x="310896" y="5614416"/>
+            <a:ext cx="2450592" cy="950976"/>
+          </a:xfrm>
+          <a:prstGeom prst="rect">
+            <a:avLst/>
+          </a:prstGeom>
+        </p:spPr>
+        <p:style>
+          <a:lnRef idx="2">
+            <a:schemeClr val="dk1"/>
+          </a:lnRef>
+          <a:fillRef idx="1">
+            <a:schemeClr val="lt1"/>
+          </a:fillRef>
+          <a:effectRef idx="0">
+            <a:schemeClr val="dk1"/>
+          </a:effectRef>
+          <a:fontRef idx="minor">
+            <a:schemeClr val="dk1"/>
+          </a:fontRef>
+        </p:style>
+        <p:txBody>
+          <a:bodyPr rtlCol="0" anchor="ctr"/>
+          <a:lstStyle/>
+          <a:p>
+            <a:pPr algn="ctr"/>
+            <a:r>
+              <a:rPr lang="es-MX" dirty="0"/>
+              <a:t>Nombre/Logo del Grupo</a:t>
+            </a:r>
+            <a:endParaRPr lang="es-PE" dirty="0"/>
+          </a:p>
+        </p:txBody>
+      </p:sp>
+      <p:sp>
+        <p:nvSpPr>
+          <p:cNvPr id="10" name="Rectángulo 9">
+            <a:extLst>
+              <a:ext uri="{FF2B5EF4-FFF2-40B4-BE49-F238E27FC236}">
+                <a16:creationId xmlns:a16="http://schemas.microsoft.com/office/drawing/2014/main" id="{CE6F6AAA-080D-4FC6-88FA-3EBC4C0CD8F6}"/>
+              </a:ext>
+            </a:extLst>
+          </p:cNvPr>
+          <p:cNvSpPr/>
+          <p:nvPr/>
+        </p:nvSpPr>
+        <p:spPr>
+          <a:xfrm>
+            <a:off x="10049256" y="5614416"/>
+            <a:ext cx="1627632" cy="950976"/>
+          </a:xfrm>
+          <a:prstGeom prst="rect">
+            <a:avLst/>
+          </a:prstGeom>
+        </p:spPr>
+        <p:style>
+          <a:lnRef idx="2">
+            <a:schemeClr val="dk1"/>
+          </a:lnRef>
+          <a:fillRef idx="1">
+            <a:schemeClr val="lt1"/>
+          </a:fillRef>
+          <a:effectRef idx="0">
+            <a:schemeClr val="dk1"/>
+          </a:effectRef>
+          <a:fontRef idx="minor">
+            <a:schemeClr val="dk1"/>
+          </a:fontRef>
+        </p:style>
+        <p:txBody>
+          <a:bodyPr rtlCol="0" anchor="ctr"/>
+          <a:lstStyle/>
+          <a:p>
+            <a:pPr algn="ctr"/>
+            <a:r>
+              <a:rPr lang="es-MX" sz="1100" dirty="0"/>
+              <a:t>Integrantes</a:t>
+            </a:r>
+            <a:endParaRPr lang="es-PE" sz="1100" dirty="0"/>
+          </a:p>
+        </p:txBody>
+      </p:sp>
+      <p:sp>
+        <p:nvSpPr>
+          <p:cNvPr id="11" name="Rectángulo 10">
+            <a:extLst>
+              <a:ext uri="{FF2B5EF4-FFF2-40B4-BE49-F238E27FC236}">
+                <a16:creationId xmlns:a16="http://schemas.microsoft.com/office/drawing/2014/main" id="{2D34766E-3CC0-47DF-87DC-62FB893F3931}"/>
+              </a:ext>
+            </a:extLst>
+          </p:cNvPr>
+          <p:cNvSpPr/>
+          <p:nvPr/>
+        </p:nvSpPr>
+        <p:spPr>
+          <a:xfrm>
+            <a:off x="5506974" y="5925312"/>
+            <a:ext cx="3790188" cy="320040"/>
+          </a:xfrm>
+          <a:prstGeom prst="rect">
+            <a:avLst/>
+          </a:prstGeom>
+        </p:spPr>
+        <p:style>
+          <a:lnRef idx="2">
+            <a:schemeClr val="dk1"/>
+          </a:lnRef>
+          <a:fillRef idx="1">
+            <a:schemeClr val="lt1"/>
+          </a:fillRef>
+          <a:effectRef idx="0">
+            <a:schemeClr val="dk1"/>
+          </a:effectRef>
+          <a:fontRef idx="minor">
+            <a:schemeClr val="dk1"/>
+          </a:fontRef>
+        </p:style>
+        <p:txBody>
+          <a:bodyPr rtlCol="0" anchor="ctr"/>
+          <a:lstStyle/>
+          <a:p>
+            <a:pPr algn="ctr"/>
+            <a:r>
+              <a:rPr lang="es-PE" sz="1100" dirty="0"/>
+              <a:t>2022 - Nombre® - Todos los derechos reservados</a:t>
+            </a:r>
+          </a:p>
+        </p:txBody>
+      </p:sp>
+      <p:sp>
+        <p:nvSpPr>
+          <p:cNvPr id="12" name="Rectángulo 11">
+            <a:extLst>
+              <a:ext uri="{FF2B5EF4-FFF2-40B4-BE49-F238E27FC236}">
+                <a16:creationId xmlns:a16="http://schemas.microsoft.com/office/drawing/2014/main" id="{5E86E855-05F8-45D1-998F-FD3B01DB39A2}"/>
+              </a:ext>
+            </a:extLst>
+          </p:cNvPr>
+          <p:cNvSpPr/>
+          <p:nvPr/>
+        </p:nvSpPr>
+        <p:spPr>
+          <a:xfrm>
+            <a:off x="2889504" y="5614416"/>
+            <a:ext cx="1865376" cy="420624"/>
+          </a:xfrm>
+          <a:prstGeom prst="rect">
+            <a:avLst/>
+          </a:prstGeom>
+        </p:spPr>
+        <p:style>
+          <a:lnRef idx="2">
+            <a:schemeClr val="dk1"/>
+          </a:lnRef>
+          <a:fillRef idx="1">
+            <a:schemeClr val="lt1"/>
+          </a:fillRef>
+          <a:effectRef idx="0">
+            <a:schemeClr val="dk1"/>
+          </a:effectRef>
+          <a:fontRef idx="minor">
+            <a:schemeClr val="dk1"/>
+          </a:fontRef>
+        </p:style>
+        <p:txBody>
+          <a:bodyPr rtlCol="0" anchor="ctr"/>
+          <a:lstStyle/>
+          <a:p>
+            <a:pPr algn="ctr"/>
+            <a:r>
+              <a:rPr lang="es-PE" sz="1100" dirty="0"/>
+              <a:t>Nosotros</a:t>
+            </a:r>
+          </a:p>
+        </p:txBody>
+      </p:sp>
+      <p:sp>
+        <p:nvSpPr>
+          <p:cNvPr id="13" name="Rectángulo 12">
+            <a:extLst>
+              <a:ext uri="{FF2B5EF4-FFF2-40B4-BE49-F238E27FC236}">
+                <a16:creationId xmlns:a16="http://schemas.microsoft.com/office/drawing/2014/main" id="{BAE1FAEE-ABB3-4846-BC1C-59A39C7AD0AB}"/>
+              </a:ext>
+            </a:extLst>
+          </p:cNvPr>
+          <p:cNvSpPr/>
+          <p:nvPr/>
+        </p:nvSpPr>
+        <p:spPr>
+          <a:xfrm>
+            <a:off x="2889504" y="6144768"/>
+            <a:ext cx="1865376" cy="425196"/>
+          </a:xfrm>
+          <a:prstGeom prst="rect">
+            <a:avLst/>
+          </a:prstGeom>
+        </p:spPr>
+        <p:style>
+          <a:lnRef idx="2">
+            <a:schemeClr val="dk1"/>
+          </a:lnRef>
+          <a:fillRef idx="1">
+            <a:schemeClr val="lt1"/>
+          </a:fillRef>
+          <a:effectRef idx="0">
+            <a:schemeClr val="dk1"/>
+          </a:effectRef>
+          <a:fontRef idx="minor">
+            <a:schemeClr val="dk1"/>
+          </a:fontRef>
+        </p:style>
+        <p:txBody>
+          <a:bodyPr rtlCol="0" anchor="ctr"/>
+          <a:lstStyle/>
+          <a:p>
+            <a:pPr algn="ctr"/>
+            <a:r>
+              <a:rPr lang="es-PE" sz="1100" dirty="0"/>
+              <a:t>Términos y Condiciones</a:t>
+            </a:r>
+          </a:p>
+        </p:txBody>
+      </p:sp>
+      <p:pic>
+        <p:nvPicPr>
+          <p:cNvPr id="3" name="Imagen 2">
+            <a:extLst>
+              <a:ext uri="{FF2B5EF4-FFF2-40B4-BE49-F238E27FC236}">
+                <a16:creationId xmlns:a16="http://schemas.microsoft.com/office/drawing/2014/main" id="{F7A6ADA6-4FE3-41F2-BAE4-945A6BD16B01}"/>
+              </a:ext>
+            </a:extLst>
+          </p:cNvPr>
+          <p:cNvPicPr>
+            <a:picLocks noChangeAspect="1"/>
+          </p:cNvPicPr>
+          <p:nvPr/>
+        </p:nvPicPr>
+        <p:blipFill>
+          <a:blip r:embed="rId2"/>
+          <a:stretch>
+            <a:fillRect/>
+          </a:stretch>
+        </p:blipFill>
+        <p:spPr>
+          <a:xfrm>
+            <a:off x="3409223" y="1629139"/>
+            <a:ext cx="5242490" cy="3651521"/>
+          </a:xfrm>
+          <a:prstGeom prst="rect">
+            <a:avLst/>
+          </a:prstGeom>
+        </p:spPr>
+      </p:pic>
+    </p:spTree>
+    <p:extLst>
+      <p:ext uri="{BB962C8B-B14F-4D97-AF65-F5344CB8AC3E}">
+        <p14:creationId xmlns:p14="http://schemas.microsoft.com/office/powerpoint/2010/main" val="4284291738"/>
+      </p:ext>
+    </p:extLst>
+  </p:cSld>
+  <p:clrMapOvr>
+    <a:masterClrMapping/>
+  </p:clrMapOvr>
+</p:sld>
+</file>
+
+<file path=ppt/slides/slide28.xml><?xml version="1.0" encoding="utf-8"?>
+<p:sld xmlns:a="http://schemas.openxmlformats.org/drawingml/2006/main" xmlns:r="http://schemas.openxmlformats.org/officeDocument/2006/relationships" xmlns:p="http://schemas.openxmlformats.org/presentationml/2006/main">
+  <p:cSld>
+    <p:spTree>
+      <p:nvGrpSpPr>
+        <p:cNvPr id="1" name=""/>
+        <p:cNvGrpSpPr/>
+        <p:nvPr/>
+      </p:nvGrpSpPr>
+      <p:grpSpPr>
+        <a:xfrm>
+          <a:off x="0" y="0"/>
+          <a:ext cx="0" cy="0"/>
+          <a:chOff x="0" y="0"/>
+          <a:chExt cx="0" cy="0"/>
+        </a:xfrm>
+      </p:grpSpPr>
+      <p:sp>
+        <p:nvSpPr>
+          <p:cNvPr id="4" name="Rectángulo 3">
+            <a:extLst>
+              <a:ext uri="{FF2B5EF4-FFF2-40B4-BE49-F238E27FC236}">
+                <a16:creationId xmlns:a16="http://schemas.microsoft.com/office/drawing/2014/main" id="{7D0C1056-F063-4295-9589-100A21F99782}"/>
+              </a:ext>
+            </a:extLst>
+          </p:cNvPr>
+          <p:cNvSpPr/>
+          <p:nvPr/>
+        </p:nvSpPr>
+        <p:spPr>
+          <a:xfrm>
+            <a:off x="182880" y="182880"/>
+            <a:ext cx="11695176" cy="1124712"/>
+          </a:xfrm>
+          <a:prstGeom prst="rect">
+            <a:avLst/>
+          </a:prstGeom>
+        </p:spPr>
+        <p:style>
+          <a:lnRef idx="2">
+            <a:schemeClr val="dk1"/>
+          </a:lnRef>
+          <a:fillRef idx="1">
+            <a:schemeClr val="lt1"/>
+          </a:fillRef>
+          <a:effectRef idx="0">
+            <a:schemeClr val="dk1"/>
+          </a:effectRef>
+          <a:fontRef idx="minor">
+            <a:schemeClr val="dk1"/>
+          </a:fontRef>
+        </p:style>
+        <p:txBody>
+          <a:bodyPr rtlCol="0" anchor="ctr"/>
+          <a:lstStyle/>
+          <a:p>
+            <a:pPr algn="ctr"/>
+            <a:endParaRPr lang="es-PE"/>
+          </a:p>
+        </p:txBody>
+      </p:sp>
+      <p:sp>
+        <p:nvSpPr>
+          <p:cNvPr id="5" name="Rectángulo 4">
+            <a:extLst>
+              <a:ext uri="{FF2B5EF4-FFF2-40B4-BE49-F238E27FC236}">
+                <a16:creationId xmlns:a16="http://schemas.microsoft.com/office/drawing/2014/main" id="{FB0592F0-31E3-4A12-9D00-8202A4B8AF40}"/>
+              </a:ext>
+            </a:extLst>
+          </p:cNvPr>
+          <p:cNvSpPr/>
+          <p:nvPr/>
+        </p:nvSpPr>
+        <p:spPr>
+          <a:xfrm>
+            <a:off x="182880" y="1417320"/>
+            <a:ext cx="11695176" cy="3968496"/>
+          </a:xfrm>
+          <a:prstGeom prst="rect">
+            <a:avLst/>
+          </a:prstGeom>
+        </p:spPr>
+        <p:style>
+          <a:lnRef idx="2">
+            <a:schemeClr val="dk1"/>
+          </a:lnRef>
+          <a:fillRef idx="1">
+            <a:schemeClr val="lt1"/>
+          </a:fillRef>
+          <a:effectRef idx="0">
+            <a:schemeClr val="dk1"/>
+          </a:effectRef>
+          <a:fontRef idx="minor">
+            <a:schemeClr val="dk1"/>
+          </a:fontRef>
+        </p:style>
+        <p:txBody>
+          <a:bodyPr rtlCol="0" anchor="ctr"/>
+          <a:lstStyle/>
+          <a:p>
+            <a:pPr algn="ctr"/>
+            <a:endParaRPr lang="es-PE"/>
+          </a:p>
+        </p:txBody>
+      </p:sp>
+      <p:sp>
+        <p:nvSpPr>
+          <p:cNvPr id="6" name="Rectángulo 5">
+            <a:extLst>
+              <a:ext uri="{FF2B5EF4-FFF2-40B4-BE49-F238E27FC236}">
+                <a16:creationId xmlns:a16="http://schemas.microsoft.com/office/drawing/2014/main" id="{15921A5A-FAF3-418A-99AE-B7FC9DD7959F}"/>
+              </a:ext>
+            </a:extLst>
+          </p:cNvPr>
+          <p:cNvSpPr/>
+          <p:nvPr/>
+        </p:nvSpPr>
+        <p:spPr>
+          <a:xfrm>
+            <a:off x="182880" y="5495544"/>
+            <a:ext cx="11695176" cy="1179576"/>
+          </a:xfrm>
+          <a:prstGeom prst="rect">
+            <a:avLst/>
+          </a:prstGeom>
+        </p:spPr>
+        <p:style>
+          <a:lnRef idx="2">
+            <a:schemeClr val="dk1"/>
+          </a:lnRef>
+          <a:fillRef idx="1">
+            <a:schemeClr val="lt1"/>
+          </a:fillRef>
+          <a:effectRef idx="0">
+            <a:schemeClr val="dk1"/>
+          </a:effectRef>
+          <a:fontRef idx="minor">
+            <a:schemeClr val="dk1"/>
+          </a:fontRef>
+        </p:style>
+        <p:txBody>
+          <a:bodyPr rtlCol="0" anchor="ctr"/>
+          <a:lstStyle/>
+          <a:p>
+            <a:pPr algn="ctr"/>
+            <a:endParaRPr lang="es-PE"/>
+          </a:p>
+        </p:txBody>
+      </p:sp>
+      <p:sp>
+        <p:nvSpPr>
+          <p:cNvPr id="7" name="Rectángulo 6">
+            <a:extLst>
+              <a:ext uri="{FF2B5EF4-FFF2-40B4-BE49-F238E27FC236}">
+                <a16:creationId xmlns:a16="http://schemas.microsoft.com/office/drawing/2014/main" id="{9A05CB20-1A4C-44A9-BCFA-BACA053BB6D0}"/>
+              </a:ext>
+            </a:extLst>
+          </p:cNvPr>
+          <p:cNvSpPr/>
+          <p:nvPr/>
+        </p:nvSpPr>
+        <p:spPr>
+          <a:xfrm>
+            <a:off x="310896" y="292608"/>
+            <a:ext cx="2816352" cy="905256"/>
+          </a:xfrm>
+          <a:prstGeom prst="rect">
+            <a:avLst/>
+          </a:prstGeom>
+        </p:spPr>
+        <p:style>
+          <a:lnRef idx="2">
+            <a:schemeClr val="dk1"/>
+          </a:lnRef>
+          <a:fillRef idx="1">
+            <a:schemeClr val="lt1"/>
+          </a:fillRef>
+          <a:effectRef idx="0">
+            <a:schemeClr val="dk1"/>
+          </a:effectRef>
+          <a:fontRef idx="minor">
+            <a:schemeClr val="dk1"/>
+          </a:fontRef>
+        </p:style>
+        <p:txBody>
+          <a:bodyPr rtlCol="0" anchor="ctr"/>
+          <a:lstStyle/>
+          <a:p>
+            <a:pPr algn="ctr"/>
+            <a:r>
+              <a:rPr lang="es-PE" dirty="0"/>
+              <a:t>Logo </a:t>
+            </a:r>
+            <a:r>
+              <a:rPr lang="es-PE" dirty="0" err="1"/>
+              <a:t>Crypto</a:t>
+            </a:r>
+            <a:r>
+              <a:rPr lang="es-PE" dirty="0"/>
+              <a:t>-nita</a:t>
+            </a:r>
+          </a:p>
+        </p:txBody>
+      </p:sp>
+      <p:sp>
+        <p:nvSpPr>
+          <p:cNvPr id="9" name="Rectángulo 8">
+            <a:extLst>
+              <a:ext uri="{FF2B5EF4-FFF2-40B4-BE49-F238E27FC236}">
+                <a16:creationId xmlns:a16="http://schemas.microsoft.com/office/drawing/2014/main" id="{9059C4E3-239F-4824-8C5A-1858ACB1C26E}"/>
+              </a:ext>
+            </a:extLst>
+          </p:cNvPr>
+          <p:cNvSpPr/>
+          <p:nvPr/>
+        </p:nvSpPr>
+        <p:spPr>
+          <a:xfrm>
+            <a:off x="310896" y="5614416"/>
+            <a:ext cx="2450592" cy="950976"/>
+          </a:xfrm>
+          <a:prstGeom prst="rect">
+            <a:avLst/>
+          </a:prstGeom>
+        </p:spPr>
+        <p:style>
+          <a:lnRef idx="2">
+            <a:schemeClr val="dk1"/>
+          </a:lnRef>
+          <a:fillRef idx="1">
+            <a:schemeClr val="lt1"/>
+          </a:fillRef>
+          <a:effectRef idx="0">
+            <a:schemeClr val="dk1"/>
+          </a:effectRef>
+          <a:fontRef idx="minor">
+            <a:schemeClr val="dk1"/>
+          </a:fontRef>
+        </p:style>
+        <p:txBody>
+          <a:bodyPr rtlCol="0" anchor="ctr"/>
+          <a:lstStyle/>
+          <a:p>
+            <a:pPr algn="ctr"/>
+            <a:r>
+              <a:rPr lang="es-MX" dirty="0"/>
+              <a:t>Nombre/Logo del Grupo</a:t>
+            </a:r>
+            <a:endParaRPr lang="es-PE" dirty="0"/>
+          </a:p>
+        </p:txBody>
+      </p:sp>
+      <p:sp>
+        <p:nvSpPr>
+          <p:cNvPr id="10" name="Rectángulo 9">
+            <a:extLst>
+              <a:ext uri="{FF2B5EF4-FFF2-40B4-BE49-F238E27FC236}">
+                <a16:creationId xmlns:a16="http://schemas.microsoft.com/office/drawing/2014/main" id="{CE6F6AAA-080D-4FC6-88FA-3EBC4C0CD8F6}"/>
+              </a:ext>
+            </a:extLst>
+          </p:cNvPr>
+          <p:cNvSpPr/>
+          <p:nvPr/>
+        </p:nvSpPr>
+        <p:spPr>
+          <a:xfrm>
+            <a:off x="10049256" y="5614416"/>
+            <a:ext cx="1627632" cy="950976"/>
+          </a:xfrm>
+          <a:prstGeom prst="rect">
+            <a:avLst/>
+          </a:prstGeom>
+        </p:spPr>
+        <p:style>
+          <a:lnRef idx="2">
+            <a:schemeClr val="dk1"/>
+          </a:lnRef>
+          <a:fillRef idx="1">
+            <a:schemeClr val="lt1"/>
+          </a:fillRef>
+          <a:effectRef idx="0">
+            <a:schemeClr val="dk1"/>
+          </a:effectRef>
+          <a:fontRef idx="minor">
+            <a:schemeClr val="dk1"/>
+          </a:fontRef>
+        </p:style>
+        <p:txBody>
+          <a:bodyPr rtlCol="0" anchor="ctr"/>
+          <a:lstStyle/>
+          <a:p>
+            <a:pPr algn="ctr"/>
+            <a:r>
+              <a:rPr lang="es-MX" sz="1100" dirty="0"/>
+              <a:t>Integrantes</a:t>
+            </a:r>
+            <a:endParaRPr lang="es-PE" sz="1100" dirty="0"/>
+          </a:p>
+        </p:txBody>
+      </p:sp>
+      <p:sp>
+        <p:nvSpPr>
+          <p:cNvPr id="11" name="Rectángulo 10">
+            <a:extLst>
+              <a:ext uri="{FF2B5EF4-FFF2-40B4-BE49-F238E27FC236}">
+                <a16:creationId xmlns:a16="http://schemas.microsoft.com/office/drawing/2014/main" id="{2D34766E-3CC0-47DF-87DC-62FB893F3931}"/>
+              </a:ext>
+            </a:extLst>
+          </p:cNvPr>
+          <p:cNvSpPr/>
+          <p:nvPr/>
+        </p:nvSpPr>
+        <p:spPr>
+          <a:xfrm>
+            <a:off x="5506974" y="5925312"/>
+            <a:ext cx="3790188" cy="320040"/>
+          </a:xfrm>
+          <a:prstGeom prst="rect">
+            <a:avLst/>
+          </a:prstGeom>
+        </p:spPr>
+        <p:style>
+          <a:lnRef idx="2">
+            <a:schemeClr val="dk1"/>
+          </a:lnRef>
+          <a:fillRef idx="1">
+            <a:schemeClr val="lt1"/>
+          </a:fillRef>
+          <a:effectRef idx="0">
+            <a:schemeClr val="dk1"/>
+          </a:effectRef>
+          <a:fontRef idx="minor">
+            <a:schemeClr val="dk1"/>
+          </a:fontRef>
+        </p:style>
+        <p:txBody>
+          <a:bodyPr rtlCol="0" anchor="ctr"/>
+          <a:lstStyle/>
+          <a:p>
+            <a:pPr algn="ctr"/>
+            <a:r>
+              <a:rPr lang="es-PE" sz="1100" dirty="0"/>
+              <a:t>2022 - Nombre® - Todos los derechos reservados</a:t>
+            </a:r>
+          </a:p>
+        </p:txBody>
+      </p:sp>
+      <p:sp>
+        <p:nvSpPr>
+          <p:cNvPr id="12" name="Rectángulo 11">
+            <a:extLst>
+              <a:ext uri="{FF2B5EF4-FFF2-40B4-BE49-F238E27FC236}">
+                <a16:creationId xmlns:a16="http://schemas.microsoft.com/office/drawing/2014/main" id="{5E86E855-05F8-45D1-998F-FD3B01DB39A2}"/>
+              </a:ext>
+            </a:extLst>
+          </p:cNvPr>
+          <p:cNvSpPr/>
+          <p:nvPr/>
+        </p:nvSpPr>
+        <p:spPr>
+          <a:xfrm>
+            <a:off x="2889504" y="5614416"/>
+            <a:ext cx="1865376" cy="420624"/>
+          </a:xfrm>
+          <a:prstGeom prst="rect">
+            <a:avLst/>
+          </a:prstGeom>
+        </p:spPr>
+        <p:style>
+          <a:lnRef idx="2">
+            <a:schemeClr val="dk1"/>
+          </a:lnRef>
+          <a:fillRef idx="1">
+            <a:schemeClr val="lt1"/>
+          </a:fillRef>
+          <a:effectRef idx="0">
+            <a:schemeClr val="dk1"/>
+          </a:effectRef>
+          <a:fontRef idx="minor">
+            <a:schemeClr val="dk1"/>
+          </a:fontRef>
+        </p:style>
+        <p:txBody>
+          <a:bodyPr rtlCol="0" anchor="ctr"/>
+          <a:lstStyle/>
+          <a:p>
+            <a:pPr algn="ctr"/>
+            <a:r>
+              <a:rPr lang="es-PE" sz="1100" dirty="0"/>
+              <a:t>Nosotros</a:t>
+            </a:r>
+          </a:p>
+        </p:txBody>
+      </p:sp>
+      <p:sp>
+        <p:nvSpPr>
+          <p:cNvPr id="13" name="Rectángulo 12">
+            <a:extLst>
+              <a:ext uri="{FF2B5EF4-FFF2-40B4-BE49-F238E27FC236}">
+                <a16:creationId xmlns:a16="http://schemas.microsoft.com/office/drawing/2014/main" id="{BAE1FAEE-ABB3-4846-BC1C-59A39C7AD0AB}"/>
+              </a:ext>
+            </a:extLst>
+          </p:cNvPr>
+          <p:cNvSpPr/>
+          <p:nvPr/>
+        </p:nvSpPr>
+        <p:spPr>
+          <a:xfrm>
+            <a:off x="2889504" y="6144768"/>
+            <a:ext cx="1865376" cy="425196"/>
+          </a:xfrm>
+          <a:prstGeom prst="rect">
+            <a:avLst/>
+          </a:prstGeom>
+        </p:spPr>
+        <p:style>
+          <a:lnRef idx="2">
+            <a:schemeClr val="dk1"/>
+          </a:lnRef>
+          <a:fillRef idx="1">
+            <a:schemeClr val="lt1"/>
+          </a:fillRef>
+          <a:effectRef idx="0">
+            <a:schemeClr val="dk1"/>
+          </a:effectRef>
+          <a:fontRef idx="minor">
+            <a:schemeClr val="dk1"/>
+          </a:fontRef>
+        </p:style>
+        <p:txBody>
+          <a:bodyPr rtlCol="0" anchor="ctr"/>
+          <a:lstStyle/>
+          <a:p>
+            <a:pPr algn="ctr"/>
+            <a:r>
+              <a:rPr lang="es-PE" sz="1100" dirty="0"/>
+              <a:t>Términos y Condiciones</a:t>
+            </a:r>
+          </a:p>
+        </p:txBody>
+      </p:sp>
+      <p:pic>
+        <p:nvPicPr>
+          <p:cNvPr id="8" name="Imagen 7">
+            <a:extLst>
+              <a:ext uri="{FF2B5EF4-FFF2-40B4-BE49-F238E27FC236}">
+                <a16:creationId xmlns:a16="http://schemas.microsoft.com/office/drawing/2014/main" id="{EC99B31A-3314-493C-B0BE-D3979F7FB2E0}"/>
+              </a:ext>
+            </a:extLst>
+          </p:cNvPr>
+          <p:cNvPicPr>
+            <a:picLocks noChangeAspect="1"/>
+          </p:cNvPicPr>
+          <p:nvPr/>
+        </p:nvPicPr>
+        <p:blipFill>
+          <a:blip r:embed="rId2"/>
+          <a:stretch>
+            <a:fillRect/>
+          </a:stretch>
+        </p:blipFill>
+        <p:spPr>
+          <a:xfrm>
+            <a:off x="3521412" y="1472184"/>
+            <a:ext cx="4277306" cy="3749316"/>
+          </a:xfrm>
+          <a:prstGeom prst="rect">
+            <a:avLst/>
+          </a:prstGeom>
+        </p:spPr>
+      </p:pic>
+    </p:spTree>
+    <p:extLst>
+      <p:ext uri="{BB962C8B-B14F-4D97-AF65-F5344CB8AC3E}">
+        <p14:creationId xmlns:p14="http://schemas.microsoft.com/office/powerpoint/2010/main" val="3217981450"/>
+      </p:ext>
+    </p:extLst>
+  </p:cSld>
+  <p:clrMapOvr>
+    <a:masterClrMapping/>
+  </p:clrMapOvr>
+</p:sld>
+</file>
+
+<file path=ppt/slides/slide29.xml><?xml version="1.0" encoding="utf-8"?>
+<p:sld xmlns:a="http://schemas.openxmlformats.org/drawingml/2006/main" xmlns:r="http://schemas.openxmlformats.org/officeDocument/2006/relationships" xmlns:p="http://schemas.openxmlformats.org/presentationml/2006/main">
+  <p:cSld>
+    <p:spTree>
+      <p:nvGrpSpPr>
+        <p:cNvPr id="1" name=""/>
+        <p:cNvGrpSpPr/>
+        <p:nvPr/>
+      </p:nvGrpSpPr>
+      <p:grpSpPr>
+        <a:xfrm>
+          <a:off x="0" y="0"/>
+          <a:ext cx="0" cy="0"/>
+          <a:chOff x="0" y="0"/>
+          <a:chExt cx="0" cy="0"/>
+        </a:xfrm>
+      </p:grpSpPr>
+      <p:sp>
+        <p:nvSpPr>
+          <p:cNvPr id="4" name="Rectángulo 3">
+            <a:extLst>
+              <a:ext uri="{FF2B5EF4-FFF2-40B4-BE49-F238E27FC236}">
+                <a16:creationId xmlns:a16="http://schemas.microsoft.com/office/drawing/2014/main" id="{7D0C1056-F063-4295-9589-100A21F99782}"/>
+              </a:ext>
+            </a:extLst>
+          </p:cNvPr>
+          <p:cNvSpPr/>
+          <p:nvPr/>
+        </p:nvSpPr>
+        <p:spPr>
+          <a:xfrm>
+            <a:off x="182880" y="182880"/>
+            <a:ext cx="11695176" cy="1124712"/>
+          </a:xfrm>
+          <a:prstGeom prst="rect">
+            <a:avLst/>
+          </a:prstGeom>
+        </p:spPr>
+        <p:style>
+          <a:lnRef idx="2">
+            <a:schemeClr val="dk1"/>
+          </a:lnRef>
+          <a:fillRef idx="1">
+            <a:schemeClr val="lt1"/>
+          </a:fillRef>
+          <a:effectRef idx="0">
+            <a:schemeClr val="dk1"/>
+          </a:effectRef>
+          <a:fontRef idx="minor">
+            <a:schemeClr val="dk1"/>
+          </a:fontRef>
+        </p:style>
+        <p:txBody>
+          <a:bodyPr rtlCol="0" anchor="ctr"/>
+          <a:lstStyle/>
+          <a:p>
+            <a:pPr algn="ctr"/>
+            <a:endParaRPr lang="es-PE"/>
+          </a:p>
+        </p:txBody>
+      </p:sp>
+      <p:sp>
+        <p:nvSpPr>
+          <p:cNvPr id="5" name="Rectángulo 4">
+            <a:extLst>
+              <a:ext uri="{FF2B5EF4-FFF2-40B4-BE49-F238E27FC236}">
+                <a16:creationId xmlns:a16="http://schemas.microsoft.com/office/drawing/2014/main" id="{FB0592F0-31E3-4A12-9D00-8202A4B8AF40}"/>
+              </a:ext>
+            </a:extLst>
+          </p:cNvPr>
+          <p:cNvSpPr/>
+          <p:nvPr/>
+        </p:nvSpPr>
+        <p:spPr>
+          <a:xfrm>
+            <a:off x="182880" y="1417320"/>
+            <a:ext cx="11695176" cy="3968496"/>
+          </a:xfrm>
+          <a:prstGeom prst="rect">
+            <a:avLst/>
+          </a:prstGeom>
+        </p:spPr>
+        <p:style>
+          <a:lnRef idx="2">
+            <a:schemeClr val="dk1"/>
+          </a:lnRef>
+          <a:fillRef idx="1">
+            <a:schemeClr val="lt1"/>
+          </a:fillRef>
+          <a:effectRef idx="0">
+            <a:schemeClr val="dk1"/>
+          </a:effectRef>
+          <a:fontRef idx="minor">
+            <a:schemeClr val="dk1"/>
+          </a:fontRef>
+        </p:style>
+        <p:txBody>
+          <a:bodyPr rtlCol="0" anchor="ctr"/>
+          <a:lstStyle/>
+          <a:p>
+            <a:pPr algn="ctr"/>
+            <a:endParaRPr lang="es-PE"/>
+          </a:p>
+        </p:txBody>
+      </p:sp>
+      <p:sp>
+        <p:nvSpPr>
+          <p:cNvPr id="6" name="Rectángulo 5">
+            <a:extLst>
+              <a:ext uri="{FF2B5EF4-FFF2-40B4-BE49-F238E27FC236}">
+                <a16:creationId xmlns:a16="http://schemas.microsoft.com/office/drawing/2014/main" id="{15921A5A-FAF3-418A-99AE-B7FC9DD7959F}"/>
+              </a:ext>
+            </a:extLst>
+          </p:cNvPr>
+          <p:cNvSpPr/>
+          <p:nvPr/>
+        </p:nvSpPr>
+        <p:spPr>
+          <a:xfrm>
+            <a:off x="182880" y="5495544"/>
+            <a:ext cx="11695176" cy="1179576"/>
+          </a:xfrm>
+          <a:prstGeom prst="rect">
+            <a:avLst/>
+          </a:prstGeom>
+        </p:spPr>
+        <p:style>
+          <a:lnRef idx="2">
+            <a:schemeClr val="dk1"/>
+          </a:lnRef>
+          <a:fillRef idx="1">
+            <a:schemeClr val="lt1"/>
+          </a:fillRef>
+          <a:effectRef idx="0">
+            <a:schemeClr val="dk1"/>
+          </a:effectRef>
+          <a:fontRef idx="minor">
+            <a:schemeClr val="dk1"/>
+          </a:fontRef>
+        </p:style>
+        <p:txBody>
+          <a:bodyPr rtlCol="0" anchor="ctr"/>
+          <a:lstStyle/>
+          <a:p>
+            <a:pPr algn="ctr"/>
+            <a:endParaRPr lang="es-PE"/>
+          </a:p>
+        </p:txBody>
+      </p:sp>
+      <p:sp>
+        <p:nvSpPr>
+          <p:cNvPr id="7" name="Rectángulo 6">
+            <a:extLst>
+              <a:ext uri="{FF2B5EF4-FFF2-40B4-BE49-F238E27FC236}">
+                <a16:creationId xmlns:a16="http://schemas.microsoft.com/office/drawing/2014/main" id="{9A05CB20-1A4C-44A9-BCFA-BACA053BB6D0}"/>
+              </a:ext>
+            </a:extLst>
+          </p:cNvPr>
+          <p:cNvSpPr/>
+          <p:nvPr/>
+        </p:nvSpPr>
+        <p:spPr>
+          <a:xfrm>
+            <a:off x="310896" y="292608"/>
+            <a:ext cx="2816352" cy="905256"/>
+          </a:xfrm>
+          <a:prstGeom prst="rect">
+            <a:avLst/>
+          </a:prstGeom>
+        </p:spPr>
+        <p:style>
+          <a:lnRef idx="2">
+            <a:schemeClr val="dk1"/>
+          </a:lnRef>
+          <a:fillRef idx="1">
+            <a:schemeClr val="lt1"/>
+          </a:fillRef>
+          <a:effectRef idx="0">
+            <a:schemeClr val="dk1"/>
+          </a:effectRef>
+          <a:fontRef idx="minor">
+            <a:schemeClr val="dk1"/>
+          </a:fontRef>
+        </p:style>
+        <p:txBody>
+          <a:bodyPr rtlCol="0" anchor="ctr"/>
+          <a:lstStyle/>
+          <a:p>
+            <a:pPr algn="ctr"/>
+            <a:r>
+              <a:rPr lang="es-PE" dirty="0"/>
+              <a:t>Logo </a:t>
+            </a:r>
+            <a:r>
+              <a:rPr lang="es-PE" dirty="0" err="1"/>
+              <a:t>Crypto</a:t>
+            </a:r>
+            <a:r>
+              <a:rPr lang="es-PE" dirty="0"/>
+              <a:t>-nita</a:t>
+            </a:r>
+          </a:p>
+        </p:txBody>
+      </p:sp>
+      <p:sp>
+        <p:nvSpPr>
+          <p:cNvPr id="9" name="Rectángulo 8">
+            <a:extLst>
+              <a:ext uri="{FF2B5EF4-FFF2-40B4-BE49-F238E27FC236}">
+                <a16:creationId xmlns:a16="http://schemas.microsoft.com/office/drawing/2014/main" id="{9059C4E3-239F-4824-8C5A-1858ACB1C26E}"/>
+              </a:ext>
+            </a:extLst>
+          </p:cNvPr>
+          <p:cNvSpPr/>
+          <p:nvPr/>
+        </p:nvSpPr>
+        <p:spPr>
+          <a:xfrm>
+            <a:off x="310896" y="5614416"/>
+            <a:ext cx="2450592" cy="950976"/>
+          </a:xfrm>
+          <a:prstGeom prst="rect">
+            <a:avLst/>
+          </a:prstGeom>
+        </p:spPr>
+        <p:style>
+          <a:lnRef idx="2">
+            <a:schemeClr val="dk1"/>
+          </a:lnRef>
+          <a:fillRef idx="1">
+            <a:schemeClr val="lt1"/>
+          </a:fillRef>
+          <a:effectRef idx="0">
+            <a:schemeClr val="dk1"/>
+          </a:effectRef>
+          <a:fontRef idx="minor">
+            <a:schemeClr val="dk1"/>
+          </a:fontRef>
+        </p:style>
+        <p:txBody>
+          <a:bodyPr rtlCol="0" anchor="ctr"/>
+          <a:lstStyle/>
+          <a:p>
+            <a:pPr algn="ctr"/>
+            <a:r>
+              <a:rPr lang="es-MX" dirty="0"/>
+              <a:t>Nombre/Logo del Grupo</a:t>
+            </a:r>
+            <a:endParaRPr lang="es-PE" dirty="0"/>
+          </a:p>
+        </p:txBody>
+      </p:sp>
+      <p:sp>
+        <p:nvSpPr>
+          <p:cNvPr id="10" name="Rectángulo 9">
+            <a:extLst>
+              <a:ext uri="{FF2B5EF4-FFF2-40B4-BE49-F238E27FC236}">
+                <a16:creationId xmlns:a16="http://schemas.microsoft.com/office/drawing/2014/main" id="{CE6F6AAA-080D-4FC6-88FA-3EBC4C0CD8F6}"/>
+              </a:ext>
+            </a:extLst>
+          </p:cNvPr>
+          <p:cNvSpPr/>
+          <p:nvPr/>
+        </p:nvSpPr>
+        <p:spPr>
+          <a:xfrm>
+            <a:off x="10049256" y="5614416"/>
+            <a:ext cx="1627632" cy="950976"/>
+          </a:xfrm>
+          <a:prstGeom prst="rect">
+            <a:avLst/>
+          </a:prstGeom>
+        </p:spPr>
+        <p:style>
+          <a:lnRef idx="2">
+            <a:schemeClr val="dk1"/>
+          </a:lnRef>
+          <a:fillRef idx="1">
+            <a:schemeClr val="lt1"/>
+          </a:fillRef>
+          <a:effectRef idx="0">
+            <a:schemeClr val="dk1"/>
+          </a:effectRef>
+          <a:fontRef idx="minor">
+            <a:schemeClr val="dk1"/>
+          </a:fontRef>
+        </p:style>
+        <p:txBody>
+          <a:bodyPr rtlCol="0" anchor="ctr"/>
+          <a:lstStyle/>
+          <a:p>
+            <a:pPr algn="ctr"/>
+            <a:r>
+              <a:rPr lang="es-MX" sz="1100" dirty="0"/>
+              <a:t>Integrantes</a:t>
+            </a:r>
+            <a:endParaRPr lang="es-PE" sz="1100" dirty="0"/>
+          </a:p>
+        </p:txBody>
+      </p:sp>
+      <p:sp>
+        <p:nvSpPr>
+          <p:cNvPr id="11" name="Rectángulo 10">
+            <a:extLst>
+              <a:ext uri="{FF2B5EF4-FFF2-40B4-BE49-F238E27FC236}">
+                <a16:creationId xmlns:a16="http://schemas.microsoft.com/office/drawing/2014/main" id="{2D34766E-3CC0-47DF-87DC-62FB893F3931}"/>
+              </a:ext>
+            </a:extLst>
+          </p:cNvPr>
+          <p:cNvSpPr/>
+          <p:nvPr/>
+        </p:nvSpPr>
+        <p:spPr>
+          <a:xfrm>
+            <a:off x="5506974" y="5925312"/>
+            <a:ext cx="3790188" cy="320040"/>
+          </a:xfrm>
+          <a:prstGeom prst="rect">
+            <a:avLst/>
+          </a:prstGeom>
+        </p:spPr>
+        <p:style>
+          <a:lnRef idx="2">
+            <a:schemeClr val="dk1"/>
+          </a:lnRef>
+          <a:fillRef idx="1">
+            <a:schemeClr val="lt1"/>
+          </a:fillRef>
+          <a:effectRef idx="0">
+            <a:schemeClr val="dk1"/>
+          </a:effectRef>
+          <a:fontRef idx="minor">
+            <a:schemeClr val="dk1"/>
+          </a:fontRef>
+        </p:style>
+        <p:txBody>
+          <a:bodyPr rtlCol="0" anchor="ctr"/>
+          <a:lstStyle/>
+          <a:p>
+            <a:pPr algn="ctr"/>
+            <a:r>
+              <a:rPr lang="es-PE" sz="1100" dirty="0"/>
+              <a:t>2022 - Nombre® - Todos los derechos reservados</a:t>
+            </a:r>
+          </a:p>
+        </p:txBody>
+      </p:sp>
+      <p:sp>
+        <p:nvSpPr>
+          <p:cNvPr id="12" name="Rectángulo 11">
+            <a:extLst>
+              <a:ext uri="{FF2B5EF4-FFF2-40B4-BE49-F238E27FC236}">
+                <a16:creationId xmlns:a16="http://schemas.microsoft.com/office/drawing/2014/main" id="{5E86E855-05F8-45D1-998F-FD3B01DB39A2}"/>
+              </a:ext>
+            </a:extLst>
+          </p:cNvPr>
+          <p:cNvSpPr/>
+          <p:nvPr/>
+        </p:nvSpPr>
+        <p:spPr>
+          <a:xfrm>
+            <a:off x="2889504" y="5614416"/>
+            <a:ext cx="1865376" cy="420624"/>
+          </a:xfrm>
+          <a:prstGeom prst="rect">
+            <a:avLst/>
+          </a:prstGeom>
+        </p:spPr>
+        <p:style>
+          <a:lnRef idx="2">
+            <a:schemeClr val="dk1"/>
+          </a:lnRef>
+          <a:fillRef idx="1">
+            <a:schemeClr val="lt1"/>
+          </a:fillRef>
+          <a:effectRef idx="0">
+            <a:schemeClr val="dk1"/>
+          </a:effectRef>
+          <a:fontRef idx="minor">
+            <a:schemeClr val="dk1"/>
+          </a:fontRef>
+        </p:style>
+        <p:txBody>
+          <a:bodyPr rtlCol="0" anchor="ctr"/>
+          <a:lstStyle/>
+          <a:p>
+            <a:pPr algn="ctr"/>
+            <a:r>
+              <a:rPr lang="es-PE" sz="1100" dirty="0"/>
+              <a:t>Nosotros</a:t>
+            </a:r>
+          </a:p>
+        </p:txBody>
+      </p:sp>
+      <p:sp>
+        <p:nvSpPr>
+          <p:cNvPr id="13" name="Rectángulo 12">
+            <a:extLst>
+              <a:ext uri="{FF2B5EF4-FFF2-40B4-BE49-F238E27FC236}">
+                <a16:creationId xmlns:a16="http://schemas.microsoft.com/office/drawing/2014/main" id="{BAE1FAEE-ABB3-4846-BC1C-59A39C7AD0AB}"/>
+              </a:ext>
+            </a:extLst>
+          </p:cNvPr>
+          <p:cNvSpPr/>
+          <p:nvPr/>
+        </p:nvSpPr>
+        <p:spPr>
+          <a:xfrm>
+            <a:off x="2889504" y="6144768"/>
+            <a:ext cx="1865376" cy="425196"/>
+          </a:xfrm>
+          <a:prstGeom prst="rect">
+            <a:avLst/>
+          </a:prstGeom>
+        </p:spPr>
+        <p:style>
+          <a:lnRef idx="2">
+            <a:schemeClr val="dk1"/>
+          </a:lnRef>
+          <a:fillRef idx="1">
+            <a:schemeClr val="lt1"/>
+          </a:fillRef>
+          <a:effectRef idx="0">
+            <a:schemeClr val="dk1"/>
+          </a:effectRef>
+          <a:fontRef idx="minor">
+            <a:schemeClr val="dk1"/>
+          </a:fontRef>
+        </p:style>
+        <p:txBody>
+          <a:bodyPr rtlCol="0" anchor="ctr"/>
+          <a:lstStyle/>
+          <a:p>
+            <a:pPr algn="ctr"/>
+            <a:r>
+              <a:rPr lang="es-PE" sz="1100" dirty="0"/>
+              <a:t>Términos y Condiciones</a:t>
+            </a:r>
+          </a:p>
+        </p:txBody>
+      </p:sp>
+      <p:pic>
+        <p:nvPicPr>
+          <p:cNvPr id="3" name="Imagen 2">
+            <a:extLst>
+              <a:ext uri="{FF2B5EF4-FFF2-40B4-BE49-F238E27FC236}">
+                <a16:creationId xmlns:a16="http://schemas.microsoft.com/office/drawing/2014/main" id="{8E8B1C22-693D-4E82-AD49-1F5BCFA66AF8}"/>
+              </a:ext>
+            </a:extLst>
+          </p:cNvPr>
+          <p:cNvPicPr>
+            <a:picLocks noChangeAspect="1"/>
+          </p:cNvPicPr>
+          <p:nvPr/>
+        </p:nvPicPr>
+        <p:blipFill>
+          <a:blip r:embed="rId2"/>
+          <a:stretch>
+            <a:fillRect/>
+          </a:stretch>
+        </p:blipFill>
+        <p:spPr>
+          <a:xfrm>
+            <a:off x="3478994" y="1511458"/>
+            <a:ext cx="5102948" cy="3780220"/>
+          </a:xfrm>
+          <a:prstGeom prst="rect">
+            <a:avLst/>
+          </a:prstGeom>
+        </p:spPr>
+      </p:pic>
+    </p:spTree>
+    <p:extLst>
+      <p:ext uri="{BB962C8B-B14F-4D97-AF65-F5344CB8AC3E}">
+        <p14:creationId xmlns:p14="http://schemas.microsoft.com/office/powerpoint/2010/main" val="4159049546"/>
+      </p:ext>
+    </p:extLst>
+  </p:cSld>
+  <p:clrMapOvr>
+    <a:masterClrMapping/>
+  </p:clrMapOvr>
+</p:sld>
+</file>
+
 <file path=ppt/slides/slide3.xml><?xml version="1.0" encoding="utf-8"?>
 <p:sld xmlns:a="http://schemas.openxmlformats.org/drawingml/2006/main" xmlns:r="http://schemas.openxmlformats.org/officeDocument/2006/relationships" xmlns:p="http://schemas.openxmlformats.org/presentationml/2006/main">
   <p:cSld>
@@ -21708,6 +23173,1487 @@
     <p:extLst>
       <p:ext uri="{BB962C8B-B14F-4D97-AF65-F5344CB8AC3E}">
         <p14:creationId xmlns:p14="http://schemas.microsoft.com/office/powerpoint/2010/main" val="3994149437"/>
+      </p:ext>
+    </p:extLst>
+  </p:cSld>
+  <p:clrMapOvr>
+    <a:masterClrMapping/>
+  </p:clrMapOvr>
+</p:sld>
+</file>
+
+<file path=ppt/slides/slide30.xml><?xml version="1.0" encoding="utf-8"?>
+<p:sld xmlns:a="http://schemas.openxmlformats.org/drawingml/2006/main" xmlns:r="http://schemas.openxmlformats.org/officeDocument/2006/relationships" xmlns:p="http://schemas.openxmlformats.org/presentationml/2006/main">
+  <p:cSld>
+    <p:spTree>
+      <p:nvGrpSpPr>
+        <p:cNvPr id="1" name=""/>
+        <p:cNvGrpSpPr/>
+        <p:nvPr/>
+      </p:nvGrpSpPr>
+      <p:grpSpPr>
+        <a:xfrm>
+          <a:off x="0" y="0"/>
+          <a:ext cx="0" cy="0"/>
+          <a:chOff x="0" y="0"/>
+          <a:chExt cx="0" cy="0"/>
+        </a:xfrm>
+      </p:grpSpPr>
+      <p:sp>
+        <p:nvSpPr>
+          <p:cNvPr id="4" name="Rectángulo 3">
+            <a:extLst>
+              <a:ext uri="{FF2B5EF4-FFF2-40B4-BE49-F238E27FC236}">
+                <a16:creationId xmlns:a16="http://schemas.microsoft.com/office/drawing/2014/main" id="{7D0C1056-F063-4295-9589-100A21F99782}"/>
+              </a:ext>
+            </a:extLst>
+          </p:cNvPr>
+          <p:cNvSpPr/>
+          <p:nvPr/>
+        </p:nvSpPr>
+        <p:spPr>
+          <a:xfrm>
+            <a:off x="182880" y="182880"/>
+            <a:ext cx="11695176" cy="1124712"/>
+          </a:xfrm>
+          <a:prstGeom prst="rect">
+            <a:avLst/>
+          </a:prstGeom>
+        </p:spPr>
+        <p:style>
+          <a:lnRef idx="2">
+            <a:schemeClr val="dk1"/>
+          </a:lnRef>
+          <a:fillRef idx="1">
+            <a:schemeClr val="lt1"/>
+          </a:fillRef>
+          <a:effectRef idx="0">
+            <a:schemeClr val="dk1"/>
+          </a:effectRef>
+          <a:fontRef idx="minor">
+            <a:schemeClr val="dk1"/>
+          </a:fontRef>
+        </p:style>
+        <p:txBody>
+          <a:bodyPr rtlCol="0" anchor="ctr"/>
+          <a:lstStyle/>
+          <a:p>
+            <a:pPr algn="ctr"/>
+            <a:endParaRPr lang="es-PE"/>
+          </a:p>
+        </p:txBody>
+      </p:sp>
+      <p:sp>
+        <p:nvSpPr>
+          <p:cNvPr id="5" name="Rectángulo 4">
+            <a:extLst>
+              <a:ext uri="{FF2B5EF4-FFF2-40B4-BE49-F238E27FC236}">
+                <a16:creationId xmlns:a16="http://schemas.microsoft.com/office/drawing/2014/main" id="{FB0592F0-31E3-4A12-9D00-8202A4B8AF40}"/>
+              </a:ext>
+            </a:extLst>
+          </p:cNvPr>
+          <p:cNvSpPr/>
+          <p:nvPr/>
+        </p:nvSpPr>
+        <p:spPr>
+          <a:xfrm>
+            <a:off x="182880" y="1417320"/>
+            <a:ext cx="11695176" cy="3968496"/>
+          </a:xfrm>
+          <a:prstGeom prst="rect">
+            <a:avLst/>
+          </a:prstGeom>
+        </p:spPr>
+        <p:style>
+          <a:lnRef idx="2">
+            <a:schemeClr val="dk1"/>
+          </a:lnRef>
+          <a:fillRef idx="1">
+            <a:schemeClr val="lt1"/>
+          </a:fillRef>
+          <a:effectRef idx="0">
+            <a:schemeClr val="dk1"/>
+          </a:effectRef>
+          <a:fontRef idx="minor">
+            <a:schemeClr val="dk1"/>
+          </a:fontRef>
+        </p:style>
+        <p:txBody>
+          <a:bodyPr rtlCol="0" anchor="ctr"/>
+          <a:lstStyle/>
+          <a:p>
+            <a:pPr algn="ctr"/>
+            <a:endParaRPr lang="es-PE"/>
+          </a:p>
+        </p:txBody>
+      </p:sp>
+      <p:sp>
+        <p:nvSpPr>
+          <p:cNvPr id="6" name="Rectángulo 5">
+            <a:extLst>
+              <a:ext uri="{FF2B5EF4-FFF2-40B4-BE49-F238E27FC236}">
+                <a16:creationId xmlns:a16="http://schemas.microsoft.com/office/drawing/2014/main" id="{15921A5A-FAF3-418A-99AE-B7FC9DD7959F}"/>
+              </a:ext>
+            </a:extLst>
+          </p:cNvPr>
+          <p:cNvSpPr/>
+          <p:nvPr/>
+        </p:nvSpPr>
+        <p:spPr>
+          <a:xfrm>
+            <a:off x="182880" y="5495544"/>
+            <a:ext cx="11695176" cy="1179576"/>
+          </a:xfrm>
+          <a:prstGeom prst="rect">
+            <a:avLst/>
+          </a:prstGeom>
+        </p:spPr>
+        <p:style>
+          <a:lnRef idx="2">
+            <a:schemeClr val="dk1"/>
+          </a:lnRef>
+          <a:fillRef idx="1">
+            <a:schemeClr val="lt1"/>
+          </a:fillRef>
+          <a:effectRef idx="0">
+            <a:schemeClr val="dk1"/>
+          </a:effectRef>
+          <a:fontRef idx="minor">
+            <a:schemeClr val="dk1"/>
+          </a:fontRef>
+        </p:style>
+        <p:txBody>
+          <a:bodyPr rtlCol="0" anchor="ctr"/>
+          <a:lstStyle/>
+          <a:p>
+            <a:pPr algn="ctr"/>
+            <a:endParaRPr lang="es-PE"/>
+          </a:p>
+        </p:txBody>
+      </p:sp>
+      <p:sp>
+        <p:nvSpPr>
+          <p:cNvPr id="7" name="Rectángulo 6">
+            <a:extLst>
+              <a:ext uri="{FF2B5EF4-FFF2-40B4-BE49-F238E27FC236}">
+                <a16:creationId xmlns:a16="http://schemas.microsoft.com/office/drawing/2014/main" id="{9A05CB20-1A4C-44A9-BCFA-BACA053BB6D0}"/>
+              </a:ext>
+            </a:extLst>
+          </p:cNvPr>
+          <p:cNvSpPr/>
+          <p:nvPr/>
+        </p:nvSpPr>
+        <p:spPr>
+          <a:xfrm>
+            <a:off x="310896" y="292608"/>
+            <a:ext cx="2816352" cy="905256"/>
+          </a:xfrm>
+          <a:prstGeom prst="rect">
+            <a:avLst/>
+          </a:prstGeom>
+        </p:spPr>
+        <p:style>
+          <a:lnRef idx="2">
+            <a:schemeClr val="dk1"/>
+          </a:lnRef>
+          <a:fillRef idx="1">
+            <a:schemeClr val="lt1"/>
+          </a:fillRef>
+          <a:effectRef idx="0">
+            <a:schemeClr val="dk1"/>
+          </a:effectRef>
+          <a:fontRef idx="minor">
+            <a:schemeClr val="dk1"/>
+          </a:fontRef>
+        </p:style>
+        <p:txBody>
+          <a:bodyPr rtlCol="0" anchor="ctr"/>
+          <a:lstStyle/>
+          <a:p>
+            <a:pPr algn="ctr"/>
+            <a:r>
+              <a:rPr lang="es-PE" dirty="0"/>
+              <a:t>Logo </a:t>
+            </a:r>
+            <a:r>
+              <a:rPr lang="es-PE" dirty="0" err="1"/>
+              <a:t>Crypto</a:t>
+            </a:r>
+            <a:r>
+              <a:rPr lang="es-PE" dirty="0"/>
+              <a:t>-nita</a:t>
+            </a:r>
+          </a:p>
+        </p:txBody>
+      </p:sp>
+      <p:sp>
+        <p:nvSpPr>
+          <p:cNvPr id="9" name="Rectángulo 8">
+            <a:extLst>
+              <a:ext uri="{FF2B5EF4-FFF2-40B4-BE49-F238E27FC236}">
+                <a16:creationId xmlns:a16="http://schemas.microsoft.com/office/drawing/2014/main" id="{9059C4E3-239F-4824-8C5A-1858ACB1C26E}"/>
+              </a:ext>
+            </a:extLst>
+          </p:cNvPr>
+          <p:cNvSpPr/>
+          <p:nvPr/>
+        </p:nvSpPr>
+        <p:spPr>
+          <a:xfrm>
+            <a:off x="310896" y="5614416"/>
+            <a:ext cx="2450592" cy="950976"/>
+          </a:xfrm>
+          <a:prstGeom prst="rect">
+            <a:avLst/>
+          </a:prstGeom>
+        </p:spPr>
+        <p:style>
+          <a:lnRef idx="2">
+            <a:schemeClr val="dk1"/>
+          </a:lnRef>
+          <a:fillRef idx="1">
+            <a:schemeClr val="lt1"/>
+          </a:fillRef>
+          <a:effectRef idx="0">
+            <a:schemeClr val="dk1"/>
+          </a:effectRef>
+          <a:fontRef idx="minor">
+            <a:schemeClr val="dk1"/>
+          </a:fontRef>
+        </p:style>
+        <p:txBody>
+          <a:bodyPr rtlCol="0" anchor="ctr"/>
+          <a:lstStyle/>
+          <a:p>
+            <a:pPr algn="ctr"/>
+            <a:r>
+              <a:rPr lang="es-MX" dirty="0"/>
+              <a:t>Nombre/Logo del Grupo</a:t>
+            </a:r>
+            <a:endParaRPr lang="es-PE" dirty="0"/>
+          </a:p>
+        </p:txBody>
+      </p:sp>
+      <p:sp>
+        <p:nvSpPr>
+          <p:cNvPr id="10" name="Rectángulo 9">
+            <a:extLst>
+              <a:ext uri="{FF2B5EF4-FFF2-40B4-BE49-F238E27FC236}">
+                <a16:creationId xmlns:a16="http://schemas.microsoft.com/office/drawing/2014/main" id="{CE6F6AAA-080D-4FC6-88FA-3EBC4C0CD8F6}"/>
+              </a:ext>
+            </a:extLst>
+          </p:cNvPr>
+          <p:cNvSpPr/>
+          <p:nvPr/>
+        </p:nvSpPr>
+        <p:spPr>
+          <a:xfrm>
+            <a:off x="10049256" y="5614416"/>
+            <a:ext cx="1627632" cy="950976"/>
+          </a:xfrm>
+          <a:prstGeom prst="rect">
+            <a:avLst/>
+          </a:prstGeom>
+        </p:spPr>
+        <p:style>
+          <a:lnRef idx="2">
+            <a:schemeClr val="dk1"/>
+          </a:lnRef>
+          <a:fillRef idx="1">
+            <a:schemeClr val="lt1"/>
+          </a:fillRef>
+          <a:effectRef idx="0">
+            <a:schemeClr val="dk1"/>
+          </a:effectRef>
+          <a:fontRef idx="minor">
+            <a:schemeClr val="dk1"/>
+          </a:fontRef>
+        </p:style>
+        <p:txBody>
+          <a:bodyPr rtlCol="0" anchor="ctr"/>
+          <a:lstStyle/>
+          <a:p>
+            <a:pPr algn="ctr"/>
+            <a:r>
+              <a:rPr lang="es-MX" sz="1100" dirty="0"/>
+              <a:t>Integrantes</a:t>
+            </a:r>
+            <a:endParaRPr lang="es-PE" sz="1100" dirty="0"/>
+          </a:p>
+        </p:txBody>
+      </p:sp>
+      <p:sp>
+        <p:nvSpPr>
+          <p:cNvPr id="11" name="Rectángulo 10">
+            <a:extLst>
+              <a:ext uri="{FF2B5EF4-FFF2-40B4-BE49-F238E27FC236}">
+                <a16:creationId xmlns:a16="http://schemas.microsoft.com/office/drawing/2014/main" id="{2D34766E-3CC0-47DF-87DC-62FB893F3931}"/>
+              </a:ext>
+            </a:extLst>
+          </p:cNvPr>
+          <p:cNvSpPr/>
+          <p:nvPr/>
+        </p:nvSpPr>
+        <p:spPr>
+          <a:xfrm>
+            <a:off x="5506974" y="5925312"/>
+            <a:ext cx="3790188" cy="320040"/>
+          </a:xfrm>
+          <a:prstGeom prst="rect">
+            <a:avLst/>
+          </a:prstGeom>
+        </p:spPr>
+        <p:style>
+          <a:lnRef idx="2">
+            <a:schemeClr val="dk1"/>
+          </a:lnRef>
+          <a:fillRef idx="1">
+            <a:schemeClr val="lt1"/>
+          </a:fillRef>
+          <a:effectRef idx="0">
+            <a:schemeClr val="dk1"/>
+          </a:effectRef>
+          <a:fontRef idx="minor">
+            <a:schemeClr val="dk1"/>
+          </a:fontRef>
+        </p:style>
+        <p:txBody>
+          <a:bodyPr rtlCol="0" anchor="ctr"/>
+          <a:lstStyle/>
+          <a:p>
+            <a:pPr algn="ctr"/>
+            <a:r>
+              <a:rPr lang="es-PE" sz="1100" dirty="0"/>
+              <a:t>2022 - Nombre® - Todos los derechos reservados</a:t>
+            </a:r>
+          </a:p>
+        </p:txBody>
+      </p:sp>
+      <p:sp>
+        <p:nvSpPr>
+          <p:cNvPr id="12" name="Rectángulo 11">
+            <a:extLst>
+              <a:ext uri="{FF2B5EF4-FFF2-40B4-BE49-F238E27FC236}">
+                <a16:creationId xmlns:a16="http://schemas.microsoft.com/office/drawing/2014/main" id="{5E86E855-05F8-45D1-998F-FD3B01DB39A2}"/>
+              </a:ext>
+            </a:extLst>
+          </p:cNvPr>
+          <p:cNvSpPr/>
+          <p:nvPr/>
+        </p:nvSpPr>
+        <p:spPr>
+          <a:xfrm>
+            <a:off x="2889504" y="5614416"/>
+            <a:ext cx="1865376" cy="420624"/>
+          </a:xfrm>
+          <a:prstGeom prst="rect">
+            <a:avLst/>
+          </a:prstGeom>
+        </p:spPr>
+        <p:style>
+          <a:lnRef idx="2">
+            <a:schemeClr val="dk1"/>
+          </a:lnRef>
+          <a:fillRef idx="1">
+            <a:schemeClr val="lt1"/>
+          </a:fillRef>
+          <a:effectRef idx="0">
+            <a:schemeClr val="dk1"/>
+          </a:effectRef>
+          <a:fontRef idx="minor">
+            <a:schemeClr val="dk1"/>
+          </a:fontRef>
+        </p:style>
+        <p:txBody>
+          <a:bodyPr rtlCol="0" anchor="ctr"/>
+          <a:lstStyle/>
+          <a:p>
+            <a:pPr algn="ctr"/>
+            <a:r>
+              <a:rPr lang="es-PE" sz="1100" dirty="0"/>
+              <a:t>Nosotros</a:t>
+            </a:r>
+          </a:p>
+        </p:txBody>
+      </p:sp>
+      <p:sp>
+        <p:nvSpPr>
+          <p:cNvPr id="13" name="Rectángulo 12">
+            <a:extLst>
+              <a:ext uri="{FF2B5EF4-FFF2-40B4-BE49-F238E27FC236}">
+                <a16:creationId xmlns:a16="http://schemas.microsoft.com/office/drawing/2014/main" id="{BAE1FAEE-ABB3-4846-BC1C-59A39C7AD0AB}"/>
+              </a:ext>
+            </a:extLst>
+          </p:cNvPr>
+          <p:cNvSpPr/>
+          <p:nvPr/>
+        </p:nvSpPr>
+        <p:spPr>
+          <a:xfrm>
+            <a:off x="2889504" y="6144768"/>
+            <a:ext cx="1865376" cy="425196"/>
+          </a:xfrm>
+          <a:prstGeom prst="rect">
+            <a:avLst/>
+          </a:prstGeom>
+        </p:spPr>
+        <p:style>
+          <a:lnRef idx="2">
+            <a:schemeClr val="dk1"/>
+          </a:lnRef>
+          <a:fillRef idx="1">
+            <a:schemeClr val="lt1"/>
+          </a:fillRef>
+          <a:effectRef idx="0">
+            <a:schemeClr val="dk1"/>
+          </a:effectRef>
+          <a:fontRef idx="minor">
+            <a:schemeClr val="dk1"/>
+          </a:fontRef>
+        </p:style>
+        <p:txBody>
+          <a:bodyPr rtlCol="0" anchor="ctr"/>
+          <a:lstStyle/>
+          <a:p>
+            <a:pPr algn="ctr"/>
+            <a:r>
+              <a:rPr lang="es-PE" sz="1100" dirty="0"/>
+              <a:t>Términos y Condiciones</a:t>
+            </a:r>
+          </a:p>
+        </p:txBody>
+      </p:sp>
+      <p:pic>
+        <p:nvPicPr>
+          <p:cNvPr id="8" name="Imagen 7">
+            <a:extLst>
+              <a:ext uri="{FF2B5EF4-FFF2-40B4-BE49-F238E27FC236}">
+                <a16:creationId xmlns:a16="http://schemas.microsoft.com/office/drawing/2014/main" id="{FDB2C328-77F4-4AF4-8DC1-901BC8A01754}"/>
+              </a:ext>
+            </a:extLst>
+          </p:cNvPr>
+          <p:cNvPicPr>
+            <a:picLocks noChangeAspect="1"/>
+          </p:cNvPicPr>
+          <p:nvPr/>
+        </p:nvPicPr>
+        <p:blipFill rotWithShape="1">
+          <a:blip r:embed="rId2"/>
+          <a:srcRect l="9238" t="16103" r="8095" b="32169"/>
+          <a:stretch/>
+        </p:blipFill>
+        <p:spPr>
+          <a:xfrm>
+            <a:off x="2990268" y="1627632"/>
+            <a:ext cx="6211463" cy="2714017"/>
+          </a:xfrm>
+          <a:prstGeom prst="rect">
+            <a:avLst/>
+          </a:prstGeom>
+        </p:spPr>
+      </p:pic>
+      <p:pic>
+        <p:nvPicPr>
+          <p:cNvPr id="15" name="Imagen 14">
+            <a:extLst>
+              <a:ext uri="{FF2B5EF4-FFF2-40B4-BE49-F238E27FC236}">
+                <a16:creationId xmlns:a16="http://schemas.microsoft.com/office/drawing/2014/main" id="{4290C81C-FF48-4D94-BD46-B239C966001E}"/>
+              </a:ext>
+            </a:extLst>
+          </p:cNvPr>
+          <p:cNvPicPr>
+            <a:picLocks noChangeAspect="1"/>
+          </p:cNvPicPr>
+          <p:nvPr/>
+        </p:nvPicPr>
+        <p:blipFill>
+          <a:blip r:embed="rId3"/>
+          <a:stretch>
+            <a:fillRect/>
+          </a:stretch>
+        </p:blipFill>
+        <p:spPr>
+          <a:xfrm>
+            <a:off x="5115568" y="4473821"/>
+            <a:ext cx="1960861" cy="779823"/>
+          </a:xfrm>
+          <a:prstGeom prst="rect">
+            <a:avLst/>
+          </a:prstGeom>
+        </p:spPr>
+      </p:pic>
+    </p:spTree>
+    <p:extLst>
+      <p:ext uri="{BB962C8B-B14F-4D97-AF65-F5344CB8AC3E}">
+        <p14:creationId xmlns:p14="http://schemas.microsoft.com/office/powerpoint/2010/main" val="1841701445"/>
+      </p:ext>
+    </p:extLst>
+  </p:cSld>
+  <p:clrMapOvr>
+    <a:masterClrMapping/>
+  </p:clrMapOvr>
+</p:sld>
+</file>
+
+<file path=ppt/slides/slide31.xml><?xml version="1.0" encoding="utf-8"?>
+<p:sld xmlns:a="http://schemas.openxmlformats.org/drawingml/2006/main" xmlns:r="http://schemas.openxmlformats.org/officeDocument/2006/relationships" xmlns:p="http://schemas.openxmlformats.org/presentationml/2006/main">
+  <p:cSld>
+    <p:spTree>
+      <p:nvGrpSpPr>
+        <p:cNvPr id="1" name=""/>
+        <p:cNvGrpSpPr/>
+        <p:nvPr/>
+      </p:nvGrpSpPr>
+      <p:grpSpPr>
+        <a:xfrm>
+          <a:off x="0" y="0"/>
+          <a:ext cx="0" cy="0"/>
+          <a:chOff x="0" y="0"/>
+          <a:chExt cx="0" cy="0"/>
+        </a:xfrm>
+      </p:grpSpPr>
+      <p:sp>
+        <p:nvSpPr>
+          <p:cNvPr id="4" name="Rectángulo 3">
+            <a:extLst>
+              <a:ext uri="{FF2B5EF4-FFF2-40B4-BE49-F238E27FC236}">
+                <a16:creationId xmlns:a16="http://schemas.microsoft.com/office/drawing/2014/main" id="{7D0C1056-F063-4295-9589-100A21F99782}"/>
+              </a:ext>
+            </a:extLst>
+          </p:cNvPr>
+          <p:cNvSpPr/>
+          <p:nvPr/>
+        </p:nvSpPr>
+        <p:spPr>
+          <a:xfrm>
+            <a:off x="182880" y="182880"/>
+            <a:ext cx="11695176" cy="1124712"/>
+          </a:xfrm>
+          <a:prstGeom prst="rect">
+            <a:avLst/>
+          </a:prstGeom>
+        </p:spPr>
+        <p:style>
+          <a:lnRef idx="2">
+            <a:schemeClr val="dk1"/>
+          </a:lnRef>
+          <a:fillRef idx="1">
+            <a:schemeClr val="lt1"/>
+          </a:fillRef>
+          <a:effectRef idx="0">
+            <a:schemeClr val="dk1"/>
+          </a:effectRef>
+          <a:fontRef idx="minor">
+            <a:schemeClr val="dk1"/>
+          </a:fontRef>
+        </p:style>
+        <p:txBody>
+          <a:bodyPr rtlCol="0" anchor="ctr"/>
+          <a:lstStyle/>
+          <a:p>
+            <a:pPr algn="ctr"/>
+            <a:endParaRPr lang="es-PE"/>
+          </a:p>
+        </p:txBody>
+      </p:sp>
+      <p:sp>
+        <p:nvSpPr>
+          <p:cNvPr id="5" name="Rectángulo 4">
+            <a:extLst>
+              <a:ext uri="{FF2B5EF4-FFF2-40B4-BE49-F238E27FC236}">
+                <a16:creationId xmlns:a16="http://schemas.microsoft.com/office/drawing/2014/main" id="{FB0592F0-31E3-4A12-9D00-8202A4B8AF40}"/>
+              </a:ext>
+            </a:extLst>
+          </p:cNvPr>
+          <p:cNvSpPr/>
+          <p:nvPr/>
+        </p:nvSpPr>
+        <p:spPr>
+          <a:xfrm>
+            <a:off x="182880" y="1417320"/>
+            <a:ext cx="11695176" cy="3968496"/>
+          </a:xfrm>
+          <a:prstGeom prst="rect">
+            <a:avLst/>
+          </a:prstGeom>
+        </p:spPr>
+        <p:style>
+          <a:lnRef idx="2">
+            <a:schemeClr val="dk1"/>
+          </a:lnRef>
+          <a:fillRef idx="1">
+            <a:schemeClr val="lt1"/>
+          </a:fillRef>
+          <a:effectRef idx="0">
+            <a:schemeClr val="dk1"/>
+          </a:effectRef>
+          <a:fontRef idx="minor">
+            <a:schemeClr val="dk1"/>
+          </a:fontRef>
+        </p:style>
+        <p:txBody>
+          <a:bodyPr rtlCol="0" anchor="ctr"/>
+          <a:lstStyle/>
+          <a:p>
+            <a:pPr algn="ctr"/>
+            <a:endParaRPr lang="es-PE"/>
+          </a:p>
+        </p:txBody>
+      </p:sp>
+      <p:sp>
+        <p:nvSpPr>
+          <p:cNvPr id="6" name="Rectángulo 5">
+            <a:extLst>
+              <a:ext uri="{FF2B5EF4-FFF2-40B4-BE49-F238E27FC236}">
+                <a16:creationId xmlns:a16="http://schemas.microsoft.com/office/drawing/2014/main" id="{15921A5A-FAF3-418A-99AE-B7FC9DD7959F}"/>
+              </a:ext>
+            </a:extLst>
+          </p:cNvPr>
+          <p:cNvSpPr/>
+          <p:nvPr/>
+        </p:nvSpPr>
+        <p:spPr>
+          <a:xfrm>
+            <a:off x="182880" y="5495544"/>
+            <a:ext cx="11695176" cy="1179576"/>
+          </a:xfrm>
+          <a:prstGeom prst="rect">
+            <a:avLst/>
+          </a:prstGeom>
+        </p:spPr>
+        <p:style>
+          <a:lnRef idx="2">
+            <a:schemeClr val="dk1"/>
+          </a:lnRef>
+          <a:fillRef idx="1">
+            <a:schemeClr val="lt1"/>
+          </a:fillRef>
+          <a:effectRef idx="0">
+            <a:schemeClr val="dk1"/>
+          </a:effectRef>
+          <a:fontRef idx="minor">
+            <a:schemeClr val="dk1"/>
+          </a:fontRef>
+        </p:style>
+        <p:txBody>
+          <a:bodyPr rtlCol="0" anchor="ctr"/>
+          <a:lstStyle/>
+          <a:p>
+            <a:pPr algn="ctr"/>
+            <a:endParaRPr lang="es-PE"/>
+          </a:p>
+        </p:txBody>
+      </p:sp>
+      <p:sp>
+        <p:nvSpPr>
+          <p:cNvPr id="7" name="Rectángulo 6">
+            <a:extLst>
+              <a:ext uri="{FF2B5EF4-FFF2-40B4-BE49-F238E27FC236}">
+                <a16:creationId xmlns:a16="http://schemas.microsoft.com/office/drawing/2014/main" id="{9A05CB20-1A4C-44A9-BCFA-BACA053BB6D0}"/>
+              </a:ext>
+            </a:extLst>
+          </p:cNvPr>
+          <p:cNvSpPr/>
+          <p:nvPr/>
+        </p:nvSpPr>
+        <p:spPr>
+          <a:xfrm>
+            <a:off x="310896" y="292608"/>
+            <a:ext cx="2816352" cy="905256"/>
+          </a:xfrm>
+          <a:prstGeom prst="rect">
+            <a:avLst/>
+          </a:prstGeom>
+        </p:spPr>
+        <p:style>
+          <a:lnRef idx="2">
+            <a:schemeClr val="dk1"/>
+          </a:lnRef>
+          <a:fillRef idx="1">
+            <a:schemeClr val="lt1"/>
+          </a:fillRef>
+          <a:effectRef idx="0">
+            <a:schemeClr val="dk1"/>
+          </a:effectRef>
+          <a:fontRef idx="minor">
+            <a:schemeClr val="dk1"/>
+          </a:fontRef>
+        </p:style>
+        <p:txBody>
+          <a:bodyPr rtlCol="0" anchor="ctr"/>
+          <a:lstStyle/>
+          <a:p>
+            <a:pPr algn="ctr"/>
+            <a:r>
+              <a:rPr lang="es-PE" dirty="0"/>
+              <a:t>Logo </a:t>
+            </a:r>
+            <a:r>
+              <a:rPr lang="es-PE" dirty="0" err="1"/>
+              <a:t>Crypto</a:t>
+            </a:r>
+            <a:r>
+              <a:rPr lang="es-PE" dirty="0"/>
+              <a:t>-nita</a:t>
+            </a:r>
+          </a:p>
+        </p:txBody>
+      </p:sp>
+      <p:sp>
+        <p:nvSpPr>
+          <p:cNvPr id="9" name="Rectángulo 8">
+            <a:extLst>
+              <a:ext uri="{FF2B5EF4-FFF2-40B4-BE49-F238E27FC236}">
+                <a16:creationId xmlns:a16="http://schemas.microsoft.com/office/drawing/2014/main" id="{9059C4E3-239F-4824-8C5A-1858ACB1C26E}"/>
+              </a:ext>
+            </a:extLst>
+          </p:cNvPr>
+          <p:cNvSpPr/>
+          <p:nvPr/>
+        </p:nvSpPr>
+        <p:spPr>
+          <a:xfrm>
+            <a:off x="310896" y="5614416"/>
+            <a:ext cx="2450592" cy="950976"/>
+          </a:xfrm>
+          <a:prstGeom prst="rect">
+            <a:avLst/>
+          </a:prstGeom>
+        </p:spPr>
+        <p:style>
+          <a:lnRef idx="2">
+            <a:schemeClr val="dk1"/>
+          </a:lnRef>
+          <a:fillRef idx="1">
+            <a:schemeClr val="lt1"/>
+          </a:fillRef>
+          <a:effectRef idx="0">
+            <a:schemeClr val="dk1"/>
+          </a:effectRef>
+          <a:fontRef idx="minor">
+            <a:schemeClr val="dk1"/>
+          </a:fontRef>
+        </p:style>
+        <p:txBody>
+          <a:bodyPr rtlCol="0" anchor="ctr"/>
+          <a:lstStyle/>
+          <a:p>
+            <a:pPr algn="ctr"/>
+            <a:r>
+              <a:rPr lang="es-MX" dirty="0"/>
+              <a:t>Nombre/Logo del Grupo</a:t>
+            </a:r>
+            <a:endParaRPr lang="es-PE" dirty="0"/>
+          </a:p>
+        </p:txBody>
+      </p:sp>
+      <p:sp>
+        <p:nvSpPr>
+          <p:cNvPr id="10" name="Rectángulo 9">
+            <a:extLst>
+              <a:ext uri="{FF2B5EF4-FFF2-40B4-BE49-F238E27FC236}">
+                <a16:creationId xmlns:a16="http://schemas.microsoft.com/office/drawing/2014/main" id="{CE6F6AAA-080D-4FC6-88FA-3EBC4C0CD8F6}"/>
+              </a:ext>
+            </a:extLst>
+          </p:cNvPr>
+          <p:cNvSpPr/>
+          <p:nvPr/>
+        </p:nvSpPr>
+        <p:spPr>
+          <a:xfrm>
+            <a:off x="10049256" y="5614416"/>
+            <a:ext cx="1627632" cy="950976"/>
+          </a:xfrm>
+          <a:prstGeom prst="rect">
+            <a:avLst/>
+          </a:prstGeom>
+        </p:spPr>
+        <p:style>
+          <a:lnRef idx="2">
+            <a:schemeClr val="dk1"/>
+          </a:lnRef>
+          <a:fillRef idx="1">
+            <a:schemeClr val="lt1"/>
+          </a:fillRef>
+          <a:effectRef idx="0">
+            <a:schemeClr val="dk1"/>
+          </a:effectRef>
+          <a:fontRef idx="minor">
+            <a:schemeClr val="dk1"/>
+          </a:fontRef>
+        </p:style>
+        <p:txBody>
+          <a:bodyPr rtlCol="0" anchor="ctr"/>
+          <a:lstStyle/>
+          <a:p>
+            <a:pPr algn="ctr"/>
+            <a:r>
+              <a:rPr lang="es-MX" sz="1100" dirty="0"/>
+              <a:t>Integrantes</a:t>
+            </a:r>
+            <a:endParaRPr lang="es-PE" sz="1100" dirty="0"/>
+          </a:p>
+        </p:txBody>
+      </p:sp>
+      <p:sp>
+        <p:nvSpPr>
+          <p:cNvPr id="11" name="Rectángulo 10">
+            <a:extLst>
+              <a:ext uri="{FF2B5EF4-FFF2-40B4-BE49-F238E27FC236}">
+                <a16:creationId xmlns:a16="http://schemas.microsoft.com/office/drawing/2014/main" id="{2D34766E-3CC0-47DF-87DC-62FB893F3931}"/>
+              </a:ext>
+            </a:extLst>
+          </p:cNvPr>
+          <p:cNvSpPr/>
+          <p:nvPr/>
+        </p:nvSpPr>
+        <p:spPr>
+          <a:xfrm>
+            <a:off x="5506974" y="5925312"/>
+            <a:ext cx="3790188" cy="320040"/>
+          </a:xfrm>
+          <a:prstGeom prst="rect">
+            <a:avLst/>
+          </a:prstGeom>
+        </p:spPr>
+        <p:style>
+          <a:lnRef idx="2">
+            <a:schemeClr val="dk1"/>
+          </a:lnRef>
+          <a:fillRef idx="1">
+            <a:schemeClr val="lt1"/>
+          </a:fillRef>
+          <a:effectRef idx="0">
+            <a:schemeClr val="dk1"/>
+          </a:effectRef>
+          <a:fontRef idx="minor">
+            <a:schemeClr val="dk1"/>
+          </a:fontRef>
+        </p:style>
+        <p:txBody>
+          <a:bodyPr rtlCol="0" anchor="ctr"/>
+          <a:lstStyle/>
+          <a:p>
+            <a:pPr algn="ctr"/>
+            <a:r>
+              <a:rPr lang="es-PE" sz="1100" dirty="0"/>
+              <a:t>2022 - Nombre® - Todos los derechos reservados</a:t>
+            </a:r>
+          </a:p>
+        </p:txBody>
+      </p:sp>
+      <p:sp>
+        <p:nvSpPr>
+          <p:cNvPr id="12" name="Rectángulo 11">
+            <a:extLst>
+              <a:ext uri="{FF2B5EF4-FFF2-40B4-BE49-F238E27FC236}">
+                <a16:creationId xmlns:a16="http://schemas.microsoft.com/office/drawing/2014/main" id="{5E86E855-05F8-45D1-998F-FD3B01DB39A2}"/>
+              </a:ext>
+            </a:extLst>
+          </p:cNvPr>
+          <p:cNvSpPr/>
+          <p:nvPr/>
+        </p:nvSpPr>
+        <p:spPr>
+          <a:xfrm>
+            <a:off x="2889504" y="5614416"/>
+            <a:ext cx="1865376" cy="420624"/>
+          </a:xfrm>
+          <a:prstGeom prst="rect">
+            <a:avLst/>
+          </a:prstGeom>
+        </p:spPr>
+        <p:style>
+          <a:lnRef idx="2">
+            <a:schemeClr val="dk1"/>
+          </a:lnRef>
+          <a:fillRef idx="1">
+            <a:schemeClr val="lt1"/>
+          </a:fillRef>
+          <a:effectRef idx="0">
+            <a:schemeClr val="dk1"/>
+          </a:effectRef>
+          <a:fontRef idx="minor">
+            <a:schemeClr val="dk1"/>
+          </a:fontRef>
+        </p:style>
+        <p:txBody>
+          <a:bodyPr rtlCol="0" anchor="ctr"/>
+          <a:lstStyle/>
+          <a:p>
+            <a:pPr algn="ctr"/>
+            <a:r>
+              <a:rPr lang="es-PE" sz="1100" dirty="0"/>
+              <a:t>Nosotros</a:t>
+            </a:r>
+          </a:p>
+        </p:txBody>
+      </p:sp>
+      <p:sp>
+        <p:nvSpPr>
+          <p:cNvPr id="13" name="Rectángulo 12">
+            <a:extLst>
+              <a:ext uri="{FF2B5EF4-FFF2-40B4-BE49-F238E27FC236}">
+                <a16:creationId xmlns:a16="http://schemas.microsoft.com/office/drawing/2014/main" id="{BAE1FAEE-ABB3-4846-BC1C-59A39C7AD0AB}"/>
+              </a:ext>
+            </a:extLst>
+          </p:cNvPr>
+          <p:cNvSpPr/>
+          <p:nvPr/>
+        </p:nvSpPr>
+        <p:spPr>
+          <a:xfrm>
+            <a:off x="2889504" y="6144768"/>
+            <a:ext cx="1865376" cy="425196"/>
+          </a:xfrm>
+          <a:prstGeom prst="rect">
+            <a:avLst/>
+          </a:prstGeom>
+        </p:spPr>
+        <p:style>
+          <a:lnRef idx="2">
+            <a:schemeClr val="dk1"/>
+          </a:lnRef>
+          <a:fillRef idx="1">
+            <a:schemeClr val="lt1"/>
+          </a:fillRef>
+          <a:effectRef idx="0">
+            <a:schemeClr val="dk1"/>
+          </a:effectRef>
+          <a:fontRef idx="minor">
+            <a:schemeClr val="dk1"/>
+          </a:fontRef>
+        </p:style>
+        <p:txBody>
+          <a:bodyPr rtlCol="0" anchor="ctr"/>
+          <a:lstStyle/>
+          <a:p>
+            <a:pPr algn="ctr"/>
+            <a:r>
+              <a:rPr lang="es-PE" sz="1100" dirty="0"/>
+              <a:t>Términos y Condiciones</a:t>
+            </a:r>
+          </a:p>
+        </p:txBody>
+      </p:sp>
+      <p:pic>
+        <p:nvPicPr>
+          <p:cNvPr id="15" name="Imagen 14">
+            <a:extLst>
+              <a:ext uri="{FF2B5EF4-FFF2-40B4-BE49-F238E27FC236}">
+                <a16:creationId xmlns:a16="http://schemas.microsoft.com/office/drawing/2014/main" id="{9FDC9738-CB10-40E9-8DA4-2EB99AA45EE1}"/>
+              </a:ext>
+            </a:extLst>
+          </p:cNvPr>
+          <p:cNvPicPr>
+            <a:picLocks noChangeAspect="1"/>
+          </p:cNvPicPr>
+          <p:nvPr/>
+        </p:nvPicPr>
+        <p:blipFill>
+          <a:blip r:embed="rId2"/>
+          <a:stretch>
+            <a:fillRect/>
+          </a:stretch>
+        </p:blipFill>
+        <p:spPr>
+          <a:xfrm>
+            <a:off x="1955260" y="1514417"/>
+            <a:ext cx="8388024" cy="3670231"/>
+          </a:xfrm>
+          <a:prstGeom prst="rect">
+            <a:avLst/>
+          </a:prstGeom>
+        </p:spPr>
+      </p:pic>
+    </p:spTree>
+    <p:extLst>
+      <p:ext uri="{BB962C8B-B14F-4D97-AF65-F5344CB8AC3E}">
+        <p14:creationId xmlns:p14="http://schemas.microsoft.com/office/powerpoint/2010/main" val="2340287123"/>
+      </p:ext>
+    </p:extLst>
+  </p:cSld>
+  <p:clrMapOvr>
+    <a:masterClrMapping/>
+  </p:clrMapOvr>
+</p:sld>
+</file>
+
+<file path=ppt/slides/slide32.xml><?xml version="1.0" encoding="utf-8"?>
+<p:sld xmlns:a="http://schemas.openxmlformats.org/drawingml/2006/main" xmlns:r="http://schemas.openxmlformats.org/officeDocument/2006/relationships" xmlns:p="http://schemas.openxmlformats.org/presentationml/2006/main">
+  <p:cSld>
+    <p:spTree>
+      <p:nvGrpSpPr>
+        <p:cNvPr id="1" name=""/>
+        <p:cNvGrpSpPr/>
+        <p:nvPr/>
+      </p:nvGrpSpPr>
+      <p:grpSpPr>
+        <a:xfrm>
+          <a:off x="0" y="0"/>
+          <a:ext cx="0" cy="0"/>
+          <a:chOff x="0" y="0"/>
+          <a:chExt cx="0" cy="0"/>
+        </a:xfrm>
+      </p:grpSpPr>
+      <p:sp>
+        <p:nvSpPr>
+          <p:cNvPr id="4" name="Rectángulo 3">
+            <a:extLst>
+              <a:ext uri="{FF2B5EF4-FFF2-40B4-BE49-F238E27FC236}">
+                <a16:creationId xmlns:a16="http://schemas.microsoft.com/office/drawing/2014/main" id="{7D0C1056-F063-4295-9589-100A21F99782}"/>
+              </a:ext>
+            </a:extLst>
+          </p:cNvPr>
+          <p:cNvSpPr/>
+          <p:nvPr/>
+        </p:nvSpPr>
+        <p:spPr>
+          <a:xfrm>
+            <a:off x="182880" y="182880"/>
+            <a:ext cx="11695176" cy="1124712"/>
+          </a:xfrm>
+          <a:prstGeom prst="rect">
+            <a:avLst/>
+          </a:prstGeom>
+        </p:spPr>
+        <p:style>
+          <a:lnRef idx="2">
+            <a:schemeClr val="dk1"/>
+          </a:lnRef>
+          <a:fillRef idx="1">
+            <a:schemeClr val="lt1"/>
+          </a:fillRef>
+          <a:effectRef idx="0">
+            <a:schemeClr val="dk1"/>
+          </a:effectRef>
+          <a:fontRef idx="minor">
+            <a:schemeClr val="dk1"/>
+          </a:fontRef>
+        </p:style>
+        <p:txBody>
+          <a:bodyPr rtlCol="0" anchor="ctr"/>
+          <a:lstStyle/>
+          <a:p>
+            <a:pPr algn="ctr"/>
+            <a:endParaRPr lang="es-PE"/>
+          </a:p>
+        </p:txBody>
+      </p:sp>
+      <p:sp>
+        <p:nvSpPr>
+          <p:cNvPr id="5" name="Rectángulo 4">
+            <a:extLst>
+              <a:ext uri="{FF2B5EF4-FFF2-40B4-BE49-F238E27FC236}">
+                <a16:creationId xmlns:a16="http://schemas.microsoft.com/office/drawing/2014/main" id="{FB0592F0-31E3-4A12-9D00-8202A4B8AF40}"/>
+              </a:ext>
+            </a:extLst>
+          </p:cNvPr>
+          <p:cNvSpPr/>
+          <p:nvPr/>
+        </p:nvSpPr>
+        <p:spPr>
+          <a:xfrm>
+            <a:off x="182880" y="1417320"/>
+            <a:ext cx="11695176" cy="3968496"/>
+          </a:xfrm>
+          <a:prstGeom prst="rect">
+            <a:avLst/>
+          </a:prstGeom>
+        </p:spPr>
+        <p:style>
+          <a:lnRef idx="2">
+            <a:schemeClr val="dk1"/>
+          </a:lnRef>
+          <a:fillRef idx="1">
+            <a:schemeClr val="lt1"/>
+          </a:fillRef>
+          <a:effectRef idx="0">
+            <a:schemeClr val="dk1"/>
+          </a:effectRef>
+          <a:fontRef idx="minor">
+            <a:schemeClr val="dk1"/>
+          </a:fontRef>
+        </p:style>
+        <p:txBody>
+          <a:bodyPr rtlCol="0" anchor="ctr"/>
+          <a:lstStyle/>
+          <a:p>
+            <a:pPr algn="ctr"/>
+            <a:endParaRPr lang="es-PE"/>
+          </a:p>
+        </p:txBody>
+      </p:sp>
+      <p:sp>
+        <p:nvSpPr>
+          <p:cNvPr id="6" name="Rectángulo 5">
+            <a:extLst>
+              <a:ext uri="{FF2B5EF4-FFF2-40B4-BE49-F238E27FC236}">
+                <a16:creationId xmlns:a16="http://schemas.microsoft.com/office/drawing/2014/main" id="{15921A5A-FAF3-418A-99AE-B7FC9DD7959F}"/>
+              </a:ext>
+            </a:extLst>
+          </p:cNvPr>
+          <p:cNvSpPr/>
+          <p:nvPr/>
+        </p:nvSpPr>
+        <p:spPr>
+          <a:xfrm>
+            <a:off x="182880" y="5495544"/>
+            <a:ext cx="11695176" cy="1179576"/>
+          </a:xfrm>
+          <a:prstGeom prst="rect">
+            <a:avLst/>
+          </a:prstGeom>
+        </p:spPr>
+        <p:style>
+          <a:lnRef idx="2">
+            <a:schemeClr val="dk1"/>
+          </a:lnRef>
+          <a:fillRef idx="1">
+            <a:schemeClr val="lt1"/>
+          </a:fillRef>
+          <a:effectRef idx="0">
+            <a:schemeClr val="dk1"/>
+          </a:effectRef>
+          <a:fontRef idx="minor">
+            <a:schemeClr val="dk1"/>
+          </a:fontRef>
+        </p:style>
+        <p:txBody>
+          <a:bodyPr rtlCol="0" anchor="ctr"/>
+          <a:lstStyle/>
+          <a:p>
+            <a:pPr algn="ctr"/>
+            <a:endParaRPr lang="es-PE"/>
+          </a:p>
+        </p:txBody>
+      </p:sp>
+      <p:sp>
+        <p:nvSpPr>
+          <p:cNvPr id="7" name="Rectángulo 6">
+            <a:extLst>
+              <a:ext uri="{FF2B5EF4-FFF2-40B4-BE49-F238E27FC236}">
+                <a16:creationId xmlns:a16="http://schemas.microsoft.com/office/drawing/2014/main" id="{9A05CB20-1A4C-44A9-BCFA-BACA053BB6D0}"/>
+              </a:ext>
+            </a:extLst>
+          </p:cNvPr>
+          <p:cNvSpPr/>
+          <p:nvPr/>
+        </p:nvSpPr>
+        <p:spPr>
+          <a:xfrm>
+            <a:off x="310896" y="292608"/>
+            <a:ext cx="2816352" cy="905256"/>
+          </a:xfrm>
+          <a:prstGeom prst="rect">
+            <a:avLst/>
+          </a:prstGeom>
+        </p:spPr>
+        <p:style>
+          <a:lnRef idx="2">
+            <a:schemeClr val="dk1"/>
+          </a:lnRef>
+          <a:fillRef idx="1">
+            <a:schemeClr val="lt1"/>
+          </a:fillRef>
+          <a:effectRef idx="0">
+            <a:schemeClr val="dk1"/>
+          </a:effectRef>
+          <a:fontRef idx="minor">
+            <a:schemeClr val="dk1"/>
+          </a:fontRef>
+        </p:style>
+        <p:txBody>
+          <a:bodyPr rtlCol="0" anchor="ctr"/>
+          <a:lstStyle/>
+          <a:p>
+            <a:pPr algn="ctr"/>
+            <a:r>
+              <a:rPr lang="es-PE" dirty="0"/>
+              <a:t>Logo </a:t>
+            </a:r>
+            <a:r>
+              <a:rPr lang="es-PE" dirty="0" err="1"/>
+              <a:t>Crypto</a:t>
+            </a:r>
+            <a:r>
+              <a:rPr lang="es-PE" dirty="0"/>
+              <a:t>-nita</a:t>
+            </a:r>
+          </a:p>
+        </p:txBody>
+      </p:sp>
+      <p:sp>
+        <p:nvSpPr>
+          <p:cNvPr id="9" name="Rectángulo 8">
+            <a:extLst>
+              <a:ext uri="{FF2B5EF4-FFF2-40B4-BE49-F238E27FC236}">
+                <a16:creationId xmlns:a16="http://schemas.microsoft.com/office/drawing/2014/main" id="{9059C4E3-239F-4824-8C5A-1858ACB1C26E}"/>
+              </a:ext>
+            </a:extLst>
+          </p:cNvPr>
+          <p:cNvSpPr/>
+          <p:nvPr/>
+        </p:nvSpPr>
+        <p:spPr>
+          <a:xfrm>
+            <a:off x="310896" y="5614416"/>
+            <a:ext cx="2450592" cy="950976"/>
+          </a:xfrm>
+          <a:prstGeom prst="rect">
+            <a:avLst/>
+          </a:prstGeom>
+        </p:spPr>
+        <p:style>
+          <a:lnRef idx="2">
+            <a:schemeClr val="dk1"/>
+          </a:lnRef>
+          <a:fillRef idx="1">
+            <a:schemeClr val="lt1"/>
+          </a:fillRef>
+          <a:effectRef idx="0">
+            <a:schemeClr val="dk1"/>
+          </a:effectRef>
+          <a:fontRef idx="minor">
+            <a:schemeClr val="dk1"/>
+          </a:fontRef>
+        </p:style>
+        <p:txBody>
+          <a:bodyPr rtlCol="0" anchor="ctr"/>
+          <a:lstStyle/>
+          <a:p>
+            <a:pPr algn="ctr"/>
+            <a:r>
+              <a:rPr lang="es-MX" dirty="0"/>
+              <a:t>Nombre/Logo del Grupo</a:t>
+            </a:r>
+            <a:endParaRPr lang="es-PE" dirty="0"/>
+          </a:p>
+        </p:txBody>
+      </p:sp>
+      <p:sp>
+        <p:nvSpPr>
+          <p:cNvPr id="10" name="Rectángulo 9">
+            <a:extLst>
+              <a:ext uri="{FF2B5EF4-FFF2-40B4-BE49-F238E27FC236}">
+                <a16:creationId xmlns:a16="http://schemas.microsoft.com/office/drawing/2014/main" id="{CE6F6AAA-080D-4FC6-88FA-3EBC4C0CD8F6}"/>
+              </a:ext>
+            </a:extLst>
+          </p:cNvPr>
+          <p:cNvSpPr/>
+          <p:nvPr/>
+        </p:nvSpPr>
+        <p:spPr>
+          <a:xfrm>
+            <a:off x="10049256" y="5614416"/>
+            <a:ext cx="1627632" cy="950976"/>
+          </a:xfrm>
+          <a:prstGeom prst="rect">
+            <a:avLst/>
+          </a:prstGeom>
+        </p:spPr>
+        <p:style>
+          <a:lnRef idx="2">
+            <a:schemeClr val="dk1"/>
+          </a:lnRef>
+          <a:fillRef idx="1">
+            <a:schemeClr val="lt1"/>
+          </a:fillRef>
+          <a:effectRef idx="0">
+            <a:schemeClr val="dk1"/>
+          </a:effectRef>
+          <a:fontRef idx="minor">
+            <a:schemeClr val="dk1"/>
+          </a:fontRef>
+        </p:style>
+        <p:txBody>
+          <a:bodyPr rtlCol="0" anchor="ctr"/>
+          <a:lstStyle/>
+          <a:p>
+            <a:pPr algn="ctr"/>
+            <a:r>
+              <a:rPr lang="es-MX" sz="1100" dirty="0"/>
+              <a:t>Integrantes</a:t>
+            </a:r>
+            <a:endParaRPr lang="es-PE" sz="1100" dirty="0"/>
+          </a:p>
+        </p:txBody>
+      </p:sp>
+      <p:sp>
+        <p:nvSpPr>
+          <p:cNvPr id="11" name="Rectángulo 10">
+            <a:extLst>
+              <a:ext uri="{FF2B5EF4-FFF2-40B4-BE49-F238E27FC236}">
+                <a16:creationId xmlns:a16="http://schemas.microsoft.com/office/drawing/2014/main" id="{2D34766E-3CC0-47DF-87DC-62FB893F3931}"/>
+              </a:ext>
+            </a:extLst>
+          </p:cNvPr>
+          <p:cNvSpPr/>
+          <p:nvPr/>
+        </p:nvSpPr>
+        <p:spPr>
+          <a:xfrm>
+            <a:off x="5506974" y="5925312"/>
+            <a:ext cx="3790188" cy="320040"/>
+          </a:xfrm>
+          <a:prstGeom prst="rect">
+            <a:avLst/>
+          </a:prstGeom>
+        </p:spPr>
+        <p:style>
+          <a:lnRef idx="2">
+            <a:schemeClr val="dk1"/>
+          </a:lnRef>
+          <a:fillRef idx="1">
+            <a:schemeClr val="lt1"/>
+          </a:fillRef>
+          <a:effectRef idx="0">
+            <a:schemeClr val="dk1"/>
+          </a:effectRef>
+          <a:fontRef idx="minor">
+            <a:schemeClr val="dk1"/>
+          </a:fontRef>
+        </p:style>
+        <p:txBody>
+          <a:bodyPr rtlCol="0" anchor="ctr"/>
+          <a:lstStyle/>
+          <a:p>
+            <a:pPr algn="ctr"/>
+            <a:r>
+              <a:rPr lang="es-PE" sz="1100" dirty="0"/>
+              <a:t>2022 - Nombre® - Todos los derechos reservados</a:t>
+            </a:r>
+          </a:p>
+        </p:txBody>
+      </p:sp>
+      <p:sp>
+        <p:nvSpPr>
+          <p:cNvPr id="12" name="Rectángulo 11">
+            <a:extLst>
+              <a:ext uri="{FF2B5EF4-FFF2-40B4-BE49-F238E27FC236}">
+                <a16:creationId xmlns:a16="http://schemas.microsoft.com/office/drawing/2014/main" id="{5E86E855-05F8-45D1-998F-FD3B01DB39A2}"/>
+              </a:ext>
+            </a:extLst>
+          </p:cNvPr>
+          <p:cNvSpPr/>
+          <p:nvPr/>
+        </p:nvSpPr>
+        <p:spPr>
+          <a:xfrm>
+            <a:off x="2889504" y="5614416"/>
+            <a:ext cx="1865376" cy="420624"/>
+          </a:xfrm>
+          <a:prstGeom prst="rect">
+            <a:avLst/>
+          </a:prstGeom>
+        </p:spPr>
+        <p:style>
+          <a:lnRef idx="2">
+            <a:schemeClr val="dk1"/>
+          </a:lnRef>
+          <a:fillRef idx="1">
+            <a:schemeClr val="lt1"/>
+          </a:fillRef>
+          <a:effectRef idx="0">
+            <a:schemeClr val="dk1"/>
+          </a:effectRef>
+          <a:fontRef idx="minor">
+            <a:schemeClr val="dk1"/>
+          </a:fontRef>
+        </p:style>
+        <p:txBody>
+          <a:bodyPr rtlCol="0" anchor="ctr"/>
+          <a:lstStyle/>
+          <a:p>
+            <a:pPr algn="ctr"/>
+            <a:r>
+              <a:rPr lang="es-PE" sz="1100" dirty="0"/>
+              <a:t>Nosotros</a:t>
+            </a:r>
+          </a:p>
+        </p:txBody>
+      </p:sp>
+      <p:sp>
+        <p:nvSpPr>
+          <p:cNvPr id="13" name="Rectángulo 12">
+            <a:extLst>
+              <a:ext uri="{FF2B5EF4-FFF2-40B4-BE49-F238E27FC236}">
+                <a16:creationId xmlns:a16="http://schemas.microsoft.com/office/drawing/2014/main" id="{BAE1FAEE-ABB3-4846-BC1C-59A39C7AD0AB}"/>
+              </a:ext>
+            </a:extLst>
+          </p:cNvPr>
+          <p:cNvSpPr/>
+          <p:nvPr/>
+        </p:nvSpPr>
+        <p:spPr>
+          <a:xfrm>
+            <a:off x="2889504" y="6144768"/>
+            <a:ext cx="1865376" cy="425196"/>
+          </a:xfrm>
+          <a:prstGeom prst="rect">
+            <a:avLst/>
+          </a:prstGeom>
+        </p:spPr>
+        <p:style>
+          <a:lnRef idx="2">
+            <a:schemeClr val="dk1"/>
+          </a:lnRef>
+          <a:fillRef idx="1">
+            <a:schemeClr val="lt1"/>
+          </a:fillRef>
+          <a:effectRef idx="0">
+            <a:schemeClr val="dk1"/>
+          </a:effectRef>
+          <a:fontRef idx="minor">
+            <a:schemeClr val="dk1"/>
+          </a:fontRef>
+        </p:style>
+        <p:txBody>
+          <a:bodyPr rtlCol="0" anchor="ctr"/>
+          <a:lstStyle/>
+          <a:p>
+            <a:pPr algn="ctr"/>
+            <a:r>
+              <a:rPr lang="es-PE" sz="1100" dirty="0"/>
+              <a:t>Términos y Condiciones</a:t>
+            </a:r>
+          </a:p>
+        </p:txBody>
+      </p:sp>
+      <p:pic>
+        <p:nvPicPr>
+          <p:cNvPr id="3" name="Imagen 2">
+            <a:extLst>
+              <a:ext uri="{FF2B5EF4-FFF2-40B4-BE49-F238E27FC236}">
+                <a16:creationId xmlns:a16="http://schemas.microsoft.com/office/drawing/2014/main" id="{0A69AA1E-C19E-48CC-89EC-EE9A9B27B255}"/>
+              </a:ext>
+            </a:extLst>
+          </p:cNvPr>
+          <p:cNvPicPr>
+            <a:picLocks noChangeAspect="1"/>
+          </p:cNvPicPr>
+          <p:nvPr/>
+        </p:nvPicPr>
+        <p:blipFill>
+          <a:blip r:embed="rId2"/>
+          <a:stretch>
+            <a:fillRect/>
+          </a:stretch>
+        </p:blipFill>
+        <p:spPr>
+          <a:xfrm>
+            <a:off x="3910492" y="1490379"/>
+            <a:ext cx="4371016" cy="3822378"/>
+          </a:xfrm>
+          <a:prstGeom prst="rect">
+            <a:avLst/>
+          </a:prstGeom>
+        </p:spPr>
+      </p:pic>
+    </p:spTree>
+    <p:extLst>
+      <p:ext uri="{BB962C8B-B14F-4D97-AF65-F5344CB8AC3E}">
+        <p14:creationId xmlns:p14="http://schemas.microsoft.com/office/powerpoint/2010/main" val="4198060686"/>
       </p:ext>
     </p:extLst>
   </p:cSld>

</xml_diff>